<commit_message>
Recovered theory page changes
</commit_message>
<xml_diff>
--- a/Assets/Powerpoints/AC Voltage Controller.pptx
+++ b/Assets/Powerpoints/AC Voltage Controller.pptx
@@ -10,6 +10,7 @@
     <p:sldId id="262" r:id="rId4"/>
     <p:sldId id="261" r:id="rId5"/>
     <p:sldId id="263" r:id="rId6"/>
+    <p:sldId id="264" r:id="rId7"/>
   </p:sldIdLst>
   <p:sldSz cx="12192000" cy="6858000"/>
   <p:notesSz cx="6858000" cy="9144000"/>
@@ -13855,8 +13856,8 @@
             </a:p>
           </p:txBody>
         </p:sp>
-        <mc:AlternateContent xmlns:mc="http://schemas.openxmlformats.org/markup-compatibility/2006">
-          <mc:Choice xmlns:a14="http://schemas.microsoft.com/office/drawing/2010/main" Requires="a14">
+        <mc:AlternateContent xmlns:mc="http://schemas.openxmlformats.org/markup-compatibility/2006" xmlns:a14="http://schemas.microsoft.com/office/drawing/2010/main">
+          <mc:Choice Requires="a14">
             <p:sp>
               <p:nvSpPr>
                 <p:cNvPr id="11" name="TextBox 10">
@@ -13912,7 +13913,7 @@
               </p:txBody>
             </p:sp>
           </mc:Choice>
-          <mc:Fallback>
+          <mc:Fallback xmlns="">
             <p:sp>
               <p:nvSpPr>
                 <p:cNvPr id="11" name="TextBox 10">
@@ -13957,8 +13958,8 @@
             </p:sp>
           </mc:Fallback>
         </mc:AlternateContent>
-        <mc:AlternateContent xmlns:mc="http://schemas.openxmlformats.org/markup-compatibility/2006">
-          <mc:Choice xmlns:a14="http://schemas.microsoft.com/office/drawing/2010/main" Requires="a14">
+        <mc:AlternateContent xmlns:mc="http://schemas.openxmlformats.org/markup-compatibility/2006" xmlns:a14="http://schemas.microsoft.com/office/drawing/2010/main">
+          <mc:Choice Requires="a14">
             <p:sp>
               <p:nvSpPr>
                 <p:cNvPr id="12" name="TextBox 11">
@@ -14032,7 +14033,7 @@
               </p:txBody>
             </p:sp>
           </mc:Choice>
-          <mc:Fallback>
+          <mc:Fallback xmlns="">
             <p:sp>
               <p:nvSpPr>
                 <p:cNvPr id="12" name="TextBox 11">
@@ -14126,8 +14127,8 @@
             </a:fontRef>
           </p:style>
         </p:cxnSp>
-        <mc:AlternateContent xmlns:mc="http://schemas.openxmlformats.org/markup-compatibility/2006">
-          <mc:Choice xmlns:a14="http://schemas.microsoft.com/office/drawing/2010/main" Requires="a14">
+        <mc:AlternateContent xmlns:mc="http://schemas.openxmlformats.org/markup-compatibility/2006" xmlns:a14="http://schemas.microsoft.com/office/drawing/2010/main">
+          <mc:Choice Requires="a14">
             <p:sp>
               <p:nvSpPr>
                 <p:cNvPr id="14" name="TextBox 13">
@@ -14221,7 +14222,7 @@
               </p:txBody>
             </p:sp>
           </mc:Choice>
-          <mc:Fallback>
+          <mc:Fallback xmlns="">
             <p:sp>
               <p:nvSpPr>
                 <p:cNvPr id="14" name="TextBox 13">
@@ -14266,8 +14267,8 @@
             </p:sp>
           </mc:Fallback>
         </mc:AlternateContent>
-        <mc:AlternateContent xmlns:mc="http://schemas.openxmlformats.org/markup-compatibility/2006">
-          <mc:Choice xmlns:a14="http://schemas.microsoft.com/office/drawing/2010/main" Requires="a14">
+        <mc:AlternateContent xmlns:mc="http://schemas.openxmlformats.org/markup-compatibility/2006" xmlns:a14="http://schemas.microsoft.com/office/drawing/2010/main">
+          <mc:Choice Requires="a14">
             <p:sp>
               <p:nvSpPr>
                 <p:cNvPr id="15" name="TextBox 14">
@@ -14331,7 +14332,7 @@
               </p:txBody>
             </p:sp>
           </mc:Choice>
-          <mc:Fallback>
+          <mc:Fallback xmlns="">
             <p:sp>
               <p:nvSpPr>
                 <p:cNvPr id="15" name="TextBox 14">
@@ -14376,8 +14377,8 @@
             </p:sp>
           </mc:Fallback>
         </mc:AlternateContent>
-        <mc:AlternateContent xmlns:mc="http://schemas.openxmlformats.org/markup-compatibility/2006">
-          <mc:Choice xmlns:a14="http://schemas.microsoft.com/office/drawing/2010/main" Requires="a14">
+        <mc:AlternateContent xmlns:mc="http://schemas.openxmlformats.org/markup-compatibility/2006" xmlns:a14="http://schemas.microsoft.com/office/drawing/2010/main">
+          <mc:Choice Requires="a14">
             <p:sp>
               <p:nvSpPr>
                 <p:cNvPr id="16" name="TextBox 15">
@@ -14480,7 +14481,7 @@
               </p:txBody>
             </p:sp>
           </mc:Choice>
-          <mc:Fallback>
+          <mc:Fallback xmlns="">
             <p:sp>
               <p:nvSpPr>
                 <p:cNvPr id="16" name="TextBox 15">
@@ -14574,8 +14575,8 @@
             </a:fontRef>
           </p:style>
         </p:cxnSp>
-        <mc:AlternateContent xmlns:mc="http://schemas.openxmlformats.org/markup-compatibility/2006">
-          <mc:Choice xmlns:a14="http://schemas.microsoft.com/office/drawing/2010/main" Requires="a14">
+        <mc:AlternateContent xmlns:mc="http://schemas.openxmlformats.org/markup-compatibility/2006" xmlns:a14="http://schemas.microsoft.com/office/drawing/2010/main">
+          <mc:Choice Requires="a14">
             <p:sp>
               <p:nvSpPr>
                 <p:cNvPr id="24" name="TextBox 23">
@@ -14682,7 +14683,7 @@
               </p:txBody>
             </p:sp>
           </mc:Choice>
-          <mc:Fallback>
+          <mc:Fallback xmlns="">
             <p:sp>
               <p:nvSpPr>
                 <p:cNvPr id="24" name="TextBox 23">
@@ -15117,8 +15118,8 @@
           </a:p>
         </p:txBody>
       </p:sp>
-      <mc:AlternateContent xmlns:mc="http://schemas.openxmlformats.org/markup-compatibility/2006">
-        <mc:Choice xmlns:a14="http://schemas.microsoft.com/office/drawing/2010/main" Requires="a14">
+      <mc:AlternateContent xmlns:mc="http://schemas.openxmlformats.org/markup-compatibility/2006" xmlns:a14="http://schemas.microsoft.com/office/drawing/2010/main">
+        <mc:Choice Requires="a14">
           <p:sp>
             <p:nvSpPr>
               <p:cNvPr id="11" name="TextBox 10">
@@ -15174,7 +15175,7 @@
             </p:txBody>
           </p:sp>
         </mc:Choice>
-        <mc:Fallback>
+        <mc:Fallback xmlns="">
           <p:sp>
             <p:nvSpPr>
               <p:cNvPr id="11" name="TextBox 10">
@@ -15268,8 +15269,8 @@
           </a:fontRef>
         </p:style>
       </p:cxnSp>
-      <mc:AlternateContent xmlns:mc="http://schemas.openxmlformats.org/markup-compatibility/2006">
-        <mc:Choice xmlns:a14="http://schemas.microsoft.com/office/drawing/2010/main" Requires="a14">
+      <mc:AlternateContent xmlns:mc="http://schemas.openxmlformats.org/markup-compatibility/2006" xmlns:a14="http://schemas.microsoft.com/office/drawing/2010/main">
+        <mc:Choice Requires="a14">
           <p:sp>
             <p:nvSpPr>
               <p:cNvPr id="14" name="TextBox 13">
@@ -15363,7 +15364,7 @@
             </p:txBody>
           </p:sp>
         </mc:Choice>
-        <mc:Fallback>
+        <mc:Fallback xmlns="">
           <p:sp>
             <p:nvSpPr>
               <p:cNvPr id="14" name="TextBox 13">
@@ -15408,8 +15409,8 @@
           </p:sp>
         </mc:Fallback>
       </mc:AlternateContent>
-      <mc:AlternateContent xmlns:mc="http://schemas.openxmlformats.org/markup-compatibility/2006">
-        <mc:Choice xmlns:a14="http://schemas.microsoft.com/office/drawing/2010/main" Requires="a14">
+      <mc:AlternateContent xmlns:mc="http://schemas.openxmlformats.org/markup-compatibility/2006" xmlns:a14="http://schemas.microsoft.com/office/drawing/2010/main">
+        <mc:Choice Requires="a14">
           <p:sp>
             <p:nvSpPr>
               <p:cNvPr id="15" name="TextBox 14">
@@ -15473,7 +15474,7 @@
             </p:txBody>
           </p:sp>
         </mc:Choice>
-        <mc:Fallback>
+        <mc:Fallback xmlns="">
           <p:sp>
             <p:nvSpPr>
               <p:cNvPr id="15" name="TextBox 14">
@@ -15518,8 +15519,8 @@
           </p:sp>
         </mc:Fallback>
       </mc:AlternateContent>
-      <mc:AlternateContent xmlns:mc="http://schemas.openxmlformats.org/markup-compatibility/2006">
-        <mc:Choice xmlns:a14="http://schemas.microsoft.com/office/drawing/2010/main" Requires="a14">
+      <mc:AlternateContent xmlns:mc="http://schemas.openxmlformats.org/markup-compatibility/2006" xmlns:a14="http://schemas.microsoft.com/office/drawing/2010/main">
+        <mc:Choice Requires="a14">
           <p:sp>
             <p:nvSpPr>
               <p:cNvPr id="16" name="TextBox 15">
@@ -15622,7 +15623,7 @@
             </p:txBody>
           </p:sp>
         </mc:Choice>
-        <mc:Fallback>
+        <mc:Fallback xmlns="">
           <p:sp>
             <p:nvSpPr>
               <p:cNvPr id="16" name="TextBox 15">
@@ -15716,8 +15717,8 @@
           </a:fontRef>
         </p:style>
       </p:cxnSp>
-      <mc:AlternateContent xmlns:mc="http://schemas.openxmlformats.org/markup-compatibility/2006">
-        <mc:Choice xmlns:a14="http://schemas.microsoft.com/office/drawing/2010/main" Requires="a14">
+      <mc:AlternateContent xmlns:mc="http://schemas.openxmlformats.org/markup-compatibility/2006" xmlns:a14="http://schemas.microsoft.com/office/drawing/2010/main">
+        <mc:Choice Requires="a14">
           <p:sp>
             <p:nvSpPr>
               <p:cNvPr id="24" name="TextBox 23">
@@ -15824,7 +15825,7 @@
             </p:txBody>
           </p:sp>
         </mc:Choice>
-        <mc:Fallback>
+        <mc:Fallback xmlns="">
           <p:sp>
             <p:nvSpPr>
               <p:cNvPr id="24" name="TextBox 23">
@@ -15978,8 +15979,8 @@
           </a:p>
         </p:txBody>
       </p:sp>
-      <mc:AlternateContent xmlns:mc="http://schemas.openxmlformats.org/markup-compatibility/2006">
-        <mc:Choice xmlns:a14="http://schemas.microsoft.com/office/drawing/2010/main" Requires="a14">
+      <mc:AlternateContent xmlns:mc="http://schemas.openxmlformats.org/markup-compatibility/2006" xmlns:a14="http://schemas.microsoft.com/office/drawing/2010/main">
+        <mc:Choice Requires="a14">
           <p:sp>
             <p:nvSpPr>
               <p:cNvPr id="12" name="TextBox 11">
@@ -16053,7 +16054,7 @@
             </p:txBody>
           </p:sp>
         </mc:Choice>
-        <mc:Fallback>
+        <mc:Fallback xmlns="">
           <p:sp>
             <p:nvSpPr>
               <p:cNvPr id="12" name="TextBox 11">
@@ -16145,6 +16146,3537 @@
     <p:extLst>
       <p:ext uri="{BB962C8B-B14F-4D97-AF65-F5344CB8AC3E}">
         <p14:creationId xmlns:p14="http://schemas.microsoft.com/office/powerpoint/2010/main" val="3305885881"/>
+      </p:ext>
+    </p:extLst>
+  </p:cSld>
+  <p:clrMapOvr>
+    <a:masterClrMapping/>
+  </p:clrMapOvr>
+</p:sld>
+</file>
+
+<file path=ppt/slides/slide6.xml><?xml version="1.0" encoding="utf-8"?>
+<p:sld xmlns:a="http://schemas.openxmlformats.org/drawingml/2006/main" xmlns:r="http://schemas.openxmlformats.org/officeDocument/2006/relationships" xmlns:p="http://schemas.openxmlformats.org/presentationml/2006/main">
+  <p:cSld>
+    <p:spTree>
+      <p:nvGrpSpPr>
+        <p:cNvPr id="1" name=""/>
+        <p:cNvGrpSpPr/>
+        <p:nvPr/>
+      </p:nvGrpSpPr>
+      <p:grpSpPr>
+        <a:xfrm>
+          <a:off x="0" y="0"/>
+          <a:ext cx="0" cy="0"/>
+          <a:chOff x="0" y="0"/>
+          <a:chExt cx="0" cy="0"/>
+        </a:xfrm>
+      </p:grpSpPr>
+      <p:cxnSp>
+        <p:nvCxnSpPr>
+          <p:cNvPr id="80" name="Straight Arrow Connector 79">
+            <a:extLst>
+              <a:ext uri="{FF2B5EF4-FFF2-40B4-BE49-F238E27FC236}">
+                <a16:creationId xmlns:a16="http://schemas.microsoft.com/office/drawing/2014/main" id="{B5163AC4-9F87-17BD-D6B6-5105CBB8B405}"/>
+              </a:ext>
+            </a:extLst>
+          </p:cNvPr>
+          <p:cNvCxnSpPr>
+            <a:cxnSpLocks/>
+          </p:cNvCxnSpPr>
+          <p:nvPr/>
+        </p:nvCxnSpPr>
+        <p:spPr>
+          <a:xfrm flipV="1">
+            <a:off x="3971638" y="6369425"/>
+            <a:ext cx="4272405" cy="12713"/>
+          </a:xfrm>
+          <a:prstGeom prst="straightConnector1">
+            <a:avLst/>
+          </a:prstGeom>
+          <a:ln w="38100" cap="flat" cmpd="sng" algn="ctr">
+            <a:solidFill>
+              <a:srgbClr val="00B050"/>
+            </a:solidFill>
+            <a:prstDash val="solid"/>
+            <a:round/>
+            <a:headEnd type="arrow" w="med" len="med"/>
+            <a:tailEnd type="arrow" w="med" len="med"/>
+          </a:ln>
+        </p:spPr>
+        <p:style>
+          <a:lnRef idx="0">
+            <a:scrgbClr r="0" g="0" b="0"/>
+          </a:lnRef>
+          <a:fillRef idx="0">
+            <a:scrgbClr r="0" g="0" b="0"/>
+          </a:fillRef>
+          <a:effectRef idx="0">
+            <a:scrgbClr r="0" g="0" b="0"/>
+          </a:effectRef>
+          <a:fontRef idx="minor">
+            <a:schemeClr val="tx1"/>
+          </a:fontRef>
+        </p:style>
+      </p:cxnSp>
+      <p:cxnSp>
+        <p:nvCxnSpPr>
+          <p:cNvPr id="78" name="Straight Arrow Connector 77">
+            <a:extLst>
+              <a:ext uri="{FF2B5EF4-FFF2-40B4-BE49-F238E27FC236}">
+                <a16:creationId xmlns:a16="http://schemas.microsoft.com/office/drawing/2014/main" id="{8D8B86A2-21A9-BFBF-0300-C0E9F4C0CBA3}"/>
+              </a:ext>
+            </a:extLst>
+          </p:cNvPr>
+          <p:cNvCxnSpPr/>
+          <p:nvPr/>
+        </p:nvCxnSpPr>
+        <p:spPr>
+          <a:xfrm>
+            <a:off x="1056225" y="6382138"/>
+            <a:ext cx="2914251" cy="0"/>
+          </a:xfrm>
+          <a:prstGeom prst="straightConnector1">
+            <a:avLst/>
+          </a:prstGeom>
+          <a:ln w="38100" cap="flat" cmpd="sng" algn="ctr">
+            <a:solidFill>
+              <a:srgbClr val="00B050"/>
+            </a:solidFill>
+            <a:prstDash val="solid"/>
+            <a:round/>
+            <a:headEnd type="arrow" w="med" len="med"/>
+            <a:tailEnd type="arrow" w="med" len="med"/>
+          </a:ln>
+        </p:spPr>
+        <p:style>
+          <a:lnRef idx="0">
+            <a:scrgbClr r="0" g="0" b="0"/>
+          </a:lnRef>
+          <a:fillRef idx="0">
+            <a:scrgbClr r="0" g="0" b="0"/>
+          </a:fillRef>
+          <a:effectRef idx="0">
+            <a:scrgbClr r="0" g="0" b="0"/>
+          </a:effectRef>
+          <a:fontRef idx="minor">
+            <a:schemeClr val="tx1"/>
+          </a:fontRef>
+        </p:style>
+      </p:cxnSp>
+      <p:grpSp>
+        <p:nvGrpSpPr>
+          <p:cNvPr id="76" name="Group 75">
+            <a:extLst>
+              <a:ext uri="{FF2B5EF4-FFF2-40B4-BE49-F238E27FC236}">
+                <a16:creationId xmlns:a16="http://schemas.microsoft.com/office/drawing/2014/main" id="{D3BFB9D8-B3C0-4BD8-939E-CAEA0AA7A694}"/>
+              </a:ext>
+            </a:extLst>
+          </p:cNvPr>
+          <p:cNvGrpSpPr/>
+          <p:nvPr/>
+        </p:nvGrpSpPr>
+        <p:grpSpPr>
+          <a:xfrm>
+            <a:off x="292690" y="485191"/>
+            <a:ext cx="11774570" cy="6115067"/>
+            <a:chOff x="331131" y="677395"/>
+            <a:chExt cx="11774570" cy="6115067"/>
+          </a:xfrm>
+        </p:grpSpPr>
+        <p:cxnSp>
+          <p:nvCxnSpPr>
+            <p:cNvPr id="7" name="Straight Connector 6">
+              <a:extLst>
+                <a:ext uri="{FF2B5EF4-FFF2-40B4-BE49-F238E27FC236}">
+                  <a16:creationId xmlns:a16="http://schemas.microsoft.com/office/drawing/2014/main" id="{9B25D0D1-DCBE-1CD9-B492-57740D5BE4D8}"/>
+                </a:ext>
+              </a:extLst>
+            </p:cNvPr>
+            <p:cNvCxnSpPr>
+              <a:cxnSpLocks/>
+            </p:cNvCxnSpPr>
+            <p:nvPr/>
+          </p:nvCxnSpPr>
+          <p:spPr>
+            <a:xfrm>
+              <a:off x="1037133" y="3429000"/>
+              <a:ext cx="10504834" cy="0"/>
+            </a:xfrm>
+            <a:prstGeom prst="line">
+              <a:avLst/>
+            </a:prstGeom>
+            <a:ln w="28575" cap="flat" cmpd="sng" algn="ctr">
+              <a:solidFill>
+                <a:schemeClr val="tx1"/>
+              </a:solidFill>
+              <a:prstDash val="solid"/>
+              <a:round/>
+              <a:headEnd type="none" w="med" len="med"/>
+              <a:tailEnd type="arrow" w="med" len="med"/>
+            </a:ln>
+          </p:spPr>
+          <p:style>
+            <a:lnRef idx="0">
+              <a:scrgbClr r="0" g="0" b="0"/>
+            </a:lnRef>
+            <a:fillRef idx="0">
+              <a:scrgbClr r="0" g="0" b="0"/>
+            </a:fillRef>
+            <a:effectRef idx="0">
+              <a:scrgbClr r="0" g="0" b="0"/>
+            </a:effectRef>
+            <a:fontRef idx="minor">
+              <a:schemeClr val="tx1"/>
+            </a:fontRef>
+          </p:style>
+        </p:cxnSp>
+        <p:cxnSp>
+          <p:nvCxnSpPr>
+            <p:cNvPr id="8" name="Straight Connector 7">
+              <a:extLst>
+                <a:ext uri="{FF2B5EF4-FFF2-40B4-BE49-F238E27FC236}">
+                  <a16:creationId xmlns:a16="http://schemas.microsoft.com/office/drawing/2014/main" id="{24623D38-4E5D-0720-8106-B3BC56938F87}"/>
+                </a:ext>
+              </a:extLst>
+            </p:cNvPr>
+            <p:cNvCxnSpPr>
+              <a:cxnSpLocks/>
+            </p:cNvCxnSpPr>
+            <p:nvPr/>
+          </p:nvCxnSpPr>
+          <p:spPr>
+            <a:xfrm flipV="1">
+              <a:off x="1058902" y="4130455"/>
+              <a:ext cx="10483065" cy="10782"/>
+            </a:xfrm>
+            <a:prstGeom prst="line">
+              <a:avLst/>
+            </a:prstGeom>
+            <a:ln w="28575" cap="flat" cmpd="sng" algn="ctr">
+              <a:solidFill>
+                <a:schemeClr val="tx1"/>
+              </a:solidFill>
+              <a:prstDash val="solid"/>
+              <a:round/>
+              <a:headEnd type="none" w="med" len="med"/>
+              <a:tailEnd type="arrow" w="med" len="med"/>
+            </a:ln>
+          </p:spPr>
+          <p:style>
+            <a:lnRef idx="0">
+              <a:scrgbClr r="0" g="0" b="0"/>
+            </a:lnRef>
+            <a:fillRef idx="0">
+              <a:scrgbClr r="0" g="0" b="0"/>
+            </a:fillRef>
+            <a:effectRef idx="0">
+              <a:scrgbClr r="0" g="0" b="0"/>
+            </a:effectRef>
+            <a:fontRef idx="minor">
+              <a:schemeClr val="tx1"/>
+            </a:fontRef>
+          </p:style>
+        </p:cxnSp>
+        <p:sp>
+          <p:nvSpPr>
+            <p:cNvPr id="17" name="Freeform: Shape 16">
+              <a:extLst>
+                <a:ext uri="{FF2B5EF4-FFF2-40B4-BE49-F238E27FC236}">
+                  <a16:creationId xmlns:a16="http://schemas.microsoft.com/office/drawing/2014/main" id="{0F72E4E6-4EB4-F439-824E-8FE8A27769E4}"/>
+                </a:ext>
+              </a:extLst>
+            </p:cNvPr>
+            <p:cNvSpPr/>
+            <p:nvPr/>
+          </p:nvSpPr>
+          <p:spPr>
+            <a:xfrm>
+              <a:off x="3971723" y="1280676"/>
+              <a:ext cx="718455" cy="727792"/>
+            </a:xfrm>
+            <a:custGeom>
+              <a:avLst/>
+              <a:gdLst>
+                <a:gd name="connsiteX0" fmla="*/ 0 w 1427584"/>
+                <a:gd name="connsiteY0" fmla="*/ 718462 h 727792"/>
+                <a:gd name="connsiteX1" fmla="*/ 718457 w 1427584"/>
+                <a:gd name="connsiteY1" fmla="*/ 5 h 727792"/>
+                <a:gd name="connsiteX2" fmla="*/ 1427584 w 1427584"/>
+                <a:gd name="connsiteY2" fmla="*/ 727792 h 727792"/>
+              </a:gdLst>
+              <a:ahLst/>
+              <a:cxnLst>
+                <a:cxn ang="0">
+                  <a:pos x="connsiteX0" y="connsiteY0"/>
+                </a:cxn>
+                <a:cxn ang="0">
+                  <a:pos x="connsiteX1" y="connsiteY1"/>
+                </a:cxn>
+                <a:cxn ang="0">
+                  <a:pos x="connsiteX2" y="connsiteY2"/>
+                </a:cxn>
+              </a:cxnLst>
+              <a:rect l="l" t="t" r="r" b="b"/>
+              <a:pathLst>
+                <a:path w="1427584" h="727792">
+                  <a:moveTo>
+                    <a:pt x="0" y="718462"/>
+                  </a:moveTo>
+                  <a:cubicBezTo>
+                    <a:pt x="240263" y="358456"/>
+                    <a:pt x="480526" y="-1550"/>
+                    <a:pt x="718457" y="5"/>
+                  </a:cubicBezTo>
+                  <a:cubicBezTo>
+                    <a:pt x="956388" y="1560"/>
+                    <a:pt x="1191986" y="364676"/>
+                    <a:pt x="1427584" y="727792"/>
+                  </a:cubicBezTo>
+                </a:path>
+              </a:pathLst>
+            </a:custGeom>
+            <a:solidFill>
+              <a:schemeClr val="accent1">
+                <a:lumMod val="20000"/>
+                <a:lumOff val="80000"/>
+              </a:schemeClr>
+            </a:solidFill>
+            <a:ln w="19050"/>
+          </p:spPr>
+          <p:style>
+            <a:lnRef idx="2">
+              <a:schemeClr val="accent1">
+                <a:shade val="50000"/>
+              </a:schemeClr>
+            </a:lnRef>
+            <a:fillRef idx="1">
+              <a:schemeClr val="accent1"/>
+            </a:fillRef>
+            <a:effectRef idx="0">
+              <a:schemeClr val="accent1"/>
+            </a:effectRef>
+            <a:fontRef idx="minor">
+              <a:schemeClr val="lt1"/>
+            </a:fontRef>
+          </p:style>
+          <p:txBody>
+            <a:bodyPr rtlCol="0" anchor="ctr"/>
+            <a:lstStyle/>
+            <a:p>
+              <a:pPr algn="ctr"/>
+              <a:endParaRPr lang="en-IN" dirty="0"/>
+            </a:p>
+          </p:txBody>
+        </p:sp>
+        <p:sp>
+          <p:nvSpPr>
+            <p:cNvPr id="29" name="Freeform: Shape 28">
+              <a:extLst>
+                <a:ext uri="{FF2B5EF4-FFF2-40B4-BE49-F238E27FC236}">
+                  <a16:creationId xmlns:a16="http://schemas.microsoft.com/office/drawing/2014/main" id="{E82EDEFB-B8A8-6A0E-0386-2CA00E4F0C41}"/>
+                </a:ext>
+              </a:extLst>
+            </p:cNvPr>
+            <p:cNvSpPr/>
+            <p:nvPr/>
+          </p:nvSpPr>
+          <p:spPr>
+            <a:xfrm>
+              <a:off x="5410054" y="1271233"/>
+              <a:ext cx="718455" cy="727792"/>
+            </a:xfrm>
+            <a:custGeom>
+              <a:avLst/>
+              <a:gdLst>
+                <a:gd name="connsiteX0" fmla="*/ 0 w 1427584"/>
+                <a:gd name="connsiteY0" fmla="*/ 718462 h 727792"/>
+                <a:gd name="connsiteX1" fmla="*/ 718457 w 1427584"/>
+                <a:gd name="connsiteY1" fmla="*/ 5 h 727792"/>
+                <a:gd name="connsiteX2" fmla="*/ 1427584 w 1427584"/>
+                <a:gd name="connsiteY2" fmla="*/ 727792 h 727792"/>
+              </a:gdLst>
+              <a:ahLst/>
+              <a:cxnLst>
+                <a:cxn ang="0">
+                  <a:pos x="connsiteX0" y="connsiteY0"/>
+                </a:cxn>
+                <a:cxn ang="0">
+                  <a:pos x="connsiteX1" y="connsiteY1"/>
+                </a:cxn>
+                <a:cxn ang="0">
+                  <a:pos x="connsiteX2" y="connsiteY2"/>
+                </a:cxn>
+              </a:cxnLst>
+              <a:rect l="l" t="t" r="r" b="b"/>
+              <a:pathLst>
+                <a:path w="1427584" h="727792">
+                  <a:moveTo>
+                    <a:pt x="0" y="718462"/>
+                  </a:moveTo>
+                  <a:cubicBezTo>
+                    <a:pt x="240263" y="358456"/>
+                    <a:pt x="480526" y="-1550"/>
+                    <a:pt x="718457" y="5"/>
+                  </a:cubicBezTo>
+                  <a:cubicBezTo>
+                    <a:pt x="956388" y="1560"/>
+                    <a:pt x="1191986" y="364676"/>
+                    <a:pt x="1427584" y="727792"/>
+                  </a:cubicBezTo>
+                </a:path>
+              </a:pathLst>
+            </a:custGeom>
+            <a:solidFill>
+              <a:schemeClr val="accent1">
+                <a:lumMod val="20000"/>
+                <a:lumOff val="80000"/>
+              </a:schemeClr>
+            </a:solidFill>
+            <a:ln w="19050"/>
+          </p:spPr>
+          <p:style>
+            <a:lnRef idx="2">
+              <a:schemeClr val="accent1">
+                <a:shade val="50000"/>
+              </a:schemeClr>
+            </a:lnRef>
+            <a:fillRef idx="1">
+              <a:schemeClr val="accent1"/>
+            </a:fillRef>
+            <a:effectRef idx="0">
+              <a:schemeClr val="accent1"/>
+            </a:effectRef>
+            <a:fontRef idx="minor">
+              <a:schemeClr val="lt1"/>
+            </a:fontRef>
+          </p:style>
+          <p:txBody>
+            <a:bodyPr rtlCol="0" anchor="ctr"/>
+            <a:lstStyle/>
+            <a:p>
+              <a:pPr algn="ctr"/>
+              <a:endParaRPr lang="en-IN" dirty="0"/>
+            </a:p>
+          </p:txBody>
+        </p:sp>
+        <p:sp>
+          <p:nvSpPr>
+            <p:cNvPr id="30" name="Freeform: Shape 29">
+              <a:extLst>
+                <a:ext uri="{FF2B5EF4-FFF2-40B4-BE49-F238E27FC236}">
+                  <a16:creationId xmlns:a16="http://schemas.microsoft.com/office/drawing/2014/main" id="{F3DA2093-E2BE-E814-F886-967E14274A2B}"/>
+                </a:ext>
+              </a:extLst>
+            </p:cNvPr>
+            <p:cNvSpPr/>
+            <p:nvPr/>
+          </p:nvSpPr>
+          <p:spPr>
+            <a:xfrm>
+              <a:off x="6840781" y="1257242"/>
+              <a:ext cx="718455" cy="727792"/>
+            </a:xfrm>
+            <a:custGeom>
+              <a:avLst/>
+              <a:gdLst>
+                <a:gd name="connsiteX0" fmla="*/ 0 w 1427584"/>
+                <a:gd name="connsiteY0" fmla="*/ 718462 h 727792"/>
+                <a:gd name="connsiteX1" fmla="*/ 718457 w 1427584"/>
+                <a:gd name="connsiteY1" fmla="*/ 5 h 727792"/>
+                <a:gd name="connsiteX2" fmla="*/ 1427584 w 1427584"/>
+                <a:gd name="connsiteY2" fmla="*/ 727792 h 727792"/>
+              </a:gdLst>
+              <a:ahLst/>
+              <a:cxnLst>
+                <a:cxn ang="0">
+                  <a:pos x="connsiteX0" y="connsiteY0"/>
+                </a:cxn>
+                <a:cxn ang="0">
+                  <a:pos x="connsiteX1" y="connsiteY1"/>
+                </a:cxn>
+                <a:cxn ang="0">
+                  <a:pos x="connsiteX2" y="connsiteY2"/>
+                </a:cxn>
+              </a:cxnLst>
+              <a:rect l="l" t="t" r="r" b="b"/>
+              <a:pathLst>
+                <a:path w="1427584" h="727792">
+                  <a:moveTo>
+                    <a:pt x="0" y="718462"/>
+                  </a:moveTo>
+                  <a:cubicBezTo>
+                    <a:pt x="240263" y="358456"/>
+                    <a:pt x="480526" y="-1550"/>
+                    <a:pt x="718457" y="5"/>
+                  </a:cubicBezTo>
+                  <a:cubicBezTo>
+                    <a:pt x="956388" y="1560"/>
+                    <a:pt x="1191986" y="364676"/>
+                    <a:pt x="1427584" y="727792"/>
+                  </a:cubicBezTo>
+                </a:path>
+              </a:pathLst>
+            </a:custGeom>
+            <a:solidFill>
+              <a:schemeClr val="accent1">
+                <a:lumMod val="20000"/>
+                <a:lumOff val="80000"/>
+              </a:schemeClr>
+            </a:solidFill>
+            <a:ln w="19050"/>
+          </p:spPr>
+          <p:style>
+            <a:lnRef idx="2">
+              <a:schemeClr val="accent1">
+                <a:shade val="50000"/>
+              </a:schemeClr>
+            </a:lnRef>
+            <a:fillRef idx="1">
+              <a:schemeClr val="accent1"/>
+            </a:fillRef>
+            <a:effectRef idx="0">
+              <a:schemeClr val="accent1"/>
+            </a:effectRef>
+            <a:fontRef idx="minor">
+              <a:schemeClr val="lt1"/>
+            </a:fontRef>
+          </p:style>
+          <p:txBody>
+            <a:bodyPr rtlCol="0" anchor="ctr"/>
+            <a:lstStyle/>
+            <a:p>
+              <a:pPr algn="ctr"/>
+              <a:endParaRPr lang="en-IN" dirty="0"/>
+            </a:p>
+          </p:txBody>
+        </p:sp>
+        <p:grpSp>
+          <p:nvGrpSpPr>
+            <p:cNvPr id="36" name="Group 35">
+              <a:extLst>
+                <a:ext uri="{FF2B5EF4-FFF2-40B4-BE49-F238E27FC236}">
+                  <a16:creationId xmlns:a16="http://schemas.microsoft.com/office/drawing/2014/main" id="{11C67986-6ED2-8A23-E663-B1E1587B9B47}"/>
+                </a:ext>
+              </a:extLst>
+            </p:cNvPr>
+            <p:cNvGrpSpPr/>
+            <p:nvPr/>
+          </p:nvGrpSpPr>
+          <p:grpSpPr>
+            <a:xfrm>
+              <a:off x="1037133" y="850187"/>
+              <a:ext cx="10504834" cy="1886073"/>
+              <a:chOff x="1037133" y="850187"/>
+              <a:chExt cx="10504834" cy="1886073"/>
+            </a:xfrm>
+          </p:grpSpPr>
+          <p:cxnSp>
+            <p:nvCxnSpPr>
+              <p:cNvPr id="10" name="Straight Connector 9">
+                <a:extLst>
+                  <a:ext uri="{FF2B5EF4-FFF2-40B4-BE49-F238E27FC236}">
+                    <a16:creationId xmlns:a16="http://schemas.microsoft.com/office/drawing/2014/main" id="{FCE72596-7248-5432-8159-9ADC4DEA7E8E}"/>
+                  </a:ext>
+                </a:extLst>
+              </p:cNvPr>
+              <p:cNvCxnSpPr>
+                <a:cxnSpLocks/>
+              </p:cNvCxnSpPr>
+              <p:nvPr/>
+            </p:nvCxnSpPr>
+            <p:spPr>
+              <a:xfrm flipV="1">
+                <a:off x="1058902" y="850187"/>
+                <a:ext cx="0" cy="1856082"/>
+              </a:xfrm>
+              <a:prstGeom prst="line">
+                <a:avLst/>
+              </a:prstGeom>
+              <a:ln w="28575" cap="flat" cmpd="sng" algn="ctr">
+                <a:solidFill>
+                  <a:schemeClr val="tx1"/>
+                </a:solidFill>
+                <a:prstDash val="solid"/>
+                <a:round/>
+                <a:headEnd type="none" w="med" len="med"/>
+                <a:tailEnd type="arrow" w="med" len="med"/>
+              </a:ln>
+            </p:spPr>
+            <p:style>
+              <a:lnRef idx="0">
+                <a:scrgbClr r="0" g="0" b="0"/>
+              </a:lnRef>
+              <a:fillRef idx="0">
+                <a:scrgbClr r="0" g="0" b="0"/>
+              </a:fillRef>
+              <a:effectRef idx="0">
+                <a:scrgbClr r="0" g="0" b="0"/>
+              </a:effectRef>
+              <a:fontRef idx="minor">
+                <a:schemeClr val="tx1"/>
+              </a:fontRef>
+            </p:style>
+          </p:cxnSp>
+          <p:sp>
+            <p:nvSpPr>
+              <p:cNvPr id="15" name="Freeform: Shape 14">
+                <a:extLst>
+                  <a:ext uri="{FF2B5EF4-FFF2-40B4-BE49-F238E27FC236}">
+                    <a16:creationId xmlns:a16="http://schemas.microsoft.com/office/drawing/2014/main" id="{494DEB3D-2F13-C408-E733-7C20B9549060}"/>
+                  </a:ext>
+                </a:extLst>
+              </p:cNvPr>
+              <p:cNvSpPr/>
+              <p:nvPr/>
+            </p:nvSpPr>
+            <p:spPr>
+              <a:xfrm>
+                <a:off x="1080672" y="1264296"/>
+                <a:ext cx="718455" cy="727792"/>
+              </a:xfrm>
+              <a:custGeom>
+                <a:avLst/>
+                <a:gdLst>
+                  <a:gd name="connsiteX0" fmla="*/ 0 w 1427584"/>
+                  <a:gd name="connsiteY0" fmla="*/ 718462 h 727792"/>
+                  <a:gd name="connsiteX1" fmla="*/ 718457 w 1427584"/>
+                  <a:gd name="connsiteY1" fmla="*/ 5 h 727792"/>
+                  <a:gd name="connsiteX2" fmla="*/ 1427584 w 1427584"/>
+                  <a:gd name="connsiteY2" fmla="*/ 727792 h 727792"/>
+                </a:gdLst>
+                <a:ahLst/>
+                <a:cxnLst>
+                  <a:cxn ang="0">
+                    <a:pos x="connsiteX0" y="connsiteY0"/>
+                  </a:cxn>
+                  <a:cxn ang="0">
+                    <a:pos x="connsiteX1" y="connsiteY1"/>
+                  </a:cxn>
+                  <a:cxn ang="0">
+                    <a:pos x="connsiteX2" y="connsiteY2"/>
+                  </a:cxn>
+                </a:cxnLst>
+                <a:rect l="l" t="t" r="r" b="b"/>
+                <a:pathLst>
+                  <a:path w="1427584" h="727792">
+                    <a:moveTo>
+                      <a:pt x="0" y="718462"/>
+                    </a:moveTo>
+                    <a:cubicBezTo>
+                      <a:pt x="240263" y="358456"/>
+                      <a:pt x="480526" y="-1550"/>
+                      <a:pt x="718457" y="5"/>
+                    </a:cubicBezTo>
+                    <a:cubicBezTo>
+                      <a:pt x="956388" y="1560"/>
+                      <a:pt x="1191986" y="364676"/>
+                      <a:pt x="1427584" y="727792"/>
+                    </a:cubicBezTo>
+                  </a:path>
+                </a:pathLst>
+              </a:custGeom>
+              <a:solidFill>
+                <a:schemeClr val="accent1">
+                  <a:lumMod val="20000"/>
+                  <a:lumOff val="80000"/>
+                </a:schemeClr>
+              </a:solidFill>
+              <a:ln w="19050"/>
+            </p:spPr>
+            <p:style>
+              <a:lnRef idx="2">
+                <a:schemeClr val="accent1">
+                  <a:shade val="50000"/>
+                </a:schemeClr>
+              </a:lnRef>
+              <a:fillRef idx="1">
+                <a:schemeClr val="accent1"/>
+              </a:fillRef>
+              <a:effectRef idx="0">
+                <a:schemeClr val="accent1"/>
+              </a:effectRef>
+              <a:fontRef idx="minor">
+                <a:schemeClr val="lt1"/>
+              </a:fontRef>
+            </p:style>
+            <p:txBody>
+              <a:bodyPr rtlCol="0" anchor="ctr"/>
+              <a:lstStyle/>
+              <a:p>
+                <a:pPr algn="ctr"/>
+                <a:endParaRPr lang="en-IN"/>
+              </a:p>
+            </p:txBody>
+          </p:sp>
+          <p:sp>
+            <p:nvSpPr>
+              <p:cNvPr id="16" name="Freeform: Shape 15">
+                <a:extLst>
+                  <a:ext uri="{FF2B5EF4-FFF2-40B4-BE49-F238E27FC236}">
+                    <a16:creationId xmlns:a16="http://schemas.microsoft.com/office/drawing/2014/main" id="{D2D88750-1A12-617A-44E8-558953BB2F69}"/>
+                  </a:ext>
+                </a:extLst>
+              </p:cNvPr>
+              <p:cNvSpPr/>
+              <p:nvPr/>
+            </p:nvSpPr>
+            <p:spPr>
+              <a:xfrm>
+                <a:off x="2530020" y="1264296"/>
+                <a:ext cx="718455" cy="727792"/>
+              </a:xfrm>
+              <a:custGeom>
+                <a:avLst/>
+                <a:gdLst>
+                  <a:gd name="connsiteX0" fmla="*/ 0 w 1427584"/>
+                  <a:gd name="connsiteY0" fmla="*/ 718462 h 727792"/>
+                  <a:gd name="connsiteX1" fmla="*/ 718457 w 1427584"/>
+                  <a:gd name="connsiteY1" fmla="*/ 5 h 727792"/>
+                  <a:gd name="connsiteX2" fmla="*/ 1427584 w 1427584"/>
+                  <a:gd name="connsiteY2" fmla="*/ 727792 h 727792"/>
+                </a:gdLst>
+                <a:ahLst/>
+                <a:cxnLst>
+                  <a:cxn ang="0">
+                    <a:pos x="connsiteX0" y="connsiteY0"/>
+                  </a:cxn>
+                  <a:cxn ang="0">
+                    <a:pos x="connsiteX1" y="connsiteY1"/>
+                  </a:cxn>
+                  <a:cxn ang="0">
+                    <a:pos x="connsiteX2" y="connsiteY2"/>
+                  </a:cxn>
+                </a:cxnLst>
+                <a:rect l="l" t="t" r="r" b="b"/>
+                <a:pathLst>
+                  <a:path w="1427584" h="727792">
+                    <a:moveTo>
+                      <a:pt x="0" y="718462"/>
+                    </a:moveTo>
+                    <a:cubicBezTo>
+                      <a:pt x="240263" y="358456"/>
+                      <a:pt x="480526" y="-1550"/>
+                      <a:pt x="718457" y="5"/>
+                    </a:cubicBezTo>
+                    <a:cubicBezTo>
+                      <a:pt x="956388" y="1560"/>
+                      <a:pt x="1191986" y="364676"/>
+                      <a:pt x="1427584" y="727792"/>
+                    </a:cubicBezTo>
+                  </a:path>
+                </a:pathLst>
+              </a:custGeom>
+              <a:solidFill>
+                <a:schemeClr val="accent1">
+                  <a:lumMod val="20000"/>
+                  <a:lumOff val="80000"/>
+                </a:schemeClr>
+              </a:solidFill>
+              <a:ln w="19050"/>
+            </p:spPr>
+            <p:style>
+              <a:lnRef idx="2">
+                <a:schemeClr val="accent1">
+                  <a:shade val="50000"/>
+                </a:schemeClr>
+              </a:lnRef>
+              <a:fillRef idx="1">
+                <a:schemeClr val="accent1"/>
+              </a:fillRef>
+              <a:effectRef idx="0">
+                <a:schemeClr val="accent1"/>
+              </a:effectRef>
+              <a:fontRef idx="minor">
+                <a:schemeClr val="lt1"/>
+              </a:fontRef>
+            </p:style>
+            <p:txBody>
+              <a:bodyPr rtlCol="0" anchor="ctr"/>
+              <a:lstStyle/>
+              <a:p>
+                <a:pPr algn="ctr"/>
+                <a:endParaRPr lang="en-IN"/>
+              </a:p>
+            </p:txBody>
+          </p:sp>
+          <p:sp>
+            <p:nvSpPr>
+              <p:cNvPr id="18" name="Freeform: Shape 17">
+                <a:extLst>
+                  <a:ext uri="{FF2B5EF4-FFF2-40B4-BE49-F238E27FC236}">
+                    <a16:creationId xmlns:a16="http://schemas.microsoft.com/office/drawing/2014/main" id="{88216129-27B2-48E8-754D-32D9CCEDD524}"/>
+                  </a:ext>
+                </a:extLst>
+              </p:cNvPr>
+              <p:cNvSpPr/>
+              <p:nvPr/>
+            </p:nvSpPr>
+            <p:spPr>
+              <a:xfrm flipV="1">
+                <a:off x="1799127" y="1992085"/>
+                <a:ext cx="718455" cy="727792"/>
+              </a:xfrm>
+              <a:custGeom>
+                <a:avLst/>
+                <a:gdLst>
+                  <a:gd name="connsiteX0" fmla="*/ 0 w 1427584"/>
+                  <a:gd name="connsiteY0" fmla="*/ 718462 h 727792"/>
+                  <a:gd name="connsiteX1" fmla="*/ 718457 w 1427584"/>
+                  <a:gd name="connsiteY1" fmla="*/ 5 h 727792"/>
+                  <a:gd name="connsiteX2" fmla="*/ 1427584 w 1427584"/>
+                  <a:gd name="connsiteY2" fmla="*/ 727792 h 727792"/>
+                </a:gdLst>
+                <a:ahLst/>
+                <a:cxnLst>
+                  <a:cxn ang="0">
+                    <a:pos x="connsiteX0" y="connsiteY0"/>
+                  </a:cxn>
+                  <a:cxn ang="0">
+                    <a:pos x="connsiteX1" y="connsiteY1"/>
+                  </a:cxn>
+                  <a:cxn ang="0">
+                    <a:pos x="connsiteX2" y="connsiteY2"/>
+                  </a:cxn>
+                </a:cxnLst>
+                <a:rect l="l" t="t" r="r" b="b"/>
+                <a:pathLst>
+                  <a:path w="1427584" h="727792">
+                    <a:moveTo>
+                      <a:pt x="0" y="718462"/>
+                    </a:moveTo>
+                    <a:cubicBezTo>
+                      <a:pt x="240263" y="358456"/>
+                      <a:pt x="480526" y="-1550"/>
+                      <a:pt x="718457" y="5"/>
+                    </a:cubicBezTo>
+                    <a:cubicBezTo>
+                      <a:pt x="956388" y="1560"/>
+                      <a:pt x="1191986" y="364676"/>
+                      <a:pt x="1427584" y="727792"/>
+                    </a:cubicBezTo>
+                  </a:path>
+                </a:pathLst>
+              </a:custGeom>
+              <a:solidFill>
+                <a:schemeClr val="accent1">
+                  <a:lumMod val="20000"/>
+                  <a:lumOff val="80000"/>
+                </a:schemeClr>
+              </a:solidFill>
+              <a:ln w="19050"/>
+            </p:spPr>
+            <p:style>
+              <a:lnRef idx="2">
+                <a:schemeClr val="accent1">
+                  <a:shade val="50000"/>
+                </a:schemeClr>
+              </a:lnRef>
+              <a:fillRef idx="1">
+                <a:schemeClr val="accent1"/>
+              </a:fillRef>
+              <a:effectRef idx="0">
+                <a:schemeClr val="accent1"/>
+              </a:effectRef>
+              <a:fontRef idx="minor">
+                <a:schemeClr val="lt1"/>
+              </a:fontRef>
+            </p:style>
+            <p:txBody>
+              <a:bodyPr rtlCol="0" anchor="ctr"/>
+              <a:lstStyle/>
+              <a:p>
+                <a:pPr algn="ctr"/>
+                <a:endParaRPr lang="en-IN"/>
+              </a:p>
+            </p:txBody>
+          </p:sp>
+          <p:sp>
+            <p:nvSpPr>
+              <p:cNvPr id="19" name="Freeform: Shape 18">
+                <a:extLst>
+                  <a:ext uri="{FF2B5EF4-FFF2-40B4-BE49-F238E27FC236}">
+                    <a16:creationId xmlns:a16="http://schemas.microsoft.com/office/drawing/2014/main" id="{98B4E6A4-B27F-D21C-2686-88072D497F1A}"/>
+                  </a:ext>
+                </a:extLst>
+              </p:cNvPr>
+              <p:cNvSpPr/>
+              <p:nvPr/>
+            </p:nvSpPr>
+            <p:spPr>
+              <a:xfrm flipV="1">
+                <a:off x="3248475" y="1999025"/>
+                <a:ext cx="718455" cy="727792"/>
+              </a:xfrm>
+              <a:custGeom>
+                <a:avLst/>
+                <a:gdLst>
+                  <a:gd name="connsiteX0" fmla="*/ 0 w 1427584"/>
+                  <a:gd name="connsiteY0" fmla="*/ 718462 h 727792"/>
+                  <a:gd name="connsiteX1" fmla="*/ 718457 w 1427584"/>
+                  <a:gd name="connsiteY1" fmla="*/ 5 h 727792"/>
+                  <a:gd name="connsiteX2" fmla="*/ 1427584 w 1427584"/>
+                  <a:gd name="connsiteY2" fmla="*/ 727792 h 727792"/>
+                </a:gdLst>
+                <a:ahLst/>
+                <a:cxnLst>
+                  <a:cxn ang="0">
+                    <a:pos x="connsiteX0" y="connsiteY0"/>
+                  </a:cxn>
+                  <a:cxn ang="0">
+                    <a:pos x="connsiteX1" y="connsiteY1"/>
+                  </a:cxn>
+                  <a:cxn ang="0">
+                    <a:pos x="connsiteX2" y="connsiteY2"/>
+                  </a:cxn>
+                </a:cxnLst>
+                <a:rect l="l" t="t" r="r" b="b"/>
+                <a:pathLst>
+                  <a:path w="1427584" h="727792">
+                    <a:moveTo>
+                      <a:pt x="0" y="718462"/>
+                    </a:moveTo>
+                    <a:cubicBezTo>
+                      <a:pt x="240263" y="358456"/>
+                      <a:pt x="480526" y="-1550"/>
+                      <a:pt x="718457" y="5"/>
+                    </a:cubicBezTo>
+                    <a:cubicBezTo>
+                      <a:pt x="956388" y="1560"/>
+                      <a:pt x="1191986" y="364676"/>
+                      <a:pt x="1427584" y="727792"/>
+                    </a:cubicBezTo>
+                  </a:path>
+                </a:pathLst>
+              </a:custGeom>
+              <a:solidFill>
+                <a:schemeClr val="accent1">
+                  <a:lumMod val="20000"/>
+                  <a:lumOff val="80000"/>
+                </a:schemeClr>
+              </a:solidFill>
+              <a:ln w="19050"/>
+            </p:spPr>
+            <p:style>
+              <a:lnRef idx="2">
+                <a:schemeClr val="accent1">
+                  <a:shade val="50000"/>
+                </a:schemeClr>
+              </a:lnRef>
+              <a:fillRef idx="1">
+                <a:schemeClr val="accent1"/>
+              </a:fillRef>
+              <a:effectRef idx="0">
+                <a:schemeClr val="accent1"/>
+              </a:effectRef>
+              <a:fontRef idx="minor">
+                <a:schemeClr val="lt1"/>
+              </a:fontRef>
+            </p:style>
+            <p:txBody>
+              <a:bodyPr rtlCol="0" anchor="ctr"/>
+              <a:lstStyle/>
+              <a:p>
+                <a:pPr algn="ctr"/>
+                <a:endParaRPr lang="en-IN"/>
+              </a:p>
+            </p:txBody>
+          </p:sp>
+          <p:sp>
+            <p:nvSpPr>
+              <p:cNvPr id="20" name="Freeform: Shape 19">
+                <a:extLst>
+                  <a:ext uri="{FF2B5EF4-FFF2-40B4-BE49-F238E27FC236}">
+                    <a16:creationId xmlns:a16="http://schemas.microsoft.com/office/drawing/2014/main" id="{3EFD3EA6-357F-F306-EDC3-EB3C31EACA26}"/>
+                  </a:ext>
+                </a:extLst>
+              </p:cNvPr>
+              <p:cNvSpPr/>
+              <p:nvPr/>
+            </p:nvSpPr>
+            <p:spPr>
+              <a:xfrm flipV="1">
+                <a:off x="8989922" y="2008468"/>
+                <a:ext cx="718455" cy="727792"/>
+              </a:xfrm>
+              <a:custGeom>
+                <a:avLst/>
+                <a:gdLst>
+                  <a:gd name="connsiteX0" fmla="*/ 0 w 1427584"/>
+                  <a:gd name="connsiteY0" fmla="*/ 718462 h 727792"/>
+                  <a:gd name="connsiteX1" fmla="*/ 718457 w 1427584"/>
+                  <a:gd name="connsiteY1" fmla="*/ 5 h 727792"/>
+                  <a:gd name="connsiteX2" fmla="*/ 1427584 w 1427584"/>
+                  <a:gd name="connsiteY2" fmla="*/ 727792 h 727792"/>
+                </a:gdLst>
+                <a:ahLst/>
+                <a:cxnLst>
+                  <a:cxn ang="0">
+                    <a:pos x="connsiteX0" y="connsiteY0"/>
+                  </a:cxn>
+                  <a:cxn ang="0">
+                    <a:pos x="connsiteX1" y="connsiteY1"/>
+                  </a:cxn>
+                  <a:cxn ang="0">
+                    <a:pos x="connsiteX2" y="connsiteY2"/>
+                  </a:cxn>
+                </a:cxnLst>
+                <a:rect l="l" t="t" r="r" b="b"/>
+                <a:pathLst>
+                  <a:path w="1427584" h="727792">
+                    <a:moveTo>
+                      <a:pt x="0" y="718462"/>
+                    </a:moveTo>
+                    <a:cubicBezTo>
+                      <a:pt x="240263" y="358456"/>
+                      <a:pt x="480526" y="-1550"/>
+                      <a:pt x="718457" y="5"/>
+                    </a:cubicBezTo>
+                    <a:cubicBezTo>
+                      <a:pt x="956388" y="1560"/>
+                      <a:pt x="1191986" y="364676"/>
+                      <a:pt x="1427584" y="727792"/>
+                    </a:cubicBezTo>
+                  </a:path>
+                </a:pathLst>
+              </a:custGeom>
+              <a:solidFill>
+                <a:schemeClr val="accent1">
+                  <a:lumMod val="20000"/>
+                  <a:lumOff val="80000"/>
+                </a:schemeClr>
+              </a:solidFill>
+              <a:ln w="19050"/>
+            </p:spPr>
+            <p:style>
+              <a:lnRef idx="2">
+                <a:schemeClr val="accent1">
+                  <a:shade val="50000"/>
+                </a:schemeClr>
+              </a:lnRef>
+              <a:fillRef idx="1">
+                <a:schemeClr val="accent1"/>
+              </a:fillRef>
+              <a:effectRef idx="0">
+                <a:schemeClr val="accent1"/>
+              </a:effectRef>
+              <a:fontRef idx="minor">
+                <a:schemeClr val="lt1"/>
+              </a:fontRef>
+            </p:style>
+            <p:txBody>
+              <a:bodyPr rtlCol="0" anchor="ctr"/>
+              <a:lstStyle/>
+              <a:p>
+                <a:pPr algn="ctr"/>
+                <a:endParaRPr lang="en-IN"/>
+              </a:p>
+            </p:txBody>
+          </p:sp>
+          <p:sp>
+            <p:nvSpPr>
+              <p:cNvPr id="32" name="Freeform: Shape 31">
+                <a:extLst>
+                  <a:ext uri="{FF2B5EF4-FFF2-40B4-BE49-F238E27FC236}">
+                    <a16:creationId xmlns:a16="http://schemas.microsoft.com/office/drawing/2014/main" id="{2CFC3C61-7950-C692-D0DD-7CBA7FF2D6C7}"/>
+                  </a:ext>
+                </a:extLst>
+              </p:cNvPr>
+              <p:cNvSpPr/>
+              <p:nvPr/>
+            </p:nvSpPr>
+            <p:spPr>
+              <a:xfrm>
+                <a:off x="8271467" y="1254965"/>
+                <a:ext cx="718455" cy="727792"/>
+              </a:xfrm>
+              <a:custGeom>
+                <a:avLst/>
+                <a:gdLst>
+                  <a:gd name="connsiteX0" fmla="*/ 0 w 1427584"/>
+                  <a:gd name="connsiteY0" fmla="*/ 718462 h 727792"/>
+                  <a:gd name="connsiteX1" fmla="*/ 718457 w 1427584"/>
+                  <a:gd name="connsiteY1" fmla="*/ 5 h 727792"/>
+                  <a:gd name="connsiteX2" fmla="*/ 1427584 w 1427584"/>
+                  <a:gd name="connsiteY2" fmla="*/ 727792 h 727792"/>
+                </a:gdLst>
+                <a:ahLst/>
+                <a:cxnLst>
+                  <a:cxn ang="0">
+                    <a:pos x="connsiteX0" y="connsiteY0"/>
+                  </a:cxn>
+                  <a:cxn ang="0">
+                    <a:pos x="connsiteX1" y="connsiteY1"/>
+                  </a:cxn>
+                  <a:cxn ang="0">
+                    <a:pos x="connsiteX2" y="connsiteY2"/>
+                  </a:cxn>
+                </a:cxnLst>
+                <a:rect l="l" t="t" r="r" b="b"/>
+                <a:pathLst>
+                  <a:path w="1427584" h="727792">
+                    <a:moveTo>
+                      <a:pt x="0" y="718462"/>
+                    </a:moveTo>
+                    <a:cubicBezTo>
+                      <a:pt x="240263" y="358456"/>
+                      <a:pt x="480526" y="-1550"/>
+                      <a:pt x="718457" y="5"/>
+                    </a:cubicBezTo>
+                    <a:cubicBezTo>
+                      <a:pt x="956388" y="1560"/>
+                      <a:pt x="1191986" y="364676"/>
+                      <a:pt x="1427584" y="727792"/>
+                    </a:cubicBezTo>
+                  </a:path>
+                </a:pathLst>
+              </a:custGeom>
+              <a:solidFill>
+                <a:schemeClr val="accent1">
+                  <a:lumMod val="20000"/>
+                  <a:lumOff val="80000"/>
+                </a:schemeClr>
+              </a:solidFill>
+              <a:ln w="19050"/>
+            </p:spPr>
+            <p:style>
+              <a:lnRef idx="2">
+                <a:schemeClr val="accent1">
+                  <a:shade val="50000"/>
+                </a:schemeClr>
+              </a:lnRef>
+              <a:fillRef idx="1">
+                <a:schemeClr val="accent1"/>
+              </a:fillRef>
+              <a:effectRef idx="0">
+                <a:schemeClr val="accent1"/>
+              </a:effectRef>
+              <a:fontRef idx="minor">
+                <a:schemeClr val="lt1"/>
+              </a:fontRef>
+            </p:style>
+            <p:txBody>
+              <a:bodyPr rtlCol="0" anchor="ctr"/>
+              <a:lstStyle/>
+              <a:p>
+                <a:pPr algn="ctr"/>
+                <a:endParaRPr lang="en-IN"/>
+              </a:p>
+            </p:txBody>
+          </p:sp>
+          <p:sp>
+            <p:nvSpPr>
+              <p:cNvPr id="33" name="Freeform: Shape 32">
+                <a:extLst>
+                  <a:ext uri="{FF2B5EF4-FFF2-40B4-BE49-F238E27FC236}">
+                    <a16:creationId xmlns:a16="http://schemas.microsoft.com/office/drawing/2014/main" id="{7B78F078-B6FF-5AEC-2326-018678A6C1CA}"/>
+                  </a:ext>
+                </a:extLst>
+              </p:cNvPr>
+              <p:cNvSpPr/>
+              <p:nvPr/>
+            </p:nvSpPr>
+            <p:spPr>
+              <a:xfrm>
+                <a:off x="9708377" y="1264296"/>
+                <a:ext cx="718455" cy="727792"/>
+              </a:xfrm>
+              <a:custGeom>
+                <a:avLst/>
+                <a:gdLst>
+                  <a:gd name="connsiteX0" fmla="*/ 0 w 1427584"/>
+                  <a:gd name="connsiteY0" fmla="*/ 718462 h 727792"/>
+                  <a:gd name="connsiteX1" fmla="*/ 718457 w 1427584"/>
+                  <a:gd name="connsiteY1" fmla="*/ 5 h 727792"/>
+                  <a:gd name="connsiteX2" fmla="*/ 1427584 w 1427584"/>
+                  <a:gd name="connsiteY2" fmla="*/ 727792 h 727792"/>
+                </a:gdLst>
+                <a:ahLst/>
+                <a:cxnLst>
+                  <a:cxn ang="0">
+                    <a:pos x="connsiteX0" y="connsiteY0"/>
+                  </a:cxn>
+                  <a:cxn ang="0">
+                    <a:pos x="connsiteX1" y="connsiteY1"/>
+                  </a:cxn>
+                  <a:cxn ang="0">
+                    <a:pos x="connsiteX2" y="connsiteY2"/>
+                  </a:cxn>
+                </a:cxnLst>
+                <a:rect l="l" t="t" r="r" b="b"/>
+                <a:pathLst>
+                  <a:path w="1427584" h="727792">
+                    <a:moveTo>
+                      <a:pt x="0" y="718462"/>
+                    </a:moveTo>
+                    <a:cubicBezTo>
+                      <a:pt x="240263" y="358456"/>
+                      <a:pt x="480526" y="-1550"/>
+                      <a:pt x="718457" y="5"/>
+                    </a:cubicBezTo>
+                    <a:cubicBezTo>
+                      <a:pt x="956388" y="1560"/>
+                      <a:pt x="1191986" y="364676"/>
+                      <a:pt x="1427584" y="727792"/>
+                    </a:cubicBezTo>
+                  </a:path>
+                </a:pathLst>
+              </a:custGeom>
+              <a:solidFill>
+                <a:schemeClr val="accent1">
+                  <a:lumMod val="20000"/>
+                  <a:lumOff val="80000"/>
+                </a:schemeClr>
+              </a:solidFill>
+              <a:ln w="19050"/>
+            </p:spPr>
+            <p:style>
+              <a:lnRef idx="2">
+                <a:schemeClr val="accent1">
+                  <a:shade val="50000"/>
+                </a:schemeClr>
+              </a:lnRef>
+              <a:fillRef idx="1">
+                <a:schemeClr val="accent1"/>
+              </a:fillRef>
+              <a:effectRef idx="0">
+                <a:schemeClr val="accent1"/>
+              </a:effectRef>
+              <a:fontRef idx="minor">
+                <a:schemeClr val="lt1"/>
+              </a:fontRef>
+            </p:style>
+            <p:txBody>
+              <a:bodyPr rtlCol="0" anchor="ctr"/>
+              <a:lstStyle/>
+              <a:p>
+                <a:pPr algn="ctr"/>
+                <a:endParaRPr lang="en-IN"/>
+              </a:p>
+            </p:txBody>
+          </p:sp>
+          <p:sp>
+            <p:nvSpPr>
+              <p:cNvPr id="34" name="Freeform: Shape 33">
+                <a:extLst>
+                  <a:ext uri="{FF2B5EF4-FFF2-40B4-BE49-F238E27FC236}">
+                    <a16:creationId xmlns:a16="http://schemas.microsoft.com/office/drawing/2014/main" id="{A896BA1E-D8CA-E228-0B38-E334DD952355}"/>
+                  </a:ext>
+                </a:extLst>
+              </p:cNvPr>
+              <p:cNvSpPr/>
+              <p:nvPr/>
+            </p:nvSpPr>
+            <p:spPr>
+              <a:xfrm flipV="1">
+                <a:off x="10423974" y="2003575"/>
+                <a:ext cx="718455" cy="727792"/>
+              </a:xfrm>
+              <a:custGeom>
+                <a:avLst/>
+                <a:gdLst>
+                  <a:gd name="connsiteX0" fmla="*/ 0 w 1427584"/>
+                  <a:gd name="connsiteY0" fmla="*/ 718462 h 727792"/>
+                  <a:gd name="connsiteX1" fmla="*/ 718457 w 1427584"/>
+                  <a:gd name="connsiteY1" fmla="*/ 5 h 727792"/>
+                  <a:gd name="connsiteX2" fmla="*/ 1427584 w 1427584"/>
+                  <a:gd name="connsiteY2" fmla="*/ 727792 h 727792"/>
+                </a:gdLst>
+                <a:ahLst/>
+                <a:cxnLst>
+                  <a:cxn ang="0">
+                    <a:pos x="connsiteX0" y="connsiteY0"/>
+                  </a:cxn>
+                  <a:cxn ang="0">
+                    <a:pos x="connsiteX1" y="connsiteY1"/>
+                  </a:cxn>
+                  <a:cxn ang="0">
+                    <a:pos x="connsiteX2" y="connsiteY2"/>
+                  </a:cxn>
+                </a:cxnLst>
+                <a:rect l="l" t="t" r="r" b="b"/>
+                <a:pathLst>
+                  <a:path w="1427584" h="727792">
+                    <a:moveTo>
+                      <a:pt x="0" y="718462"/>
+                    </a:moveTo>
+                    <a:cubicBezTo>
+                      <a:pt x="240263" y="358456"/>
+                      <a:pt x="480526" y="-1550"/>
+                      <a:pt x="718457" y="5"/>
+                    </a:cubicBezTo>
+                    <a:cubicBezTo>
+                      <a:pt x="956388" y="1560"/>
+                      <a:pt x="1191986" y="364676"/>
+                      <a:pt x="1427584" y="727792"/>
+                    </a:cubicBezTo>
+                  </a:path>
+                </a:pathLst>
+              </a:custGeom>
+              <a:solidFill>
+                <a:schemeClr val="accent1">
+                  <a:lumMod val="20000"/>
+                  <a:lumOff val="80000"/>
+                </a:schemeClr>
+              </a:solidFill>
+              <a:ln w="19050"/>
+            </p:spPr>
+            <p:style>
+              <a:lnRef idx="2">
+                <a:schemeClr val="accent1">
+                  <a:shade val="50000"/>
+                </a:schemeClr>
+              </a:lnRef>
+              <a:fillRef idx="1">
+                <a:schemeClr val="accent1"/>
+              </a:fillRef>
+              <a:effectRef idx="0">
+                <a:schemeClr val="accent1"/>
+              </a:effectRef>
+              <a:fontRef idx="minor">
+                <a:schemeClr val="lt1"/>
+              </a:fontRef>
+            </p:style>
+            <p:txBody>
+              <a:bodyPr rtlCol="0" anchor="ctr"/>
+              <a:lstStyle/>
+              <a:p>
+                <a:pPr algn="ctr"/>
+                <a:endParaRPr lang="en-IN"/>
+              </a:p>
+            </p:txBody>
+          </p:sp>
+          <p:sp>
+            <p:nvSpPr>
+              <p:cNvPr id="49" name="Freeform: Shape 48">
+                <a:extLst>
+                  <a:ext uri="{FF2B5EF4-FFF2-40B4-BE49-F238E27FC236}">
+                    <a16:creationId xmlns:a16="http://schemas.microsoft.com/office/drawing/2014/main" id="{4D786D37-1E74-5A74-2125-72209FFC66F6}"/>
+                  </a:ext>
+                </a:extLst>
+              </p:cNvPr>
+              <p:cNvSpPr/>
+              <p:nvPr/>
+            </p:nvSpPr>
+            <p:spPr>
+              <a:xfrm flipV="1">
+                <a:off x="4693285" y="1999025"/>
+                <a:ext cx="718455" cy="727792"/>
+              </a:xfrm>
+              <a:custGeom>
+                <a:avLst/>
+                <a:gdLst>
+                  <a:gd name="connsiteX0" fmla="*/ 0 w 1427584"/>
+                  <a:gd name="connsiteY0" fmla="*/ 718462 h 727792"/>
+                  <a:gd name="connsiteX1" fmla="*/ 718457 w 1427584"/>
+                  <a:gd name="connsiteY1" fmla="*/ 5 h 727792"/>
+                  <a:gd name="connsiteX2" fmla="*/ 1427584 w 1427584"/>
+                  <a:gd name="connsiteY2" fmla="*/ 727792 h 727792"/>
+                </a:gdLst>
+                <a:ahLst/>
+                <a:cxnLst>
+                  <a:cxn ang="0">
+                    <a:pos x="connsiteX0" y="connsiteY0"/>
+                  </a:cxn>
+                  <a:cxn ang="0">
+                    <a:pos x="connsiteX1" y="connsiteY1"/>
+                  </a:cxn>
+                  <a:cxn ang="0">
+                    <a:pos x="connsiteX2" y="connsiteY2"/>
+                  </a:cxn>
+                </a:cxnLst>
+                <a:rect l="l" t="t" r="r" b="b"/>
+                <a:pathLst>
+                  <a:path w="1427584" h="727792">
+                    <a:moveTo>
+                      <a:pt x="0" y="718462"/>
+                    </a:moveTo>
+                    <a:cubicBezTo>
+                      <a:pt x="240263" y="358456"/>
+                      <a:pt x="480526" y="-1550"/>
+                      <a:pt x="718457" y="5"/>
+                    </a:cubicBezTo>
+                    <a:cubicBezTo>
+                      <a:pt x="956388" y="1560"/>
+                      <a:pt x="1191986" y="364676"/>
+                      <a:pt x="1427584" y="727792"/>
+                    </a:cubicBezTo>
+                  </a:path>
+                </a:pathLst>
+              </a:custGeom>
+              <a:solidFill>
+                <a:schemeClr val="accent1">
+                  <a:lumMod val="20000"/>
+                  <a:lumOff val="80000"/>
+                </a:schemeClr>
+              </a:solidFill>
+              <a:ln w="19050"/>
+            </p:spPr>
+            <p:style>
+              <a:lnRef idx="2">
+                <a:schemeClr val="accent1">
+                  <a:shade val="50000"/>
+                </a:schemeClr>
+              </a:lnRef>
+              <a:fillRef idx="1">
+                <a:schemeClr val="accent1"/>
+              </a:fillRef>
+              <a:effectRef idx="0">
+                <a:schemeClr val="accent1"/>
+              </a:effectRef>
+              <a:fontRef idx="minor">
+                <a:schemeClr val="lt1"/>
+              </a:fontRef>
+            </p:style>
+            <p:txBody>
+              <a:bodyPr rtlCol="0" anchor="ctr"/>
+              <a:lstStyle/>
+              <a:p>
+                <a:pPr algn="ctr"/>
+                <a:endParaRPr lang="en-IN"/>
+              </a:p>
+            </p:txBody>
+          </p:sp>
+          <p:sp>
+            <p:nvSpPr>
+              <p:cNvPr id="50" name="Freeform: Shape 49">
+                <a:extLst>
+                  <a:ext uri="{FF2B5EF4-FFF2-40B4-BE49-F238E27FC236}">
+                    <a16:creationId xmlns:a16="http://schemas.microsoft.com/office/drawing/2014/main" id="{DA38CDA9-1301-3E01-2A8C-7F8EC7CB9553}"/>
+                  </a:ext>
+                </a:extLst>
+              </p:cNvPr>
+              <p:cNvSpPr/>
+              <p:nvPr/>
+            </p:nvSpPr>
+            <p:spPr>
+              <a:xfrm flipV="1">
+                <a:off x="6122305" y="2001416"/>
+                <a:ext cx="718455" cy="727792"/>
+              </a:xfrm>
+              <a:custGeom>
+                <a:avLst/>
+                <a:gdLst>
+                  <a:gd name="connsiteX0" fmla="*/ 0 w 1427584"/>
+                  <a:gd name="connsiteY0" fmla="*/ 718462 h 727792"/>
+                  <a:gd name="connsiteX1" fmla="*/ 718457 w 1427584"/>
+                  <a:gd name="connsiteY1" fmla="*/ 5 h 727792"/>
+                  <a:gd name="connsiteX2" fmla="*/ 1427584 w 1427584"/>
+                  <a:gd name="connsiteY2" fmla="*/ 727792 h 727792"/>
+                </a:gdLst>
+                <a:ahLst/>
+                <a:cxnLst>
+                  <a:cxn ang="0">
+                    <a:pos x="connsiteX0" y="connsiteY0"/>
+                  </a:cxn>
+                  <a:cxn ang="0">
+                    <a:pos x="connsiteX1" y="connsiteY1"/>
+                  </a:cxn>
+                  <a:cxn ang="0">
+                    <a:pos x="connsiteX2" y="connsiteY2"/>
+                  </a:cxn>
+                </a:cxnLst>
+                <a:rect l="l" t="t" r="r" b="b"/>
+                <a:pathLst>
+                  <a:path w="1427584" h="727792">
+                    <a:moveTo>
+                      <a:pt x="0" y="718462"/>
+                    </a:moveTo>
+                    <a:cubicBezTo>
+                      <a:pt x="240263" y="358456"/>
+                      <a:pt x="480526" y="-1550"/>
+                      <a:pt x="718457" y="5"/>
+                    </a:cubicBezTo>
+                    <a:cubicBezTo>
+                      <a:pt x="956388" y="1560"/>
+                      <a:pt x="1191986" y="364676"/>
+                      <a:pt x="1427584" y="727792"/>
+                    </a:cubicBezTo>
+                  </a:path>
+                </a:pathLst>
+              </a:custGeom>
+              <a:solidFill>
+                <a:schemeClr val="accent1">
+                  <a:lumMod val="20000"/>
+                  <a:lumOff val="80000"/>
+                </a:schemeClr>
+              </a:solidFill>
+              <a:ln w="19050"/>
+            </p:spPr>
+            <p:style>
+              <a:lnRef idx="2">
+                <a:schemeClr val="accent1">
+                  <a:shade val="50000"/>
+                </a:schemeClr>
+              </a:lnRef>
+              <a:fillRef idx="1">
+                <a:schemeClr val="accent1"/>
+              </a:fillRef>
+              <a:effectRef idx="0">
+                <a:schemeClr val="accent1"/>
+              </a:effectRef>
+              <a:fontRef idx="minor">
+                <a:schemeClr val="lt1"/>
+              </a:fontRef>
+            </p:style>
+            <p:txBody>
+              <a:bodyPr rtlCol="0" anchor="ctr"/>
+              <a:lstStyle/>
+              <a:p>
+                <a:pPr algn="ctr"/>
+                <a:endParaRPr lang="en-IN"/>
+              </a:p>
+            </p:txBody>
+          </p:sp>
+          <p:sp>
+            <p:nvSpPr>
+              <p:cNvPr id="51" name="Freeform: Shape 50">
+                <a:extLst>
+                  <a:ext uri="{FF2B5EF4-FFF2-40B4-BE49-F238E27FC236}">
+                    <a16:creationId xmlns:a16="http://schemas.microsoft.com/office/drawing/2014/main" id="{CE2477E8-47B1-33CE-2A50-10C18BF4DBEE}"/>
+                  </a:ext>
+                </a:extLst>
+              </p:cNvPr>
+              <p:cNvSpPr/>
+              <p:nvPr/>
+            </p:nvSpPr>
+            <p:spPr>
+              <a:xfrm flipV="1">
+                <a:off x="7564029" y="1967977"/>
+                <a:ext cx="718455" cy="727792"/>
+              </a:xfrm>
+              <a:custGeom>
+                <a:avLst/>
+                <a:gdLst>
+                  <a:gd name="connsiteX0" fmla="*/ 0 w 1427584"/>
+                  <a:gd name="connsiteY0" fmla="*/ 718462 h 727792"/>
+                  <a:gd name="connsiteX1" fmla="*/ 718457 w 1427584"/>
+                  <a:gd name="connsiteY1" fmla="*/ 5 h 727792"/>
+                  <a:gd name="connsiteX2" fmla="*/ 1427584 w 1427584"/>
+                  <a:gd name="connsiteY2" fmla="*/ 727792 h 727792"/>
+                </a:gdLst>
+                <a:ahLst/>
+                <a:cxnLst>
+                  <a:cxn ang="0">
+                    <a:pos x="connsiteX0" y="connsiteY0"/>
+                  </a:cxn>
+                  <a:cxn ang="0">
+                    <a:pos x="connsiteX1" y="connsiteY1"/>
+                  </a:cxn>
+                  <a:cxn ang="0">
+                    <a:pos x="connsiteX2" y="connsiteY2"/>
+                  </a:cxn>
+                </a:cxnLst>
+                <a:rect l="l" t="t" r="r" b="b"/>
+                <a:pathLst>
+                  <a:path w="1427584" h="727792">
+                    <a:moveTo>
+                      <a:pt x="0" y="718462"/>
+                    </a:moveTo>
+                    <a:cubicBezTo>
+                      <a:pt x="240263" y="358456"/>
+                      <a:pt x="480526" y="-1550"/>
+                      <a:pt x="718457" y="5"/>
+                    </a:cubicBezTo>
+                    <a:cubicBezTo>
+                      <a:pt x="956388" y="1560"/>
+                      <a:pt x="1191986" y="364676"/>
+                      <a:pt x="1427584" y="727792"/>
+                    </a:cubicBezTo>
+                  </a:path>
+                </a:pathLst>
+              </a:custGeom>
+              <a:solidFill>
+                <a:schemeClr val="accent1">
+                  <a:lumMod val="20000"/>
+                  <a:lumOff val="80000"/>
+                </a:schemeClr>
+              </a:solidFill>
+              <a:ln w="19050"/>
+            </p:spPr>
+            <p:style>
+              <a:lnRef idx="2">
+                <a:schemeClr val="accent1">
+                  <a:shade val="50000"/>
+                </a:schemeClr>
+              </a:lnRef>
+              <a:fillRef idx="1">
+                <a:schemeClr val="accent1"/>
+              </a:fillRef>
+              <a:effectRef idx="0">
+                <a:schemeClr val="accent1"/>
+              </a:effectRef>
+              <a:fontRef idx="minor">
+                <a:schemeClr val="lt1"/>
+              </a:fontRef>
+            </p:style>
+            <p:txBody>
+              <a:bodyPr rtlCol="0" anchor="ctr"/>
+              <a:lstStyle/>
+              <a:p>
+                <a:pPr algn="ctr"/>
+                <a:endParaRPr lang="en-IN"/>
+              </a:p>
+            </p:txBody>
+          </p:sp>
+          <p:cxnSp>
+            <p:nvCxnSpPr>
+              <p:cNvPr id="4" name="Straight Connector 3">
+                <a:extLst>
+                  <a:ext uri="{FF2B5EF4-FFF2-40B4-BE49-F238E27FC236}">
+                    <a16:creationId xmlns:a16="http://schemas.microsoft.com/office/drawing/2014/main" id="{D48D52EF-211E-E60C-B24B-A0B11C04680E}"/>
+                  </a:ext>
+                </a:extLst>
+              </p:cNvPr>
+              <p:cNvCxnSpPr>
+                <a:cxnSpLocks/>
+              </p:cNvCxnSpPr>
+              <p:nvPr/>
+            </p:nvCxnSpPr>
+            <p:spPr>
+              <a:xfrm flipV="1">
+                <a:off x="1037133" y="1982757"/>
+                <a:ext cx="10504834" cy="9329"/>
+              </a:xfrm>
+              <a:prstGeom prst="line">
+                <a:avLst/>
+              </a:prstGeom>
+              <a:ln w="28575" cap="flat" cmpd="sng" algn="ctr">
+                <a:solidFill>
+                  <a:schemeClr val="tx1"/>
+                </a:solidFill>
+                <a:prstDash val="solid"/>
+                <a:round/>
+                <a:headEnd type="none" w="med" len="med"/>
+                <a:tailEnd type="arrow" w="med" len="med"/>
+              </a:ln>
+            </p:spPr>
+            <p:style>
+              <a:lnRef idx="0">
+                <a:scrgbClr r="0" g="0" b="0"/>
+              </a:lnRef>
+              <a:fillRef idx="0">
+                <a:scrgbClr r="0" g="0" b="0"/>
+              </a:fillRef>
+              <a:effectRef idx="0">
+                <a:scrgbClr r="0" g="0" b="0"/>
+              </a:effectRef>
+              <a:fontRef idx="minor">
+                <a:schemeClr val="tx1"/>
+              </a:fontRef>
+            </p:style>
+          </p:cxnSp>
+        </p:grpSp>
+        <p:grpSp>
+          <p:nvGrpSpPr>
+            <p:cNvPr id="37" name="Group 36">
+              <a:extLst>
+                <a:ext uri="{FF2B5EF4-FFF2-40B4-BE49-F238E27FC236}">
+                  <a16:creationId xmlns:a16="http://schemas.microsoft.com/office/drawing/2014/main" id="{2985770A-A5FE-1569-D4DD-EC087DE23FDD}"/>
+                </a:ext>
+              </a:extLst>
+            </p:cNvPr>
+            <p:cNvGrpSpPr/>
+            <p:nvPr/>
+          </p:nvGrpSpPr>
+          <p:grpSpPr>
+            <a:xfrm>
+              <a:off x="1037133" y="4516016"/>
+              <a:ext cx="10504834" cy="1869123"/>
+              <a:chOff x="1037133" y="929950"/>
+              <a:chExt cx="10504834" cy="1869123"/>
+            </a:xfrm>
+          </p:grpSpPr>
+          <p:cxnSp>
+            <p:nvCxnSpPr>
+              <p:cNvPr id="38" name="Straight Connector 37">
+                <a:extLst>
+                  <a:ext uri="{FF2B5EF4-FFF2-40B4-BE49-F238E27FC236}">
+                    <a16:creationId xmlns:a16="http://schemas.microsoft.com/office/drawing/2014/main" id="{5ACEDEB9-D02B-7AD3-2C83-E1EA13C84855}"/>
+                  </a:ext>
+                </a:extLst>
+              </p:cNvPr>
+              <p:cNvCxnSpPr>
+                <a:cxnSpLocks/>
+              </p:cNvCxnSpPr>
+              <p:nvPr/>
+            </p:nvCxnSpPr>
+            <p:spPr>
+              <a:xfrm flipV="1">
+                <a:off x="1058902" y="929950"/>
+                <a:ext cx="0" cy="1869123"/>
+              </a:xfrm>
+              <a:prstGeom prst="line">
+                <a:avLst/>
+              </a:prstGeom>
+              <a:ln w="28575" cap="flat" cmpd="sng" algn="ctr">
+                <a:solidFill>
+                  <a:schemeClr val="tx1"/>
+                </a:solidFill>
+                <a:prstDash val="solid"/>
+                <a:round/>
+                <a:headEnd type="none" w="med" len="med"/>
+                <a:tailEnd type="arrow" w="med" len="med"/>
+              </a:ln>
+            </p:spPr>
+            <p:style>
+              <a:lnRef idx="0">
+                <a:scrgbClr r="0" g="0" b="0"/>
+              </a:lnRef>
+              <a:fillRef idx="0">
+                <a:scrgbClr r="0" g="0" b="0"/>
+              </a:fillRef>
+              <a:effectRef idx="0">
+                <a:scrgbClr r="0" g="0" b="0"/>
+              </a:effectRef>
+              <a:fontRef idx="minor">
+                <a:schemeClr val="tx1"/>
+              </a:fontRef>
+            </p:style>
+          </p:cxnSp>
+          <p:sp>
+            <p:nvSpPr>
+              <p:cNvPr id="39" name="Freeform: Shape 38">
+                <a:extLst>
+                  <a:ext uri="{FF2B5EF4-FFF2-40B4-BE49-F238E27FC236}">
+                    <a16:creationId xmlns:a16="http://schemas.microsoft.com/office/drawing/2014/main" id="{C155E28C-DCA0-B279-42A8-92D8E52DE2DB}"/>
+                  </a:ext>
+                </a:extLst>
+              </p:cNvPr>
+              <p:cNvSpPr/>
+              <p:nvPr/>
+            </p:nvSpPr>
+            <p:spPr>
+              <a:xfrm>
+                <a:off x="1080672" y="1264296"/>
+                <a:ext cx="718455" cy="727792"/>
+              </a:xfrm>
+              <a:custGeom>
+                <a:avLst/>
+                <a:gdLst>
+                  <a:gd name="connsiteX0" fmla="*/ 0 w 1427584"/>
+                  <a:gd name="connsiteY0" fmla="*/ 718462 h 727792"/>
+                  <a:gd name="connsiteX1" fmla="*/ 718457 w 1427584"/>
+                  <a:gd name="connsiteY1" fmla="*/ 5 h 727792"/>
+                  <a:gd name="connsiteX2" fmla="*/ 1427584 w 1427584"/>
+                  <a:gd name="connsiteY2" fmla="*/ 727792 h 727792"/>
+                </a:gdLst>
+                <a:ahLst/>
+                <a:cxnLst>
+                  <a:cxn ang="0">
+                    <a:pos x="connsiteX0" y="connsiteY0"/>
+                  </a:cxn>
+                  <a:cxn ang="0">
+                    <a:pos x="connsiteX1" y="connsiteY1"/>
+                  </a:cxn>
+                  <a:cxn ang="0">
+                    <a:pos x="connsiteX2" y="connsiteY2"/>
+                  </a:cxn>
+                </a:cxnLst>
+                <a:rect l="l" t="t" r="r" b="b"/>
+                <a:pathLst>
+                  <a:path w="1427584" h="727792">
+                    <a:moveTo>
+                      <a:pt x="0" y="718462"/>
+                    </a:moveTo>
+                    <a:cubicBezTo>
+                      <a:pt x="240263" y="358456"/>
+                      <a:pt x="480526" y="-1550"/>
+                      <a:pt x="718457" y="5"/>
+                    </a:cubicBezTo>
+                    <a:cubicBezTo>
+                      <a:pt x="956388" y="1560"/>
+                      <a:pt x="1191986" y="364676"/>
+                      <a:pt x="1427584" y="727792"/>
+                    </a:cubicBezTo>
+                  </a:path>
+                </a:pathLst>
+              </a:custGeom>
+              <a:solidFill>
+                <a:schemeClr val="accent1">
+                  <a:lumMod val="20000"/>
+                  <a:lumOff val="80000"/>
+                </a:schemeClr>
+              </a:solidFill>
+              <a:ln w="19050"/>
+            </p:spPr>
+            <p:style>
+              <a:lnRef idx="2">
+                <a:schemeClr val="accent1">
+                  <a:shade val="50000"/>
+                </a:schemeClr>
+              </a:lnRef>
+              <a:fillRef idx="1">
+                <a:schemeClr val="accent1"/>
+              </a:fillRef>
+              <a:effectRef idx="0">
+                <a:schemeClr val="accent1"/>
+              </a:effectRef>
+              <a:fontRef idx="minor">
+                <a:schemeClr val="lt1"/>
+              </a:fontRef>
+            </p:style>
+            <p:txBody>
+              <a:bodyPr rtlCol="0" anchor="ctr"/>
+              <a:lstStyle/>
+              <a:p>
+                <a:pPr algn="ctr"/>
+                <a:endParaRPr lang="en-IN"/>
+              </a:p>
+            </p:txBody>
+          </p:sp>
+          <p:sp>
+            <p:nvSpPr>
+              <p:cNvPr id="40" name="Freeform: Shape 39">
+                <a:extLst>
+                  <a:ext uri="{FF2B5EF4-FFF2-40B4-BE49-F238E27FC236}">
+                    <a16:creationId xmlns:a16="http://schemas.microsoft.com/office/drawing/2014/main" id="{D33E8ADB-3D4B-8AD4-23A7-045810ACDD0F}"/>
+                  </a:ext>
+                </a:extLst>
+              </p:cNvPr>
+              <p:cNvSpPr/>
+              <p:nvPr/>
+            </p:nvSpPr>
+            <p:spPr>
+              <a:xfrm>
+                <a:off x="2530020" y="1264296"/>
+                <a:ext cx="718455" cy="727792"/>
+              </a:xfrm>
+              <a:custGeom>
+                <a:avLst/>
+                <a:gdLst>
+                  <a:gd name="connsiteX0" fmla="*/ 0 w 1427584"/>
+                  <a:gd name="connsiteY0" fmla="*/ 718462 h 727792"/>
+                  <a:gd name="connsiteX1" fmla="*/ 718457 w 1427584"/>
+                  <a:gd name="connsiteY1" fmla="*/ 5 h 727792"/>
+                  <a:gd name="connsiteX2" fmla="*/ 1427584 w 1427584"/>
+                  <a:gd name="connsiteY2" fmla="*/ 727792 h 727792"/>
+                </a:gdLst>
+                <a:ahLst/>
+                <a:cxnLst>
+                  <a:cxn ang="0">
+                    <a:pos x="connsiteX0" y="connsiteY0"/>
+                  </a:cxn>
+                  <a:cxn ang="0">
+                    <a:pos x="connsiteX1" y="connsiteY1"/>
+                  </a:cxn>
+                  <a:cxn ang="0">
+                    <a:pos x="connsiteX2" y="connsiteY2"/>
+                  </a:cxn>
+                </a:cxnLst>
+                <a:rect l="l" t="t" r="r" b="b"/>
+                <a:pathLst>
+                  <a:path w="1427584" h="727792">
+                    <a:moveTo>
+                      <a:pt x="0" y="718462"/>
+                    </a:moveTo>
+                    <a:cubicBezTo>
+                      <a:pt x="240263" y="358456"/>
+                      <a:pt x="480526" y="-1550"/>
+                      <a:pt x="718457" y="5"/>
+                    </a:cubicBezTo>
+                    <a:cubicBezTo>
+                      <a:pt x="956388" y="1560"/>
+                      <a:pt x="1191986" y="364676"/>
+                      <a:pt x="1427584" y="727792"/>
+                    </a:cubicBezTo>
+                  </a:path>
+                </a:pathLst>
+              </a:custGeom>
+              <a:solidFill>
+                <a:schemeClr val="accent1">
+                  <a:lumMod val="20000"/>
+                  <a:lumOff val="80000"/>
+                </a:schemeClr>
+              </a:solidFill>
+              <a:ln w="19050"/>
+            </p:spPr>
+            <p:style>
+              <a:lnRef idx="2">
+                <a:schemeClr val="accent1">
+                  <a:shade val="50000"/>
+                </a:schemeClr>
+              </a:lnRef>
+              <a:fillRef idx="1">
+                <a:schemeClr val="accent1"/>
+              </a:fillRef>
+              <a:effectRef idx="0">
+                <a:schemeClr val="accent1"/>
+              </a:effectRef>
+              <a:fontRef idx="minor">
+                <a:schemeClr val="lt1"/>
+              </a:fontRef>
+            </p:style>
+            <p:txBody>
+              <a:bodyPr rtlCol="0" anchor="ctr"/>
+              <a:lstStyle/>
+              <a:p>
+                <a:pPr algn="ctr"/>
+                <a:endParaRPr lang="en-IN"/>
+              </a:p>
+            </p:txBody>
+          </p:sp>
+          <p:sp>
+            <p:nvSpPr>
+              <p:cNvPr id="41" name="Freeform: Shape 40">
+                <a:extLst>
+                  <a:ext uri="{FF2B5EF4-FFF2-40B4-BE49-F238E27FC236}">
+                    <a16:creationId xmlns:a16="http://schemas.microsoft.com/office/drawing/2014/main" id="{E46076EE-9061-CA15-1E1A-CA4F00CC20EF}"/>
+                  </a:ext>
+                </a:extLst>
+              </p:cNvPr>
+              <p:cNvSpPr/>
+              <p:nvPr/>
+            </p:nvSpPr>
+            <p:spPr>
+              <a:xfrm flipV="1">
+                <a:off x="1799127" y="1992085"/>
+                <a:ext cx="718455" cy="727792"/>
+              </a:xfrm>
+              <a:custGeom>
+                <a:avLst/>
+                <a:gdLst>
+                  <a:gd name="connsiteX0" fmla="*/ 0 w 1427584"/>
+                  <a:gd name="connsiteY0" fmla="*/ 718462 h 727792"/>
+                  <a:gd name="connsiteX1" fmla="*/ 718457 w 1427584"/>
+                  <a:gd name="connsiteY1" fmla="*/ 5 h 727792"/>
+                  <a:gd name="connsiteX2" fmla="*/ 1427584 w 1427584"/>
+                  <a:gd name="connsiteY2" fmla="*/ 727792 h 727792"/>
+                </a:gdLst>
+                <a:ahLst/>
+                <a:cxnLst>
+                  <a:cxn ang="0">
+                    <a:pos x="connsiteX0" y="connsiteY0"/>
+                  </a:cxn>
+                  <a:cxn ang="0">
+                    <a:pos x="connsiteX1" y="connsiteY1"/>
+                  </a:cxn>
+                  <a:cxn ang="0">
+                    <a:pos x="connsiteX2" y="connsiteY2"/>
+                  </a:cxn>
+                </a:cxnLst>
+                <a:rect l="l" t="t" r="r" b="b"/>
+                <a:pathLst>
+                  <a:path w="1427584" h="727792">
+                    <a:moveTo>
+                      <a:pt x="0" y="718462"/>
+                    </a:moveTo>
+                    <a:cubicBezTo>
+                      <a:pt x="240263" y="358456"/>
+                      <a:pt x="480526" y="-1550"/>
+                      <a:pt x="718457" y="5"/>
+                    </a:cubicBezTo>
+                    <a:cubicBezTo>
+                      <a:pt x="956388" y="1560"/>
+                      <a:pt x="1191986" y="364676"/>
+                      <a:pt x="1427584" y="727792"/>
+                    </a:cubicBezTo>
+                  </a:path>
+                </a:pathLst>
+              </a:custGeom>
+              <a:solidFill>
+                <a:schemeClr val="accent1">
+                  <a:lumMod val="20000"/>
+                  <a:lumOff val="80000"/>
+                </a:schemeClr>
+              </a:solidFill>
+              <a:ln w="19050"/>
+            </p:spPr>
+            <p:style>
+              <a:lnRef idx="2">
+                <a:schemeClr val="accent1">
+                  <a:shade val="50000"/>
+                </a:schemeClr>
+              </a:lnRef>
+              <a:fillRef idx="1">
+                <a:schemeClr val="accent1"/>
+              </a:fillRef>
+              <a:effectRef idx="0">
+                <a:schemeClr val="accent1"/>
+              </a:effectRef>
+              <a:fontRef idx="minor">
+                <a:schemeClr val="lt1"/>
+              </a:fontRef>
+            </p:style>
+            <p:txBody>
+              <a:bodyPr rtlCol="0" anchor="ctr"/>
+              <a:lstStyle/>
+              <a:p>
+                <a:pPr algn="ctr"/>
+                <a:endParaRPr lang="en-IN"/>
+              </a:p>
+            </p:txBody>
+          </p:sp>
+          <p:sp>
+            <p:nvSpPr>
+              <p:cNvPr id="42" name="Freeform: Shape 41">
+                <a:extLst>
+                  <a:ext uri="{FF2B5EF4-FFF2-40B4-BE49-F238E27FC236}">
+                    <a16:creationId xmlns:a16="http://schemas.microsoft.com/office/drawing/2014/main" id="{C634BF8F-E564-46BE-403B-540C8440F860}"/>
+                  </a:ext>
+                </a:extLst>
+              </p:cNvPr>
+              <p:cNvSpPr/>
+              <p:nvPr/>
+            </p:nvSpPr>
+            <p:spPr>
+              <a:xfrm flipV="1">
+                <a:off x="3248475" y="1999025"/>
+                <a:ext cx="718455" cy="727792"/>
+              </a:xfrm>
+              <a:custGeom>
+                <a:avLst/>
+                <a:gdLst>
+                  <a:gd name="connsiteX0" fmla="*/ 0 w 1427584"/>
+                  <a:gd name="connsiteY0" fmla="*/ 718462 h 727792"/>
+                  <a:gd name="connsiteX1" fmla="*/ 718457 w 1427584"/>
+                  <a:gd name="connsiteY1" fmla="*/ 5 h 727792"/>
+                  <a:gd name="connsiteX2" fmla="*/ 1427584 w 1427584"/>
+                  <a:gd name="connsiteY2" fmla="*/ 727792 h 727792"/>
+                </a:gdLst>
+                <a:ahLst/>
+                <a:cxnLst>
+                  <a:cxn ang="0">
+                    <a:pos x="connsiteX0" y="connsiteY0"/>
+                  </a:cxn>
+                  <a:cxn ang="0">
+                    <a:pos x="connsiteX1" y="connsiteY1"/>
+                  </a:cxn>
+                  <a:cxn ang="0">
+                    <a:pos x="connsiteX2" y="connsiteY2"/>
+                  </a:cxn>
+                </a:cxnLst>
+                <a:rect l="l" t="t" r="r" b="b"/>
+                <a:pathLst>
+                  <a:path w="1427584" h="727792">
+                    <a:moveTo>
+                      <a:pt x="0" y="718462"/>
+                    </a:moveTo>
+                    <a:cubicBezTo>
+                      <a:pt x="240263" y="358456"/>
+                      <a:pt x="480526" y="-1550"/>
+                      <a:pt x="718457" y="5"/>
+                    </a:cubicBezTo>
+                    <a:cubicBezTo>
+                      <a:pt x="956388" y="1560"/>
+                      <a:pt x="1191986" y="364676"/>
+                      <a:pt x="1427584" y="727792"/>
+                    </a:cubicBezTo>
+                  </a:path>
+                </a:pathLst>
+              </a:custGeom>
+              <a:solidFill>
+                <a:schemeClr val="accent1">
+                  <a:lumMod val="20000"/>
+                  <a:lumOff val="80000"/>
+                </a:schemeClr>
+              </a:solidFill>
+              <a:ln w="19050"/>
+            </p:spPr>
+            <p:style>
+              <a:lnRef idx="2">
+                <a:schemeClr val="accent1">
+                  <a:shade val="50000"/>
+                </a:schemeClr>
+              </a:lnRef>
+              <a:fillRef idx="1">
+                <a:schemeClr val="accent1"/>
+              </a:fillRef>
+              <a:effectRef idx="0">
+                <a:schemeClr val="accent1"/>
+              </a:effectRef>
+              <a:fontRef idx="minor">
+                <a:schemeClr val="lt1"/>
+              </a:fontRef>
+            </p:style>
+            <p:txBody>
+              <a:bodyPr rtlCol="0" anchor="ctr"/>
+              <a:lstStyle/>
+              <a:p>
+                <a:pPr algn="ctr"/>
+                <a:endParaRPr lang="en-IN"/>
+              </a:p>
+            </p:txBody>
+          </p:sp>
+          <p:sp>
+            <p:nvSpPr>
+              <p:cNvPr id="43" name="Freeform: Shape 42">
+                <a:extLst>
+                  <a:ext uri="{FF2B5EF4-FFF2-40B4-BE49-F238E27FC236}">
+                    <a16:creationId xmlns:a16="http://schemas.microsoft.com/office/drawing/2014/main" id="{128BF63D-7C03-2BDA-7AA4-6CADB27AD14C}"/>
+                  </a:ext>
+                </a:extLst>
+              </p:cNvPr>
+              <p:cNvSpPr/>
+              <p:nvPr/>
+            </p:nvSpPr>
+            <p:spPr>
+              <a:xfrm flipV="1">
+                <a:off x="8989922" y="2008468"/>
+                <a:ext cx="718455" cy="727792"/>
+              </a:xfrm>
+              <a:custGeom>
+                <a:avLst/>
+                <a:gdLst>
+                  <a:gd name="connsiteX0" fmla="*/ 0 w 1427584"/>
+                  <a:gd name="connsiteY0" fmla="*/ 718462 h 727792"/>
+                  <a:gd name="connsiteX1" fmla="*/ 718457 w 1427584"/>
+                  <a:gd name="connsiteY1" fmla="*/ 5 h 727792"/>
+                  <a:gd name="connsiteX2" fmla="*/ 1427584 w 1427584"/>
+                  <a:gd name="connsiteY2" fmla="*/ 727792 h 727792"/>
+                </a:gdLst>
+                <a:ahLst/>
+                <a:cxnLst>
+                  <a:cxn ang="0">
+                    <a:pos x="connsiteX0" y="connsiteY0"/>
+                  </a:cxn>
+                  <a:cxn ang="0">
+                    <a:pos x="connsiteX1" y="connsiteY1"/>
+                  </a:cxn>
+                  <a:cxn ang="0">
+                    <a:pos x="connsiteX2" y="connsiteY2"/>
+                  </a:cxn>
+                </a:cxnLst>
+                <a:rect l="l" t="t" r="r" b="b"/>
+                <a:pathLst>
+                  <a:path w="1427584" h="727792">
+                    <a:moveTo>
+                      <a:pt x="0" y="718462"/>
+                    </a:moveTo>
+                    <a:cubicBezTo>
+                      <a:pt x="240263" y="358456"/>
+                      <a:pt x="480526" y="-1550"/>
+                      <a:pt x="718457" y="5"/>
+                    </a:cubicBezTo>
+                    <a:cubicBezTo>
+                      <a:pt x="956388" y="1560"/>
+                      <a:pt x="1191986" y="364676"/>
+                      <a:pt x="1427584" y="727792"/>
+                    </a:cubicBezTo>
+                  </a:path>
+                </a:pathLst>
+              </a:custGeom>
+              <a:solidFill>
+                <a:schemeClr val="accent1">
+                  <a:lumMod val="20000"/>
+                  <a:lumOff val="80000"/>
+                </a:schemeClr>
+              </a:solidFill>
+              <a:ln w="19050"/>
+            </p:spPr>
+            <p:style>
+              <a:lnRef idx="2">
+                <a:schemeClr val="accent1">
+                  <a:shade val="50000"/>
+                </a:schemeClr>
+              </a:lnRef>
+              <a:fillRef idx="1">
+                <a:schemeClr val="accent1"/>
+              </a:fillRef>
+              <a:effectRef idx="0">
+                <a:schemeClr val="accent1"/>
+              </a:effectRef>
+              <a:fontRef idx="minor">
+                <a:schemeClr val="lt1"/>
+              </a:fontRef>
+            </p:style>
+            <p:txBody>
+              <a:bodyPr rtlCol="0" anchor="ctr"/>
+              <a:lstStyle/>
+              <a:p>
+                <a:pPr algn="ctr"/>
+                <a:endParaRPr lang="en-IN"/>
+              </a:p>
+            </p:txBody>
+          </p:sp>
+          <p:sp>
+            <p:nvSpPr>
+              <p:cNvPr id="44" name="Freeform: Shape 43">
+                <a:extLst>
+                  <a:ext uri="{FF2B5EF4-FFF2-40B4-BE49-F238E27FC236}">
+                    <a16:creationId xmlns:a16="http://schemas.microsoft.com/office/drawing/2014/main" id="{AD147CD5-2191-0690-B0FD-241A23909C1B}"/>
+                  </a:ext>
+                </a:extLst>
+              </p:cNvPr>
+              <p:cNvSpPr/>
+              <p:nvPr/>
+            </p:nvSpPr>
+            <p:spPr>
+              <a:xfrm>
+                <a:off x="8271467" y="1254965"/>
+                <a:ext cx="718455" cy="727792"/>
+              </a:xfrm>
+              <a:custGeom>
+                <a:avLst/>
+                <a:gdLst>
+                  <a:gd name="connsiteX0" fmla="*/ 0 w 1427584"/>
+                  <a:gd name="connsiteY0" fmla="*/ 718462 h 727792"/>
+                  <a:gd name="connsiteX1" fmla="*/ 718457 w 1427584"/>
+                  <a:gd name="connsiteY1" fmla="*/ 5 h 727792"/>
+                  <a:gd name="connsiteX2" fmla="*/ 1427584 w 1427584"/>
+                  <a:gd name="connsiteY2" fmla="*/ 727792 h 727792"/>
+                </a:gdLst>
+                <a:ahLst/>
+                <a:cxnLst>
+                  <a:cxn ang="0">
+                    <a:pos x="connsiteX0" y="connsiteY0"/>
+                  </a:cxn>
+                  <a:cxn ang="0">
+                    <a:pos x="connsiteX1" y="connsiteY1"/>
+                  </a:cxn>
+                  <a:cxn ang="0">
+                    <a:pos x="connsiteX2" y="connsiteY2"/>
+                  </a:cxn>
+                </a:cxnLst>
+                <a:rect l="l" t="t" r="r" b="b"/>
+                <a:pathLst>
+                  <a:path w="1427584" h="727792">
+                    <a:moveTo>
+                      <a:pt x="0" y="718462"/>
+                    </a:moveTo>
+                    <a:cubicBezTo>
+                      <a:pt x="240263" y="358456"/>
+                      <a:pt x="480526" y="-1550"/>
+                      <a:pt x="718457" y="5"/>
+                    </a:cubicBezTo>
+                    <a:cubicBezTo>
+                      <a:pt x="956388" y="1560"/>
+                      <a:pt x="1191986" y="364676"/>
+                      <a:pt x="1427584" y="727792"/>
+                    </a:cubicBezTo>
+                  </a:path>
+                </a:pathLst>
+              </a:custGeom>
+              <a:solidFill>
+                <a:schemeClr val="accent1">
+                  <a:lumMod val="20000"/>
+                  <a:lumOff val="80000"/>
+                </a:schemeClr>
+              </a:solidFill>
+              <a:ln w="19050"/>
+            </p:spPr>
+            <p:style>
+              <a:lnRef idx="2">
+                <a:schemeClr val="accent1">
+                  <a:shade val="50000"/>
+                </a:schemeClr>
+              </a:lnRef>
+              <a:fillRef idx="1">
+                <a:schemeClr val="accent1"/>
+              </a:fillRef>
+              <a:effectRef idx="0">
+                <a:schemeClr val="accent1"/>
+              </a:effectRef>
+              <a:fontRef idx="minor">
+                <a:schemeClr val="lt1"/>
+              </a:fontRef>
+            </p:style>
+            <p:txBody>
+              <a:bodyPr rtlCol="0" anchor="ctr"/>
+              <a:lstStyle/>
+              <a:p>
+                <a:pPr algn="ctr"/>
+                <a:endParaRPr lang="en-IN"/>
+              </a:p>
+            </p:txBody>
+          </p:sp>
+          <p:sp>
+            <p:nvSpPr>
+              <p:cNvPr id="45" name="Freeform: Shape 44">
+                <a:extLst>
+                  <a:ext uri="{FF2B5EF4-FFF2-40B4-BE49-F238E27FC236}">
+                    <a16:creationId xmlns:a16="http://schemas.microsoft.com/office/drawing/2014/main" id="{E7E98D8A-174C-C60D-2ACF-CA52F1675DC6}"/>
+                  </a:ext>
+                </a:extLst>
+              </p:cNvPr>
+              <p:cNvSpPr/>
+              <p:nvPr/>
+            </p:nvSpPr>
+            <p:spPr>
+              <a:xfrm>
+                <a:off x="9708377" y="1264296"/>
+                <a:ext cx="718455" cy="727792"/>
+              </a:xfrm>
+              <a:custGeom>
+                <a:avLst/>
+                <a:gdLst>
+                  <a:gd name="connsiteX0" fmla="*/ 0 w 1427584"/>
+                  <a:gd name="connsiteY0" fmla="*/ 718462 h 727792"/>
+                  <a:gd name="connsiteX1" fmla="*/ 718457 w 1427584"/>
+                  <a:gd name="connsiteY1" fmla="*/ 5 h 727792"/>
+                  <a:gd name="connsiteX2" fmla="*/ 1427584 w 1427584"/>
+                  <a:gd name="connsiteY2" fmla="*/ 727792 h 727792"/>
+                </a:gdLst>
+                <a:ahLst/>
+                <a:cxnLst>
+                  <a:cxn ang="0">
+                    <a:pos x="connsiteX0" y="connsiteY0"/>
+                  </a:cxn>
+                  <a:cxn ang="0">
+                    <a:pos x="connsiteX1" y="connsiteY1"/>
+                  </a:cxn>
+                  <a:cxn ang="0">
+                    <a:pos x="connsiteX2" y="connsiteY2"/>
+                  </a:cxn>
+                </a:cxnLst>
+                <a:rect l="l" t="t" r="r" b="b"/>
+                <a:pathLst>
+                  <a:path w="1427584" h="727792">
+                    <a:moveTo>
+                      <a:pt x="0" y="718462"/>
+                    </a:moveTo>
+                    <a:cubicBezTo>
+                      <a:pt x="240263" y="358456"/>
+                      <a:pt x="480526" y="-1550"/>
+                      <a:pt x="718457" y="5"/>
+                    </a:cubicBezTo>
+                    <a:cubicBezTo>
+                      <a:pt x="956388" y="1560"/>
+                      <a:pt x="1191986" y="364676"/>
+                      <a:pt x="1427584" y="727792"/>
+                    </a:cubicBezTo>
+                  </a:path>
+                </a:pathLst>
+              </a:custGeom>
+              <a:solidFill>
+                <a:schemeClr val="accent1">
+                  <a:lumMod val="20000"/>
+                  <a:lumOff val="80000"/>
+                </a:schemeClr>
+              </a:solidFill>
+              <a:ln w="19050"/>
+            </p:spPr>
+            <p:style>
+              <a:lnRef idx="2">
+                <a:schemeClr val="accent1">
+                  <a:shade val="50000"/>
+                </a:schemeClr>
+              </a:lnRef>
+              <a:fillRef idx="1">
+                <a:schemeClr val="accent1"/>
+              </a:fillRef>
+              <a:effectRef idx="0">
+                <a:schemeClr val="accent1"/>
+              </a:effectRef>
+              <a:fontRef idx="minor">
+                <a:schemeClr val="lt1"/>
+              </a:fontRef>
+            </p:style>
+            <p:txBody>
+              <a:bodyPr rtlCol="0" anchor="ctr"/>
+              <a:lstStyle/>
+              <a:p>
+                <a:pPr algn="ctr"/>
+                <a:endParaRPr lang="en-IN"/>
+              </a:p>
+            </p:txBody>
+          </p:sp>
+          <p:sp>
+            <p:nvSpPr>
+              <p:cNvPr id="46" name="Freeform: Shape 45">
+                <a:extLst>
+                  <a:ext uri="{FF2B5EF4-FFF2-40B4-BE49-F238E27FC236}">
+                    <a16:creationId xmlns:a16="http://schemas.microsoft.com/office/drawing/2014/main" id="{64FDE4C6-1D19-27AA-1952-AC465C0DC9A2}"/>
+                  </a:ext>
+                </a:extLst>
+              </p:cNvPr>
+              <p:cNvSpPr/>
+              <p:nvPr/>
+            </p:nvSpPr>
+            <p:spPr>
+              <a:xfrm flipV="1">
+                <a:off x="10423974" y="2003575"/>
+                <a:ext cx="718455" cy="727792"/>
+              </a:xfrm>
+              <a:custGeom>
+                <a:avLst/>
+                <a:gdLst>
+                  <a:gd name="connsiteX0" fmla="*/ 0 w 1427584"/>
+                  <a:gd name="connsiteY0" fmla="*/ 718462 h 727792"/>
+                  <a:gd name="connsiteX1" fmla="*/ 718457 w 1427584"/>
+                  <a:gd name="connsiteY1" fmla="*/ 5 h 727792"/>
+                  <a:gd name="connsiteX2" fmla="*/ 1427584 w 1427584"/>
+                  <a:gd name="connsiteY2" fmla="*/ 727792 h 727792"/>
+                </a:gdLst>
+                <a:ahLst/>
+                <a:cxnLst>
+                  <a:cxn ang="0">
+                    <a:pos x="connsiteX0" y="connsiteY0"/>
+                  </a:cxn>
+                  <a:cxn ang="0">
+                    <a:pos x="connsiteX1" y="connsiteY1"/>
+                  </a:cxn>
+                  <a:cxn ang="0">
+                    <a:pos x="connsiteX2" y="connsiteY2"/>
+                  </a:cxn>
+                </a:cxnLst>
+                <a:rect l="l" t="t" r="r" b="b"/>
+                <a:pathLst>
+                  <a:path w="1427584" h="727792">
+                    <a:moveTo>
+                      <a:pt x="0" y="718462"/>
+                    </a:moveTo>
+                    <a:cubicBezTo>
+                      <a:pt x="240263" y="358456"/>
+                      <a:pt x="480526" y="-1550"/>
+                      <a:pt x="718457" y="5"/>
+                    </a:cubicBezTo>
+                    <a:cubicBezTo>
+                      <a:pt x="956388" y="1560"/>
+                      <a:pt x="1191986" y="364676"/>
+                      <a:pt x="1427584" y="727792"/>
+                    </a:cubicBezTo>
+                  </a:path>
+                </a:pathLst>
+              </a:custGeom>
+              <a:solidFill>
+                <a:schemeClr val="accent1">
+                  <a:lumMod val="20000"/>
+                  <a:lumOff val="80000"/>
+                </a:schemeClr>
+              </a:solidFill>
+              <a:ln w="19050"/>
+            </p:spPr>
+            <p:style>
+              <a:lnRef idx="2">
+                <a:schemeClr val="accent1">
+                  <a:shade val="50000"/>
+                </a:schemeClr>
+              </a:lnRef>
+              <a:fillRef idx="1">
+                <a:schemeClr val="accent1"/>
+              </a:fillRef>
+              <a:effectRef idx="0">
+                <a:schemeClr val="accent1"/>
+              </a:effectRef>
+              <a:fontRef idx="minor">
+                <a:schemeClr val="lt1"/>
+              </a:fontRef>
+            </p:style>
+            <p:txBody>
+              <a:bodyPr rtlCol="0" anchor="ctr"/>
+              <a:lstStyle/>
+              <a:p>
+                <a:pPr algn="ctr"/>
+                <a:endParaRPr lang="en-IN"/>
+              </a:p>
+            </p:txBody>
+          </p:sp>
+          <p:cxnSp>
+            <p:nvCxnSpPr>
+              <p:cNvPr id="47" name="Straight Connector 46">
+                <a:extLst>
+                  <a:ext uri="{FF2B5EF4-FFF2-40B4-BE49-F238E27FC236}">
+                    <a16:creationId xmlns:a16="http://schemas.microsoft.com/office/drawing/2014/main" id="{F95997D2-F9FB-FEDC-FC5F-549DFB80462D}"/>
+                  </a:ext>
+                </a:extLst>
+              </p:cNvPr>
+              <p:cNvCxnSpPr>
+                <a:cxnSpLocks/>
+              </p:cNvCxnSpPr>
+              <p:nvPr/>
+            </p:nvCxnSpPr>
+            <p:spPr>
+              <a:xfrm flipV="1">
+                <a:off x="1037133" y="1982757"/>
+                <a:ext cx="10504834" cy="9329"/>
+              </a:xfrm>
+              <a:prstGeom prst="line">
+                <a:avLst/>
+              </a:prstGeom>
+              <a:ln w="28575" cap="flat" cmpd="sng" algn="ctr">
+                <a:solidFill>
+                  <a:schemeClr val="tx1"/>
+                </a:solidFill>
+                <a:prstDash val="solid"/>
+                <a:round/>
+                <a:headEnd type="none" w="med" len="med"/>
+                <a:tailEnd type="arrow" w="med" len="med"/>
+              </a:ln>
+            </p:spPr>
+            <p:style>
+              <a:lnRef idx="0">
+                <a:scrgbClr r="0" g="0" b="0"/>
+              </a:lnRef>
+              <a:fillRef idx="0">
+                <a:scrgbClr r="0" g="0" b="0"/>
+              </a:fillRef>
+              <a:effectRef idx="0">
+                <a:scrgbClr r="0" g="0" b="0"/>
+              </a:effectRef>
+              <a:fontRef idx="minor">
+                <a:schemeClr val="tx1"/>
+              </a:fontRef>
+            </p:style>
+          </p:cxnSp>
+        </p:grpSp>
+        <p:cxnSp>
+          <p:nvCxnSpPr>
+            <p:cNvPr id="52" name="Straight Connector 51">
+              <a:extLst>
+                <a:ext uri="{FF2B5EF4-FFF2-40B4-BE49-F238E27FC236}">
+                  <a16:creationId xmlns:a16="http://schemas.microsoft.com/office/drawing/2014/main" id="{AB539D4E-BEE9-0989-D673-1F327068D96A}"/>
+                </a:ext>
+              </a:extLst>
+            </p:cNvPr>
+            <p:cNvCxnSpPr>
+              <a:cxnSpLocks/>
+            </p:cNvCxnSpPr>
+            <p:nvPr/>
+          </p:nvCxnSpPr>
+          <p:spPr>
+            <a:xfrm flipV="1">
+              <a:off x="1058902" y="2879061"/>
+              <a:ext cx="0" cy="549939"/>
+            </a:xfrm>
+            <a:prstGeom prst="line">
+              <a:avLst/>
+            </a:prstGeom>
+            <a:ln w="28575" cap="flat" cmpd="sng" algn="ctr">
+              <a:solidFill>
+                <a:schemeClr val="tx1"/>
+              </a:solidFill>
+              <a:prstDash val="solid"/>
+              <a:round/>
+              <a:headEnd type="none" w="med" len="med"/>
+              <a:tailEnd type="arrow" w="med" len="med"/>
+            </a:ln>
+          </p:spPr>
+          <p:style>
+            <a:lnRef idx="0">
+              <a:scrgbClr r="0" g="0" b="0"/>
+            </a:lnRef>
+            <a:fillRef idx="0">
+              <a:scrgbClr r="0" g="0" b="0"/>
+            </a:fillRef>
+            <a:effectRef idx="0">
+              <a:scrgbClr r="0" g="0" b="0"/>
+            </a:effectRef>
+            <a:fontRef idx="minor">
+              <a:schemeClr val="tx1"/>
+            </a:fontRef>
+          </p:style>
+        </p:cxnSp>
+        <p:cxnSp>
+          <p:nvCxnSpPr>
+            <p:cNvPr id="55" name="Straight Connector 54">
+              <a:extLst>
+                <a:ext uri="{FF2B5EF4-FFF2-40B4-BE49-F238E27FC236}">
+                  <a16:creationId xmlns:a16="http://schemas.microsoft.com/office/drawing/2014/main" id="{B1F33363-46A3-DA7C-0D3C-1BC039B417B8}"/>
+                </a:ext>
+              </a:extLst>
+            </p:cNvPr>
+            <p:cNvCxnSpPr>
+              <a:cxnSpLocks/>
+            </p:cNvCxnSpPr>
+            <p:nvPr/>
+          </p:nvCxnSpPr>
+          <p:spPr>
+            <a:xfrm flipV="1">
+              <a:off x="1062010" y="3591298"/>
+              <a:ext cx="0" cy="549939"/>
+            </a:xfrm>
+            <a:prstGeom prst="line">
+              <a:avLst/>
+            </a:prstGeom>
+            <a:ln w="28575" cap="flat" cmpd="sng" algn="ctr">
+              <a:solidFill>
+                <a:schemeClr val="tx1"/>
+              </a:solidFill>
+              <a:prstDash val="solid"/>
+              <a:round/>
+              <a:headEnd type="none" w="med" len="med"/>
+              <a:tailEnd type="arrow" w="med" len="med"/>
+            </a:ln>
+          </p:spPr>
+          <p:style>
+            <a:lnRef idx="0">
+              <a:scrgbClr r="0" g="0" b="0"/>
+            </a:lnRef>
+            <a:fillRef idx="0">
+              <a:scrgbClr r="0" g="0" b="0"/>
+            </a:fillRef>
+            <a:effectRef idx="0">
+              <a:scrgbClr r="0" g="0" b="0"/>
+            </a:effectRef>
+            <a:fontRef idx="minor">
+              <a:schemeClr val="tx1"/>
+            </a:fontRef>
+          </p:style>
+        </p:cxnSp>
+        <p:sp>
+          <p:nvSpPr>
+            <p:cNvPr id="56" name="Rectangle 55">
+              <a:extLst>
+                <a:ext uri="{FF2B5EF4-FFF2-40B4-BE49-F238E27FC236}">
+                  <a16:creationId xmlns:a16="http://schemas.microsoft.com/office/drawing/2014/main" id="{DAF1D388-0056-6BEF-0E5B-C5B4044A9AE7}"/>
+                </a:ext>
+              </a:extLst>
+            </p:cNvPr>
+            <p:cNvSpPr/>
+            <p:nvPr/>
+          </p:nvSpPr>
+          <p:spPr>
+            <a:xfrm>
+              <a:off x="1052679" y="3221989"/>
+              <a:ext cx="83975" cy="198328"/>
+            </a:xfrm>
+            <a:prstGeom prst="rect">
+              <a:avLst/>
+            </a:prstGeom>
+            <a:solidFill>
+              <a:srgbClr val="FF0000"/>
+            </a:solidFill>
+            <a:ln>
+              <a:solidFill>
+                <a:schemeClr val="tx1"/>
+              </a:solidFill>
+            </a:ln>
+          </p:spPr>
+          <p:style>
+            <a:lnRef idx="2">
+              <a:schemeClr val="accent1">
+                <a:shade val="50000"/>
+              </a:schemeClr>
+            </a:lnRef>
+            <a:fillRef idx="1">
+              <a:schemeClr val="accent1"/>
+            </a:fillRef>
+            <a:effectRef idx="0">
+              <a:schemeClr val="accent1"/>
+            </a:effectRef>
+            <a:fontRef idx="minor">
+              <a:schemeClr val="lt1"/>
+            </a:fontRef>
+          </p:style>
+          <p:txBody>
+            <a:bodyPr rtlCol="0" anchor="ctr"/>
+            <a:lstStyle/>
+            <a:p>
+              <a:pPr algn="ctr"/>
+              <a:endParaRPr lang="en-IN"/>
+            </a:p>
+          </p:txBody>
+        </p:sp>
+        <p:sp>
+          <p:nvSpPr>
+            <p:cNvPr id="57" name="Rectangle 56">
+              <a:extLst>
+                <a:ext uri="{FF2B5EF4-FFF2-40B4-BE49-F238E27FC236}">
+                  <a16:creationId xmlns:a16="http://schemas.microsoft.com/office/drawing/2014/main" id="{6FF8534F-D270-57BD-3757-6CD93F567B2F}"/>
+                </a:ext>
+              </a:extLst>
+            </p:cNvPr>
+            <p:cNvSpPr/>
+            <p:nvPr/>
+          </p:nvSpPr>
+          <p:spPr>
+            <a:xfrm>
+              <a:off x="2506694" y="3212658"/>
+              <a:ext cx="83975" cy="198328"/>
+            </a:xfrm>
+            <a:prstGeom prst="rect">
+              <a:avLst/>
+            </a:prstGeom>
+            <a:solidFill>
+              <a:srgbClr val="FF0000"/>
+            </a:solidFill>
+            <a:ln>
+              <a:solidFill>
+                <a:schemeClr val="tx1"/>
+              </a:solidFill>
+            </a:ln>
+          </p:spPr>
+          <p:style>
+            <a:lnRef idx="2">
+              <a:schemeClr val="accent1">
+                <a:shade val="50000"/>
+              </a:schemeClr>
+            </a:lnRef>
+            <a:fillRef idx="1">
+              <a:schemeClr val="accent1"/>
+            </a:fillRef>
+            <a:effectRef idx="0">
+              <a:schemeClr val="accent1"/>
+            </a:effectRef>
+            <a:fontRef idx="minor">
+              <a:schemeClr val="lt1"/>
+            </a:fontRef>
+          </p:style>
+          <p:txBody>
+            <a:bodyPr rtlCol="0" anchor="ctr"/>
+            <a:lstStyle/>
+            <a:p>
+              <a:pPr algn="ctr"/>
+              <a:endParaRPr lang="en-IN"/>
+            </a:p>
+          </p:txBody>
+        </p:sp>
+        <p:sp>
+          <p:nvSpPr>
+            <p:cNvPr id="58" name="Rectangle 57">
+              <a:extLst>
+                <a:ext uri="{FF2B5EF4-FFF2-40B4-BE49-F238E27FC236}">
+                  <a16:creationId xmlns:a16="http://schemas.microsoft.com/office/drawing/2014/main" id="{6065AB13-6BAF-F999-411A-C5578A3316A6}"/>
+                </a:ext>
+              </a:extLst>
+            </p:cNvPr>
+            <p:cNvSpPr/>
+            <p:nvPr/>
+          </p:nvSpPr>
+          <p:spPr>
+            <a:xfrm>
+              <a:off x="8266768" y="3214803"/>
+              <a:ext cx="83975" cy="198328"/>
+            </a:xfrm>
+            <a:prstGeom prst="rect">
+              <a:avLst/>
+            </a:prstGeom>
+            <a:solidFill>
+              <a:srgbClr val="FF0000"/>
+            </a:solidFill>
+            <a:ln>
+              <a:solidFill>
+                <a:schemeClr val="tx1"/>
+              </a:solidFill>
+            </a:ln>
+          </p:spPr>
+          <p:style>
+            <a:lnRef idx="2">
+              <a:schemeClr val="accent1">
+                <a:shade val="50000"/>
+              </a:schemeClr>
+            </a:lnRef>
+            <a:fillRef idx="1">
+              <a:schemeClr val="accent1"/>
+            </a:fillRef>
+            <a:effectRef idx="0">
+              <a:schemeClr val="accent1"/>
+            </a:effectRef>
+            <a:fontRef idx="minor">
+              <a:schemeClr val="lt1"/>
+            </a:fontRef>
+          </p:style>
+          <p:txBody>
+            <a:bodyPr rtlCol="0" anchor="ctr"/>
+            <a:lstStyle/>
+            <a:p>
+              <a:pPr algn="ctr"/>
+              <a:endParaRPr lang="en-IN"/>
+            </a:p>
+          </p:txBody>
+        </p:sp>
+        <p:sp>
+          <p:nvSpPr>
+            <p:cNvPr id="59" name="Rectangle 58">
+              <a:extLst>
+                <a:ext uri="{FF2B5EF4-FFF2-40B4-BE49-F238E27FC236}">
+                  <a16:creationId xmlns:a16="http://schemas.microsoft.com/office/drawing/2014/main" id="{BAFB8AE5-3D18-DE0D-B318-BFC1E71D896E}"/>
+                </a:ext>
+              </a:extLst>
+            </p:cNvPr>
+            <p:cNvSpPr/>
+            <p:nvPr/>
+          </p:nvSpPr>
+          <p:spPr>
+            <a:xfrm>
+              <a:off x="9700407" y="3231795"/>
+              <a:ext cx="83975" cy="198328"/>
+            </a:xfrm>
+            <a:prstGeom prst="rect">
+              <a:avLst/>
+            </a:prstGeom>
+            <a:solidFill>
+              <a:srgbClr val="FF0000"/>
+            </a:solidFill>
+            <a:ln>
+              <a:solidFill>
+                <a:schemeClr val="tx1"/>
+              </a:solidFill>
+            </a:ln>
+          </p:spPr>
+          <p:style>
+            <a:lnRef idx="2">
+              <a:schemeClr val="accent1">
+                <a:shade val="50000"/>
+              </a:schemeClr>
+            </a:lnRef>
+            <a:fillRef idx="1">
+              <a:schemeClr val="accent1"/>
+            </a:fillRef>
+            <a:effectRef idx="0">
+              <a:schemeClr val="accent1"/>
+            </a:effectRef>
+            <a:fontRef idx="minor">
+              <a:schemeClr val="lt1"/>
+            </a:fontRef>
+          </p:style>
+          <p:txBody>
+            <a:bodyPr rtlCol="0" anchor="ctr"/>
+            <a:lstStyle/>
+            <a:p>
+              <a:pPr algn="ctr"/>
+              <a:endParaRPr lang="en-IN"/>
+            </a:p>
+          </p:txBody>
+        </p:sp>
+        <p:grpSp>
+          <p:nvGrpSpPr>
+            <p:cNvPr id="62" name="Group 61">
+              <a:extLst>
+                <a:ext uri="{FF2B5EF4-FFF2-40B4-BE49-F238E27FC236}">
+                  <a16:creationId xmlns:a16="http://schemas.microsoft.com/office/drawing/2014/main" id="{11C8A61D-B487-EBAF-D573-DE950782F379}"/>
+                </a:ext>
+              </a:extLst>
+            </p:cNvPr>
+            <p:cNvGrpSpPr/>
+            <p:nvPr/>
+          </p:nvGrpSpPr>
+          <p:grpSpPr>
+            <a:xfrm>
+              <a:off x="1789796" y="3938241"/>
+              <a:ext cx="1500666" cy="199890"/>
+              <a:chOff x="1789796" y="3938241"/>
+              <a:chExt cx="1500666" cy="199890"/>
+            </a:xfrm>
+          </p:grpSpPr>
+          <p:sp>
+            <p:nvSpPr>
+              <p:cNvPr id="60" name="Rectangle 59">
+                <a:extLst>
+                  <a:ext uri="{FF2B5EF4-FFF2-40B4-BE49-F238E27FC236}">
+                    <a16:creationId xmlns:a16="http://schemas.microsoft.com/office/drawing/2014/main" id="{C8D6F864-BE66-E29D-72BB-9A7164E4FBE8}"/>
+                  </a:ext>
+                </a:extLst>
+              </p:cNvPr>
+              <p:cNvSpPr/>
+              <p:nvPr/>
+            </p:nvSpPr>
+            <p:spPr>
+              <a:xfrm>
+                <a:off x="1789796" y="3939803"/>
+                <a:ext cx="83975" cy="198328"/>
+              </a:xfrm>
+              <a:prstGeom prst="rect">
+                <a:avLst/>
+              </a:prstGeom>
+              <a:solidFill>
+                <a:srgbClr val="FF0000"/>
+              </a:solidFill>
+              <a:ln>
+                <a:solidFill>
+                  <a:schemeClr val="tx1"/>
+                </a:solidFill>
+              </a:ln>
+            </p:spPr>
+            <p:style>
+              <a:lnRef idx="2">
+                <a:schemeClr val="accent1">
+                  <a:shade val="50000"/>
+                </a:schemeClr>
+              </a:lnRef>
+              <a:fillRef idx="1">
+                <a:schemeClr val="accent1"/>
+              </a:fillRef>
+              <a:effectRef idx="0">
+                <a:schemeClr val="accent1"/>
+              </a:effectRef>
+              <a:fontRef idx="minor">
+                <a:schemeClr val="lt1"/>
+              </a:fontRef>
+            </p:style>
+            <p:txBody>
+              <a:bodyPr rtlCol="0" anchor="ctr"/>
+              <a:lstStyle/>
+              <a:p>
+                <a:pPr algn="ctr"/>
+                <a:endParaRPr lang="en-IN"/>
+              </a:p>
+            </p:txBody>
+          </p:sp>
+          <p:sp>
+            <p:nvSpPr>
+              <p:cNvPr id="61" name="Rectangle 60">
+                <a:extLst>
+                  <a:ext uri="{FF2B5EF4-FFF2-40B4-BE49-F238E27FC236}">
+                    <a16:creationId xmlns:a16="http://schemas.microsoft.com/office/drawing/2014/main" id="{B7B48AEE-107C-542F-3E42-B3BA986F44CE}"/>
+                  </a:ext>
+                </a:extLst>
+              </p:cNvPr>
+              <p:cNvSpPr/>
+              <p:nvPr/>
+            </p:nvSpPr>
+            <p:spPr>
+              <a:xfrm>
+                <a:off x="3206487" y="3938241"/>
+                <a:ext cx="83975" cy="198328"/>
+              </a:xfrm>
+              <a:prstGeom prst="rect">
+                <a:avLst/>
+              </a:prstGeom>
+              <a:solidFill>
+                <a:srgbClr val="FF0000"/>
+              </a:solidFill>
+              <a:ln>
+                <a:solidFill>
+                  <a:schemeClr val="tx1"/>
+                </a:solidFill>
+              </a:ln>
+            </p:spPr>
+            <p:style>
+              <a:lnRef idx="2">
+                <a:schemeClr val="accent1">
+                  <a:shade val="50000"/>
+                </a:schemeClr>
+              </a:lnRef>
+              <a:fillRef idx="1">
+                <a:schemeClr val="accent1"/>
+              </a:fillRef>
+              <a:effectRef idx="0">
+                <a:schemeClr val="accent1"/>
+              </a:effectRef>
+              <a:fontRef idx="minor">
+                <a:schemeClr val="lt1"/>
+              </a:fontRef>
+            </p:style>
+            <p:txBody>
+              <a:bodyPr rtlCol="0" anchor="ctr"/>
+              <a:lstStyle/>
+              <a:p>
+                <a:pPr algn="ctr"/>
+                <a:endParaRPr lang="en-IN"/>
+              </a:p>
+            </p:txBody>
+          </p:sp>
+        </p:grpSp>
+        <p:grpSp>
+          <p:nvGrpSpPr>
+            <p:cNvPr id="63" name="Group 62">
+              <a:extLst>
+                <a:ext uri="{FF2B5EF4-FFF2-40B4-BE49-F238E27FC236}">
+                  <a16:creationId xmlns:a16="http://schemas.microsoft.com/office/drawing/2014/main" id="{CAD4D3AC-DE62-7EC0-1FBA-C260C541C2C4}"/>
+                </a:ext>
+              </a:extLst>
+            </p:cNvPr>
+            <p:cNvGrpSpPr/>
+            <p:nvPr/>
+          </p:nvGrpSpPr>
+          <p:grpSpPr>
+            <a:xfrm>
+              <a:off x="8982730" y="3932127"/>
+              <a:ext cx="1500666" cy="199890"/>
+              <a:chOff x="1789796" y="3938241"/>
+              <a:chExt cx="1500666" cy="199890"/>
+            </a:xfrm>
+          </p:grpSpPr>
+          <p:sp>
+            <p:nvSpPr>
+              <p:cNvPr id="64" name="Rectangle 63">
+                <a:extLst>
+                  <a:ext uri="{FF2B5EF4-FFF2-40B4-BE49-F238E27FC236}">
+                    <a16:creationId xmlns:a16="http://schemas.microsoft.com/office/drawing/2014/main" id="{54EB70CB-F99E-CA78-9EAD-A0BDC5B51635}"/>
+                  </a:ext>
+                </a:extLst>
+              </p:cNvPr>
+              <p:cNvSpPr/>
+              <p:nvPr/>
+            </p:nvSpPr>
+            <p:spPr>
+              <a:xfrm>
+                <a:off x="1789796" y="3939803"/>
+                <a:ext cx="83975" cy="198328"/>
+              </a:xfrm>
+              <a:prstGeom prst="rect">
+                <a:avLst/>
+              </a:prstGeom>
+              <a:solidFill>
+                <a:srgbClr val="FF0000"/>
+              </a:solidFill>
+              <a:ln>
+                <a:solidFill>
+                  <a:schemeClr val="tx1"/>
+                </a:solidFill>
+              </a:ln>
+            </p:spPr>
+            <p:style>
+              <a:lnRef idx="2">
+                <a:schemeClr val="accent1">
+                  <a:shade val="50000"/>
+                </a:schemeClr>
+              </a:lnRef>
+              <a:fillRef idx="1">
+                <a:schemeClr val="accent1"/>
+              </a:fillRef>
+              <a:effectRef idx="0">
+                <a:schemeClr val="accent1"/>
+              </a:effectRef>
+              <a:fontRef idx="minor">
+                <a:schemeClr val="lt1"/>
+              </a:fontRef>
+            </p:style>
+            <p:txBody>
+              <a:bodyPr rtlCol="0" anchor="ctr"/>
+              <a:lstStyle/>
+              <a:p>
+                <a:pPr algn="ctr"/>
+                <a:endParaRPr lang="en-IN"/>
+              </a:p>
+            </p:txBody>
+          </p:sp>
+          <p:sp>
+            <p:nvSpPr>
+              <p:cNvPr id="65" name="Rectangle 64">
+                <a:extLst>
+                  <a:ext uri="{FF2B5EF4-FFF2-40B4-BE49-F238E27FC236}">
+                    <a16:creationId xmlns:a16="http://schemas.microsoft.com/office/drawing/2014/main" id="{90DABC81-5D86-91A7-4207-5D2F2F72D909}"/>
+                  </a:ext>
+                </a:extLst>
+              </p:cNvPr>
+              <p:cNvSpPr/>
+              <p:nvPr/>
+            </p:nvSpPr>
+            <p:spPr>
+              <a:xfrm>
+                <a:off x="3206487" y="3938241"/>
+                <a:ext cx="83975" cy="198328"/>
+              </a:xfrm>
+              <a:prstGeom prst="rect">
+                <a:avLst/>
+              </a:prstGeom>
+              <a:solidFill>
+                <a:srgbClr val="FF0000"/>
+              </a:solidFill>
+              <a:ln>
+                <a:solidFill>
+                  <a:schemeClr val="tx1"/>
+                </a:solidFill>
+              </a:ln>
+            </p:spPr>
+            <p:style>
+              <a:lnRef idx="2">
+                <a:schemeClr val="accent1">
+                  <a:shade val="50000"/>
+                </a:schemeClr>
+              </a:lnRef>
+              <a:fillRef idx="1">
+                <a:schemeClr val="accent1"/>
+              </a:fillRef>
+              <a:effectRef idx="0">
+                <a:schemeClr val="accent1"/>
+              </a:effectRef>
+              <a:fontRef idx="minor">
+                <a:schemeClr val="lt1"/>
+              </a:fontRef>
+            </p:style>
+            <p:txBody>
+              <a:bodyPr rtlCol="0" anchor="ctr"/>
+              <a:lstStyle/>
+              <a:p>
+                <a:pPr algn="ctr"/>
+                <a:endParaRPr lang="en-IN"/>
+              </a:p>
+            </p:txBody>
+          </p:sp>
+        </p:grpSp>
+        <p:sp>
+          <p:nvSpPr>
+            <p:cNvPr id="66" name="TextBox 65">
+              <a:extLst>
+                <a:ext uri="{FF2B5EF4-FFF2-40B4-BE49-F238E27FC236}">
+                  <a16:creationId xmlns:a16="http://schemas.microsoft.com/office/drawing/2014/main" id="{FE050B9E-8992-E4B9-6B9E-D75964425D24}"/>
+                </a:ext>
+              </a:extLst>
+            </p:cNvPr>
+            <p:cNvSpPr txBox="1"/>
+            <p:nvPr/>
+          </p:nvSpPr>
+          <p:spPr>
+            <a:xfrm>
+              <a:off x="344347" y="677395"/>
+              <a:ext cx="792307" cy="523220"/>
+            </a:xfrm>
+            <a:prstGeom prst="rect">
+              <a:avLst/>
+            </a:prstGeom>
+            <a:noFill/>
+          </p:spPr>
+          <p:txBody>
+            <a:bodyPr wrap="square" rtlCol="0">
+              <a:spAutoFit/>
+            </a:bodyPr>
+            <a:lstStyle/>
+            <a:p>
+              <a:pPr algn="ctr"/>
+              <a:r>
+                <a:rPr lang="en-US" sz="2800" b="1" dirty="0">
+                  <a:latin typeface="Times New Roman" panose="02020603050405020304" pitchFamily="18" charset="0"/>
+                  <a:cs typeface="Times New Roman" panose="02020603050405020304" pitchFamily="18" charset="0"/>
+                </a:rPr>
+                <a:t>V</a:t>
+              </a:r>
+              <a:r>
+                <a:rPr lang="en-US" sz="2800" b="1" baseline="-25000" dirty="0">
+                  <a:latin typeface="Times New Roman" panose="02020603050405020304" pitchFamily="18" charset="0"/>
+                  <a:cs typeface="Times New Roman" panose="02020603050405020304" pitchFamily="18" charset="0"/>
+                </a:rPr>
+                <a:t>in</a:t>
+              </a:r>
+              <a:endParaRPr lang="en-IN" sz="2800" b="1" dirty="0">
+                <a:latin typeface="Times New Roman" panose="02020603050405020304" pitchFamily="18" charset="0"/>
+                <a:cs typeface="Times New Roman" panose="02020603050405020304" pitchFamily="18" charset="0"/>
+              </a:endParaRPr>
+            </a:p>
+          </p:txBody>
+        </p:sp>
+        <p:sp>
+          <p:nvSpPr>
+            <p:cNvPr id="67" name="TextBox 66">
+              <a:extLst>
+                <a:ext uri="{FF2B5EF4-FFF2-40B4-BE49-F238E27FC236}">
+                  <a16:creationId xmlns:a16="http://schemas.microsoft.com/office/drawing/2014/main" id="{79FF68B9-67B3-9C15-046A-E4C9227E64CE}"/>
+                </a:ext>
+              </a:extLst>
+            </p:cNvPr>
+            <p:cNvSpPr txBox="1"/>
+            <p:nvPr/>
+          </p:nvSpPr>
+          <p:spPr>
+            <a:xfrm>
+              <a:off x="344347" y="4473124"/>
+              <a:ext cx="792307" cy="523220"/>
+            </a:xfrm>
+            <a:prstGeom prst="rect">
+              <a:avLst/>
+            </a:prstGeom>
+            <a:noFill/>
+          </p:spPr>
+          <p:txBody>
+            <a:bodyPr wrap="square" rtlCol="0">
+              <a:spAutoFit/>
+            </a:bodyPr>
+            <a:lstStyle/>
+            <a:p>
+              <a:pPr algn="ctr"/>
+              <a:r>
+                <a:rPr lang="en-US" sz="2800" b="1" dirty="0">
+                  <a:latin typeface="Times New Roman" panose="02020603050405020304" pitchFamily="18" charset="0"/>
+                  <a:cs typeface="Times New Roman" panose="02020603050405020304" pitchFamily="18" charset="0"/>
+                </a:rPr>
+                <a:t>V</a:t>
+              </a:r>
+              <a:r>
+                <a:rPr lang="en-US" sz="2800" b="1" baseline="-25000" dirty="0">
+                  <a:latin typeface="Times New Roman" panose="02020603050405020304" pitchFamily="18" charset="0"/>
+                  <a:cs typeface="Times New Roman" panose="02020603050405020304" pitchFamily="18" charset="0"/>
+                </a:rPr>
+                <a:t>o</a:t>
+              </a:r>
+              <a:endParaRPr lang="en-IN" sz="2800" b="1" dirty="0">
+                <a:latin typeface="Times New Roman" panose="02020603050405020304" pitchFamily="18" charset="0"/>
+                <a:cs typeface="Times New Roman" panose="02020603050405020304" pitchFamily="18" charset="0"/>
+              </a:endParaRPr>
+            </a:p>
+          </p:txBody>
+        </p:sp>
+        <p:sp>
+          <p:nvSpPr>
+            <p:cNvPr id="68" name="TextBox 67">
+              <a:extLst>
+                <a:ext uri="{FF2B5EF4-FFF2-40B4-BE49-F238E27FC236}">
+                  <a16:creationId xmlns:a16="http://schemas.microsoft.com/office/drawing/2014/main" id="{CB2244D9-92BF-719D-E50D-12A591883A57}"/>
+                </a:ext>
+              </a:extLst>
+            </p:cNvPr>
+            <p:cNvSpPr txBox="1"/>
+            <p:nvPr/>
+          </p:nvSpPr>
+          <p:spPr>
+            <a:xfrm>
+              <a:off x="331131" y="3535382"/>
+              <a:ext cx="792307" cy="523220"/>
+            </a:xfrm>
+            <a:prstGeom prst="rect">
+              <a:avLst/>
+            </a:prstGeom>
+            <a:noFill/>
+          </p:spPr>
+          <p:txBody>
+            <a:bodyPr wrap="square" rtlCol="0">
+              <a:spAutoFit/>
+            </a:bodyPr>
+            <a:lstStyle/>
+            <a:p>
+              <a:pPr algn="ctr"/>
+              <a:r>
+                <a:rPr lang="en-US" sz="2800" b="1" dirty="0">
+                  <a:latin typeface="Times New Roman" panose="02020603050405020304" pitchFamily="18" charset="0"/>
+                  <a:cs typeface="Times New Roman" panose="02020603050405020304" pitchFamily="18" charset="0"/>
+                </a:rPr>
+                <a:t>i</a:t>
+              </a:r>
+              <a:r>
+                <a:rPr lang="en-US" sz="2800" b="1" baseline="-25000" dirty="0">
+                  <a:latin typeface="Times New Roman" panose="02020603050405020304" pitchFamily="18" charset="0"/>
+                  <a:cs typeface="Times New Roman" panose="02020603050405020304" pitchFamily="18" charset="0"/>
+                </a:rPr>
+                <a:t>g2</a:t>
+              </a:r>
+              <a:endParaRPr lang="en-IN" sz="2800" b="1" dirty="0">
+                <a:latin typeface="Times New Roman" panose="02020603050405020304" pitchFamily="18" charset="0"/>
+                <a:cs typeface="Times New Roman" panose="02020603050405020304" pitchFamily="18" charset="0"/>
+              </a:endParaRPr>
+            </a:p>
+          </p:txBody>
+        </p:sp>
+        <p:sp>
+          <p:nvSpPr>
+            <p:cNvPr id="69" name="TextBox 68">
+              <a:extLst>
+                <a:ext uri="{FF2B5EF4-FFF2-40B4-BE49-F238E27FC236}">
+                  <a16:creationId xmlns:a16="http://schemas.microsoft.com/office/drawing/2014/main" id="{7586438C-D802-039A-06EA-B6B05AFCF9D8}"/>
+                </a:ext>
+              </a:extLst>
+            </p:cNvPr>
+            <p:cNvSpPr txBox="1"/>
+            <p:nvPr/>
+          </p:nvSpPr>
+          <p:spPr>
+            <a:xfrm>
+              <a:off x="353176" y="2800193"/>
+              <a:ext cx="792307" cy="523220"/>
+            </a:xfrm>
+            <a:prstGeom prst="rect">
+              <a:avLst/>
+            </a:prstGeom>
+            <a:noFill/>
+          </p:spPr>
+          <p:txBody>
+            <a:bodyPr wrap="square" rtlCol="0">
+              <a:spAutoFit/>
+            </a:bodyPr>
+            <a:lstStyle/>
+            <a:p>
+              <a:pPr algn="ctr"/>
+              <a:r>
+                <a:rPr lang="en-US" sz="2800" b="1" dirty="0">
+                  <a:latin typeface="Times New Roman" panose="02020603050405020304" pitchFamily="18" charset="0"/>
+                  <a:cs typeface="Times New Roman" panose="02020603050405020304" pitchFamily="18" charset="0"/>
+                </a:rPr>
+                <a:t>i</a:t>
+              </a:r>
+              <a:r>
+                <a:rPr lang="en-US" sz="2800" b="1" baseline="-25000" dirty="0">
+                  <a:latin typeface="Times New Roman" panose="02020603050405020304" pitchFamily="18" charset="0"/>
+                  <a:cs typeface="Times New Roman" panose="02020603050405020304" pitchFamily="18" charset="0"/>
+                </a:rPr>
+                <a:t>g1</a:t>
+              </a:r>
+              <a:endParaRPr lang="en-IN" sz="2800" b="1" dirty="0">
+                <a:latin typeface="Times New Roman" panose="02020603050405020304" pitchFamily="18" charset="0"/>
+                <a:cs typeface="Times New Roman" panose="02020603050405020304" pitchFamily="18" charset="0"/>
+              </a:endParaRPr>
+            </a:p>
+          </p:txBody>
+        </p:sp>
+        <p:sp>
+          <p:nvSpPr>
+            <p:cNvPr id="72" name="TextBox 71">
+              <a:extLst>
+                <a:ext uri="{FF2B5EF4-FFF2-40B4-BE49-F238E27FC236}">
+                  <a16:creationId xmlns:a16="http://schemas.microsoft.com/office/drawing/2014/main" id="{EEC063C6-3858-14EC-6C87-B9A663F4C561}"/>
+                </a:ext>
+              </a:extLst>
+            </p:cNvPr>
+            <p:cNvSpPr txBox="1"/>
+            <p:nvPr/>
+          </p:nvSpPr>
+          <p:spPr>
+            <a:xfrm>
+              <a:off x="11307227" y="1706367"/>
+              <a:ext cx="792307" cy="523220"/>
+            </a:xfrm>
+            <a:prstGeom prst="rect">
+              <a:avLst/>
+            </a:prstGeom>
+            <a:noFill/>
+          </p:spPr>
+          <p:txBody>
+            <a:bodyPr wrap="square" rtlCol="0">
+              <a:spAutoFit/>
+            </a:bodyPr>
+            <a:lstStyle/>
+            <a:p>
+              <a:pPr algn="ctr"/>
+              <a:r>
+                <a:rPr lang="en-US" sz="2800" b="1" dirty="0">
+                  <a:latin typeface="Times New Roman" panose="02020603050405020304" pitchFamily="18" charset="0"/>
+                  <a:cs typeface="Times New Roman" panose="02020603050405020304" pitchFamily="18" charset="0"/>
+                </a:rPr>
+                <a:t>t</a:t>
+              </a:r>
+              <a:endParaRPr lang="en-IN" sz="2800" b="1" dirty="0">
+                <a:latin typeface="Times New Roman" panose="02020603050405020304" pitchFamily="18" charset="0"/>
+                <a:cs typeface="Times New Roman" panose="02020603050405020304" pitchFamily="18" charset="0"/>
+              </a:endParaRPr>
+            </a:p>
+          </p:txBody>
+        </p:sp>
+        <p:sp>
+          <p:nvSpPr>
+            <p:cNvPr id="73" name="TextBox 72">
+              <a:extLst>
+                <a:ext uri="{FF2B5EF4-FFF2-40B4-BE49-F238E27FC236}">
+                  <a16:creationId xmlns:a16="http://schemas.microsoft.com/office/drawing/2014/main" id="{E563AD0B-B2AB-119C-D61D-912BFABA9F0B}"/>
+                </a:ext>
+              </a:extLst>
+            </p:cNvPr>
+            <p:cNvSpPr txBox="1"/>
+            <p:nvPr/>
+          </p:nvSpPr>
+          <p:spPr>
+            <a:xfrm>
+              <a:off x="11313394" y="3167390"/>
+              <a:ext cx="792307" cy="523220"/>
+            </a:xfrm>
+            <a:prstGeom prst="rect">
+              <a:avLst/>
+            </a:prstGeom>
+            <a:noFill/>
+          </p:spPr>
+          <p:txBody>
+            <a:bodyPr wrap="square" rtlCol="0">
+              <a:spAutoFit/>
+            </a:bodyPr>
+            <a:lstStyle/>
+            <a:p>
+              <a:pPr algn="ctr"/>
+              <a:r>
+                <a:rPr lang="en-US" sz="2800" b="1" dirty="0">
+                  <a:latin typeface="Times New Roman" panose="02020603050405020304" pitchFamily="18" charset="0"/>
+                  <a:cs typeface="Times New Roman" panose="02020603050405020304" pitchFamily="18" charset="0"/>
+                </a:rPr>
+                <a:t>t</a:t>
+              </a:r>
+              <a:endParaRPr lang="en-IN" sz="2800" b="1" dirty="0">
+                <a:latin typeface="Times New Roman" panose="02020603050405020304" pitchFamily="18" charset="0"/>
+                <a:cs typeface="Times New Roman" panose="02020603050405020304" pitchFamily="18" charset="0"/>
+              </a:endParaRPr>
+            </a:p>
+          </p:txBody>
+        </p:sp>
+        <p:sp>
+          <p:nvSpPr>
+            <p:cNvPr id="74" name="TextBox 73">
+              <a:extLst>
+                <a:ext uri="{FF2B5EF4-FFF2-40B4-BE49-F238E27FC236}">
+                  <a16:creationId xmlns:a16="http://schemas.microsoft.com/office/drawing/2014/main" id="{F403C0BA-2127-9933-8242-CCE15CB9F795}"/>
+                </a:ext>
+              </a:extLst>
+            </p:cNvPr>
+            <p:cNvSpPr txBox="1"/>
+            <p:nvPr/>
+          </p:nvSpPr>
+          <p:spPr>
+            <a:xfrm>
+              <a:off x="11307227" y="3844886"/>
+              <a:ext cx="792307" cy="523220"/>
+            </a:xfrm>
+            <a:prstGeom prst="rect">
+              <a:avLst/>
+            </a:prstGeom>
+            <a:noFill/>
+          </p:spPr>
+          <p:txBody>
+            <a:bodyPr wrap="square" rtlCol="0">
+              <a:spAutoFit/>
+            </a:bodyPr>
+            <a:lstStyle/>
+            <a:p>
+              <a:pPr algn="ctr"/>
+              <a:r>
+                <a:rPr lang="en-US" sz="2800" b="1" dirty="0">
+                  <a:latin typeface="Times New Roman" panose="02020603050405020304" pitchFamily="18" charset="0"/>
+                  <a:cs typeface="Times New Roman" panose="02020603050405020304" pitchFamily="18" charset="0"/>
+                </a:rPr>
+                <a:t>t</a:t>
+              </a:r>
+              <a:endParaRPr lang="en-IN" sz="2800" b="1" dirty="0">
+                <a:latin typeface="Times New Roman" panose="02020603050405020304" pitchFamily="18" charset="0"/>
+                <a:cs typeface="Times New Roman" panose="02020603050405020304" pitchFamily="18" charset="0"/>
+              </a:endParaRPr>
+            </a:p>
+          </p:txBody>
+        </p:sp>
+        <p:sp>
+          <p:nvSpPr>
+            <p:cNvPr id="75" name="TextBox 74">
+              <a:extLst>
+                <a:ext uri="{FF2B5EF4-FFF2-40B4-BE49-F238E27FC236}">
+                  <a16:creationId xmlns:a16="http://schemas.microsoft.com/office/drawing/2014/main" id="{D5286FCB-6E27-7D23-A183-C2FB4AEC2339}"/>
+                </a:ext>
+              </a:extLst>
+            </p:cNvPr>
+            <p:cNvSpPr txBox="1"/>
+            <p:nvPr/>
+          </p:nvSpPr>
+          <p:spPr>
+            <a:xfrm>
+              <a:off x="11307227" y="5307213"/>
+              <a:ext cx="792307" cy="523220"/>
+            </a:xfrm>
+            <a:prstGeom prst="rect">
+              <a:avLst/>
+            </a:prstGeom>
+            <a:noFill/>
+          </p:spPr>
+          <p:txBody>
+            <a:bodyPr wrap="square" rtlCol="0">
+              <a:spAutoFit/>
+            </a:bodyPr>
+            <a:lstStyle/>
+            <a:p>
+              <a:pPr algn="ctr"/>
+              <a:r>
+                <a:rPr lang="en-US" sz="2800" b="1" dirty="0">
+                  <a:latin typeface="Times New Roman" panose="02020603050405020304" pitchFamily="18" charset="0"/>
+                  <a:cs typeface="Times New Roman" panose="02020603050405020304" pitchFamily="18" charset="0"/>
+                </a:rPr>
+                <a:t>t</a:t>
+              </a:r>
+              <a:endParaRPr lang="en-IN" sz="2800" b="1" dirty="0">
+                <a:latin typeface="Times New Roman" panose="02020603050405020304" pitchFamily="18" charset="0"/>
+                <a:cs typeface="Times New Roman" panose="02020603050405020304" pitchFamily="18" charset="0"/>
+              </a:endParaRPr>
+            </a:p>
+          </p:txBody>
+        </p:sp>
+        <p:sp>
+          <p:nvSpPr>
+            <p:cNvPr id="79" name="TextBox 78">
+              <a:extLst>
+                <a:ext uri="{FF2B5EF4-FFF2-40B4-BE49-F238E27FC236}">
+                  <a16:creationId xmlns:a16="http://schemas.microsoft.com/office/drawing/2014/main" id="{4C75CD7E-7891-AF5D-06A3-95CC13ACADCD}"/>
+                </a:ext>
+              </a:extLst>
+            </p:cNvPr>
+            <p:cNvSpPr txBox="1"/>
+            <p:nvPr/>
+          </p:nvSpPr>
+          <p:spPr>
+            <a:xfrm>
+              <a:off x="2089340" y="6330797"/>
+              <a:ext cx="1002658" cy="461665"/>
+            </a:xfrm>
+            <a:prstGeom prst="rect">
+              <a:avLst/>
+            </a:prstGeom>
+            <a:solidFill>
+              <a:schemeClr val="bg1"/>
+            </a:solidFill>
+          </p:spPr>
+          <p:txBody>
+            <a:bodyPr wrap="square" rtlCol="0">
+              <a:spAutoFit/>
+            </a:bodyPr>
+            <a:lstStyle/>
+            <a:p>
+              <a:pPr algn="ctr"/>
+              <a:r>
+                <a:rPr lang="en-US" sz="2400" b="1" dirty="0">
+                  <a:solidFill>
+                    <a:srgbClr val="00B050"/>
+                  </a:solidFill>
+                  <a:latin typeface="Times New Roman" panose="02020603050405020304" pitchFamily="18" charset="0"/>
+                  <a:cs typeface="Times New Roman" panose="02020603050405020304" pitchFamily="18" charset="0"/>
+                </a:rPr>
+                <a:t>T</a:t>
+              </a:r>
+              <a:r>
+                <a:rPr lang="en-US" sz="2400" b="1" baseline="-25000" dirty="0">
+                  <a:solidFill>
+                    <a:srgbClr val="00B050"/>
+                  </a:solidFill>
+                  <a:latin typeface="Times New Roman" panose="02020603050405020304" pitchFamily="18" charset="0"/>
+                  <a:cs typeface="Times New Roman" panose="02020603050405020304" pitchFamily="18" charset="0"/>
+                </a:rPr>
+                <a:t>ON</a:t>
+              </a:r>
+              <a:endParaRPr lang="en-IN" sz="2400" b="1" dirty="0">
+                <a:solidFill>
+                  <a:srgbClr val="00B050"/>
+                </a:solidFill>
+                <a:latin typeface="Times New Roman" panose="02020603050405020304" pitchFamily="18" charset="0"/>
+                <a:cs typeface="Times New Roman" panose="02020603050405020304" pitchFamily="18" charset="0"/>
+              </a:endParaRPr>
+            </a:p>
+          </p:txBody>
+        </p:sp>
+        <p:sp>
+          <p:nvSpPr>
+            <p:cNvPr id="82" name="TextBox 81">
+              <a:extLst>
+                <a:ext uri="{FF2B5EF4-FFF2-40B4-BE49-F238E27FC236}">
+                  <a16:creationId xmlns:a16="http://schemas.microsoft.com/office/drawing/2014/main" id="{52051E7C-374A-2C26-342D-CB3EE199F326}"/>
+                </a:ext>
+              </a:extLst>
+            </p:cNvPr>
+            <p:cNvSpPr txBox="1"/>
+            <p:nvPr/>
+          </p:nvSpPr>
+          <p:spPr>
+            <a:xfrm>
+              <a:off x="5580566" y="6296613"/>
+              <a:ext cx="1002658" cy="461665"/>
+            </a:xfrm>
+            <a:prstGeom prst="rect">
+              <a:avLst/>
+            </a:prstGeom>
+            <a:solidFill>
+              <a:schemeClr val="bg1"/>
+            </a:solidFill>
+          </p:spPr>
+          <p:txBody>
+            <a:bodyPr wrap="square" rtlCol="0">
+              <a:spAutoFit/>
+            </a:bodyPr>
+            <a:lstStyle/>
+            <a:p>
+              <a:pPr algn="ctr"/>
+              <a:r>
+                <a:rPr lang="en-US" sz="2400" b="1" dirty="0">
+                  <a:solidFill>
+                    <a:srgbClr val="00B050"/>
+                  </a:solidFill>
+                  <a:latin typeface="Times New Roman" panose="02020603050405020304" pitchFamily="18" charset="0"/>
+                  <a:cs typeface="Times New Roman" panose="02020603050405020304" pitchFamily="18" charset="0"/>
+                </a:rPr>
+                <a:t>T</a:t>
+              </a:r>
+              <a:r>
+                <a:rPr lang="en-US" sz="2400" b="1" baseline="-25000" dirty="0">
+                  <a:solidFill>
+                    <a:srgbClr val="00B050"/>
+                  </a:solidFill>
+                  <a:latin typeface="Times New Roman" panose="02020603050405020304" pitchFamily="18" charset="0"/>
+                  <a:cs typeface="Times New Roman" panose="02020603050405020304" pitchFamily="18" charset="0"/>
+                </a:rPr>
+                <a:t>OFF</a:t>
+              </a:r>
+              <a:endParaRPr lang="en-IN" sz="2400" b="1" dirty="0">
+                <a:solidFill>
+                  <a:srgbClr val="00B050"/>
+                </a:solidFill>
+                <a:latin typeface="Times New Roman" panose="02020603050405020304" pitchFamily="18" charset="0"/>
+                <a:cs typeface="Times New Roman" panose="02020603050405020304" pitchFamily="18" charset="0"/>
+              </a:endParaRPr>
+            </a:p>
+          </p:txBody>
+        </p:sp>
+      </p:grpSp>
+    </p:spTree>
+    <p:extLst>
+      <p:ext uri="{BB962C8B-B14F-4D97-AF65-F5344CB8AC3E}">
+        <p14:creationId xmlns:p14="http://schemas.microsoft.com/office/powerpoint/2010/main" val="1494336013"/>
       </p:ext>
     </p:extLst>
   </p:cSld>

</xml_diff>

<commit_message>
Completed ACVR theory page
</commit_message>
<xml_diff>
--- a/Assets/Powerpoints/AC Voltage Controller.pptx
+++ b/Assets/Powerpoints/AC Voltage Controller.pptx
@@ -11,6 +11,8 @@
     <p:sldId id="261" r:id="rId5"/>
     <p:sldId id="263" r:id="rId6"/>
     <p:sldId id="264" r:id="rId7"/>
+    <p:sldId id="265" r:id="rId8"/>
+    <p:sldId id="266" r:id="rId9"/>
   </p:sldIdLst>
   <p:sldSz cx="12192000" cy="6858000"/>
   <p:notesSz cx="6858000" cy="9144000"/>
@@ -266,7 +268,7 @@
           <a:p>
             <a:fld id="{62092866-234F-450F-AD7A-560A105E5EC1}" type="datetimeFigureOut">
               <a:rPr lang="en-IN" smtClean="0"/>
-              <a:t>19-12-2022</a:t>
+              <a:t>20-12-2022</a:t>
             </a:fld>
             <a:endParaRPr lang="en-IN"/>
           </a:p>
@@ -466,7 +468,7 @@
           <a:p>
             <a:fld id="{62092866-234F-450F-AD7A-560A105E5EC1}" type="datetimeFigureOut">
               <a:rPr lang="en-IN" smtClean="0"/>
-              <a:t>19-12-2022</a:t>
+              <a:t>20-12-2022</a:t>
             </a:fld>
             <a:endParaRPr lang="en-IN"/>
           </a:p>
@@ -676,7 +678,7 @@
           <a:p>
             <a:fld id="{62092866-234F-450F-AD7A-560A105E5EC1}" type="datetimeFigureOut">
               <a:rPr lang="en-IN" smtClean="0"/>
-              <a:t>19-12-2022</a:t>
+              <a:t>20-12-2022</a:t>
             </a:fld>
             <a:endParaRPr lang="en-IN"/>
           </a:p>
@@ -876,7 +878,7 @@
           <a:p>
             <a:fld id="{62092866-234F-450F-AD7A-560A105E5EC1}" type="datetimeFigureOut">
               <a:rPr lang="en-IN" smtClean="0"/>
-              <a:t>19-12-2022</a:t>
+              <a:t>20-12-2022</a:t>
             </a:fld>
             <a:endParaRPr lang="en-IN"/>
           </a:p>
@@ -1152,7 +1154,7 @@
           <a:p>
             <a:fld id="{62092866-234F-450F-AD7A-560A105E5EC1}" type="datetimeFigureOut">
               <a:rPr lang="en-IN" smtClean="0"/>
-              <a:t>19-12-2022</a:t>
+              <a:t>20-12-2022</a:t>
             </a:fld>
             <a:endParaRPr lang="en-IN"/>
           </a:p>
@@ -1420,7 +1422,7 @@
           <a:p>
             <a:fld id="{62092866-234F-450F-AD7A-560A105E5EC1}" type="datetimeFigureOut">
               <a:rPr lang="en-IN" smtClean="0"/>
-              <a:t>19-12-2022</a:t>
+              <a:t>20-12-2022</a:t>
             </a:fld>
             <a:endParaRPr lang="en-IN"/>
           </a:p>
@@ -1835,7 +1837,7 @@
           <a:p>
             <a:fld id="{62092866-234F-450F-AD7A-560A105E5EC1}" type="datetimeFigureOut">
               <a:rPr lang="en-IN" smtClean="0"/>
-              <a:t>19-12-2022</a:t>
+              <a:t>20-12-2022</a:t>
             </a:fld>
             <a:endParaRPr lang="en-IN"/>
           </a:p>
@@ -1977,7 +1979,7 @@
           <a:p>
             <a:fld id="{62092866-234F-450F-AD7A-560A105E5EC1}" type="datetimeFigureOut">
               <a:rPr lang="en-IN" smtClean="0"/>
-              <a:t>19-12-2022</a:t>
+              <a:t>20-12-2022</a:t>
             </a:fld>
             <a:endParaRPr lang="en-IN"/>
           </a:p>
@@ -2090,7 +2092,7 @@
           <a:p>
             <a:fld id="{62092866-234F-450F-AD7A-560A105E5EC1}" type="datetimeFigureOut">
               <a:rPr lang="en-IN" smtClean="0"/>
-              <a:t>19-12-2022</a:t>
+              <a:t>20-12-2022</a:t>
             </a:fld>
             <a:endParaRPr lang="en-IN"/>
           </a:p>
@@ -2403,7 +2405,7 @@
           <a:p>
             <a:fld id="{62092866-234F-450F-AD7A-560A105E5EC1}" type="datetimeFigureOut">
               <a:rPr lang="en-IN" smtClean="0"/>
-              <a:t>19-12-2022</a:t>
+              <a:t>20-12-2022</a:t>
             </a:fld>
             <a:endParaRPr lang="en-IN"/>
           </a:p>
@@ -2692,7 +2694,7 @@
           <a:p>
             <a:fld id="{62092866-234F-450F-AD7A-560A105E5EC1}" type="datetimeFigureOut">
               <a:rPr lang="en-IN" smtClean="0"/>
-              <a:t>19-12-2022</a:t>
+              <a:t>20-12-2022</a:t>
             </a:fld>
             <a:endParaRPr lang="en-IN"/>
           </a:p>
@@ -2935,7 +2937,7 @@
           <a:p>
             <a:fld id="{62092866-234F-450F-AD7A-560A105E5EC1}" type="datetimeFigureOut">
               <a:rPr lang="en-IN" smtClean="0"/>
-              <a:t>19-12-2022</a:t>
+              <a:t>20-12-2022</a:t>
             </a:fld>
             <a:endParaRPr lang="en-IN"/>
           </a:p>
@@ -19686,6 +19688,4607 @@
 </p:sld>
 </file>
 
+<file path=ppt/slides/slide7.xml><?xml version="1.0" encoding="utf-8"?>
+<p:sld xmlns:a="http://schemas.openxmlformats.org/drawingml/2006/main" xmlns:r="http://schemas.openxmlformats.org/officeDocument/2006/relationships" xmlns:p="http://schemas.openxmlformats.org/presentationml/2006/main">
+  <p:cSld>
+    <p:spTree>
+      <p:nvGrpSpPr>
+        <p:cNvPr id="1" name=""/>
+        <p:cNvGrpSpPr/>
+        <p:nvPr/>
+      </p:nvGrpSpPr>
+      <p:grpSpPr>
+        <a:xfrm>
+          <a:off x="0" y="0"/>
+          <a:ext cx="0" cy="0"/>
+          <a:chOff x="0" y="0"/>
+          <a:chExt cx="0" cy="0"/>
+        </a:xfrm>
+      </p:grpSpPr>
+      <p:cxnSp>
+        <p:nvCxnSpPr>
+          <p:cNvPr id="57" name="Straight Connector 56">
+            <a:extLst>
+              <a:ext uri="{FF2B5EF4-FFF2-40B4-BE49-F238E27FC236}">
+                <a16:creationId xmlns:a16="http://schemas.microsoft.com/office/drawing/2014/main" id="{8D1E23AC-D61A-675A-71FC-EFC51DA484EF}"/>
+              </a:ext>
+            </a:extLst>
+          </p:cNvPr>
+          <p:cNvCxnSpPr>
+            <a:cxnSpLocks/>
+          </p:cNvCxnSpPr>
+          <p:nvPr/>
+        </p:nvCxnSpPr>
+        <p:spPr>
+          <a:xfrm flipH="1">
+            <a:off x="3042695" y="2010495"/>
+            <a:ext cx="2707943" cy="0"/>
+          </a:xfrm>
+          <a:prstGeom prst="line">
+            <a:avLst/>
+          </a:prstGeom>
+          <a:ln w="57150">
+            <a:solidFill>
+              <a:schemeClr val="tx1"/>
+            </a:solidFill>
+          </a:ln>
+        </p:spPr>
+        <p:style>
+          <a:lnRef idx="1">
+            <a:schemeClr val="accent1"/>
+          </a:lnRef>
+          <a:fillRef idx="0">
+            <a:schemeClr val="accent1"/>
+          </a:fillRef>
+          <a:effectRef idx="0">
+            <a:schemeClr val="accent1"/>
+          </a:effectRef>
+          <a:fontRef idx="minor">
+            <a:schemeClr val="tx1"/>
+          </a:fontRef>
+        </p:style>
+      </p:cxnSp>
+      <p:cxnSp>
+        <p:nvCxnSpPr>
+          <p:cNvPr id="58" name="Straight Connector 57">
+            <a:extLst>
+              <a:ext uri="{FF2B5EF4-FFF2-40B4-BE49-F238E27FC236}">
+                <a16:creationId xmlns:a16="http://schemas.microsoft.com/office/drawing/2014/main" id="{D1D53056-3608-6E21-23F7-D984F692D9FE}"/>
+              </a:ext>
+            </a:extLst>
+          </p:cNvPr>
+          <p:cNvCxnSpPr>
+            <a:cxnSpLocks/>
+          </p:cNvCxnSpPr>
+          <p:nvPr/>
+        </p:nvCxnSpPr>
+        <p:spPr>
+          <a:xfrm>
+            <a:off x="3071602" y="2035504"/>
+            <a:ext cx="0" cy="3585720"/>
+          </a:xfrm>
+          <a:prstGeom prst="line">
+            <a:avLst/>
+          </a:prstGeom>
+          <a:ln w="57150">
+            <a:solidFill>
+              <a:schemeClr val="tx1"/>
+            </a:solidFill>
+          </a:ln>
+        </p:spPr>
+        <p:style>
+          <a:lnRef idx="1">
+            <a:schemeClr val="accent1"/>
+          </a:lnRef>
+          <a:fillRef idx="0">
+            <a:schemeClr val="accent1"/>
+          </a:fillRef>
+          <a:effectRef idx="0">
+            <a:schemeClr val="accent1"/>
+          </a:effectRef>
+          <a:fontRef idx="minor">
+            <a:schemeClr val="tx1"/>
+          </a:fontRef>
+        </p:style>
+      </p:cxnSp>
+      <p:grpSp>
+        <p:nvGrpSpPr>
+          <p:cNvPr id="107" name="Group 106">
+            <a:extLst>
+              <a:ext uri="{FF2B5EF4-FFF2-40B4-BE49-F238E27FC236}">
+                <a16:creationId xmlns:a16="http://schemas.microsoft.com/office/drawing/2014/main" id="{18A6A490-EBE0-DFF3-E962-A918851A5BC8}"/>
+              </a:ext>
+            </a:extLst>
+          </p:cNvPr>
+          <p:cNvGrpSpPr/>
+          <p:nvPr/>
+        </p:nvGrpSpPr>
+        <p:grpSpPr>
+          <a:xfrm>
+            <a:off x="2522958" y="3223764"/>
+            <a:ext cx="1114259" cy="1083120"/>
+            <a:chOff x="10511683" y="1426815"/>
+            <a:chExt cx="1411966" cy="1443123"/>
+          </a:xfrm>
+        </p:grpSpPr>
+        <p:sp>
+          <p:nvSpPr>
+            <p:cNvPr id="54" name="Oval 53">
+              <a:extLst>
+                <a:ext uri="{FF2B5EF4-FFF2-40B4-BE49-F238E27FC236}">
+                  <a16:creationId xmlns:a16="http://schemas.microsoft.com/office/drawing/2014/main" id="{9C44AAD4-4FEA-4ABB-6990-54BA1B33AF21}"/>
+                </a:ext>
+              </a:extLst>
+            </p:cNvPr>
+            <p:cNvSpPr/>
+            <p:nvPr/>
+          </p:nvSpPr>
+          <p:spPr>
+            <a:xfrm>
+              <a:off x="10511683" y="1426815"/>
+              <a:ext cx="1411966" cy="1443123"/>
+            </a:xfrm>
+            <a:prstGeom prst="ellipse">
+              <a:avLst/>
+            </a:prstGeom>
+            <a:solidFill>
+              <a:schemeClr val="bg1">
+                <a:lumMod val="95000"/>
+              </a:schemeClr>
+            </a:solidFill>
+            <a:ln w="38100"/>
+          </p:spPr>
+          <p:style>
+            <a:lnRef idx="2">
+              <a:schemeClr val="accent1">
+                <a:shade val="50000"/>
+              </a:schemeClr>
+            </a:lnRef>
+            <a:fillRef idx="1">
+              <a:schemeClr val="accent1"/>
+            </a:fillRef>
+            <a:effectRef idx="0">
+              <a:schemeClr val="accent1"/>
+            </a:effectRef>
+            <a:fontRef idx="minor">
+              <a:schemeClr val="lt1"/>
+            </a:fontRef>
+          </p:style>
+          <p:txBody>
+            <a:bodyPr rtlCol="0" anchor="ctr"/>
+            <a:lstStyle/>
+            <a:p>
+              <a:pPr algn="ctr"/>
+              <a:endParaRPr lang="en-IN" sz="4000" dirty="0">
+                <a:solidFill>
+                  <a:srgbClr val="FF0000"/>
+                </a:solidFill>
+              </a:endParaRPr>
+            </a:p>
+          </p:txBody>
+        </p:sp>
+        <p:grpSp>
+          <p:nvGrpSpPr>
+            <p:cNvPr id="46" name="Group 45">
+              <a:extLst>
+                <a:ext uri="{FF2B5EF4-FFF2-40B4-BE49-F238E27FC236}">
+                  <a16:creationId xmlns:a16="http://schemas.microsoft.com/office/drawing/2014/main" id="{0C683EDA-A6B5-CBC4-0624-70122FBAF142}"/>
+                </a:ext>
+              </a:extLst>
+            </p:cNvPr>
+            <p:cNvGrpSpPr/>
+            <p:nvPr/>
+          </p:nvGrpSpPr>
+          <p:grpSpPr>
+            <a:xfrm rot="5400000" flipV="1">
+              <a:off x="10921432" y="1708703"/>
+              <a:ext cx="592453" cy="880897"/>
+              <a:chOff x="3308385" y="8500613"/>
+              <a:chExt cx="232509" cy="554880"/>
+            </a:xfrm>
+          </p:grpSpPr>
+          <p:sp>
+            <p:nvSpPr>
+              <p:cNvPr id="47" name="Arc 46">
+                <a:extLst>
+                  <a:ext uri="{FF2B5EF4-FFF2-40B4-BE49-F238E27FC236}">
+                    <a16:creationId xmlns:a16="http://schemas.microsoft.com/office/drawing/2014/main" id="{2FBA4396-2A55-AAFF-5145-FA3E20D50E36}"/>
+                  </a:ext>
+                </a:extLst>
+              </p:cNvPr>
+              <p:cNvSpPr/>
+              <p:nvPr/>
+            </p:nvSpPr>
+            <p:spPr>
+              <a:xfrm rot="16200000">
+                <a:off x="3286889" y="8524303"/>
+                <a:ext cx="277695" cy="230315"/>
+              </a:xfrm>
+              <a:prstGeom prst="arc">
+                <a:avLst>
+                  <a:gd name="adj1" fmla="val 10739696"/>
+                  <a:gd name="adj2" fmla="val 0"/>
+                </a:avLst>
+              </a:prstGeom>
+              <a:ln w="76200">
+                <a:solidFill>
+                  <a:srgbClr val="FF0000"/>
+                </a:solidFill>
+              </a:ln>
+            </p:spPr>
+            <p:style>
+              <a:lnRef idx="1">
+                <a:schemeClr val="dk1"/>
+              </a:lnRef>
+              <a:fillRef idx="0">
+                <a:schemeClr val="dk1"/>
+              </a:fillRef>
+              <a:effectRef idx="0">
+                <a:schemeClr val="dk1"/>
+              </a:effectRef>
+              <a:fontRef idx="minor">
+                <a:schemeClr val="tx1"/>
+              </a:fontRef>
+            </p:style>
+            <p:txBody>
+              <a:bodyPr rtlCol="0" anchor="ctr"/>
+              <a:lstStyle/>
+              <a:p>
+                <a:pPr algn="ctr"/>
+                <a:endParaRPr lang="en-IN"/>
+              </a:p>
+            </p:txBody>
+          </p:sp>
+          <p:sp>
+            <p:nvSpPr>
+              <p:cNvPr id="48" name="Arc 47">
+                <a:extLst>
+                  <a:ext uri="{FF2B5EF4-FFF2-40B4-BE49-F238E27FC236}">
+                    <a16:creationId xmlns:a16="http://schemas.microsoft.com/office/drawing/2014/main" id="{864551BD-AFFD-9D46-5920-45813D789EAD}"/>
+                  </a:ext>
+                </a:extLst>
+              </p:cNvPr>
+              <p:cNvSpPr/>
+              <p:nvPr/>
+            </p:nvSpPr>
+            <p:spPr>
+              <a:xfrm rot="5400000" flipH="1">
+                <a:off x="3284695" y="8801488"/>
+                <a:ext cx="277695" cy="230315"/>
+              </a:xfrm>
+              <a:prstGeom prst="arc">
+                <a:avLst>
+                  <a:gd name="adj1" fmla="val 10739696"/>
+                  <a:gd name="adj2" fmla="val 0"/>
+                </a:avLst>
+              </a:prstGeom>
+              <a:ln w="76200">
+                <a:solidFill>
+                  <a:srgbClr val="FF0000"/>
+                </a:solidFill>
+              </a:ln>
+            </p:spPr>
+            <p:style>
+              <a:lnRef idx="1">
+                <a:schemeClr val="dk1"/>
+              </a:lnRef>
+              <a:fillRef idx="0">
+                <a:schemeClr val="dk1"/>
+              </a:fillRef>
+              <a:effectRef idx="0">
+                <a:schemeClr val="dk1"/>
+              </a:effectRef>
+              <a:fontRef idx="minor">
+                <a:schemeClr val="tx1"/>
+              </a:fontRef>
+            </p:style>
+            <p:txBody>
+              <a:bodyPr rtlCol="0" anchor="ctr"/>
+              <a:lstStyle/>
+              <a:p>
+                <a:pPr algn="ctr"/>
+                <a:endParaRPr lang="en-IN"/>
+              </a:p>
+            </p:txBody>
+          </p:sp>
+        </p:grpSp>
+      </p:grpSp>
+      <p:cxnSp>
+        <p:nvCxnSpPr>
+          <p:cNvPr id="68" name="Straight Connector 67">
+            <a:extLst>
+              <a:ext uri="{FF2B5EF4-FFF2-40B4-BE49-F238E27FC236}">
+                <a16:creationId xmlns:a16="http://schemas.microsoft.com/office/drawing/2014/main" id="{F4E7BECB-DEF0-3B0C-774C-C1E02D4FD3A2}"/>
+              </a:ext>
+            </a:extLst>
+          </p:cNvPr>
+          <p:cNvCxnSpPr>
+            <a:cxnSpLocks/>
+          </p:cNvCxnSpPr>
+          <p:nvPr/>
+        </p:nvCxnSpPr>
+        <p:spPr>
+          <a:xfrm flipH="1">
+            <a:off x="6402601" y="2009822"/>
+            <a:ext cx="2804569" cy="0"/>
+          </a:xfrm>
+          <a:prstGeom prst="line">
+            <a:avLst/>
+          </a:prstGeom>
+          <a:ln w="57150">
+            <a:solidFill>
+              <a:schemeClr val="tx1"/>
+            </a:solidFill>
+          </a:ln>
+        </p:spPr>
+        <p:style>
+          <a:lnRef idx="1">
+            <a:schemeClr val="accent1"/>
+          </a:lnRef>
+          <a:fillRef idx="0">
+            <a:schemeClr val="accent1"/>
+          </a:fillRef>
+          <a:effectRef idx="0">
+            <a:schemeClr val="accent1"/>
+          </a:effectRef>
+          <a:fontRef idx="minor">
+            <a:schemeClr val="tx1"/>
+          </a:fontRef>
+        </p:style>
+      </p:cxnSp>
+      <p:grpSp>
+        <p:nvGrpSpPr>
+          <p:cNvPr id="28" name="Group 27">
+            <a:extLst>
+              <a:ext uri="{FF2B5EF4-FFF2-40B4-BE49-F238E27FC236}">
+                <a16:creationId xmlns:a16="http://schemas.microsoft.com/office/drawing/2014/main" id="{A8EED743-280A-79DF-2853-8D857E1D6F03}"/>
+              </a:ext>
+            </a:extLst>
+          </p:cNvPr>
+          <p:cNvGrpSpPr/>
+          <p:nvPr/>
+        </p:nvGrpSpPr>
+        <p:grpSpPr>
+          <a:xfrm>
+            <a:off x="8856640" y="2846268"/>
+            <a:ext cx="439795" cy="2316888"/>
+            <a:chOff x="7918605" y="2686715"/>
+            <a:chExt cx="439795" cy="2316888"/>
+          </a:xfrm>
+        </p:grpSpPr>
+        <p:grpSp>
+          <p:nvGrpSpPr>
+            <p:cNvPr id="29" name="Group 28">
+              <a:extLst>
+                <a:ext uri="{FF2B5EF4-FFF2-40B4-BE49-F238E27FC236}">
+                  <a16:creationId xmlns:a16="http://schemas.microsoft.com/office/drawing/2014/main" id="{2E64F8CC-A1BA-1ABE-3FC5-89CB7862CBA9}"/>
+                </a:ext>
+              </a:extLst>
+            </p:cNvPr>
+            <p:cNvGrpSpPr/>
+            <p:nvPr/>
+          </p:nvGrpSpPr>
+          <p:grpSpPr>
+            <a:xfrm rot="16200000">
+              <a:off x="7615874" y="3638920"/>
+              <a:ext cx="1045257" cy="439795"/>
+              <a:chOff x="2905113" y="3027281"/>
+              <a:chExt cx="1489971" cy="494935"/>
+            </a:xfrm>
+          </p:grpSpPr>
+          <p:cxnSp>
+            <p:nvCxnSpPr>
+              <p:cNvPr id="32" name="Straight Connector 31">
+                <a:extLst>
+                  <a:ext uri="{FF2B5EF4-FFF2-40B4-BE49-F238E27FC236}">
+                    <a16:creationId xmlns:a16="http://schemas.microsoft.com/office/drawing/2014/main" id="{938B76D0-13F0-D8DF-2464-8B5F6C801562}"/>
+                  </a:ext>
+                </a:extLst>
+              </p:cNvPr>
+              <p:cNvCxnSpPr>
+                <a:cxnSpLocks/>
+              </p:cNvCxnSpPr>
+              <p:nvPr/>
+            </p:nvCxnSpPr>
+            <p:spPr>
+              <a:xfrm rot="5400000" flipH="1" flipV="1">
+                <a:off x="2786718" y="3145681"/>
+                <a:ext cx="394474" cy="157683"/>
+              </a:xfrm>
+              <a:prstGeom prst="line">
+                <a:avLst/>
+              </a:prstGeom>
+              <a:ln w="57150">
+                <a:solidFill>
+                  <a:srgbClr val="0070C0"/>
+                </a:solidFill>
+              </a:ln>
+            </p:spPr>
+            <p:style>
+              <a:lnRef idx="1">
+                <a:schemeClr val="accent1"/>
+              </a:lnRef>
+              <a:fillRef idx="0">
+                <a:schemeClr val="accent1"/>
+              </a:fillRef>
+              <a:effectRef idx="0">
+                <a:schemeClr val="accent1"/>
+              </a:effectRef>
+              <a:fontRef idx="minor">
+                <a:schemeClr val="tx1"/>
+              </a:fontRef>
+            </p:style>
+          </p:cxnSp>
+          <p:grpSp>
+            <p:nvGrpSpPr>
+              <p:cNvPr id="33" name="Group 32">
+                <a:extLst>
+                  <a:ext uri="{FF2B5EF4-FFF2-40B4-BE49-F238E27FC236}">
+                    <a16:creationId xmlns:a16="http://schemas.microsoft.com/office/drawing/2014/main" id="{ECEB88F6-6D48-1049-5CDC-A64F13490333}"/>
+                  </a:ext>
+                </a:extLst>
+              </p:cNvPr>
+              <p:cNvGrpSpPr/>
+              <p:nvPr/>
+            </p:nvGrpSpPr>
+            <p:grpSpPr>
+              <a:xfrm>
+                <a:off x="3062796" y="3038382"/>
+                <a:ext cx="301842" cy="483834"/>
+                <a:chOff x="3062796" y="3027285"/>
+                <a:chExt cx="301842" cy="483834"/>
+              </a:xfrm>
+            </p:grpSpPr>
+            <p:cxnSp>
+              <p:nvCxnSpPr>
+                <p:cNvPr id="44" name="Straight Connector 43">
+                  <a:extLst>
+                    <a:ext uri="{FF2B5EF4-FFF2-40B4-BE49-F238E27FC236}">
+                      <a16:creationId xmlns:a16="http://schemas.microsoft.com/office/drawing/2014/main" id="{BED13C27-8C79-C4DE-1782-E7B8883120EA}"/>
+                    </a:ext>
+                  </a:extLst>
+                </p:cNvPr>
+                <p:cNvCxnSpPr>
+                  <a:cxnSpLocks/>
+                </p:cNvCxnSpPr>
+                <p:nvPr/>
+              </p:nvCxnSpPr>
+              <p:spPr>
+                <a:xfrm flipH="1" flipV="1">
+                  <a:off x="3062796" y="3027285"/>
+                  <a:ext cx="150921" cy="483834"/>
+                </a:xfrm>
+                <a:prstGeom prst="line">
+                  <a:avLst/>
+                </a:prstGeom>
+                <a:ln w="57150">
+                  <a:solidFill>
+                    <a:srgbClr val="0070C0"/>
+                  </a:solidFill>
+                </a:ln>
+              </p:spPr>
+              <p:style>
+                <a:lnRef idx="1">
+                  <a:schemeClr val="accent1"/>
+                </a:lnRef>
+                <a:fillRef idx="0">
+                  <a:schemeClr val="accent1"/>
+                </a:fillRef>
+                <a:effectRef idx="0">
+                  <a:schemeClr val="accent1"/>
+                </a:effectRef>
+                <a:fontRef idx="minor">
+                  <a:schemeClr val="tx1"/>
+                </a:fontRef>
+              </p:style>
+            </p:cxnSp>
+            <p:cxnSp>
+              <p:nvCxnSpPr>
+                <p:cNvPr id="45" name="Straight Connector 44">
+                  <a:extLst>
+                    <a:ext uri="{FF2B5EF4-FFF2-40B4-BE49-F238E27FC236}">
+                      <a16:creationId xmlns:a16="http://schemas.microsoft.com/office/drawing/2014/main" id="{61B81033-6398-A4FA-A290-2B1E8406FA8C}"/>
+                    </a:ext>
+                  </a:extLst>
+                </p:cNvPr>
+                <p:cNvCxnSpPr>
+                  <a:cxnSpLocks/>
+                </p:cNvCxnSpPr>
+                <p:nvPr/>
+              </p:nvCxnSpPr>
+              <p:spPr>
+                <a:xfrm flipV="1">
+                  <a:off x="3213717" y="3027285"/>
+                  <a:ext cx="150921" cy="483834"/>
+                </a:xfrm>
+                <a:prstGeom prst="line">
+                  <a:avLst/>
+                </a:prstGeom>
+                <a:ln w="57150">
+                  <a:solidFill>
+                    <a:srgbClr val="0070C0"/>
+                  </a:solidFill>
+                </a:ln>
+              </p:spPr>
+              <p:style>
+                <a:lnRef idx="1">
+                  <a:schemeClr val="accent1"/>
+                </a:lnRef>
+                <a:fillRef idx="0">
+                  <a:schemeClr val="accent1"/>
+                </a:fillRef>
+                <a:effectRef idx="0">
+                  <a:schemeClr val="accent1"/>
+                </a:effectRef>
+                <a:fontRef idx="minor">
+                  <a:schemeClr val="tx1"/>
+                </a:fontRef>
+              </p:style>
+            </p:cxnSp>
+          </p:grpSp>
+          <p:grpSp>
+            <p:nvGrpSpPr>
+              <p:cNvPr id="34" name="Group 33">
+                <a:extLst>
+                  <a:ext uri="{FF2B5EF4-FFF2-40B4-BE49-F238E27FC236}">
+                    <a16:creationId xmlns:a16="http://schemas.microsoft.com/office/drawing/2014/main" id="{CCDC7D04-B189-27E5-C95C-3E61F7B23589}"/>
+                  </a:ext>
+                </a:extLst>
+              </p:cNvPr>
+              <p:cNvGrpSpPr/>
+              <p:nvPr/>
+            </p:nvGrpSpPr>
+            <p:grpSpPr>
+              <a:xfrm>
+                <a:off x="3366118" y="3027281"/>
+                <a:ext cx="301842" cy="483838"/>
+                <a:chOff x="3062796" y="3027281"/>
+                <a:chExt cx="301842" cy="483838"/>
+              </a:xfrm>
+            </p:grpSpPr>
+            <p:cxnSp>
+              <p:nvCxnSpPr>
+                <p:cNvPr id="42" name="Straight Connector 41">
+                  <a:extLst>
+                    <a:ext uri="{FF2B5EF4-FFF2-40B4-BE49-F238E27FC236}">
+                      <a16:creationId xmlns:a16="http://schemas.microsoft.com/office/drawing/2014/main" id="{1DB2858D-7166-682F-A64B-C5F86CEA8060}"/>
+                    </a:ext>
+                  </a:extLst>
+                </p:cNvPr>
+                <p:cNvCxnSpPr>
+                  <a:cxnSpLocks/>
+                </p:cNvCxnSpPr>
+                <p:nvPr/>
+              </p:nvCxnSpPr>
+              <p:spPr>
+                <a:xfrm flipH="1" flipV="1">
+                  <a:off x="3062796" y="3027281"/>
+                  <a:ext cx="150922" cy="483834"/>
+                </a:xfrm>
+                <a:prstGeom prst="line">
+                  <a:avLst/>
+                </a:prstGeom>
+                <a:ln w="57150">
+                  <a:solidFill>
+                    <a:srgbClr val="0070C0"/>
+                  </a:solidFill>
+                </a:ln>
+              </p:spPr>
+              <p:style>
+                <a:lnRef idx="1">
+                  <a:schemeClr val="accent1"/>
+                </a:lnRef>
+                <a:fillRef idx="0">
+                  <a:schemeClr val="accent1"/>
+                </a:fillRef>
+                <a:effectRef idx="0">
+                  <a:schemeClr val="accent1"/>
+                </a:effectRef>
+                <a:fontRef idx="minor">
+                  <a:schemeClr val="tx1"/>
+                </a:fontRef>
+              </p:style>
+            </p:cxnSp>
+            <p:cxnSp>
+              <p:nvCxnSpPr>
+                <p:cNvPr id="43" name="Straight Connector 42">
+                  <a:extLst>
+                    <a:ext uri="{FF2B5EF4-FFF2-40B4-BE49-F238E27FC236}">
+                      <a16:creationId xmlns:a16="http://schemas.microsoft.com/office/drawing/2014/main" id="{31266ACE-9972-CBF2-D4E7-2E0BC7E723AD}"/>
+                    </a:ext>
+                  </a:extLst>
+                </p:cNvPr>
+                <p:cNvCxnSpPr>
+                  <a:cxnSpLocks/>
+                </p:cNvCxnSpPr>
+                <p:nvPr/>
+              </p:nvCxnSpPr>
+              <p:spPr>
+                <a:xfrm flipV="1">
+                  <a:off x="3213717" y="3027285"/>
+                  <a:ext cx="150921" cy="483834"/>
+                </a:xfrm>
+                <a:prstGeom prst="line">
+                  <a:avLst/>
+                </a:prstGeom>
+                <a:ln w="57150">
+                  <a:solidFill>
+                    <a:srgbClr val="0070C0"/>
+                  </a:solidFill>
+                </a:ln>
+              </p:spPr>
+              <p:style>
+                <a:lnRef idx="1">
+                  <a:schemeClr val="accent1"/>
+                </a:lnRef>
+                <a:fillRef idx="0">
+                  <a:schemeClr val="accent1"/>
+                </a:fillRef>
+                <a:effectRef idx="0">
+                  <a:schemeClr val="accent1"/>
+                </a:effectRef>
+                <a:fontRef idx="minor">
+                  <a:schemeClr val="tx1"/>
+                </a:fontRef>
+              </p:style>
+            </p:cxnSp>
+          </p:grpSp>
+          <p:grpSp>
+            <p:nvGrpSpPr>
+              <p:cNvPr id="35" name="Group 34">
+                <a:extLst>
+                  <a:ext uri="{FF2B5EF4-FFF2-40B4-BE49-F238E27FC236}">
+                    <a16:creationId xmlns:a16="http://schemas.microsoft.com/office/drawing/2014/main" id="{40A7E96A-1956-3C21-86BD-35D87C493246}"/>
+                  </a:ext>
+                </a:extLst>
+              </p:cNvPr>
+              <p:cNvGrpSpPr/>
+              <p:nvPr/>
+            </p:nvGrpSpPr>
+            <p:grpSpPr>
+              <a:xfrm>
+                <a:off x="3971282" y="3038381"/>
+                <a:ext cx="301843" cy="483835"/>
+                <a:chOff x="3062796" y="3027284"/>
+                <a:chExt cx="301843" cy="483835"/>
+              </a:xfrm>
+            </p:grpSpPr>
+            <p:cxnSp>
+              <p:nvCxnSpPr>
+                <p:cNvPr id="40" name="Straight Connector 39">
+                  <a:extLst>
+                    <a:ext uri="{FF2B5EF4-FFF2-40B4-BE49-F238E27FC236}">
+                      <a16:creationId xmlns:a16="http://schemas.microsoft.com/office/drawing/2014/main" id="{00B26B98-0CF1-0669-0958-9C2588B0FEA6}"/>
+                    </a:ext>
+                  </a:extLst>
+                </p:cNvPr>
+                <p:cNvCxnSpPr>
+                  <a:cxnSpLocks/>
+                </p:cNvCxnSpPr>
+                <p:nvPr/>
+              </p:nvCxnSpPr>
+              <p:spPr>
+                <a:xfrm flipH="1" flipV="1">
+                  <a:off x="3062796" y="3027285"/>
+                  <a:ext cx="150921" cy="483834"/>
+                </a:xfrm>
+                <a:prstGeom prst="line">
+                  <a:avLst/>
+                </a:prstGeom>
+                <a:ln w="57150">
+                  <a:solidFill>
+                    <a:srgbClr val="0070C0"/>
+                  </a:solidFill>
+                </a:ln>
+              </p:spPr>
+              <p:style>
+                <a:lnRef idx="1">
+                  <a:schemeClr val="accent1"/>
+                </a:lnRef>
+                <a:fillRef idx="0">
+                  <a:schemeClr val="accent1"/>
+                </a:fillRef>
+                <a:effectRef idx="0">
+                  <a:schemeClr val="accent1"/>
+                </a:effectRef>
+                <a:fontRef idx="minor">
+                  <a:schemeClr val="tx1"/>
+                </a:fontRef>
+              </p:style>
+            </p:cxnSp>
+            <p:cxnSp>
+              <p:nvCxnSpPr>
+                <p:cNvPr id="41" name="Straight Connector 40">
+                  <a:extLst>
+                    <a:ext uri="{FF2B5EF4-FFF2-40B4-BE49-F238E27FC236}">
+                      <a16:creationId xmlns:a16="http://schemas.microsoft.com/office/drawing/2014/main" id="{65EB126C-9789-06BD-D73F-4B0999D09FD7}"/>
+                    </a:ext>
+                  </a:extLst>
+                </p:cNvPr>
+                <p:cNvCxnSpPr>
+                  <a:cxnSpLocks/>
+                </p:cNvCxnSpPr>
+                <p:nvPr/>
+              </p:nvCxnSpPr>
+              <p:spPr>
+                <a:xfrm flipV="1">
+                  <a:off x="3213719" y="3027284"/>
+                  <a:ext cx="150920" cy="483834"/>
+                </a:xfrm>
+                <a:prstGeom prst="line">
+                  <a:avLst/>
+                </a:prstGeom>
+                <a:ln w="57150">
+                  <a:solidFill>
+                    <a:srgbClr val="0070C0"/>
+                  </a:solidFill>
+                </a:ln>
+              </p:spPr>
+              <p:style>
+                <a:lnRef idx="1">
+                  <a:schemeClr val="accent1"/>
+                </a:lnRef>
+                <a:fillRef idx="0">
+                  <a:schemeClr val="accent1"/>
+                </a:fillRef>
+                <a:effectRef idx="0">
+                  <a:schemeClr val="accent1"/>
+                </a:effectRef>
+                <a:fontRef idx="minor">
+                  <a:schemeClr val="tx1"/>
+                </a:fontRef>
+              </p:style>
+            </p:cxnSp>
+          </p:grpSp>
+          <p:grpSp>
+            <p:nvGrpSpPr>
+              <p:cNvPr id="36" name="Group 35">
+                <a:extLst>
+                  <a:ext uri="{FF2B5EF4-FFF2-40B4-BE49-F238E27FC236}">
+                    <a16:creationId xmlns:a16="http://schemas.microsoft.com/office/drawing/2014/main" id="{C17B8F68-FA00-EECF-A7E0-26799C4F9681}"/>
+                  </a:ext>
+                </a:extLst>
+              </p:cNvPr>
+              <p:cNvGrpSpPr/>
+              <p:nvPr/>
+            </p:nvGrpSpPr>
+            <p:grpSpPr>
+              <a:xfrm>
+                <a:off x="3667960" y="3038382"/>
+                <a:ext cx="301842" cy="483834"/>
+                <a:chOff x="3062796" y="3027285"/>
+                <a:chExt cx="301842" cy="483834"/>
+              </a:xfrm>
+            </p:grpSpPr>
+            <p:cxnSp>
+              <p:nvCxnSpPr>
+                <p:cNvPr id="38" name="Straight Connector 37">
+                  <a:extLst>
+                    <a:ext uri="{FF2B5EF4-FFF2-40B4-BE49-F238E27FC236}">
+                      <a16:creationId xmlns:a16="http://schemas.microsoft.com/office/drawing/2014/main" id="{E89FA7F8-B115-5F57-BC45-C4A312DDA692}"/>
+                    </a:ext>
+                  </a:extLst>
+                </p:cNvPr>
+                <p:cNvCxnSpPr>
+                  <a:cxnSpLocks/>
+                </p:cNvCxnSpPr>
+                <p:nvPr/>
+              </p:nvCxnSpPr>
+              <p:spPr>
+                <a:xfrm flipH="1" flipV="1">
+                  <a:off x="3062796" y="3027285"/>
+                  <a:ext cx="150921" cy="483834"/>
+                </a:xfrm>
+                <a:prstGeom prst="line">
+                  <a:avLst/>
+                </a:prstGeom>
+                <a:ln w="57150">
+                  <a:solidFill>
+                    <a:srgbClr val="0070C0"/>
+                  </a:solidFill>
+                </a:ln>
+              </p:spPr>
+              <p:style>
+                <a:lnRef idx="1">
+                  <a:schemeClr val="accent1"/>
+                </a:lnRef>
+                <a:fillRef idx="0">
+                  <a:schemeClr val="accent1"/>
+                </a:fillRef>
+                <a:effectRef idx="0">
+                  <a:schemeClr val="accent1"/>
+                </a:effectRef>
+                <a:fontRef idx="minor">
+                  <a:schemeClr val="tx1"/>
+                </a:fontRef>
+              </p:style>
+            </p:cxnSp>
+            <p:cxnSp>
+              <p:nvCxnSpPr>
+                <p:cNvPr id="39" name="Straight Connector 38">
+                  <a:extLst>
+                    <a:ext uri="{FF2B5EF4-FFF2-40B4-BE49-F238E27FC236}">
+                      <a16:creationId xmlns:a16="http://schemas.microsoft.com/office/drawing/2014/main" id="{AB07838D-0EF9-8235-6E87-537931F9C67F}"/>
+                    </a:ext>
+                  </a:extLst>
+                </p:cNvPr>
+                <p:cNvCxnSpPr>
+                  <a:cxnSpLocks/>
+                </p:cNvCxnSpPr>
+                <p:nvPr/>
+              </p:nvCxnSpPr>
+              <p:spPr>
+                <a:xfrm flipV="1">
+                  <a:off x="3213717" y="3027285"/>
+                  <a:ext cx="150921" cy="483834"/>
+                </a:xfrm>
+                <a:prstGeom prst="line">
+                  <a:avLst/>
+                </a:prstGeom>
+                <a:ln w="57150">
+                  <a:solidFill>
+                    <a:srgbClr val="0070C0"/>
+                  </a:solidFill>
+                </a:ln>
+              </p:spPr>
+              <p:style>
+                <a:lnRef idx="1">
+                  <a:schemeClr val="accent1"/>
+                </a:lnRef>
+                <a:fillRef idx="0">
+                  <a:schemeClr val="accent1"/>
+                </a:fillRef>
+                <a:effectRef idx="0">
+                  <a:schemeClr val="accent1"/>
+                </a:effectRef>
+                <a:fontRef idx="minor">
+                  <a:schemeClr val="tx1"/>
+                </a:fontRef>
+              </p:style>
+            </p:cxnSp>
+          </p:grpSp>
+          <p:cxnSp>
+            <p:nvCxnSpPr>
+              <p:cNvPr id="37" name="Straight Connector 36">
+                <a:extLst>
+                  <a:ext uri="{FF2B5EF4-FFF2-40B4-BE49-F238E27FC236}">
+                    <a16:creationId xmlns:a16="http://schemas.microsoft.com/office/drawing/2014/main" id="{226F0D78-5167-1D52-1F9B-AB3F0B1CAC16}"/>
+                  </a:ext>
+                </a:extLst>
+              </p:cNvPr>
+              <p:cNvCxnSpPr>
+                <a:cxnSpLocks/>
+              </p:cNvCxnSpPr>
+              <p:nvPr/>
+            </p:nvCxnSpPr>
+            <p:spPr>
+              <a:xfrm rot="5400000" flipH="1">
+                <a:off x="4136867" y="3163543"/>
+                <a:ext cx="394475" cy="121959"/>
+              </a:xfrm>
+              <a:prstGeom prst="line">
+                <a:avLst/>
+              </a:prstGeom>
+              <a:ln w="57150">
+                <a:solidFill>
+                  <a:srgbClr val="0070C0"/>
+                </a:solidFill>
+              </a:ln>
+            </p:spPr>
+            <p:style>
+              <a:lnRef idx="1">
+                <a:schemeClr val="accent1"/>
+              </a:lnRef>
+              <a:fillRef idx="0">
+                <a:schemeClr val="accent1"/>
+              </a:fillRef>
+              <a:effectRef idx="0">
+                <a:schemeClr val="accent1"/>
+              </a:effectRef>
+              <a:fontRef idx="minor">
+                <a:schemeClr val="tx1"/>
+              </a:fontRef>
+            </p:style>
+          </p:cxnSp>
+        </p:grpSp>
+        <p:cxnSp>
+          <p:nvCxnSpPr>
+            <p:cNvPr id="30" name="Straight Connector 29">
+              <a:extLst>
+                <a:ext uri="{FF2B5EF4-FFF2-40B4-BE49-F238E27FC236}">
+                  <a16:creationId xmlns:a16="http://schemas.microsoft.com/office/drawing/2014/main" id="{B3288600-5885-82D5-CA65-BA56FF0F90C3}"/>
+                </a:ext>
+              </a:extLst>
+            </p:cNvPr>
+            <p:cNvCxnSpPr>
+              <a:cxnSpLocks/>
+            </p:cNvCxnSpPr>
+            <p:nvPr/>
+          </p:nvCxnSpPr>
+          <p:spPr>
+            <a:xfrm>
+              <a:off x="8258947" y="2686715"/>
+              <a:ext cx="0" cy="649474"/>
+            </a:xfrm>
+            <a:prstGeom prst="line">
+              <a:avLst/>
+            </a:prstGeom>
+            <a:ln w="57150">
+              <a:solidFill>
+                <a:srgbClr val="0070C0"/>
+              </a:solidFill>
+            </a:ln>
+          </p:spPr>
+          <p:style>
+            <a:lnRef idx="1">
+              <a:schemeClr val="accent1"/>
+            </a:lnRef>
+            <a:fillRef idx="0">
+              <a:schemeClr val="accent1"/>
+            </a:fillRef>
+            <a:effectRef idx="0">
+              <a:schemeClr val="accent1"/>
+            </a:effectRef>
+            <a:fontRef idx="minor">
+              <a:schemeClr val="tx1"/>
+            </a:fontRef>
+          </p:style>
+        </p:cxnSp>
+        <p:cxnSp>
+          <p:nvCxnSpPr>
+            <p:cNvPr id="73" name="Straight Connector 72">
+              <a:extLst>
+                <a:ext uri="{FF2B5EF4-FFF2-40B4-BE49-F238E27FC236}">
+                  <a16:creationId xmlns:a16="http://schemas.microsoft.com/office/drawing/2014/main" id="{03FE481C-A25E-58DC-A774-CFD5EA234D98}"/>
+                </a:ext>
+              </a:extLst>
+            </p:cNvPr>
+            <p:cNvCxnSpPr>
+              <a:cxnSpLocks/>
+            </p:cNvCxnSpPr>
+            <p:nvPr/>
+          </p:nvCxnSpPr>
+          <p:spPr>
+            <a:xfrm>
+              <a:off x="8258947" y="4354129"/>
+              <a:ext cx="0" cy="649474"/>
+            </a:xfrm>
+            <a:prstGeom prst="line">
+              <a:avLst/>
+            </a:prstGeom>
+            <a:ln w="57150">
+              <a:solidFill>
+                <a:srgbClr val="0070C0"/>
+              </a:solidFill>
+            </a:ln>
+          </p:spPr>
+          <p:style>
+            <a:lnRef idx="1">
+              <a:schemeClr val="accent1"/>
+            </a:lnRef>
+            <a:fillRef idx="0">
+              <a:schemeClr val="accent1"/>
+            </a:fillRef>
+            <a:effectRef idx="0">
+              <a:schemeClr val="accent1"/>
+            </a:effectRef>
+            <a:fontRef idx="minor">
+              <a:schemeClr val="tx1"/>
+            </a:fontRef>
+          </p:style>
+        </p:cxnSp>
+      </p:grpSp>
+      <p:cxnSp>
+        <p:nvCxnSpPr>
+          <p:cNvPr id="70" name="Straight Connector 69">
+            <a:extLst>
+              <a:ext uri="{FF2B5EF4-FFF2-40B4-BE49-F238E27FC236}">
+                <a16:creationId xmlns:a16="http://schemas.microsoft.com/office/drawing/2014/main" id="{A4409F92-6E0E-B417-3081-7FF383EADB83}"/>
+              </a:ext>
+            </a:extLst>
+          </p:cNvPr>
+          <p:cNvCxnSpPr>
+            <a:cxnSpLocks/>
+          </p:cNvCxnSpPr>
+          <p:nvPr/>
+        </p:nvCxnSpPr>
+        <p:spPr>
+          <a:xfrm>
+            <a:off x="9197799" y="2009822"/>
+            <a:ext cx="0" cy="1052827"/>
+          </a:xfrm>
+          <a:prstGeom prst="line">
+            <a:avLst/>
+          </a:prstGeom>
+          <a:ln w="57150">
+            <a:solidFill>
+              <a:schemeClr val="tx1"/>
+            </a:solidFill>
+          </a:ln>
+        </p:spPr>
+        <p:style>
+          <a:lnRef idx="1">
+            <a:schemeClr val="accent1"/>
+          </a:lnRef>
+          <a:fillRef idx="0">
+            <a:schemeClr val="accent1"/>
+          </a:fillRef>
+          <a:effectRef idx="0">
+            <a:schemeClr val="accent1"/>
+          </a:effectRef>
+          <a:fontRef idx="minor">
+            <a:schemeClr val="tx1"/>
+          </a:fontRef>
+        </p:style>
+      </p:cxnSp>
+      <p:cxnSp>
+        <p:nvCxnSpPr>
+          <p:cNvPr id="74" name="Straight Connector 73">
+            <a:extLst>
+              <a:ext uri="{FF2B5EF4-FFF2-40B4-BE49-F238E27FC236}">
+                <a16:creationId xmlns:a16="http://schemas.microsoft.com/office/drawing/2014/main" id="{39DEF17A-956A-A2B4-5934-9B679B76C390}"/>
+              </a:ext>
+            </a:extLst>
+          </p:cNvPr>
+          <p:cNvCxnSpPr>
+            <a:cxnSpLocks/>
+          </p:cNvCxnSpPr>
+          <p:nvPr/>
+        </p:nvCxnSpPr>
+        <p:spPr>
+          <a:xfrm>
+            <a:off x="9196982" y="4856329"/>
+            <a:ext cx="0" cy="784189"/>
+          </a:xfrm>
+          <a:prstGeom prst="line">
+            <a:avLst/>
+          </a:prstGeom>
+          <a:ln w="57150">
+            <a:solidFill>
+              <a:schemeClr val="tx1"/>
+            </a:solidFill>
+          </a:ln>
+        </p:spPr>
+        <p:style>
+          <a:lnRef idx="1">
+            <a:schemeClr val="accent1"/>
+          </a:lnRef>
+          <a:fillRef idx="0">
+            <a:schemeClr val="accent1"/>
+          </a:fillRef>
+          <a:effectRef idx="0">
+            <a:schemeClr val="accent1"/>
+          </a:effectRef>
+          <a:fontRef idx="minor">
+            <a:schemeClr val="tx1"/>
+          </a:fontRef>
+        </p:style>
+      </p:cxnSp>
+      <p:cxnSp>
+        <p:nvCxnSpPr>
+          <p:cNvPr id="82" name="Straight Connector 81">
+            <a:extLst>
+              <a:ext uri="{FF2B5EF4-FFF2-40B4-BE49-F238E27FC236}">
+                <a16:creationId xmlns:a16="http://schemas.microsoft.com/office/drawing/2014/main" id="{7C9877FC-692D-385D-8B8F-0D73C0399C52}"/>
+              </a:ext>
+            </a:extLst>
+          </p:cNvPr>
+          <p:cNvCxnSpPr>
+            <a:cxnSpLocks/>
+          </p:cNvCxnSpPr>
+          <p:nvPr/>
+        </p:nvCxnSpPr>
+        <p:spPr>
+          <a:xfrm flipH="1">
+            <a:off x="3042289" y="5620944"/>
+            <a:ext cx="6164881" cy="280"/>
+          </a:xfrm>
+          <a:prstGeom prst="line">
+            <a:avLst/>
+          </a:prstGeom>
+          <a:ln w="57150">
+            <a:solidFill>
+              <a:schemeClr val="tx1"/>
+            </a:solidFill>
+          </a:ln>
+        </p:spPr>
+        <p:style>
+          <a:lnRef idx="1">
+            <a:schemeClr val="accent1"/>
+          </a:lnRef>
+          <a:fillRef idx="0">
+            <a:schemeClr val="accent1"/>
+          </a:fillRef>
+          <a:effectRef idx="0">
+            <a:schemeClr val="accent1"/>
+          </a:effectRef>
+          <a:fontRef idx="minor">
+            <a:schemeClr val="tx1"/>
+          </a:fontRef>
+        </p:style>
+      </p:cxnSp>
+      <p:sp>
+        <p:nvSpPr>
+          <p:cNvPr id="87" name="TextBox 86">
+            <a:extLst>
+              <a:ext uri="{FF2B5EF4-FFF2-40B4-BE49-F238E27FC236}">
+                <a16:creationId xmlns:a16="http://schemas.microsoft.com/office/drawing/2014/main" id="{6E9C5DDA-8560-F659-E79A-E6E2B3040CEF}"/>
+              </a:ext>
+            </a:extLst>
+          </p:cNvPr>
+          <p:cNvSpPr txBox="1"/>
+          <p:nvPr/>
+        </p:nvSpPr>
+        <p:spPr>
+          <a:xfrm>
+            <a:off x="1242403" y="3324614"/>
+            <a:ext cx="1411963" cy="830997"/>
+          </a:xfrm>
+          <a:prstGeom prst="rect">
+            <a:avLst/>
+          </a:prstGeom>
+          <a:noFill/>
+        </p:spPr>
+        <p:txBody>
+          <a:bodyPr wrap="square" rtlCol="0">
+            <a:spAutoFit/>
+          </a:bodyPr>
+          <a:lstStyle/>
+          <a:p>
+            <a:pPr algn="ctr"/>
+            <a:r>
+              <a:rPr lang="en-IN" sz="2400" b="1" dirty="0">
+                <a:solidFill>
+                  <a:srgbClr val="FF0000"/>
+                </a:solidFill>
+                <a:latin typeface="Times New Roman" panose="02020603050405020304" pitchFamily="18" charset="0"/>
+                <a:cs typeface="Times New Roman" panose="02020603050405020304" pitchFamily="18" charset="0"/>
+              </a:rPr>
+              <a:t>1</a:t>
+            </a:r>
+            <a:r>
+              <a:rPr lang="el-GR" sz="2400" b="1" dirty="0">
+                <a:solidFill>
+                  <a:srgbClr val="FF0000"/>
+                </a:solidFill>
+                <a:latin typeface="Times New Roman" panose="02020603050405020304" pitchFamily="18" charset="0"/>
+                <a:cs typeface="Times New Roman" panose="02020603050405020304" pitchFamily="18" charset="0"/>
+              </a:rPr>
+              <a:t>φ</a:t>
+            </a:r>
+            <a:r>
+              <a:rPr lang="en-US" sz="2400" b="1" dirty="0">
+                <a:solidFill>
+                  <a:srgbClr val="FF0000"/>
+                </a:solidFill>
+                <a:latin typeface="Times New Roman" panose="02020603050405020304" pitchFamily="18" charset="0"/>
+                <a:cs typeface="Times New Roman" panose="02020603050405020304" pitchFamily="18" charset="0"/>
+              </a:rPr>
+              <a:t> AC Supply</a:t>
+            </a:r>
+            <a:endParaRPr lang="en-IN" sz="2400" b="1" dirty="0">
+              <a:solidFill>
+                <a:srgbClr val="FF0000"/>
+              </a:solidFill>
+              <a:latin typeface="Times New Roman" panose="02020603050405020304" pitchFamily="18" charset="0"/>
+              <a:cs typeface="Times New Roman" panose="02020603050405020304" pitchFamily="18" charset="0"/>
+            </a:endParaRPr>
+          </a:p>
+        </p:txBody>
+      </p:sp>
+      <p:cxnSp>
+        <p:nvCxnSpPr>
+          <p:cNvPr id="97" name="Straight Arrow Connector 96">
+            <a:extLst>
+              <a:ext uri="{FF2B5EF4-FFF2-40B4-BE49-F238E27FC236}">
+                <a16:creationId xmlns:a16="http://schemas.microsoft.com/office/drawing/2014/main" id="{82B22EAD-F63E-E9C6-57CD-23CCE4992076}"/>
+              </a:ext>
+            </a:extLst>
+          </p:cNvPr>
+          <p:cNvCxnSpPr/>
+          <p:nvPr/>
+        </p:nvCxnSpPr>
+        <p:spPr>
+          <a:xfrm>
+            <a:off x="9918442" y="2000491"/>
+            <a:ext cx="0" cy="3620453"/>
+          </a:xfrm>
+          <a:prstGeom prst="straightConnector1">
+            <a:avLst/>
+          </a:prstGeom>
+          <a:ln w="38100" cap="flat" cmpd="sng" algn="ctr">
+            <a:solidFill>
+              <a:srgbClr val="FF0000"/>
+            </a:solidFill>
+            <a:prstDash val="solid"/>
+            <a:round/>
+            <a:headEnd type="arrow" w="med" len="med"/>
+            <a:tailEnd type="arrow" w="med" len="med"/>
+          </a:ln>
+        </p:spPr>
+        <p:style>
+          <a:lnRef idx="0">
+            <a:scrgbClr r="0" g="0" b="0"/>
+          </a:lnRef>
+          <a:fillRef idx="0">
+            <a:scrgbClr r="0" g="0" b="0"/>
+          </a:fillRef>
+          <a:effectRef idx="0">
+            <a:scrgbClr r="0" g="0" b="0"/>
+          </a:effectRef>
+          <a:fontRef idx="minor">
+            <a:schemeClr val="tx1"/>
+          </a:fontRef>
+        </p:style>
+      </p:cxnSp>
+      <p:sp>
+        <p:nvSpPr>
+          <p:cNvPr id="98" name="TextBox 97">
+            <a:extLst>
+              <a:ext uri="{FF2B5EF4-FFF2-40B4-BE49-F238E27FC236}">
+                <a16:creationId xmlns:a16="http://schemas.microsoft.com/office/drawing/2014/main" id="{FB15EE5C-833D-D2AB-B00C-C0BE821E645E}"/>
+              </a:ext>
+            </a:extLst>
+          </p:cNvPr>
+          <p:cNvSpPr txBox="1"/>
+          <p:nvPr/>
+        </p:nvSpPr>
+        <p:spPr>
+          <a:xfrm>
+            <a:off x="9586930" y="3581300"/>
+            <a:ext cx="701958" cy="400110"/>
+          </a:xfrm>
+          <a:prstGeom prst="rect">
+            <a:avLst/>
+          </a:prstGeom>
+          <a:solidFill>
+            <a:schemeClr val="bg1"/>
+          </a:solidFill>
+        </p:spPr>
+        <p:txBody>
+          <a:bodyPr wrap="square" rtlCol="0">
+            <a:spAutoFit/>
+          </a:bodyPr>
+          <a:lstStyle/>
+          <a:p>
+            <a:pPr algn="ctr"/>
+            <a:r>
+              <a:rPr lang="en-US" sz="2000" b="1" dirty="0">
+                <a:latin typeface="Times New Roman" panose="02020603050405020304" pitchFamily="18" charset="0"/>
+                <a:cs typeface="Times New Roman" panose="02020603050405020304" pitchFamily="18" charset="0"/>
+              </a:rPr>
+              <a:t>V</a:t>
+            </a:r>
+            <a:r>
+              <a:rPr lang="en-US" sz="2000" b="1" baseline="-25000" dirty="0">
+                <a:latin typeface="Times New Roman" panose="02020603050405020304" pitchFamily="18" charset="0"/>
+                <a:cs typeface="Times New Roman" panose="02020603050405020304" pitchFamily="18" charset="0"/>
+              </a:rPr>
+              <a:t>O</a:t>
+            </a:r>
+            <a:endParaRPr lang="en-IN" sz="2000" dirty="0"/>
+          </a:p>
+        </p:txBody>
+      </p:sp>
+      <p:cxnSp>
+        <p:nvCxnSpPr>
+          <p:cNvPr id="101" name="Straight Arrow Connector 100">
+            <a:extLst>
+              <a:ext uri="{FF2B5EF4-FFF2-40B4-BE49-F238E27FC236}">
+                <a16:creationId xmlns:a16="http://schemas.microsoft.com/office/drawing/2014/main" id="{FFBFC383-690D-A1EC-B379-A2C77A295A4A}"/>
+              </a:ext>
+            </a:extLst>
+          </p:cNvPr>
+          <p:cNvCxnSpPr/>
+          <p:nvPr/>
+        </p:nvCxnSpPr>
+        <p:spPr>
+          <a:xfrm>
+            <a:off x="4164255" y="2047608"/>
+            <a:ext cx="0" cy="3537023"/>
+          </a:xfrm>
+          <a:prstGeom prst="straightConnector1">
+            <a:avLst/>
+          </a:prstGeom>
+          <a:ln w="38100" cap="flat" cmpd="sng" algn="ctr">
+            <a:solidFill>
+              <a:srgbClr val="FF0000"/>
+            </a:solidFill>
+            <a:prstDash val="solid"/>
+            <a:round/>
+            <a:headEnd type="arrow" w="med" len="med"/>
+            <a:tailEnd type="arrow" w="med" len="med"/>
+          </a:ln>
+        </p:spPr>
+        <p:style>
+          <a:lnRef idx="0">
+            <a:scrgbClr r="0" g="0" b="0"/>
+          </a:lnRef>
+          <a:fillRef idx="0">
+            <a:scrgbClr r="0" g="0" b="0"/>
+          </a:fillRef>
+          <a:effectRef idx="0">
+            <a:scrgbClr r="0" g="0" b="0"/>
+          </a:effectRef>
+          <a:fontRef idx="minor">
+            <a:schemeClr val="tx1"/>
+          </a:fontRef>
+        </p:style>
+      </p:cxnSp>
+      <p:sp>
+        <p:nvSpPr>
+          <p:cNvPr id="102" name="TextBox 101">
+            <a:extLst>
+              <a:ext uri="{FF2B5EF4-FFF2-40B4-BE49-F238E27FC236}">
+                <a16:creationId xmlns:a16="http://schemas.microsoft.com/office/drawing/2014/main" id="{2F5B2B96-F8A8-3AF8-88CC-6D2CABD3BB5E}"/>
+              </a:ext>
+            </a:extLst>
+          </p:cNvPr>
+          <p:cNvSpPr txBox="1"/>
+          <p:nvPr/>
+        </p:nvSpPr>
+        <p:spPr>
+          <a:xfrm>
+            <a:off x="3837742" y="3416845"/>
+            <a:ext cx="701958" cy="390890"/>
+          </a:xfrm>
+          <a:prstGeom prst="rect">
+            <a:avLst/>
+          </a:prstGeom>
+          <a:solidFill>
+            <a:schemeClr val="bg1"/>
+          </a:solidFill>
+        </p:spPr>
+        <p:txBody>
+          <a:bodyPr wrap="square" rtlCol="0">
+            <a:spAutoFit/>
+          </a:bodyPr>
+          <a:lstStyle/>
+          <a:p>
+            <a:pPr algn="ctr"/>
+            <a:r>
+              <a:rPr lang="en-US" sz="2000" b="1" dirty="0">
+                <a:latin typeface="Times New Roman" panose="02020603050405020304" pitchFamily="18" charset="0"/>
+                <a:cs typeface="Times New Roman" panose="02020603050405020304" pitchFamily="18" charset="0"/>
+              </a:rPr>
+              <a:t>V</a:t>
+            </a:r>
+            <a:r>
+              <a:rPr lang="en-US" sz="2000" b="1" baseline="-25000" dirty="0">
+                <a:latin typeface="Times New Roman" panose="02020603050405020304" pitchFamily="18" charset="0"/>
+                <a:cs typeface="Times New Roman" panose="02020603050405020304" pitchFamily="18" charset="0"/>
+              </a:rPr>
+              <a:t>S</a:t>
+            </a:r>
+            <a:endParaRPr lang="en-IN" sz="2000" dirty="0"/>
+          </a:p>
+        </p:txBody>
+      </p:sp>
+      <p:sp>
+        <p:nvSpPr>
+          <p:cNvPr id="103" name="TextBox 102">
+            <a:extLst>
+              <a:ext uri="{FF2B5EF4-FFF2-40B4-BE49-F238E27FC236}">
+                <a16:creationId xmlns:a16="http://schemas.microsoft.com/office/drawing/2014/main" id="{B961E458-6260-BCDD-36CC-F3D5ACBD071D}"/>
+              </a:ext>
+            </a:extLst>
+          </p:cNvPr>
+          <p:cNvSpPr txBox="1"/>
+          <p:nvPr/>
+        </p:nvSpPr>
+        <p:spPr>
+          <a:xfrm>
+            <a:off x="8333937" y="3638354"/>
+            <a:ext cx="350527" cy="523220"/>
+          </a:xfrm>
+          <a:prstGeom prst="rect">
+            <a:avLst/>
+          </a:prstGeom>
+          <a:noFill/>
+        </p:spPr>
+        <p:txBody>
+          <a:bodyPr wrap="square" rtlCol="0">
+            <a:spAutoFit/>
+          </a:bodyPr>
+          <a:lstStyle/>
+          <a:p>
+            <a:r>
+              <a:rPr lang="en-US" sz="2800" b="1" dirty="0">
+                <a:latin typeface="Times New Roman" panose="02020603050405020304" pitchFamily="18" charset="0"/>
+                <a:cs typeface="Times New Roman" panose="02020603050405020304" pitchFamily="18" charset="0"/>
+              </a:rPr>
+              <a:t>R</a:t>
+            </a:r>
+            <a:endParaRPr lang="en-IN" sz="2800" b="1" dirty="0">
+              <a:latin typeface="Times New Roman" panose="02020603050405020304" pitchFamily="18" charset="0"/>
+              <a:cs typeface="Times New Roman" panose="02020603050405020304" pitchFamily="18" charset="0"/>
+            </a:endParaRPr>
+          </a:p>
+        </p:txBody>
+      </p:sp>
+      <p:grpSp>
+        <p:nvGrpSpPr>
+          <p:cNvPr id="17" name="Group 16">
+            <a:extLst>
+              <a:ext uri="{FF2B5EF4-FFF2-40B4-BE49-F238E27FC236}">
+                <a16:creationId xmlns:a16="http://schemas.microsoft.com/office/drawing/2014/main" id="{DB622D44-C9F5-20B7-EEFF-27D70D3857B3}"/>
+              </a:ext>
+            </a:extLst>
+          </p:cNvPr>
+          <p:cNvGrpSpPr/>
+          <p:nvPr/>
+        </p:nvGrpSpPr>
+        <p:grpSpPr>
+          <a:xfrm>
+            <a:off x="5750638" y="1236776"/>
+            <a:ext cx="1161133" cy="1459740"/>
+            <a:chOff x="5935168" y="1220910"/>
+            <a:chExt cx="1161133" cy="1459740"/>
+          </a:xfrm>
+        </p:grpSpPr>
+        <p:sp>
+          <p:nvSpPr>
+            <p:cNvPr id="9" name="Isosceles Triangle 8">
+              <a:extLst>
+                <a:ext uri="{FF2B5EF4-FFF2-40B4-BE49-F238E27FC236}">
+                  <a16:creationId xmlns:a16="http://schemas.microsoft.com/office/drawing/2014/main" id="{8B418E5E-2DB1-D095-E24C-23D98E5BFC0C}"/>
+                </a:ext>
+              </a:extLst>
+            </p:cNvPr>
+            <p:cNvSpPr/>
+            <p:nvPr/>
+          </p:nvSpPr>
+          <p:spPr>
+            <a:xfrm rot="16200000" flipV="1">
+              <a:off x="5930456" y="1892441"/>
+              <a:ext cx="626659" cy="591853"/>
+            </a:xfrm>
+            <a:prstGeom prst="triangle">
+              <a:avLst/>
+            </a:prstGeom>
+            <a:ln w="28575">
+              <a:solidFill>
+                <a:srgbClr val="002060"/>
+              </a:solidFill>
+            </a:ln>
+          </p:spPr>
+          <p:style>
+            <a:lnRef idx="2">
+              <a:schemeClr val="accent1">
+                <a:shade val="50000"/>
+              </a:schemeClr>
+            </a:lnRef>
+            <a:fillRef idx="1">
+              <a:schemeClr val="accent1"/>
+            </a:fillRef>
+            <a:effectRef idx="0">
+              <a:schemeClr val="accent1"/>
+            </a:effectRef>
+            <a:fontRef idx="minor">
+              <a:schemeClr val="lt1"/>
+            </a:fontRef>
+          </p:style>
+          <p:txBody>
+            <a:bodyPr rtlCol="0" anchor="ctr"/>
+            <a:lstStyle/>
+            <a:p>
+              <a:pPr algn="ctr"/>
+              <a:endParaRPr lang="en-IN"/>
+            </a:p>
+          </p:txBody>
+        </p:sp>
+        <p:cxnSp>
+          <p:nvCxnSpPr>
+            <p:cNvPr id="2" name="Straight Connector 1">
+              <a:extLst>
+                <a:ext uri="{FF2B5EF4-FFF2-40B4-BE49-F238E27FC236}">
+                  <a16:creationId xmlns:a16="http://schemas.microsoft.com/office/drawing/2014/main" id="{A565CFAD-2E4E-C285-B17D-89E0232953D4}"/>
+                </a:ext>
+              </a:extLst>
+            </p:cNvPr>
+            <p:cNvCxnSpPr>
+              <a:cxnSpLocks/>
+            </p:cNvCxnSpPr>
+            <p:nvPr/>
+          </p:nvCxnSpPr>
+          <p:spPr>
+            <a:xfrm flipV="1">
+              <a:off x="5935168" y="1230241"/>
+              <a:ext cx="0" cy="1325553"/>
+            </a:xfrm>
+            <a:prstGeom prst="line">
+              <a:avLst/>
+            </a:prstGeom>
+            <a:ln w="76200">
+              <a:solidFill>
+                <a:srgbClr val="002060"/>
+              </a:solidFill>
+            </a:ln>
+          </p:spPr>
+          <p:style>
+            <a:lnRef idx="1">
+              <a:schemeClr val="accent1"/>
+            </a:lnRef>
+            <a:fillRef idx="0">
+              <a:schemeClr val="accent1"/>
+            </a:fillRef>
+            <a:effectRef idx="0">
+              <a:schemeClr val="accent1"/>
+            </a:effectRef>
+            <a:fontRef idx="minor">
+              <a:schemeClr val="tx1"/>
+            </a:fontRef>
+          </p:style>
+        </p:cxnSp>
+        <p:sp>
+          <p:nvSpPr>
+            <p:cNvPr id="12" name="Isosceles Triangle 11">
+              <a:extLst>
+                <a:ext uri="{FF2B5EF4-FFF2-40B4-BE49-F238E27FC236}">
+                  <a16:creationId xmlns:a16="http://schemas.microsoft.com/office/drawing/2014/main" id="{A507A9B3-C808-71FC-9856-6F1103F14059}"/>
+                </a:ext>
+              </a:extLst>
+            </p:cNvPr>
+            <p:cNvSpPr/>
+            <p:nvPr/>
+          </p:nvSpPr>
+          <p:spPr>
+            <a:xfrm rot="5400000" flipH="1" flipV="1">
+              <a:off x="5930456" y="1346256"/>
+              <a:ext cx="626659" cy="591853"/>
+            </a:xfrm>
+            <a:prstGeom prst="triangle">
+              <a:avLst/>
+            </a:prstGeom>
+            <a:ln w="28575">
+              <a:solidFill>
+                <a:srgbClr val="002060"/>
+              </a:solidFill>
+            </a:ln>
+          </p:spPr>
+          <p:style>
+            <a:lnRef idx="2">
+              <a:schemeClr val="accent1">
+                <a:shade val="50000"/>
+              </a:schemeClr>
+            </a:lnRef>
+            <a:fillRef idx="1">
+              <a:schemeClr val="accent1"/>
+            </a:fillRef>
+            <a:effectRef idx="0">
+              <a:schemeClr val="accent1"/>
+            </a:effectRef>
+            <a:fontRef idx="minor">
+              <a:schemeClr val="lt1"/>
+            </a:fontRef>
+          </p:style>
+          <p:txBody>
+            <a:bodyPr rtlCol="0" anchor="ctr"/>
+            <a:lstStyle/>
+            <a:p>
+              <a:pPr algn="ctr"/>
+              <a:endParaRPr lang="en-IN"/>
+            </a:p>
+          </p:txBody>
+        </p:sp>
+        <p:cxnSp>
+          <p:nvCxnSpPr>
+            <p:cNvPr id="13" name="Straight Connector 12">
+              <a:extLst>
+                <a:ext uri="{FF2B5EF4-FFF2-40B4-BE49-F238E27FC236}">
+                  <a16:creationId xmlns:a16="http://schemas.microsoft.com/office/drawing/2014/main" id="{21A28834-DCBB-8AF9-4127-47290E0E4E94}"/>
+                </a:ext>
+              </a:extLst>
+            </p:cNvPr>
+            <p:cNvCxnSpPr>
+              <a:cxnSpLocks/>
+            </p:cNvCxnSpPr>
+            <p:nvPr/>
+          </p:nvCxnSpPr>
+          <p:spPr>
+            <a:xfrm flipV="1">
+              <a:off x="6587131" y="1220910"/>
+              <a:ext cx="0" cy="1325553"/>
+            </a:xfrm>
+            <a:prstGeom prst="line">
+              <a:avLst/>
+            </a:prstGeom>
+            <a:ln w="76200">
+              <a:solidFill>
+                <a:srgbClr val="002060"/>
+              </a:solidFill>
+            </a:ln>
+          </p:spPr>
+          <p:style>
+            <a:lnRef idx="1">
+              <a:schemeClr val="accent1"/>
+            </a:lnRef>
+            <a:fillRef idx="0">
+              <a:schemeClr val="accent1"/>
+            </a:fillRef>
+            <a:effectRef idx="0">
+              <a:schemeClr val="accent1"/>
+            </a:effectRef>
+            <a:fontRef idx="minor">
+              <a:schemeClr val="tx1"/>
+            </a:fontRef>
+          </p:style>
+        </p:cxnSp>
+        <p:cxnSp>
+          <p:nvCxnSpPr>
+            <p:cNvPr id="15" name="Straight Connector 14">
+              <a:extLst>
+                <a:ext uri="{FF2B5EF4-FFF2-40B4-BE49-F238E27FC236}">
+                  <a16:creationId xmlns:a16="http://schemas.microsoft.com/office/drawing/2014/main" id="{4ED6778B-60C1-C71E-7658-292AE3CA8925}"/>
+                </a:ext>
+              </a:extLst>
+            </p:cNvPr>
+            <p:cNvCxnSpPr>
+              <a:cxnSpLocks/>
+            </p:cNvCxnSpPr>
+            <p:nvPr/>
+          </p:nvCxnSpPr>
+          <p:spPr>
+            <a:xfrm>
+              <a:off x="6578128" y="2346112"/>
+              <a:ext cx="449693" cy="245197"/>
+            </a:xfrm>
+            <a:prstGeom prst="line">
+              <a:avLst/>
+            </a:prstGeom>
+            <a:ln w="57150">
+              <a:solidFill>
+                <a:schemeClr val="accent1">
+                  <a:lumMod val="50000"/>
+                </a:schemeClr>
+              </a:solidFill>
+            </a:ln>
+          </p:spPr>
+          <p:style>
+            <a:lnRef idx="1">
+              <a:schemeClr val="accent1"/>
+            </a:lnRef>
+            <a:fillRef idx="0">
+              <a:schemeClr val="accent1"/>
+            </a:fillRef>
+            <a:effectRef idx="0">
+              <a:schemeClr val="accent1"/>
+            </a:effectRef>
+            <a:fontRef idx="minor">
+              <a:schemeClr val="tx1"/>
+            </a:fontRef>
+          </p:style>
+        </p:cxnSp>
+        <p:sp>
+          <p:nvSpPr>
+            <p:cNvPr id="14" name="Oval 13">
+              <a:extLst>
+                <a:ext uri="{FF2B5EF4-FFF2-40B4-BE49-F238E27FC236}">
+                  <a16:creationId xmlns:a16="http://schemas.microsoft.com/office/drawing/2014/main" id="{54FBDBD9-034B-76B9-0CB8-1A0634EC99C1}"/>
+                </a:ext>
+              </a:extLst>
+            </p:cNvPr>
+            <p:cNvSpPr/>
+            <p:nvPr/>
+          </p:nvSpPr>
+          <p:spPr>
+            <a:xfrm>
+              <a:off x="6921073" y="2501968"/>
+              <a:ext cx="175228" cy="178682"/>
+            </a:xfrm>
+            <a:prstGeom prst="ellipse">
+              <a:avLst/>
+            </a:prstGeom>
+            <a:solidFill>
+              <a:schemeClr val="accent1">
+                <a:lumMod val="60000"/>
+                <a:lumOff val="40000"/>
+              </a:schemeClr>
+            </a:solidFill>
+            <a:ln w="57150">
+              <a:solidFill>
+                <a:srgbClr val="002060"/>
+              </a:solidFill>
+            </a:ln>
+          </p:spPr>
+          <p:style>
+            <a:lnRef idx="2">
+              <a:schemeClr val="accent1">
+                <a:shade val="50000"/>
+              </a:schemeClr>
+            </a:lnRef>
+            <a:fillRef idx="1">
+              <a:schemeClr val="accent1"/>
+            </a:fillRef>
+            <a:effectRef idx="0">
+              <a:schemeClr val="accent1"/>
+            </a:effectRef>
+            <a:fontRef idx="minor">
+              <a:schemeClr val="lt1"/>
+            </a:fontRef>
+          </p:style>
+          <p:txBody>
+            <a:bodyPr rtlCol="0" anchor="ctr"/>
+            <a:lstStyle/>
+            <a:p>
+              <a:pPr algn="ctr"/>
+              <a:endParaRPr lang="en-IN"/>
+            </a:p>
+          </p:txBody>
+        </p:sp>
+      </p:grpSp>
+      <p:sp>
+        <p:nvSpPr>
+          <p:cNvPr id="20" name="TextBox 19">
+            <a:extLst>
+              <a:ext uri="{FF2B5EF4-FFF2-40B4-BE49-F238E27FC236}">
+                <a16:creationId xmlns:a16="http://schemas.microsoft.com/office/drawing/2014/main" id="{69A9C31B-8205-722F-3566-E20EC3D61DC5}"/>
+              </a:ext>
+            </a:extLst>
+          </p:cNvPr>
+          <p:cNvSpPr txBox="1"/>
+          <p:nvPr/>
+        </p:nvSpPr>
+        <p:spPr>
+          <a:xfrm>
+            <a:off x="5409994" y="2600984"/>
+            <a:ext cx="1411963" cy="461665"/>
+          </a:xfrm>
+          <a:prstGeom prst="rect">
+            <a:avLst/>
+          </a:prstGeom>
+          <a:noFill/>
+        </p:spPr>
+        <p:txBody>
+          <a:bodyPr wrap="square" rtlCol="0">
+            <a:spAutoFit/>
+          </a:bodyPr>
+          <a:lstStyle/>
+          <a:p>
+            <a:pPr algn="ctr"/>
+            <a:r>
+              <a:rPr lang="en-US" sz="2400" b="1" dirty="0" err="1">
+                <a:solidFill>
+                  <a:srgbClr val="FF0000"/>
+                </a:solidFill>
+                <a:latin typeface="Times New Roman" panose="02020603050405020304" pitchFamily="18" charset="0"/>
+                <a:cs typeface="Times New Roman" panose="02020603050405020304" pitchFamily="18" charset="0"/>
+              </a:rPr>
+              <a:t>Triac</a:t>
+            </a:r>
+            <a:endParaRPr lang="en-IN" sz="2400" b="1" dirty="0">
+              <a:solidFill>
+                <a:srgbClr val="FF0000"/>
+              </a:solidFill>
+              <a:latin typeface="Times New Roman" panose="02020603050405020304" pitchFamily="18" charset="0"/>
+              <a:cs typeface="Times New Roman" panose="02020603050405020304" pitchFamily="18" charset="0"/>
+            </a:endParaRPr>
+          </a:p>
+        </p:txBody>
+      </p:sp>
+    </p:spTree>
+    <p:extLst>
+      <p:ext uri="{BB962C8B-B14F-4D97-AF65-F5344CB8AC3E}">
+        <p14:creationId xmlns:p14="http://schemas.microsoft.com/office/powerpoint/2010/main" val="2723665323"/>
+      </p:ext>
+    </p:extLst>
+  </p:cSld>
+  <p:clrMapOvr>
+    <a:masterClrMapping/>
+  </p:clrMapOvr>
+</p:sld>
+</file>
+
+<file path=ppt/slides/slide8.xml><?xml version="1.0" encoding="utf-8"?>
+<p:sld xmlns:a="http://schemas.openxmlformats.org/drawingml/2006/main" xmlns:r="http://schemas.openxmlformats.org/officeDocument/2006/relationships" xmlns:p="http://schemas.openxmlformats.org/presentationml/2006/main">
+  <p:cSld>
+    <p:spTree>
+      <p:nvGrpSpPr>
+        <p:cNvPr id="1" name=""/>
+        <p:cNvGrpSpPr/>
+        <p:nvPr/>
+      </p:nvGrpSpPr>
+      <p:grpSpPr>
+        <a:xfrm>
+          <a:off x="0" y="0"/>
+          <a:ext cx="0" cy="0"/>
+          <a:chOff x="0" y="0"/>
+          <a:chExt cx="0" cy="0"/>
+        </a:xfrm>
+      </p:grpSpPr>
+      <p:cxnSp>
+        <p:nvCxnSpPr>
+          <p:cNvPr id="57" name="Straight Connector 56">
+            <a:extLst>
+              <a:ext uri="{FF2B5EF4-FFF2-40B4-BE49-F238E27FC236}">
+                <a16:creationId xmlns:a16="http://schemas.microsoft.com/office/drawing/2014/main" id="{8D1E23AC-D61A-675A-71FC-EFC51DA484EF}"/>
+              </a:ext>
+            </a:extLst>
+          </p:cNvPr>
+          <p:cNvCxnSpPr>
+            <a:cxnSpLocks/>
+          </p:cNvCxnSpPr>
+          <p:nvPr/>
+        </p:nvCxnSpPr>
+        <p:spPr>
+          <a:xfrm flipV="1">
+            <a:off x="6198142" y="449176"/>
+            <a:ext cx="0" cy="3063283"/>
+          </a:xfrm>
+          <a:prstGeom prst="line">
+            <a:avLst/>
+          </a:prstGeom>
+          <a:ln w="57150">
+            <a:solidFill>
+              <a:schemeClr val="tx1"/>
+            </a:solidFill>
+          </a:ln>
+        </p:spPr>
+        <p:style>
+          <a:lnRef idx="1">
+            <a:schemeClr val="accent1"/>
+          </a:lnRef>
+          <a:fillRef idx="0">
+            <a:schemeClr val="accent1"/>
+          </a:fillRef>
+          <a:effectRef idx="0">
+            <a:schemeClr val="accent1"/>
+          </a:effectRef>
+          <a:fontRef idx="minor">
+            <a:schemeClr val="tx1"/>
+          </a:fontRef>
+        </p:style>
+      </p:cxnSp>
+      <p:cxnSp>
+        <p:nvCxnSpPr>
+          <p:cNvPr id="58" name="Straight Connector 57">
+            <a:extLst>
+              <a:ext uri="{FF2B5EF4-FFF2-40B4-BE49-F238E27FC236}">
+                <a16:creationId xmlns:a16="http://schemas.microsoft.com/office/drawing/2014/main" id="{D1D53056-3608-6E21-23F7-D984F692D9FE}"/>
+              </a:ext>
+            </a:extLst>
+          </p:cNvPr>
+          <p:cNvCxnSpPr>
+            <a:cxnSpLocks/>
+          </p:cNvCxnSpPr>
+          <p:nvPr/>
+        </p:nvCxnSpPr>
+        <p:spPr>
+          <a:xfrm>
+            <a:off x="2178036" y="2000191"/>
+            <a:ext cx="8160" cy="3621935"/>
+          </a:xfrm>
+          <a:prstGeom prst="line">
+            <a:avLst/>
+          </a:prstGeom>
+          <a:ln w="57150">
+            <a:solidFill>
+              <a:schemeClr val="tx1"/>
+            </a:solidFill>
+          </a:ln>
+        </p:spPr>
+        <p:style>
+          <a:lnRef idx="1">
+            <a:schemeClr val="accent1"/>
+          </a:lnRef>
+          <a:fillRef idx="0">
+            <a:schemeClr val="accent1"/>
+          </a:fillRef>
+          <a:effectRef idx="0">
+            <a:schemeClr val="accent1"/>
+          </a:effectRef>
+          <a:fontRef idx="minor">
+            <a:schemeClr val="tx1"/>
+          </a:fontRef>
+        </p:style>
+      </p:cxnSp>
+      <p:grpSp>
+        <p:nvGrpSpPr>
+          <p:cNvPr id="107" name="Group 106">
+            <a:extLst>
+              <a:ext uri="{FF2B5EF4-FFF2-40B4-BE49-F238E27FC236}">
+                <a16:creationId xmlns:a16="http://schemas.microsoft.com/office/drawing/2014/main" id="{18A6A490-EBE0-DFF3-E962-A918851A5BC8}"/>
+              </a:ext>
+            </a:extLst>
+          </p:cNvPr>
+          <p:cNvGrpSpPr/>
+          <p:nvPr/>
+        </p:nvGrpSpPr>
+        <p:grpSpPr>
+          <a:xfrm>
+            <a:off x="1629392" y="3188451"/>
+            <a:ext cx="1114259" cy="1083120"/>
+            <a:chOff x="10511683" y="1426815"/>
+            <a:chExt cx="1411966" cy="1443123"/>
+          </a:xfrm>
+        </p:grpSpPr>
+        <p:sp>
+          <p:nvSpPr>
+            <p:cNvPr id="54" name="Oval 53">
+              <a:extLst>
+                <a:ext uri="{FF2B5EF4-FFF2-40B4-BE49-F238E27FC236}">
+                  <a16:creationId xmlns:a16="http://schemas.microsoft.com/office/drawing/2014/main" id="{9C44AAD4-4FEA-4ABB-6990-54BA1B33AF21}"/>
+                </a:ext>
+              </a:extLst>
+            </p:cNvPr>
+            <p:cNvSpPr/>
+            <p:nvPr/>
+          </p:nvSpPr>
+          <p:spPr>
+            <a:xfrm>
+              <a:off x="10511683" y="1426815"/>
+              <a:ext cx="1411966" cy="1443123"/>
+            </a:xfrm>
+            <a:prstGeom prst="ellipse">
+              <a:avLst/>
+            </a:prstGeom>
+            <a:solidFill>
+              <a:schemeClr val="bg1">
+                <a:lumMod val="95000"/>
+              </a:schemeClr>
+            </a:solidFill>
+            <a:ln w="38100"/>
+          </p:spPr>
+          <p:style>
+            <a:lnRef idx="2">
+              <a:schemeClr val="accent1">
+                <a:shade val="50000"/>
+              </a:schemeClr>
+            </a:lnRef>
+            <a:fillRef idx="1">
+              <a:schemeClr val="accent1"/>
+            </a:fillRef>
+            <a:effectRef idx="0">
+              <a:schemeClr val="accent1"/>
+            </a:effectRef>
+            <a:fontRef idx="minor">
+              <a:schemeClr val="lt1"/>
+            </a:fontRef>
+          </p:style>
+          <p:txBody>
+            <a:bodyPr rtlCol="0" anchor="ctr"/>
+            <a:lstStyle/>
+            <a:p>
+              <a:pPr algn="ctr"/>
+              <a:endParaRPr lang="en-IN" sz="4000" dirty="0">
+                <a:solidFill>
+                  <a:srgbClr val="FF0000"/>
+                </a:solidFill>
+              </a:endParaRPr>
+            </a:p>
+          </p:txBody>
+        </p:sp>
+        <p:grpSp>
+          <p:nvGrpSpPr>
+            <p:cNvPr id="46" name="Group 45">
+              <a:extLst>
+                <a:ext uri="{FF2B5EF4-FFF2-40B4-BE49-F238E27FC236}">
+                  <a16:creationId xmlns:a16="http://schemas.microsoft.com/office/drawing/2014/main" id="{0C683EDA-A6B5-CBC4-0624-70122FBAF142}"/>
+                </a:ext>
+              </a:extLst>
+            </p:cNvPr>
+            <p:cNvGrpSpPr/>
+            <p:nvPr/>
+          </p:nvGrpSpPr>
+          <p:grpSpPr>
+            <a:xfrm rot="5400000" flipV="1">
+              <a:off x="10921432" y="1708703"/>
+              <a:ext cx="592453" cy="880897"/>
+              <a:chOff x="3308385" y="8500613"/>
+              <a:chExt cx="232509" cy="554880"/>
+            </a:xfrm>
+          </p:grpSpPr>
+          <p:sp>
+            <p:nvSpPr>
+              <p:cNvPr id="47" name="Arc 46">
+                <a:extLst>
+                  <a:ext uri="{FF2B5EF4-FFF2-40B4-BE49-F238E27FC236}">
+                    <a16:creationId xmlns:a16="http://schemas.microsoft.com/office/drawing/2014/main" id="{2FBA4396-2A55-AAFF-5145-FA3E20D50E36}"/>
+                  </a:ext>
+                </a:extLst>
+              </p:cNvPr>
+              <p:cNvSpPr/>
+              <p:nvPr/>
+            </p:nvSpPr>
+            <p:spPr>
+              <a:xfrm rot="16200000">
+                <a:off x="3286889" y="8524303"/>
+                <a:ext cx="277695" cy="230315"/>
+              </a:xfrm>
+              <a:prstGeom prst="arc">
+                <a:avLst>
+                  <a:gd name="adj1" fmla="val 10739696"/>
+                  <a:gd name="adj2" fmla="val 0"/>
+                </a:avLst>
+              </a:prstGeom>
+              <a:ln w="76200">
+                <a:solidFill>
+                  <a:srgbClr val="FF0000"/>
+                </a:solidFill>
+              </a:ln>
+            </p:spPr>
+            <p:style>
+              <a:lnRef idx="1">
+                <a:schemeClr val="dk1"/>
+              </a:lnRef>
+              <a:fillRef idx="0">
+                <a:schemeClr val="dk1"/>
+              </a:fillRef>
+              <a:effectRef idx="0">
+                <a:schemeClr val="dk1"/>
+              </a:effectRef>
+              <a:fontRef idx="minor">
+                <a:schemeClr val="tx1"/>
+              </a:fontRef>
+            </p:style>
+            <p:txBody>
+              <a:bodyPr rtlCol="0" anchor="ctr"/>
+              <a:lstStyle/>
+              <a:p>
+                <a:pPr algn="ctr"/>
+                <a:endParaRPr lang="en-IN"/>
+              </a:p>
+            </p:txBody>
+          </p:sp>
+          <p:sp>
+            <p:nvSpPr>
+              <p:cNvPr id="48" name="Arc 47">
+                <a:extLst>
+                  <a:ext uri="{FF2B5EF4-FFF2-40B4-BE49-F238E27FC236}">
+                    <a16:creationId xmlns:a16="http://schemas.microsoft.com/office/drawing/2014/main" id="{864551BD-AFFD-9D46-5920-45813D789EAD}"/>
+                  </a:ext>
+                </a:extLst>
+              </p:cNvPr>
+              <p:cNvSpPr/>
+              <p:nvPr/>
+            </p:nvSpPr>
+            <p:spPr>
+              <a:xfrm rot="5400000" flipH="1">
+                <a:off x="3284695" y="8801488"/>
+                <a:ext cx="277695" cy="230315"/>
+              </a:xfrm>
+              <a:prstGeom prst="arc">
+                <a:avLst>
+                  <a:gd name="adj1" fmla="val 10739696"/>
+                  <a:gd name="adj2" fmla="val 0"/>
+                </a:avLst>
+              </a:prstGeom>
+              <a:ln w="76200">
+                <a:solidFill>
+                  <a:srgbClr val="FF0000"/>
+                </a:solidFill>
+              </a:ln>
+            </p:spPr>
+            <p:style>
+              <a:lnRef idx="1">
+                <a:schemeClr val="dk1"/>
+              </a:lnRef>
+              <a:fillRef idx="0">
+                <a:schemeClr val="dk1"/>
+              </a:fillRef>
+              <a:effectRef idx="0">
+                <a:schemeClr val="dk1"/>
+              </a:effectRef>
+              <a:fontRef idx="minor">
+                <a:schemeClr val="tx1"/>
+              </a:fontRef>
+            </p:style>
+            <p:txBody>
+              <a:bodyPr rtlCol="0" anchor="ctr"/>
+              <a:lstStyle/>
+              <a:p>
+                <a:pPr algn="ctr"/>
+                <a:endParaRPr lang="en-IN"/>
+              </a:p>
+            </p:txBody>
+          </p:sp>
+        </p:grpSp>
+      </p:grpSp>
+      <p:cxnSp>
+        <p:nvCxnSpPr>
+          <p:cNvPr id="68" name="Straight Connector 67">
+            <a:extLst>
+              <a:ext uri="{FF2B5EF4-FFF2-40B4-BE49-F238E27FC236}">
+                <a16:creationId xmlns:a16="http://schemas.microsoft.com/office/drawing/2014/main" id="{F4E7BECB-DEF0-3B0C-774C-C1E02D4FD3A2}"/>
+              </a:ext>
+            </a:extLst>
+          </p:cNvPr>
+          <p:cNvCxnSpPr>
+            <a:cxnSpLocks/>
+          </p:cNvCxnSpPr>
+          <p:nvPr/>
+        </p:nvCxnSpPr>
+        <p:spPr>
+          <a:xfrm flipH="1" flipV="1">
+            <a:off x="2178036" y="1965458"/>
+            <a:ext cx="2491293" cy="9331"/>
+          </a:xfrm>
+          <a:prstGeom prst="line">
+            <a:avLst/>
+          </a:prstGeom>
+          <a:ln w="57150">
+            <a:solidFill>
+              <a:schemeClr val="tx1"/>
+            </a:solidFill>
+          </a:ln>
+        </p:spPr>
+        <p:style>
+          <a:lnRef idx="1">
+            <a:schemeClr val="accent1"/>
+          </a:lnRef>
+          <a:fillRef idx="0">
+            <a:schemeClr val="accent1"/>
+          </a:fillRef>
+          <a:effectRef idx="0">
+            <a:schemeClr val="accent1"/>
+          </a:effectRef>
+          <a:fontRef idx="minor">
+            <a:schemeClr val="tx1"/>
+          </a:fontRef>
+        </p:style>
+      </p:cxnSp>
+      <p:grpSp>
+        <p:nvGrpSpPr>
+          <p:cNvPr id="28" name="Group 27">
+            <a:extLst>
+              <a:ext uri="{FF2B5EF4-FFF2-40B4-BE49-F238E27FC236}">
+                <a16:creationId xmlns:a16="http://schemas.microsoft.com/office/drawing/2014/main" id="{A8EED743-280A-79DF-2853-8D857E1D6F03}"/>
+              </a:ext>
+            </a:extLst>
+          </p:cNvPr>
+          <p:cNvGrpSpPr/>
+          <p:nvPr/>
+        </p:nvGrpSpPr>
+        <p:grpSpPr>
+          <a:xfrm>
+            <a:off x="9500806" y="2811235"/>
+            <a:ext cx="439795" cy="2316888"/>
+            <a:chOff x="7918605" y="2686715"/>
+            <a:chExt cx="439795" cy="2316888"/>
+          </a:xfrm>
+        </p:grpSpPr>
+        <p:grpSp>
+          <p:nvGrpSpPr>
+            <p:cNvPr id="29" name="Group 28">
+              <a:extLst>
+                <a:ext uri="{FF2B5EF4-FFF2-40B4-BE49-F238E27FC236}">
+                  <a16:creationId xmlns:a16="http://schemas.microsoft.com/office/drawing/2014/main" id="{2E64F8CC-A1BA-1ABE-3FC5-89CB7862CBA9}"/>
+                </a:ext>
+              </a:extLst>
+            </p:cNvPr>
+            <p:cNvGrpSpPr/>
+            <p:nvPr/>
+          </p:nvGrpSpPr>
+          <p:grpSpPr>
+            <a:xfrm rot="16200000">
+              <a:off x="7615874" y="3638920"/>
+              <a:ext cx="1045257" cy="439795"/>
+              <a:chOff x="2905113" y="3027281"/>
+              <a:chExt cx="1489971" cy="494935"/>
+            </a:xfrm>
+          </p:grpSpPr>
+          <p:cxnSp>
+            <p:nvCxnSpPr>
+              <p:cNvPr id="32" name="Straight Connector 31">
+                <a:extLst>
+                  <a:ext uri="{FF2B5EF4-FFF2-40B4-BE49-F238E27FC236}">
+                    <a16:creationId xmlns:a16="http://schemas.microsoft.com/office/drawing/2014/main" id="{938B76D0-13F0-D8DF-2464-8B5F6C801562}"/>
+                  </a:ext>
+                </a:extLst>
+              </p:cNvPr>
+              <p:cNvCxnSpPr>
+                <a:cxnSpLocks/>
+              </p:cNvCxnSpPr>
+              <p:nvPr/>
+            </p:nvCxnSpPr>
+            <p:spPr>
+              <a:xfrm rot="5400000" flipH="1" flipV="1">
+                <a:off x="2786718" y="3145681"/>
+                <a:ext cx="394474" cy="157683"/>
+              </a:xfrm>
+              <a:prstGeom prst="line">
+                <a:avLst/>
+              </a:prstGeom>
+              <a:ln w="57150">
+                <a:solidFill>
+                  <a:srgbClr val="0070C0"/>
+                </a:solidFill>
+              </a:ln>
+            </p:spPr>
+            <p:style>
+              <a:lnRef idx="1">
+                <a:schemeClr val="accent1"/>
+              </a:lnRef>
+              <a:fillRef idx="0">
+                <a:schemeClr val="accent1"/>
+              </a:fillRef>
+              <a:effectRef idx="0">
+                <a:schemeClr val="accent1"/>
+              </a:effectRef>
+              <a:fontRef idx="minor">
+                <a:schemeClr val="tx1"/>
+              </a:fontRef>
+            </p:style>
+          </p:cxnSp>
+          <p:grpSp>
+            <p:nvGrpSpPr>
+              <p:cNvPr id="33" name="Group 32">
+                <a:extLst>
+                  <a:ext uri="{FF2B5EF4-FFF2-40B4-BE49-F238E27FC236}">
+                    <a16:creationId xmlns:a16="http://schemas.microsoft.com/office/drawing/2014/main" id="{ECEB88F6-6D48-1049-5CDC-A64F13490333}"/>
+                  </a:ext>
+                </a:extLst>
+              </p:cNvPr>
+              <p:cNvGrpSpPr/>
+              <p:nvPr/>
+            </p:nvGrpSpPr>
+            <p:grpSpPr>
+              <a:xfrm>
+                <a:off x="3062796" y="3038382"/>
+                <a:ext cx="301842" cy="483834"/>
+                <a:chOff x="3062796" y="3027285"/>
+                <a:chExt cx="301842" cy="483834"/>
+              </a:xfrm>
+            </p:grpSpPr>
+            <p:cxnSp>
+              <p:nvCxnSpPr>
+                <p:cNvPr id="44" name="Straight Connector 43">
+                  <a:extLst>
+                    <a:ext uri="{FF2B5EF4-FFF2-40B4-BE49-F238E27FC236}">
+                      <a16:creationId xmlns:a16="http://schemas.microsoft.com/office/drawing/2014/main" id="{BED13C27-8C79-C4DE-1782-E7B8883120EA}"/>
+                    </a:ext>
+                  </a:extLst>
+                </p:cNvPr>
+                <p:cNvCxnSpPr>
+                  <a:cxnSpLocks/>
+                </p:cNvCxnSpPr>
+                <p:nvPr/>
+              </p:nvCxnSpPr>
+              <p:spPr>
+                <a:xfrm flipH="1" flipV="1">
+                  <a:off x="3062796" y="3027285"/>
+                  <a:ext cx="150921" cy="483834"/>
+                </a:xfrm>
+                <a:prstGeom prst="line">
+                  <a:avLst/>
+                </a:prstGeom>
+                <a:ln w="57150">
+                  <a:solidFill>
+                    <a:srgbClr val="0070C0"/>
+                  </a:solidFill>
+                </a:ln>
+              </p:spPr>
+              <p:style>
+                <a:lnRef idx="1">
+                  <a:schemeClr val="accent1"/>
+                </a:lnRef>
+                <a:fillRef idx="0">
+                  <a:schemeClr val="accent1"/>
+                </a:fillRef>
+                <a:effectRef idx="0">
+                  <a:schemeClr val="accent1"/>
+                </a:effectRef>
+                <a:fontRef idx="minor">
+                  <a:schemeClr val="tx1"/>
+                </a:fontRef>
+              </p:style>
+            </p:cxnSp>
+            <p:cxnSp>
+              <p:nvCxnSpPr>
+                <p:cNvPr id="45" name="Straight Connector 44">
+                  <a:extLst>
+                    <a:ext uri="{FF2B5EF4-FFF2-40B4-BE49-F238E27FC236}">
+                      <a16:creationId xmlns:a16="http://schemas.microsoft.com/office/drawing/2014/main" id="{61B81033-6398-A4FA-A290-2B1E8406FA8C}"/>
+                    </a:ext>
+                  </a:extLst>
+                </p:cNvPr>
+                <p:cNvCxnSpPr>
+                  <a:cxnSpLocks/>
+                </p:cNvCxnSpPr>
+                <p:nvPr/>
+              </p:nvCxnSpPr>
+              <p:spPr>
+                <a:xfrm flipV="1">
+                  <a:off x="3213717" y="3027285"/>
+                  <a:ext cx="150921" cy="483834"/>
+                </a:xfrm>
+                <a:prstGeom prst="line">
+                  <a:avLst/>
+                </a:prstGeom>
+                <a:ln w="57150">
+                  <a:solidFill>
+                    <a:srgbClr val="0070C0"/>
+                  </a:solidFill>
+                </a:ln>
+              </p:spPr>
+              <p:style>
+                <a:lnRef idx="1">
+                  <a:schemeClr val="accent1"/>
+                </a:lnRef>
+                <a:fillRef idx="0">
+                  <a:schemeClr val="accent1"/>
+                </a:fillRef>
+                <a:effectRef idx="0">
+                  <a:schemeClr val="accent1"/>
+                </a:effectRef>
+                <a:fontRef idx="minor">
+                  <a:schemeClr val="tx1"/>
+                </a:fontRef>
+              </p:style>
+            </p:cxnSp>
+          </p:grpSp>
+          <p:grpSp>
+            <p:nvGrpSpPr>
+              <p:cNvPr id="34" name="Group 33">
+                <a:extLst>
+                  <a:ext uri="{FF2B5EF4-FFF2-40B4-BE49-F238E27FC236}">
+                    <a16:creationId xmlns:a16="http://schemas.microsoft.com/office/drawing/2014/main" id="{CCDC7D04-B189-27E5-C95C-3E61F7B23589}"/>
+                  </a:ext>
+                </a:extLst>
+              </p:cNvPr>
+              <p:cNvGrpSpPr/>
+              <p:nvPr/>
+            </p:nvGrpSpPr>
+            <p:grpSpPr>
+              <a:xfrm>
+                <a:off x="3366118" y="3027281"/>
+                <a:ext cx="301842" cy="483838"/>
+                <a:chOff x="3062796" y="3027281"/>
+                <a:chExt cx="301842" cy="483838"/>
+              </a:xfrm>
+            </p:grpSpPr>
+            <p:cxnSp>
+              <p:nvCxnSpPr>
+                <p:cNvPr id="42" name="Straight Connector 41">
+                  <a:extLst>
+                    <a:ext uri="{FF2B5EF4-FFF2-40B4-BE49-F238E27FC236}">
+                      <a16:creationId xmlns:a16="http://schemas.microsoft.com/office/drawing/2014/main" id="{1DB2858D-7166-682F-A64B-C5F86CEA8060}"/>
+                    </a:ext>
+                  </a:extLst>
+                </p:cNvPr>
+                <p:cNvCxnSpPr>
+                  <a:cxnSpLocks/>
+                </p:cNvCxnSpPr>
+                <p:nvPr/>
+              </p:nvCxnSpPr>
+              <p:spPr>
+                <a:xfrm flipH="1" flipV="1">
+                  <a:off x="3062796" y="3027281"/>
+                  <a:ext cx="150922" cy="483834"/>
+                </a:xfrm>
+                <a:prstGeom prst="line">
+                  <a:avLst/>
+                </a:prstGeom>
+                <a:ln w="57150">
+                  <a:solidFill>
+                    <a:srgbClr val="0070C0"/>
+                  </a:solidFill>
+                </a:ln>
+              </p:spPr>
+              <p:style>
+                <a:lnRef idx="1">
+                  <a:schemeClr val="accent1"/>
+                </a:lnRef>
+                <a:fillRef idx="0">
+                  <a:schemeClr val="accent1"/>
+                </a:fillRef>
+                <a:effectRef idx="0">
+                  <a:schemeClr val="accent1"/>
+                </a:effectRef>
+                <a:fontRef idx="minor">
+                  <a:schemeClr val="tx1"/>
+                </a:fontRef>
+              </p:style>
+            </p:cxnSp>
+            <p:cxnSp>
+              <p:nvCxnSpPr>
+                <p:cNvPr id="43" name="Straight Connector 42">
+                  <a:extLst>
+                    <a:ext uri="{FF2B5EF4-FFF2-40B4-BE49-F238E27FC236}">
+                      <a16:creationId xmlns:a16="http://schemas.microsoft.com/office/drawing/2014/main" id="{31266ACE-9972-CBF2-D4E7-2E0BC7E723AD}"/>
+                    </a:ext>
+                  </a:extLst>
+                </p:cNvPr>
+                <p:cNvCxnSpPr>
+                  <a:cxnSpLocks/>
+                </p:cNvCxnSpPr>
+                <p:nvPr/>
+              </p:nvCxnSpPr>
+              <p:spPr>
+                <a:xfrm flipV="1">
+                  <a:off x="3213717" y="3027285"/>
+                  <a:ext cx="150921" cy="483834"/>
+                </a:xfrm>
+                <a:prstGeom prst="line">
+                  <a:avLst/>
+                </a:prstGeom>
+                <a:ln w="57150">
+                  <a:solidFill>
+                    <a:srgbClr val="0070C0"/>
+                  </a:solidFill>
+                </a:ln>
+              </p:spPr>
+              <p:style>
+                <a:lnRef idx="1">
+                  <a:schemeClr val="accent1"/>
+                </a:lnRef>
+                <a:fillRef idx="0">
+                  <a:schemeClr val="accent1"/>
+                </a:fillRef>
+                <a:effectRef idx="0">
+                  <a:schemeClr val="accent1"/>
+                </a:effectRef>
+                <a:fontRef idx="minor">
+                  <a:schemeClr val="tx1"/>
+                </a:fontRef>
+              </p:style>
+            </p:cxnSp>
+          </p:grpSp>
+          <p:grpSp>
+            <p:nvGrpSpPr>
+              <p:cNvPr id="35" name="Group 34">
+                <a:extLst>
+                  <a:ext uri="{FF2B5EF4-FFF2-40B4-BE49-F238E27FC236}">
+                    <a16:creationId xmlns:a16="http://schemas.microsoft.com/office/drawing/2014/main" id="{40A7E96A-1956-3C21-86BD-35D87C493246}"/>
+                  </a:ext>
+                </a:extLst>
+              </p:cNvPr>
+              <p:cNvGrpSpPr/>
+              <p:nvPr/>
+            </p:nvGrpSpPr>
+            <p:grpSpPr>
+              <a:xfrm>
+                <a:off x="3971282" y="3038381"/>
+                <a:ext cx="301843" cy="483835"/>
+                <a:chOff x="3062796" y="3027284"/>
+                <a:chExt cx="301843" cy="483835"/>
+              </a:xfrm>
+            </p:grpSpPr>
+            <p:cxnSp>
+              <p:nvCxnSpPr>
+                <p:cNvPr id="40" name="Straight Connector 39">
+                  <a:extLst>
+                    <a:ext uri="{FF2B5EF4-FFF2-40B4-BE49-F238E27FC236}">
+                      <a16:creationId xmlns:a16="http://schemas.microsoft.com/office/drawing/2014/main" id="{00B26B98-0CF1-0669-0958-9C2588B0FEA6}"/>
+                    </a:ext>
+                  </a:extLst>
+                </p:cNvPr>
+                <p:cNvCxnSpPr>
+                  <a:cxnSpLocks/>
+                </p:cNvCxnSpPr>
+                <p:nvPr/>
+              </p:nvCxnSpPr>
+              <p:spPr>
+                <a:xfrm flipH="1" flipV="1">
+                  <a:off x="3062796" y="3027285"/>
+                  <a:ext cx="150921" cy="483834"/>
+                </a:xfrm>
+                <a:prstGeom prst="line">
+                  <a:avLst/>
+                </a:prstGeom>
+                <a:ln w="57150">
+                  <a:solidFill>
+                    <a:srgbClr val="0070C0"/>
+                  </a:solidFill>
+                </a:ln>
+              </p:spPr>
+              <p:style>
+                <a:lnRef idx="1">
+                  <a:schemeClr val="accent1"/>
+                </a:lnRef>
+                <a:fillRef idx="0">
+                  <a:schemeClr val="accent1"/>
+                </a:fillRef>
+                <a:effectRef idx="0">
+                  <a:schemeClr val="accent1"/>
+                </a:effectRef>
+                <a:fontRef idx="minor">
+                  <a:schemeClr val="tx1"/>
+                </a:fontRef>
+              </p:style>
+            </p:cxnSp>
+            <p:cxnSp>
+              <p:nvCxnSpPr>
+                <p:cNvPr id="41" name="Straight Connector 40">
+                  <a:extLst>
+                    <a:ext uri="{FF2B5EF4-FFF2-40B4-BE49-F238E27FC236}">
+                      <a16:creationId xmlns:a16="http://schemas.microsoft.com/office/drawing/2014/main" id="{65EB126C-9789-06BD-D73F-4B0999D09FD7}"/>
+                    </a:ext>
+                  </a:extLst>
+                </p:cNvPr>
+                <p:cNvCxnSpPr>
+                  <a:cxnSpLocks/>
+                </p:cNvCxnSpPr>
+                <p:nvPr/>
+              </p:nvCxnSpPr>
+              <p:spPr>
+                <a:xfrm flipV="1">
+                  <a:off x="3213719" y="3027284"/>
+                  <a:ext cx="150920" cy="483834"/>
+                </a:xfrm>
+                <a:prstGeom prst="line">
+                  <a:avLst/>
+                </a:prstGeom>
+                <a:ln w="57150">
+                  <a:solidFill>
+                    <a:srgbClr val="0070C0"/>
+                  </a:solidFill>
+                </a:ln>
+              </p:spPr>
+              <p:style>
+                <a:lnRef idx="1">
+                  <a:schemeClr val="accent1"/>
+                </a:lnRef>
+                <a:fillRef idx="0">
+                  <a:schemeClr val="accent1"/>
+                </a:fillRef>
+                <a:effectRef idx="0">
+                  <a:schemeClr val="accent1"/>
+                </a:effectRef>
+                <a:fontRef idx="minor">
+                  <a:schemeClr val="tx1"/>
+                </a:fontRef>
+              </p:style>
+            </p:cxnSp>
+          </p:grpSp>
+          <p:grpSp>
+            <p:nvGrpSpPr>
+              <p:cNvPr id="36" name="Group 35">
+                <a:extLst>
+                  <a:ext uri="{FF2B5EF4-FFF2-40B4-BE49-F238E27FC236}">
+                    <a16:creationId xmlns:a16="http://schemas.microsoft.com/office/drawing/2014/main" id="{C17B8F68-FA00-EECF-A7E0-26799C4F9681}"/>
+                  </a:ext>
+                </a:extLst>
+              </p:cNvPr>
+              <p:cNvGrpSpPr/>
+              <p:nvPr/>
+            </p:nvGrpSpPr>
+            <p:grpSpPr>
+              <a:xfrm>
+                <a:off x="3667960" y="3038382"/>
+                <a:ext cx="301842" cy="483834"/>
+                <a:chOff x="3062796" y="3027285"/>
+                <a:chExt cx="301842" cy="483834"/>
+              </a:xfrm>
+            </p:grpSpPr>
+            <p:cxnSp>
+              <p:nvCxnSpPr>
+                <p:cNvPr id="38" name="Straight Connector 37">
+                  <a:extLst>
+                    <a:ext uri="{FF2B5EF4-FFF2-40B4-BE49-F238E27FC236}">
+                      <a16:creationId xmlns:a16="http://schemas.microsoft.com/office/drawing/2014/main" id="{E89FA7F8-B115-5F57-BC45-C4A312DDA692}"/>
+                    </a:ext>
+                  </a:extLst>
+                </p:cNvPr>
+                <p:cNvCxnSpPr>
+                  <a:cxnSpLocks/>
+                </p:cNvCxnSpPr>
+                <p:nvPr/>
+              </p:nvCxnSpPr>
+              <p:spPr>
+                <a:xfrm flipH="1" flipV="1">
+                  <a:off x="3062796" y="3027285"/>
+                  <a:ext cx="150921" cy="483834"/>
+                </a:xfrm>
+                <a:prstGeom prst="line">
+                  <a:avLst/>
+                </a:prstGeom>
+                <a:ln w="57150">
+                  <a:solidFill>
+                    <a:srgbClr val="0070C0"/>
+                  </a:solidFill>
+                </a:ln>
+              </p:spPr>
+              <p:style>
+                <a:lnRef idx="1">
+                  <a:schemeClr val="accent1"/>
+                </a:lnRef>
+                <a:fillRef idx="0">
+                  <a:schemeClr val="accent1"/>
+                </a:fillRef>
+                <a:effectRef idx="0">
+                  <a:schemeClr val="accent1"/>
+                </a:effectRef>
+                <a:fontRef idx="minor">
+                  <a:schemeClr val="tx1"/>
+                </a:fontRef>
+              </p:style>
+            </p:cxnSp>
+            <p:cxnSp>
+              <p:nvCxnSpPr>
+                <p:cNvPr id="39" name="Straight Connector 38">
+                  <a:extLst>
+                    <a:ext uri="{FF2B5EF4-FFF2-40B4-BE49-F238E27FC236}">
+                      <a16:creationId xmlns:a16="http://schemas.microsoft.com/office/drawing/2014/main" id="{AB07838D-0EF9-8235-6E87-537931F9C67F}"/>
+                    </a:ext>
+                  </a:extLst>
+                </p:cNvPr>
+                <p:cNvCxnSpPr>
+                  <a:cxnSpLocks/>
+                </p:cNvCxnSpPr>
+                <p:nvPr/>
+              </p:nvCxnSpPr>
+              <p:spPr>
+                <a:xfrm flipV="1">
+                  <a:off x="3213717" y="3027285"/>
+                  <a:ext cx="150921" cy="483834"/>
+                </a:xfrm>
+                <a:prstGeom prst="line">
+                  <a:avLst/>
+                </a:prstGeom>
+                <a:ln w="57150">
+                  <a:solidFill>
+                    <a:srgbClr val="0070C0"/>
+                  </a:solidFill>
+                </a:ln>
+              </p:spPr>
+              <p:style>
+                <a:lnRef idx="1">
+                  <a:schemeClr val="accent1"/>
+                </a:lnRef>
+                <a:fillRef idx="0">
+                  <a:schemeClr val="accent1"/>
+                </a:fillRef>
+                <a:effectRef idx="0">
+                  <a:schemeClr val="accent1"/>
+                </a:effectRef>
+                <a:fontRef idx="minor">
+                  <a:schemeClr val="tx1"/>
+                </a:fontRef>
+              </p:style>
+            </p:cxnSp>
+          </p:grpSp>
+          <p:cxnSp>
+            <p:nvCxnSpPr>
+              <p:cNvPr id="37" name="Straight Connector 36">
+                <a:extLst>
+                  <a:ext uri="{FF2B5EF4-FFF2-40B4-BE49-F238E27FC236}">
+                    <a16:creationId xmlns:a16="http://schemas.microsoft.com/office/drawing/2014/main" id="{226F0D78-5167-1D52-1F9B-AB3F0B1CAC16}"/>
+                  </a:ext>
+                </a:extLst>
+              </p:cNvPr>
+              <p:cNvCxnSpPr>
+                <a:cxnSpLocks/>
+              </p:cNvCxnSpPr>
+              <p:nvPr/>
+            </p:nvCxnSpPr>
+            <p:spPr>
+              <a:xfrm rot="5400000" flipH="1">
+                <a:off x="4136867" y="3163543"/>
+                <a:ext cx="394475" cy="121959"/>
+              </a:xfrm>
+              <a:prstGeom prst="line">
+                <a:avLst/>
+              </a:prstGeom>
+              <a:ln w="57150">
+                <a:solidFill>
+                  <a:srgbClr val="0070C0"/>
+                </a:solidFill>
+              </a:ln>
+            </p:spPr>
+            <p:style>
+              <a:lnRef idx="1">
+                <a:schemeClr val="accent1"/>
+              </a:lnRef>
+              <a:fillRef idx="0">
+                <a:schemeClr val="accent1"/>
+              </a:fillRef>
+              <a:effectRef idx="0">
+                <a:schemeClr val="accent1"/>
+              </a:effectRef>
+              <a:fontRef idx="minor">
+                <a:schemeClr val="tx1"/>
+              </a:fontRef>
+            </p:style>
+          </p:cxnSp>
+        </p:grpSp>
+        <p:cxnSp>
+          <p:nvCxnSpPr>
+            <p:cNvPr id="30" name="Straight Connector 29">
+              <a:extLst>
+                <a:ext uri="{FF2B5EF4-FFF2-40B4-BE49-F238E27FC236}">
+                  <a16:creationId xmlns:a16="http://schemas.microsoft.com/office/drawing/2014/main" id="{B3288600-5885-82D5-CA65-BA56FF0F90C3}"/>
+                </a:ext>
+              </a:extLst>
+            </p:cNvPr>
+            <p:cNvCxnSpPr>
+              <a:cxnSpLocks/>
+            </p:cNvCxnSpPr>
+            <p:nvPr/>
+          </p:nvCxnSpPr>
+          <p:spPr>
+            <a:xfrm>
+              <a:off x="8258947" y="2686715"/>
+              <a:ext cx="0" cy="649474"/>
+            </a:xfrm>
+            <a:prstGeom prst="line">
+              <a:avLst/>
+            </a:prstGeom>
+            <a:ln w="57150">
+              <a:solidFill>
+                <a:srgbClr val="0070C0"/>
+              </a:solidFill>
+            </a:ln>
+          </p:spPr>
+          <p:style>
+            <a:lnRef idx="1">
+              <a:schemeClr val="accent1"/>
+            </a:lnRef>
+            <a:fillRef idx="0">
+              <a:schemeClr val="accent1"/>
+            </a:fillRef>
+            <a:effectRef idx="0">
+              <a:schemeClr val="accent1"/>
+            </a:effectRef>
+            <a:fontRef idx="minor">
+              <a:schemeClr val="tx1"/>
+            </a:fontRef>
+          </p:style>
+        </p:cxnSp>
+        <p:cxnSp>
+          <p:nvCxnSpPr>
+            <p:cNvPr id="73" name="Straight Connector 72">
+              <a:extLst>
+                <a:ext uri="{FF2B5EF4-FFF2-40B4-BE49-F238E27FC236}">
+                  <a16:creationId xmlns:a16="http://schemas.microsoft.com/office/drawing/2014/main" id="{03FE481C-A25E-58DC-A774-CFD5EA234D98}"/>
+                </a:ext>
+              </a:extLst>
+            </p:cNvPr>
+            <p:cNvCxnSpPr>
+              <a:cxnSpLocks/>
+            </p:cNvCxnSpPr>
+            <p:nvPr/>
+          </p:nvCxnSpPr>
+          <p:spPr>
+            <a:xfrm>
+              <a:off x="8258947" y="4354129"/>
+              <a:ext cx="0" cy="649474"/>
+            </a:xfrm>
+            <a:prstGeom prst="line">
+              <a:avLst/>
+            </a:prstGeom>
+            <a:ln w="57150">
+              <a:solidFill>
+                <a:srgbClr val="0070C0"/>
+              </a:solidFill>
+            </a:ln>
+          </p:spPr>
+          <p:style>
+            <a:lnRef idx="1">
+              <a:schemeClr val="accent1"/>
+            </a:lnRef>
+            <a:fillRef idx="0">
+              <a:schemeClr val="accent1"/>
+            </a:fillRef>
+            <a:effectRef idx="0">
+              <a:schemeClr val="accent1"/>
+            </a:effectRef>
+            <a:fontRef idx="minor">
+              <a:schemeClr val="tx1"/>
+            </a:fontRef>
+          </p:style>
+        </p:cxnSp>
+      </p:grpSp>
+      <p:cxnSp>
+        <p:nvCxnSpPr>
+          <p:cNvPr id="70" name="Straight Connector 69">
+            <a:extLst>
+              <a:ext uri="{FF2B5EF4-FFF2-40B4-BE49-F238E27FC236}">
+                <a16:creationId xmlns:a16="http://schemas.microsoft.com/office/drawing/2014/main" id="{A4409F92-6E0E-B417-3081-7FF383EADB83}"/>
+              </a:ext>
+            </a:extLst>
+          </p:cNvPr>
+          <p:cNvCxnSpPr>
+            <a:cxnSpLocks/>
+          </p:cNvCxnSpPr>
+          <p:nvPr/>
+        </p:nvCxnSpPr>
+        <p:spPr>
+          <a:xfrm>
+            <a:off x="9841965" y="1974789"/>
+            <a:ext cx="0" cy="1052827"/>
+          </a:xfrm>
+          <a:prstGeom prst="line">
+            <a:avLst/>
+          </a:prstGeom>
+          <a:ln w="57150">
+            <a:solidFill>
+              <a:schemeClr val="tx1"/>
+            </a:solidFill>
+          </a:ln>
+        </p:spPr>
+        <p:style>
+          <a:lnRef idx="1">
+            <a:schemeClr val="accent1"/>
+          </a:lnRef>
+          <a:fillRef idx="0">
+            <a:schemeClr val="accent1"/>
+          </a:fillRef>
+          <a:effectRef idx="0">
+            <a:schemeClr val="accent1"/>
+          </a:effectRef>
+          <a:fontRef idx="minor">
+            <a:schemeClr val="tx1"/>
+          </a:fontRef>
+        </p:style>
+      </p:cxnSp>
+      <p:cxnSp>
+        <p:nvCxnSpPr>
+          <p:cNvPr id="74" name="Straight Connector 73">
+            <a:extLst>
+              <a:ext uri="{FF2B5EF4-FFF2-40B4-BE49-F238E27FC236}">
+                <a16:creationId xmlns:a16="http://schemas.microsoft.com/office/drawing/2014/main" id="{39DEF17A-956A-A2B4-5934-9B679B76C390}"/>
+              </a:ext>
+            </a:extLst>
+          </p:cNvPr>
+          <p:cNvCxnSpPr>
+            <a:cxnSpLocks/>
+          </p:cNvCxnSpPr>
+          <p:nvPr/>
+        </p:nvCxnSpPr>
+        <p:spPr>
+          <a:xfrm>
+            <a:off x="9841148" y="4821296"/>
+            <a:ext cx="0" cy="784189"/>
+          </a:xfrm>
+          <a:prstGeom prst="line">
+            <a:avLst/>
+          </a:prstGeom>
+          <a:ln w="57150">
+            <a:solidFill>
+              <a:schemeClr val="tx1"/>
+            </a:solidFill>
+          </a:ln>
+        </p:spPr>
+        <p:style>
+          <a:lnRef idx="1">
+            <a:schemeClr val="accent1"/>
+          </a:lnRef>
+          <a:fillRef idx="0">
+            <a:schemeClr val="accent1"/>
+          </a:fillRef>
+          <a:effectRef idx="0">
+            <a:schemeClr val="accent1"/>
+          </a:effectRef>
+          <a:fontRef idx="minor">
+            <a:schemeClr val="tx1"/>
+          </a:fontRef>
+        </p:style>
+      </p:cxnSp>
+      <p:cxnSp>
+        <p:nvCxnSpPr>
+          <p:cNvPr id="82" name="Straight Connector 81">
+            <a:extLst>
+              <a:ext uri="{FF2B5EF4-FFF2-40B4-BE49-F238E27FC236}">
+                <a16:creationId xmlns:a16="http://schemas.microsoft.com/office/drawing/2014/main" id="{7C9877FC-692D-385D-8B8F-0D73C0399C52}"/>
+              </a:ext>
+            </a:extLst>
+          </p:cNvPr>
+          <p:cNvCxnSpPr>
+            <a:cxnSpLocks/>
+          </p:cNvCxnSpPr>
+          <p:nvPr/>
+        </p:nvCxnSpPr>
+        <p:spPr>
+          <a:xfrm flipH="1" flipV="1">
+            <a:off x="2178036" y="5605485"/>
+            <a:ext cx="7673300" cy="16641"/>
+          </a:xfrm>
+          <a:prstGeom prst="line">
+            <a:avLst/>
+          </a:prstGeom>
+          <a:ln w="57150">
+            <a:solidFill>
+              <a:schemeClr val="tx1"/>
+            </a:solidFill>
+          </a:ln>
+        </p:spPr>
+        <p:style>
+          <a:lnRef idx="1">
+            <a:schemeClr val="accent1"/>
+          </a:lnRef>
+          <a:fillRef idx="0">
+            <a:schemeClr val="accent1"/>
+          </a:fillRef>
+          <a:effectRef idx="0">
+            <a:schemeClr val="accent1"/>
+          </a:effectRef>
+          <a:fontRef idx="minor">
+            <a:schemeClr val="tx1"/>
+          </a:fontRef>
+        </p:style>
+      </p:cxnSp>
+      <p:sp>
+        <p:nvSpPr>
+          <p:cNvPr id="87" name="TextBox 86">
+            <a:extLst>
+              <a:ext uri="{FF2B5EF4-FFF2-40B4-BE49-F238E27FC236}">
+                <a16:creationId xmlns:a16="http://schemas.microsoft.com/office/drawing/2014/main" id="{6E9C5DDA-8560-F659-E79A-E6E2B3040CEF}"/>
+              </a:ext>
+            </a:extLst>
+          </p:cNvPr>
+          <p:cNvSpPr txBox="1"/>
+          <p:nvPr/>
+        </p:nvSpPr>
+        <p:spPr>
+          <a:xfrm>
+            <a:off x="337708" y="3271676"/>
+            <a:ext cx="1411963" cy="830997"/>
+          </a:xfrm>
+          <a:prstGeom prst="rect">
+            <a:avLst/>
+          </a:prstGeom>
+          <a:noFill/>
+        </p:spPr>
+        <p:txBody>
+          <a:bodyPr wrap="square" rtlCol="0">
+            <a:spAutoFit/>
+          </a:bodyPr>
+          <a:lstStyle/>
+          <a:p>
+            <a:pPr algn="ctr"/>
+            <a:r>
+              <a:rPr lang="en-IN" sz="2400" b="1" dirty="0">
+                <a:solidFill>
+                  <a:srgbClr val="FF0000"/>
+                </a:solidFill>
+                <a:latin typeface="Times New Roman" panose="02020603050405020304" pitchFamily="18" charset="0"/>
+                <a:cs typeface="Times New Roman" panose="02020603050405020304" pitchFamily="18" charset="0"/>
+              </a:rPr>
+              <a:t>1</a:t>
+            </a:r>
+            <a:r>
+              <a:rPr lang="el-GR" sz="2400" b="1" dirty="0">
+                <a:solidFill>
+                  <a:srgbClr val="FF0000"/>
+                </a:solidFill>
+                <a:latin typeface="Times New Roman" panose="02020603050405020304" pitchFamily="18" charset="0"/>
+                <a:cs typeface="Times New Roman" panose="02020603050405020304" pitchFamily="18" charset="0"/>
+              </a:rPr>
+              <a:t>φ</a:t>
+            </a:r>
+            <a:r>
+              <a:rPr lang="en-US" sz="2400" b="1" dirty="0">
+                <a:solidFill>
+                  <a:srgbClr val="FF0000"/>
+                </a:solidFill>
+                <a:latin typeface="Times New Roman" panose="02020603050405020304" pitchFamily="18" charset="0"/>
+                <a:cs typeface="Times New Roman" panose="02020603050405020304" pitchFamily="18" charset="0"/>
+              </a:rPr>
+              <a:t> AC Supply</a:t>
+            </a:r>
+            <a:endParaRPr lang="en-IN" sz="2400" b="1" dirty="0">
+              <a:solidFill>
+                <a:srgbClr val="FF0000"/>
+              </a:solidFill>
+              <a:latin typeface="Times New Roman" panose="02020603050405020304" pitchFamily="18" charset="0"/>
+              <a:cs typeface="Times New Roman" panose="02020603050405020304" pitchFamily="18" charset="0"/>
+            </a:endParaRPr>
+          </a:p>
+        </p:txBody>
+      </p:sp>
+      <p:cxnSp>
+        <p:nvCxnSpPr>
+          <p:cNvPr id="97" name="Straight Arrow Connector 96">
+            <a:extLst>
+              <a:ext uri="{FF2B5EF4-FFF2-40B4-BE49-F238E27FC236}">
+                <a16:creationId xmlns:a16="http://schemas.microsoft.com/office/drawing/2014/main" id="{82B22EAD-F63E-E9C6-57CD-23CCE4992076}"/>
+              </a:ext>
+            </a:extLst>
+          </p:cNvPr>
+          <p:cNvCxnSpPr/>
+          <p:nvPr/>
+        </p:nvCxnSpPr>
+        <p:spPr>
+          <a:xfrm>
+            <a:off x="10562608" y="1965458"/>
+            <a:ext cx="0" cy="3620453"/>
+          </a:xfrm>
+          <a:prstGeom prst="straightConnector1">
+            <a:avLst/>
+          </a:prstGeom>
+          <a:ln w="38100" cap="flat" cmpd="sng" algn="ctr">
+            <a:solidFill>
+              <a:srgbClr val="FF0000"/>
+            </a:solidFill>
+            <a:prstDash val="solid"/>
+            <a:round/>
+            <a:headEnd type="arrow" w="med" len="med"/>
+            <a:tailEnd type="arrow" w="med" len="med"/>
+          </a:ln>
+        </p:spPr>
+        <p:style>
+          <a:lnRef idx="0">
+            <a:scrgbClr r="0" g="0" b="0"/>
+          </a:lnRef>
+          <a:fillRef idx="0">
+            <a:scrgbClr r="0" g="0" b="0"/>
+          </a:fillRef>
+          <a:effectRef idx="0">
+            <a:scrgbClr r="0" g="0" b="0"/>
+          </a:effectRef>
+          <a:fontRef idx="minor">
+            <a:schemeClr val="tx1"/>
+          </a:fontRef>
+        </p:style>
+      </p:cxnSp>
+      <p:sp>
+        <p:nvSpPr>
+          <p:cNvPr id="98" name="TextBox 97">
+            <a:extLst>
+              <a:ext uri="{FF2B5EF4-FFF2-40B4-BE49-F238E27FC236}">
+                <a16:creationId xmlns:a16="http://schemas.microsoft.com/office/drawing/2014/main" id="{FB15EE5C-833D-D2AB-B00C-C0BE821E645E}"/>
+              </a:ext>
+            </a:extLst>
+          </p:cNvPr>
+          <p:cNvSpPr txBox="1"/>
+          <p:nvPr/>
+        </p:nvSpPr>
+        <p:spPr>
+          <a:xfrm>
+            <a:off x="10231096" y="3546267"/>
+            <a:ext cx="701958" cy="400110"/>
+          </a:xfrm>
+          <a:prstGeom prst="rect">
+            <a:avLst/>
+          </a:prstGeom>
+          <a:solidFill>
+            <a:schemeClr val="bg1"/>
+          </a:solidFill>
+        </p:spPr>
+        <p:txBody>
+          <a:bodyPr wrap="square" rtlCol="0">
+            <a:spAutoFit/>
+          </a:bodyPr>
+          <a:lstStyle/>
+          <a:p>
+            <a:pPr algn="ctr"/>
+            <a:r>
+              <a:rPr lang="en-US" sz="2000" b="1" dirty="0">
+                <a:latin typeface="Times New Roman" panose="02020603050405020304" pitchFamily="18" charset="0"/>
+                <a:cs typeface="Times New Roman" panose="02020603050405020304" pitchFamily="18" charset="0"/>
+              </a:rPr>
+              <a:t>V</a:t>
+            </a:r>
+            <a:r>
+              <a:rPr lang="en-US" sz="2000" b="1" baseline="-25000" dirty="0">
+                <a:latin typeface="Times New Roman" panose="02020603050405020304" pitchFamily="18" charset="0"/>
+                <a:cs typeface="Times New Roman" panose="02020603050405020304" pitchFamily="18" charset="0"/>
+              </a:rPr>
+              <a:t>O</a:t>
+            </a:r>
+            <a:endParaRPr lang="en-IN" sz="2000" dirty="0"/>
+          </a:p>
+        </p:txBody>
+      </p:sp>
+      <p:cxnSp>
+        <p:nvCxnSpPr>
+          <p:cNvPr id="101" name="Straight Arrow Connector 100">
+            <a:extLst>
+              <a:ext uri="{FF2B5EF4-FFF2-40B4-BE49-F238E27FC236}">
+                <a16:creationId xmlns:a16="http://schemas.microsoft.com/office/drawing/2014/main" id="{FFBFC383-690D-A1EC-B379-A2C77A295A4A}"/>
+              </a:ext>
+            </a:extLst>
+          </p:cNvPr>
+          <p:cNvCxnSpPr/>
+          <p:nvPr/>
+        </p:nvCxnSpPr>
+        <p:spPr>
+          <a:xfrm>
+            <a:off x="3037423" y="2029946"/>
+            <a:ext cx="0" cy="3537023"/>
+          </a:xfrm>
+          <a:prstGeom prst="straightConnector1">
+            <a:avLst/>
+          </a:prstGeom>
+          <a:ln w="38100" cap="flat" cmpd="sng" algn="ctr">
+            <a:solidFill>
+              <a:srgbClr val="FF0000"/>
+            </a:solidFill>
+            <a:prstDash val="solid"/>
+            <a:round/>
+            <a:headEnd type="arrow" w="med" len="med"/>
+            <a:tailEnd type="arrow" w="med" len="med"/>
+          </a:ln>
+        </p:spPr>
+        <p:style>
+          <a:lnRef idx="0">
+            <a:scrgbClr r="0" g="0" b="0"/>
+          </a:lnRef>
+          <a:fillRef idx="0">
+            <a:scrgbClr r="0" g="0" b="0"/>
+          </a:fillRef>
+          <a:effectRef idx="0">
+            <a:scrgbClr r="0" g="0" b="0"/>
+          </a:effectRef>
+          <a:fontRef idx="minor">
+            <a:schemeClr val="tx1"/>
+          </a:fontRef>
+        </p:style>
+      </p:cxnSp>
+      <p:sp>
+        <p:nvSpPr>
+          <p:cNvPr id="102" name="TextBox 101">
+            <a:extLst>
+              <a:ext uri="{FF2B5EF4-FFF2-40B4-BE49-F238E27FC236}">
+                <a16:creationId xmlns:a16="http://schemas.microsoft.com/office/drawing/2014/main" id="{2F5B2B96-F8A8-3AF8-88CC-6D2CABD3BB5E}"/>
+              </a:ext>
+            </a:extLst>
+          </p:cNvPr>
+          <p:cNvSpPr txBox="1"/>
+          <p:nvPr/>
+        </p:nvSpPr>
+        <p:spPr>
+          <a:xfrm>
+            <a:off x="2772964" y="3384514"/>
+            <a:ext cx="602553" cy="400110"/>
+          </a:xfrm>
+          <a:prstGeom prst="rect">
+            <a:avLst/>
+          </a:prstGeom>
+          <a:solidFill>
+            <a:schemeClr val="bg1"/>
+          </a:solidFill>
+        </p:spPr>
+        <p:txBody>
+          <a:bodyPr wrap="square" rtlCol="0">
+            <a:spAutoFit/>
+          </a:bodyPr>
+          <a:lstStyle/>
+          <a:p>
+            <a:pPr algn="ctr"/>
+            <a:r>
+              <a:rPr lang="en-US" sz="2000" b="1" dirty="0">
+                <a:latin typeface="Times New Roman" panose="02020603050405020304" pitchFamily="18" charset="0"/>
+                <a:cs typeface="Times New Roman" panose="02020603050405020304" pitchFamily="18" charset="0"/>
+              </a:rPr>
+              <a:t>V</a:t>
+            </a:r>
+            <a:r>
+              <a:rPr lang="en-US" sz="2000" b="1" baseline="-25000" dirty="0">
+                <a:latin typeface="Times New Roman" panose="02020603050405020304" pitchFamily="18" charset="0"/>
+                <a:cs typeface="Times New Roman" panose="02020603050405020304" pitchFamily="18" charset="0"/>
+              </a:rPr>
+              <a:t>S</a:t>
+            </a:r>
+            <a:endParaRPr lang="en-IN" sz="2000" dirty="0"/>
+          </a:p>
+        </p:txBody>
+      </p:sp>
+      <p:sp>
+        <p:nvSpPr>
+          <p:cNvPr id="103" name="TextBox 102">
+            <a:extLst>
+              <a:ext uri="{FF2B5EF4-FFF2-40B4-BE49-F238E27FC236}">
+                <a16:creationId xmlns:a16="http://schemas.microsoft.com/office/drawing/2014/main" id="{B961E458-6260-BCDD-36CC-F3D5ACBD071D}"/>
+              </a:ext>
+            </a:extLst>
+          </p:cNvPr>
+          <p:cNvSpPr txBox="1"/>
+          <p:nvPr/>
+        </p:nvSpPr>
+        <p:spPr>
+          <a:xfrm>
+            <a:off x="8978103" y="3603321"/>
+            <a:ext cx="350527" cy="523220"/>
+          </a:xfrm>
+          <a:prstGeom prst="rect">
+            <a:avLst/>
+          </a:prstGeom>
+          <a:noFill/>
+        </p:spPr>
+        <p:txBody>
+          <a:bodyPr wrap="square" rtlCol="0">
+            <a:spAutoFit/>
+          </a:bodyPr>
+          <a:lstStyle/>
+          <a:p>
+            <a:r>
+              <a:rPr lang="en-US" sz="2800" b="1" dirty="0">
+                <a:latin typeface="Times New Roman" panose="02020603050405020304" pitchFamily="18" charset="0"/>
+                <a:cs typeface="Times New Roman" panose="02020603050405020304" pitchFamily="18" charset="0"/>
+              </a:rPr>
+              <a:t>R</a:t>
+            </a:r>
+            <a:endParaRPr lang="en-IN" sz="2800" b="1" dirty="0">
+              <a:latin typeface="Times New Roman" panose="02020603050405020304" pitchFamily="18" charset="0"/>
+              <a:cs typeface="Times New Roman" panose="02020603050405020304" pitchFamily="18" charset="0"/>
+            </a:endParaRPr>
+          </a:p>
+        </p:txBody>
+      </p:sp>
+      <p:sp>
+        <p:nvSpPr>
+          <p:cNvPr id="3" name="Rectangle 2">
+            <a:extLst>
+              <a:ext uri="{FF2B5EF4-FFF2-40B4-BE49-F238E27FC236}">
+                <a16:creationId xmlns:a16="http://schemas.microsoft.com/office/drawing/2014/main" id="{52529481-EB67-B8D2-DD71-CB848D9E9AD7}"/>
+              </a:ext>
+            </a:extLst>
+          </p:cNvPr>
+          <p:cNvSpPr/>
+          <p:nvPr/>
+        </p:nvSpPr>
+        <p:spPr>
+          <a:xfrm rot="18889903">
+            <a:off x="5115796" y="885720"/>
+            <a:ext cx="2164692" cy="2159477"/>
+          </a:xfrm>
+          <a:prstGeom prst="rect">
+            <a:avLst/>
+          </a:prstGeom>
+          <a:noFill/>
+          <a:ln w="57150">
+            <a:solidFill>
+              <a:schemeClr val="tx1"/>
+            </a:solidFill>
+          </a:ln>
+        </p:spPr>
+        <p:style>
+          <a:lnRef idx="2">
+            <a:schemeClr val="accent1">
+              <a:shade val="50000"/>
+            </a:schemeClr>
+          </a:lnRef>
+          <a:fillRef idx="1">
+            <a:schemeClr val="accent1"/>
+          </a:fillRef>
+          <a:effectRef idx="0">
+            <a:schemeClr val="accent1"/>
+          </a:effectRef>
+          <a:fontRef idx="minor">
+            <a:schemeClr val="lt1"/>
+          </a:fontRef>
+        </p:style>
+        <p:txBody>
+          <a:bodyPr rtlCol="0" anchor="ctr"/>
+          <a:lstStyle/>
+          <a:p>
+            <a:pPr algn="ctr"/>
+            <a:endParaRPr lang="en-IN"/>
+          </a:p>
+        </p:txBody>
+      </p:sp>
+      <p:grpSp>
+        <p:nvGrpSpPr>
+          <p:cNvPr id="4" name="Group 3">
+            <a:extLst>
+              <a:ext uri="{FF2B5EF4-FFF2-40B4-BE49-F238E27FC236}">
+                <a16:creationId xmlns:a16="http://schemas.microsoft.com/office/drawing/2014/main" id="{4E5D0422-B44C-B555-C961-4DC3E5D387D9}"/>
+              </a:ext>
+            </a:extLst>
+          </p:cNvPr>
+          <p:cNvGrpSpPr/>
+          <p:nvPr/>
+        </p:nvGrpSpPr>
+        <p:grpSpPr>
+          <a:xfrm rot="16200000">
+            <a:off x="5701793" y="1735426"/>
+            <a:ext cx="1027870" cy="548191"/>
+            <a:chOff x="4576309" y="2069522"/>
+            <a:chExt cx="1027870" cy="548191"/>
+          </a:xfrm>
+        </p:grpSpPr>
+        <p:cxnSp>
+          <p:nvCxnSpPr>
+            <p:cNvPr id="5" name="Straight Connector 4">
+              <a:extLst>
+                <a:ext uri="{FF2B5EF4-FFF2-40B4-BE49-F238E27FC236}">
+                  <a16:creationId xmlns:a16="http://schemas.microsoft.com/office/drawing/2014/main" id="{5CF7D213-5C7D-2C37-6B06-72FC3479B9B5}"/>
+                </a:ext>
+              </a:extLst>
+            </p:cNvPr>
+            <p:cNvCxnSpPr>
+              <a:cxnSpLocks/>
+            </p:cNvCxnSpPr>
+            <p:nvPr/>
+          </p:nvCxnSpPr>
+          <p:spPr>
+            <a:xfrm rot="16200000" flipH="1" flipV="1">
+              <a:off x="5084192" y="1813895"/>
+              <a:ext cx="12104" cy="1027870"/>
+            </a:xfrm>
+            <a:prstGeom prst="line">
+              <a:avLst/>
+            </a:prstGeom>
+            <a:ln w="57150">
+              <a:solidFill>
+                <a:schemeClr val="accent1"/>
+              </a:solidFill>
+            </a:ln>
+          </p:spPr>
+          <p:style>
+            <a:lnRef idx="1">
+              <a:schemeClr val="accent1"/>
+            </a:lnRef>
+            <a:fillRef idx="0">
+              <a:schemeClr val="accent1"/>
+            </a:fillRef>
+            <a:effectRef idx="0">
+              <a:schemeClr val="accent1"/>
+            </a:effectRef>
+            <a:fontRef idx="minor">
+              <a:schemeClr val="tx1"/>
+            </a:fontRef>
+          </p:style>
+        </p:cxnSp>
+        <p:grpSp>
+          <p:nvGrpSpPr>
+            <p:cNvPr id="6" name="Group 5">
+              <a:extLst>
+                <a:ext uri="{FF2B5EF4-FFF2-40B4-BE49-F238E27FC236}">
+                  <a16:creationId xmlns:a16="http://schemas.microsoft.com/office/drawing/2014/main" id="{D7A5998A-145D-85D1-9F8C-3BE4417A0E9D}"/>
+                </a:ext>
+              </a:extLst>
+            </p:cNvPr>
+            <p:cNvGrpSpPr/>
+            <p:nvPr/>
+          </p:nvGrpSpPr>
+          <p:grpSpPr>
+            <a:xfrm rot="16200000" flipH="1">
+              <a:off x="4890372" y="2120561"/>
+              <a:ext cx="512854" cy="410776"/>
+              <a:chOff x="3610041" y="3464345"/>
+              <a:chExt cx="693435" cy="420634"/>
+            </a:xfrm>
+          </p:grpSpPr>
+          <p:sp>
+            <p:nvSpPr>
+              <p:cNvPr id="10" name="Isosceles Triangle 9">
+                <a:extLst>
+                  <a:ext uri="{FF2B5EF4-FFF2-40B4-BE49-F238E27FC236}">
+                    <a16:creationId xmlns:a16="http://schemas.microsoft.com/office/drawing/2014/main" id="{526BC6F3-A969-8FD9-F1CC-DD8D76043B41}"/>
+                  </a:ext>
+                </a:extLst>
+              </p:cNvPr>
+              <p:cNvSpPr/>
+              <p:nvPr/>
+            </p:nvSpPr>
+            <p:spPr>
+              <a:xfrm>
+                <a:off x="3610045" y="3464345"/>
+                <a:ext cx="653139" cy="420634"/>
+              </a:xfrm>
+              <a:prstGeom prst="triangle">
+                <a:avLst/>
+              </a:prstGeom>
+              <a:ln w="57150">
+                <a:solidFill>
+                  <a:schemeClr val="accent1"/>
+                </a:solidFill>
+              </a:ln>
+            </p:spPr>
+            <p:style>
+              <a:lnRef idx="2">
+                <a:schemeClr val="accent1">
+                  <a:shade val="50000"/>
+                </a:schemeClr>
+              </a:lnRef>
+              <a:fillRef idx="1">
+                <a:schemeClr val="accent1"/>
+              </a:fillRef>
+              <a:effectRef idx="0">
+                <a:schemeClr val="accent1"/>
+              </a:effectRef>
+              <a:fontRef idx="minor">
+                <a:schemeClr val="lt1"/>
+              </a:fontRef>
+            </p:style>
+            <p:txBody>
+              <a:bodyPr rtlCol="0" anchor="ctr"/>
+              <a:lstStyle/>
+              <a:p>
+                <a:pPr algn="ctr"/>
+                <a:endParaRPr lang="en-IN"/>
+              </a:p>
+            </p:txBody>
+          </p:sp>
+          <p:cxnSp>
+            <p:nvCxnSpPr>
+              <p:cNvPr id="11" name="Straight Connector 10">
+                <a:extLst>
+                  <a:ext uri="{FF2B5EF4-FFF2-40B4-BE49-F238E27FC236}">
+                    <a16:creationId xmlns:a16="http://schemas.microsoft.com/office/drawing/2014/main" id="{5A17FD9C-CC63-99FD-A3E3-949AC97F1615}"/>
+                  </a:ext>
+                </a:extLst>
+              </p:cNvPr>
+              <p:cNvCxnSpPr>
+                <a:cxnSpLocks/>
+              </p:cNvCxnSpPr>
+              <p:nvPr/>
+            </p:nvCxnSpPr>
+            <p:spPr>
+              <a:xfrm>
+                <a:off x="3610045" y="3491609"/>
+                <a:ext cx="693435" cy="0"/>
+              </a:xfrm>
+              <a:prstGeom prst="line">
+                <a:avLst/>
+              </a:prstGeom>
+              <a:ln w="57150">
+                <a:solidFill>
+                  <a:schemeClr val="accent1"/>
+                </a:solidFill>
+              </a:ln>
+            </p:spPr>
+            <p:style>
+              <a:lnRef idx="1">
+                <a:schemeClr val="accent1"/>
+              </a:lnRef>
+              <a:fillRef idx="0">
+                <a:schemeClr val="accent1"/>
+              </a:fillRef>
+              <a:effectRef idx="0">
+                <a:schemeClr val="accent1"/>
+              </a:effectRef>
+              <a:fontRef idx="minor">
+                <a:schemeClr val="tx1"/>
+              </a:fontRef>
+            </p:style>
+          </p:cxnSp>
+        </p:grpSp>
+        <p:cxnSp>
+          <p:nvCxnSpPr>
+            <p:cNvPr id="7" name="Straight Connector 6">
+              <a:extLst>
+                <a:ext uri="{FF2B5EF4-FFF2-40B4-BE49-F238E27FC236}">
+                  <a16:creationId xmlns:a16="http://schemas.microsoft.com/office/drawing/2014/main" id="{7B5547D6-BF41-2422-EC42-3F42B9C012C2}"/>
+                </a:ext>
+              </a:extLst>
+            </p:cNvPr>
+            <p:cNvCxnSpPr>
+              <a:cxnSpLocks/>
+            </p:cNvCxnSpPr>
+            <p:nvPr/>
+          </p:nvCxnSpPr>
+          <p:spPr>
+            <a:xfrm rot="16200000" flipH="1" flipV="1">
+              <a:off x="4743654" y="2341508"/>
+              <a:ext cx="214725" cy="207413"/>
+            </a:xfrm>
+            <a:prstGeom prst="line">
+              <a:avLst/>
+            </a:prstGeom>
+            <a:ln w="57150">
+              <a:solidFill>
+                <a:schemeClr val="accent1"/>
+              </a:solidFill>
+            </a:ln>
+          </p:spPr>
+          <p:style>
+            <a:lnRef idx="1">
+              <a:schemeClr val="accent1"/>
+            </a:lnRef>
+            <a:fillRef idx="0">
+              <a:schemeClr val="accent1"/>
+            </a:fillRef>
+            <a:effectRef idx="0">
+              <a:schemeClr val="accent1"/>
+            </a:effectRef>
+            <a:fontRef idx="minor">
+              <a:schemeClr val="tx1"/>
+            </a:fontRef>
+          </p:style>
+        </p:cxnSp>
+        <p:sp>
+          <p:nvSpPr>
+            <p:cNvPr id="8" name="Oval 7">
+              <a:extLst>
+                <a:ext uri="{FF2B5EF4-FFF2-40B4-BE49-F238E27FC236}">
+                  <a16:creationId xmlns:a16="http://schemas.microsoft.com/office/drawing/2014/main" id="{5D7BE761-F7BB-04F7-629D-BF8D4510860A}"/>
+                </a:ext>
+              </a:extLst>
+            </p:cNvPr>
+            <p:cNvSpPr/>
+            <p:nvPr/>
+          </p:nvSpPr>
+          <p:spPr>
+            <a:xfrm rot="16200000" flipH="1">
+              <a:off x="4678501" y="2539451"/>
+              <a:ext cx="85562" cy="70962"/>
+            </a:xfrm>
+            <a:prstGeom prst="ellipse">
+              <a:avLst/>
+            </a:prstGeom>
+            <a:ln w="57150">
+              <a:solidFill>
+                <a:schemeClr val="accent1"/>
+              </a:solidFill>
+            </a:ln>
+          </p:spPr>
+          <p:style>
+            <a:lnRef idx="2">
+              <a:schemeClr val="accent1">
+                <a:shade val="50000"/>
+              </a:schemeClr>
+            </a:lnRef>
+            <a:fillRef idx="1">
+              <a:schemeClr val="accent1"/>
+            </a:fillRef>
+            <a:effectRef idx="0">
+              <a:schemeClr val="accent1"/>
+            </a:effectRef>
+            <a:fontRef idx="minor">
+              <a:schemeClr val="lt1"/>
+            </a:fontRef>
+          </p:style>
+          <p:txBody>
+            <a:bodyPr rtlCol="0" anchor="ctr"/>
+            <a:lstStyle/>
+            <a:p>
+              <a:pPr algn="ctr"/>
+              <a:endParaRPr lang="en-IN"/>
+            </a:p>
+          </p:txBody>
+        </p:sp>
+      </p:grpSp>
+      <p:grpSp>
+        <p:nvGrpSpPr>
+          <p:cNvPr id="24" name="Group 23">
+            <a:extLst>
+              <a:ext uri="{FF2B5EF4-FFF2-40B4-BE49-F238E27FC236}">
+                <a16:creationId xmlns:a16="http://schemas.microsoft.com/office/drawing/2014/main" id="{3BA379AE-3066-1A8B-55A4-12314CB55BD0}"/>
+              </a:ext>
+            </a:extLst>
+          </p:cNvPr>
+          <p:cNvGrpSpPr/>
+          <p:nvPr/>
+        </p:nvGrpSpPr>
+        <p:grpSpPr>
+          <a:xfrm rot="8105944">
+            <a:off x="4925505" y="878541"/>
+            <a:ext cx="1027870" cy="597901"/>
+            <a:chOff x="5684207" y="4079267"/>
+            <a:chExt cx="1027870" cy="597901"/>
+          </a:xfrm>
+        </p:grpSpPr>
+        <p:grpSp>
+          <p:nvGrpSpPr>
+            <p:cNvPr id="19" name="Group 18">
+              <a:extLst>
+                <a:ext uri="{FF2B5EF4-FFF2-40B4-BE49-F238E27FC236}">
+                  <a16:creationId xmlns:a16="http://schemas.microsoft.com/office/drawing/2014/main" id="{89B62568-7093-EBA2-1DE2-CCDD7427553A}"/>
+                </a:ext>
+              </a:extLst>
+            </p:cNvPr>
+            <p:cNvGrpSpPr/>
+            <p:nvPr/>
+          </p:nvGrpSpPr>
+          <p:grpSpPr>
+            <a:xfrm>
+              <a:off x="5684207" y="4137175"/>
+              <a:ext cx="1027870" cy="483052"/>
+              <a:chOff x="5529288" y="2475183"/>
+              <a:chExt cx="1027870" cy="483052"/>
+            </a:xfrm>
+          </p:grpSpPr>
+          <p:cxnSp>
+            <p:nvCxnSpPr>
+              <p:cNvPr id="16" name="Straight Connector 15">
+                <a:extLst>
+                  <a:ext uri="{FF2B5EF4-FFF2-40B4-BE49-F238E27FC236}">
+                    <a16:creationId xmlns:a16="http://schemas.microsoft.com/office/drawing/2014/main" id="{C1CDC7E8-34E0-CA7D-24D9-2624667578C2}"/>
+                  </a:ext>
+                </a:extLst>
+              </p:cNvPr>
+              <p:cNvCxnSpPr>
+                <a:cxnSpLocks/>
+              </p:cNvCxnSpPr>
+              <p:nvPr/>
+            </p:nvCxnSpPr>
+            <p:spPr>
+              <a:xfrm rot="16200000" flipH="1" flipV="1">
+                <a:off x="6037171" y="2196556"/>
+                <a:ext cx="12104" cy="1027870"/>
+              </a:xfrm>
+              <a:prstGeom prst="line">
+                <a:avLst/>
+              </a:prstGeom>
+              <a:ln w="57150">
+                <a:solidFill>
+                  <a:schemeClr val="accent1"/>
+                </a:solidFill>
+              </a:ln>
+            </p:spPr>
+            <p:style>
+              <a:lnRef idx="1">
+                <a:schemeClr val="accent1"/>
+              </a:lnRef>
+              <a:fillRef idx="0">
+                <a:schemeClr val="accent1"/>
+              </a:fillRef>
+              <a:effectRef idx="0">
+                <a:schemeClr val="accent1"/>
+              </a:effectRef>
+              <a:fontRef idx="minor">
+                <a:schemeClr val="tx1"/>
+              </a:fontRef>
+            </p:style>
+          </p:cxnSp>
+          <p:sp>
+            <p:nvSpPr>
+              <p:cNvPr id="18" name="Isosceles Triangle 17">
+                <a:extLst>
+                  <a:ext uri="{FF2B5EF4-FFF2-40B4-BE49-F238E27FC236}">
+                    <a16:creationId xmlns:a16="http://schemas.microsoft.com/office/drawing/2014/main" id="{23EE3877-4395-553D-2344-ED6537D8B90F}"/>
+                  </a:ext>
+                </a:extLst>
+              </p:cNvPr>
+              <p:cNvSpPr/>
+              <p:nvPr/>
+            </p:nvSpPr>
+            <p:spPr>
+              <a:xfrm rot="16200000" flipH="1">
+                <a:off x="5829054" y="2511321"/>
+                <a:ext cx="483052" cy="410776"/>
+              </a:xfrm>
+              <a:prstGeom prst="triangle">
+                <a:avLst/>
+              </a:prstGeom>
+              <a:ln w="57150">
+                <a:solidFill>
+                  <a:schemeClr val="accent1"/>
+                </a:solidFill>
+              </a:ln>
+            </p:spPr>
+            <p:style>
+              <a:lnRef idx="2">
+                <a:schemeClr val="accent1">
+                  <a:shade val="50000"/>
+                </a:schemeClr>
+              </a:lnRef>
+              <a:fillRef idx="1">
+                <a:schemeClr val="accent1"/>
+              </a:fillRef>
+              <a:effectRef idx="0">
+                <a:schemeClr val="accent1"/>
+              </a:effectRef>
+              <a:fontRef idx="minor">
+                <a:schemeClr val="lt1"/>
+              </a:fontRef>
+            </p:style>
+            <p:txBody>
+              <a:bodyPr rtlCol="0" anchor="ctr"/>
+              <a:lstStyle/>
+              <a:p>
+                <a:pPr algn="ctr"/>
+                <a:endParaRPr lang="en-IN"/>
+              </a:p>
+            </p:txBody>
+          </p:sp>
+        </p:grpSp>
+        <p:cxnSp>
+          <p:nvCxnSpPr>
+            <p:cNvPr id="21" name="Straight Connector 20">
+              <a:extLst>
+                <a:ext uri="{FF2B5EF4-FFF2-40B4-BE49-F238E27FC236}">
+                  <a16:creationId xmlns:a16="http://schemas.microsoft.com/office/drawing/2014/main" id="{9A554552-7446-1C13-9AEA-60C192A94A58}"/>
+                </a:ext>
+              </a:extLst>
+            </p:cNvPr>
+            <p:cNvCxnSpPr>
+              <a:cxnSpLocks/>
+            </p:cNvCxnSpPr>
+            <p:nvPr/>
+          </p:nvCxnSpPr>
+          <p:spPr>
+            <a:xfrm flipV="1">
+              <a:off x="6020111" y="4079267"/>
+              <a:ext cx="0" cy="597901"/>
+            </a:xfrm>
+            <a:prstGeom prst="line">
+              <a:avLst/>
+            </a:prstGeom>
+            <a:ln w="57150">
+              <a:solidFill>
+                <a:schemeClr val="accent1"/>
+              </a:solidFill>
+            </a:ln>
+          </p:spPr>
+          <p:style>
+            <a:lnRef idx="1">
+              <a:schemeClr val="accent1"/>
+            </a:lnRef>
+            <a:fillRef idx="0">
+              <a:schemeClr val="accent1"/>
+            </a:fillRef>
+            <a:effectRef idx="0">
+              <a:schemeClr val="accent1"/>
+            </a:effectRef>
+            <a:fontRef idx="minor">
+              <a:schemeClr val="tx1"/>
+            </a:fontRef>
+          </p:style>
+        </p:cxnSp>
+      </p:grpSp>
+      <p:grpSp>
+        <p:nvGrpSpPr>
+          <p:cNvPr id="25" name="Group 24">
+            <a:extLst>
+              <a:ext uri="{FF2B5EF4-FFF2-40B4-BE49-F238E27FC236}">
+                <a16:creationId xmlns:a16="http://schemas.microsoft.com/office/drawing/2014/main" id="{FEBBC32D-807C-51B9-15FF-3566DAA4CBD2}"/>
+              </a:ext>
+            </a:extLst>
+          </p:cNvPr>
+          <p:cNvGrpSpPr/>
+          <p:nvPr/>
+        </p:nvGrpSpPr>
+        <p:grpSpPr>
+          <a:xfrm rot="8105944">
+            <a:off x="6483862" y="2380492"/>
+            <a:ext cx="1027870" cy="597901"/>
+            <a:chOff x="5684207" y="4079267"/>
+            <a:chExt cx="1027870" cy="597901"/>
+          </a:xfrm>
+        </p:grpSpPr>
+        <p:grpSp>
+          <p:nvGrpSpPr>
+            <p:cNvPr id="26" name="Group 25">
+              <a:extLst>
+                <a:ext uri="{FF2B5EF4-FFF2-40B4-BE49-F238E27FC236}">
+                  <a16:creationId xmlns:a16="http://schemas.microsoft.com/office/drawing/2014/main" id="{DBABFD9F-EA1C-4C49-F7A2-A794925831E3}"/>
+                </a:ext>
+              </a:extLst>
+            </p:cNvPr>
+            <p:cNvGrpSpPr/>
+            <p:nvPr/>
+          </p:nvGrpSpPr>
+          <p:grpSpPr>
+            <a:xfrm>
+              <a:off x="5684207" y="4137175"/>
+              <a:ext cx="1027870" cy="483052"/>
+              <a:chOff x="5529288" y="2475183"/>
+              <a:chExt cx="1027870" cy="483052"/>
+            </a:xfrm>
+          </p:grpSpPr>
+          <p:cxnSp>
+            <p:nvCxnSpPr>
+              <p:cNvPr id="31" name="Straight Connector 30">
+                <a:extLst>
+                  <a:ext uri="{FF2B5EF4-FFF2-40B4-BE49-F238E27FC236}">
+                    <a16:creationId xmlns:a16="http://schemas.microsoft.com/office/drawing/2014/main" id="{B288EEC0-28DF-0677-7EF0-FB10C4739AFB}"/>
+                  </a:ext>
+                </a:extLst>
+              </p:cNvPr>
+              <p:cNvCxnSpPr>
+                <a:cxnSpLocks/>
+              </p:cNvCxnSpPr>
+              <p:nvPr/>
+            </p:nvCxnSpPr>
+            <p:spPr>
+              <a:xfrm rot="16200000" flipH="1" flipV="1">
+                <a:off x="6037171" y="2196556"/>
+                <a:ext cx="12104" cy="1027870"/>
+              </a:xfrm>
+              <a:prstGeom prst="line">
+                <a:avLst/>
+              </a:prstGeom>
+              <a:ln w="57150">
+                <a:solidFill>
+                  <a:schemeClr val="accent1"/>
+                </a:solidFill>
+              </a:ln>
+            </p:spPr>
+            <p:style>
+              <a:lnRef idx="1">
+                <a:schemeClr val="accent1"/>
+              </a:lnRef>
+              <a:fillRef idx="0">
+                <a:schemeClr val="accent1"/>
+              </a:fillRef>
+              <a:effectRef idx="0">
+                <a:schemeClr val="accent1"/>
+              </a:effectRef>
+              <a:fontRef idx="minor">
+                <a:schemeClr val="tx1"/>
+              </a:fontRef>
+            </p:style>
+          </p:cxnSp>
+          <p:sp>
+            <p:nvSpPr>
+              <p:cNvPr id="49" name="Isosceles Triangle 48">
+                <a:extLst>
+                  <a:ext uri="{FF2B5EF4-FFF2-40B4-BE49-F238E27FC236}">
+                    <a16:creationId xmlns:a16="http://schemas.microsoft.com/office/drawing/2014/main" id="{036619D0-6870-7FB5-321A-75074A0B807F}"/>
+                  </a:ext>
+                </a:extLst>
+              </p:cNvPr>
+              <p:cNvSpPr/>
+              <p:nvPr/>
+            </p:nvSpPr>
+            <p:spPr>
+              <a:xfrm rot="16200000" flipH="1">
+                <a:off x="5829054" y="2511321"/>
+                <a:ext cx="483052" cy="410776"/>
+              </a:xfrm>
+              <a:prstGeom prst="triangle">
+                <a:avLst/>
+              </a:prstGeom>
+              <a:ln w="57150">
+                <a:solidFill>
+                  <a:schemeClr val="accent1"/>
+                </a:solidFill>
+              </a:ln>
+            </p:spPr>
+            <p:style>
+              <a:lnRef idx="2">
+                <a:schemeClr val="accent1">
+                  <a:shade val="50000"/>
+                </a:schemeClr>
+              </a:lnRef>
+              <a:fillRef idx="1">
+                <a:schemeClr val="accent1"/>
+              </a:fillRef>
+              <a:effectRef idx="0">
+                <a:schemeClr val="accent1"/>
+              </a:effectRef>
+              <a:fontRef idx="minor">
+                <a:schemeClr val="lt1"/>
+              </a:fontRef>
+            </p:style>
+            <p:txBody>
+              <a:bodyPr rtlCol="0" anchor="ctr"/>
+              <a:lstStyle/>
+              <a:p>
+                <a:pPr algn="ctr"/>
+                <a:endParaRPr lang="en-IN"/>
+              </a:p>
+            </p:txBody>
+          </p:sp>
+        </p:grpSp>
+        <p:cxnSp>
+          <p:nvCxnSpPr>
+            <p:cNvPr id="27" name="Straight Connector 26">
+              <a:extLst>
+                <a:ext uri="{FF2B5EF4-FFF2-40B4-BE49-F238E27FC236}">
+                  <a16:creationId xmlns:a16="http://schemas.microsoft.com/office/drawing/2014/main" id="{E5ACC5B1-7CE9-6924-D22A-0F0037455B2E}"/>
+                </a:ext>
+              </a:extLst>
+            </p:cNvPr>
+            <p:cNvCxnSpPr>
+              <a:cxnSpLocks/>
+            </p:cNvCxnSpPr>
+            <p:nvPr/>
+          </p:nvCxnSpPr>
+          <p:spPr>
+            <a:xfrm flipV="1">
+              <a:off x="6020111" y="4079267"/>
+              <a:ext cx="0" cy="597901"/>
+            </a:xfrm>
+            <a:prstGeom prst="line">
+              <a:avLst/>
+            </a:prstGeom>
+            <a:ln w="57150">
+              <a:solidFill>
+                <a:schemeClr val="accent1"/>
+              </a:solidFill>
+            </a:ln>
+          </p:spPr>
+          <p:style>
+            <a:lnRef idx="1">
+              <a:schemeClr val="accent1"/>
+            </a:lnRef>
+            <a:fillRef idx="0">
+              <a:schemeClr val="accent1"/>
+            </a:fillRef>
+            <a:effectRef idx="0">
+              <a:schemeClr val="accent1"/>
+            </a:effectRef>
+            <a:fontRef idx="minor">
+              <a:schemeClr val="tx1"/>
+            </a:fontRef>
+          </p:style>
+        </p:cxnSp>
+      </p:grpSp>
+      <p:grpSp>
+        <p:nvGrpSpPr>
+          <p:cNvPr id="50" name="Group 49">
+            <a:extLst>
+              <a:ext uri="{FF2B5EF4-FFF2-40B4-BE49-F238E27FC236}">
+                <a16:creationId xmlns:a16="http://schemas.microsoft.com/office/drawing/2014/main" id="{E8CD4B8A-071D-4A28-D962-FD97B7A06839}"/>
+              </a:ext>
+            </a:extLst>
+          </p:cNvPr>
+          <p:cNvGrpSpPr/>
+          <p:nvPr/>
+        </p:nvGrpSpPr>
+        <p:grpSpPr>
+          <a:xfrm rot="2705944">
+            <a:off x="4917684" y="2433920"/>
+            <a:ext cx="1027870" cy="597901"/>
+            <a:chOff x="5684207" y="4079267"/>
+            <a:chExt cx="1027870" cy="597901"/>
+          </a:xfrm>
+        </p:grpSpPr>
+        <p:grpSp>
+          <p:nvGrpSpPr>
+            <p:cNvPr id="51" name="Group 50">
+              <a:extLst>
+                <a:ext uri="{FF2B5EF4-FFF2-40B4-BE49-F238E27FC236}">
+                  <a16:creationId xmlns:a16="http://schemas.microsoft.com/office/drawing/2014/main" id="{567C09C9-7611-28F3-7B38-68E699CD7B44}"/>
+                </a:ext>
+              </a:extLst>
+            </p:cNvPr>
+            <p:cNvGrpSpPr/>
+            <p:nvPr/>
+          </p:nvGrpSpPr>
+          <p:grpSpPr>
+            <a:xfrm>
+              <a:off x="5684207" y="4137175"/>
+              <a:ext cx="1027870" cy="483052"/>
+              <a:chOff x="5529288" y="2475183"/>
+              <a:chExt cx="1027870" cy="483052"/>
+            </a:xfrm>
+          </p:grpSpPr>
+          <p:cxnSp>
+            <p:nvCxnSpPr>
+              <p:cNvPr id="53" name="Straight Connector 52">
+                <a:extLst>
+                  <a:ext uri="{FF2B5EF4-FFF2-40B4-BE49-F238E27FC236}">
+                    <a16:creationId xmlns:a16="http://schemas.microsoft.com/office/drawing/2014/main" id="{50D6ECAC-FA4F-703F-46E8-51E86254351C}"/>
+                  </a:ext>
+                </a:extLst>
+              </p:cNvPr>
+              <p:cNvCxnSpPr>
+                <a:cxnSpLocks/>
+              </p:cNvCxnSpPr>
+              <p:nvPr/>
+            </p:nvCxnSpPr>
+            <p:spPr>
+              <a:xfrm rot="16200000" flipH="1" flipV="1">
+                <a:off x="6037171" y="2196556"/>
+                <a:ext cx="12104" cy="1027870"/>
+              </a:xfrm>
+              <a:prstGeom prst="line">
+                <a:avLst/>
+              </a:prstGeom>
+              <a:ln w="57150">
+                <a:solidFill>
+                  <a:schemeClr val="accent1"/>
+                </a:solidFill>
+              </a:ln>
+            </p:spPr>
+            <p:style>
+              <a:lnRef idx="1">
+                <a:schemeClr val="accent1"/>
+              </a:lnRef>
+              <a:fillRef idx="0">
+                <a:schemeClr val="accent1"/>
+              </a:fillRef>
+              <a:effectRef idx="0">
+                <a:schemeClr val="accent1"/>
+              </a:effectRef>
+              <a:fontRef idx="minor">
+                <a:schemeClr val="tx1"/>
+              </a:fontRef>
+            </p:style>
+          </p:cxnSp>
+          <p:sp>
+            <p:nvSpPr>
+              <p:cNvPr id="55" name="Isosceles Triangle 54">
+                <a:extLst>
+                  <a:ext uri="{FF2B5EF4-FFF2-40B4-BE49-F238E27FC236}">
+                    <a16:creationId xmlns:a16="http://schemas.microsoft.com/office/drawing/2014/main" id="{D5DC116C-48FC-93B3-49B1-808F08577D1C}"/>
+                  </a:ext>
+                </a:extLst>
+              </p:cNvPr>
+              <p:cNvSpPr/>
+              <p:nvPr/>
+            </p:nvSpPr>
+            <p:spPr>
+              <a:xfrm rot="16200000" flipH="1">
+                <a:off x="5829054" y="2511321"/>
+                <a:ext cx="483052" cy="410776"/>
+              </a:xfrm>
+              <a:prstGeom prst="triangle">
+                <a:avLst/>
+              </a:prstGeom>
+              <a:ln w="57150">
+                <a:solidFill>
+                  <a:schemeClr val="accent1"/>
+                </a:solidFill>
+              </a:ln>
+            </p:spPr>
+            <p:style>
+              <a:lnRef idx="2">
+                <a:schemeClr val="accent1">
+                  <a:shade val="50000"/>
+                </a:schemeClr>
+              </a:lnRef>
+              <a:fillRef idx="1">
+                <a:schemeClr val="accent1"/>
+              </a:fillRef>
+              <a:effectRef idx="0">
+                <a:schemeClr val="accent1"/>
+              </a:effectRef>
+              <a:fontRef idx="minor">
+                <a:schemeClr val="lt1"/>
+              </a:fontRef>
+            </p:style>
+            <p:txBody>
+              <a:bodyPr rtlCol="0" anchor="ctr"/>
+              <a:lstStyle/>
+              <a:p>
+                <a:pPr algn="ctr"/>
+                <a:endParaRPr lang="en-IN"/>
+              </a:p>
+            </p:txBody>
+          </p:sp>
+        </p:grpSp>
+        <p:cxnSp>
+          <p:nvCxnSpPr>
+            <p:cNvPr id="52" name="Straight Connector 51">
+              <a:extLst>
+                <a:ext uri="{FF2B5EF4-FFF2-40B4-BE49-F238E27FC236}">
+                  <a16:creationId xmlns:a16="http://schemas.microsoft.com/office/drawing/2014/main" id="{80807B7D-93A0-119B-AC17-3A111184F769}"/>
+                </a:ext>
+              </a:extLst>
+            </p:cNvPr>
+            <p:cNvCxnSpPr>
+              <a:cxnSpLocks/>
+            </p:cNvCxnSpPr>
+            <p:nvPr/>
+          </p:nvCxnSpPr>
+          <p:spPr>
+            <a:xfrm flipV="1">
+              <a:off x="6020111" y="4079267"/>
+              <a:ext cx="0" cy="597901"/>
+            </a:xfrm>
+            <a:prstGeom prst="line">
+              <a:avLst/>
+            </a:prstGeom>
+            <a:ln w="57150">
+              <a:solidFill>
+                <a:schemeClr val="accent1"/>
+              </a:solidFill>
+            </a:ln>
+          </p:spPr>
+          <p:style>
+            <a:lnRef idx="1">
+              <a:schemeClr val="accent1"/>
+            </a:lnRef>
+            <a:fillRef idx="0">
+              <a:schemeClr val="accent1"/>
+            </a:fillRef>
+            <a:effectRef idx="0">
+              <a:schemeClr val="accent1"/>
+            </a:effectRef>
+            <a:fontRef idx="minor">
+              <a:schemeClr val="tx1"/>
+            </a:fontRef>
+          </p:style>
+        </p:cxnSp>
+      </p:grpSp>
+      <p:grpSp>
+        <p:nvGrpSpPr>
+          <p:cNvPr id="56" name="Group 55">
+            <a:extLst>
+              <a:ext uri="{FF2B5EF4-FFF2-40B4-BE49-F238E27FC236}">
+                <a16:creationId xmlns:a16="http://schemas.microsoft.com/office/drawing/2014/main" id="{1AC1BDC8-470F-783C-2D37-F2978757817E}"/>
+              </a:ext>
+            </a:extLst>
+          </p:cNvPr>
+          <p:cNvGrpSpPr/>
+          <p:nvPr/>
+        </p:nvGrpSpPr>
+        <p:grpSpPr>
+          <a:xfrm rot="2705944">
+            <a:off x="6470185" y="916813"/>
+            <a:ext cx="1027870" cy="597901"/>
+            <a:chOff x="5684207" y="4079267"/>
+            <a:chExt cx="1027870" cy="597901"/>
+          </a:xfrm>
+        </p:grpSpPr>
+        <p:grpSp>
+          <p:nvGrpSpPr>
+            <p:cNvPr id="59" name="Group 58">
+              <a:extLst>
+                <a:ext uri="{FF2B5EF4-FFF2-40B4-BE49-F238E27FC236}">
+                  <a16:creationId xmlns:a16="http://schemas.microsoft.com/office/drawing/2014/main" id="{DF08D5C2-4BB2-6A64-99F9-269E1E3660CF}"/>
+                </a:ext>
+              </a:extLst>
+            </p:cNvPr>
+            <p:cNvGrpSpPr/>
+            <p:nvPr/>
+          </p:nvGrpSpPr>
+          <p:grpSpPr>
+            <a:xfrm>
+              <a:off x="5684207" y="4137175"/>
+              <a:ext cx="1027870" cy="483052"/>
+              <a:chOff x="5529288" y="2475183"/>
+              <a:chExt cx="1027870" cy="483052"/>
+            </a:xfrm>
+          </p:grpSpPr>
+          <p:cxnSp>
+            <p:nvCxnSpPr>
+              <p:cNvPr id="61" name="Straight Connector 60">
+                <a:extLst>
+                  <a:ext uri="{FF2B5EF4-FFF2-40B4-BE49-F238E27FC236}">
+                    <a16:creationId xmlns:a16="http://schemas.microsoft.com/office/drawing/2014/main" id="{0E9D2C3D-9AD0-91EB-8231-84C95A39572B}"/>
+                  </a:ext>
+                </a:extLst>
+              </p:cNvPr>
+              <p:cNvCxnSpPr>
+                <a:cxnSpLocks/>
+              </p:cNvCxnSpPr>
+              <p:nvPr/>
+            </p:nvCxnSpPr>
+            <p:spPr>
+              <a:xfrm rot="16200000" flipH="1" flipV="1">
+                <a:off x="6037171" y="2196556"/>
+                <a:ext cx="12104" cy="1027870"/>
+              </a:xfrm>
+              <a:prstGeom prst="line">
+                <a:avLst/>
+              </a:prstGeom>
+              <a:ln w="57150">
+                <a:solidFill>
+                  <a:schemeClr val="accent1"/>
+                </a:solidFill>
+              </a:ln>
+            </p:spPr>
+            <p:style>
+              <a:lnRef idx="1">
+                <a:schemeClr val="accent1"/>
+              </a:lnRef>
+              <a:fillRef idx="0">
+                <a:schemeClr val="accent1"/>
+              </a:fillRef>
+              <a:effectRef idx="0">
+                <a:schemeClr val="accent1"/>
+              </a:effectRef>
+              <a:fontRef idx="minor">
+                <a:schemeClr val="tx1"/>
+              </a:fontRef>
+            </p:style>
+          </p:cxnSp>
+          <p:sp>
+            <p:nvSpPr>
+              <p:cNvPr id="62" name="Isosceles Triangle 61">
+                <a:extLst>
+                  <a:ext uri="{FF2B5EF4-FFF2-40B4-BE49-F238E27FC236}">
+                    <a16:creationId xmlns:a16="http://schemas.microsoft.com/office/drawing/2014/main" id="{9790E37C-CBCC-8A56-36E9-CAC5DAD94650}"/>
+                  </a:ext>
+                </a:extLst>
+              </p:cNvPr>
+              <p:cNvSpPr/>
+              <p:nvPr/>
+            </p:nvSpPr>
+            <p:spPr>
+              <a:xfrm rot="16200000" flipH="1">
+                <a:off x="5829054" y="2511321"/>
+                <a:ext cx="483052" cy="410776"/>
+              </a:xfrm>
+              <a:prstGeom prst="triangle">
+                <a:avLst/>
+              </a:prstGeom>
+              <a:ln w="57150">
+                <a:solidFill>
+                  <a:schemeClr val="accent1"/>
+                </a:solidFill>
+              </a:ln>
+            </p:spPr>
+            <p:style>
+              <a:lnRef idx="2">
+                <a:schemeClr val="accent1">
+                  <a:shade val="50000"/>
+                </a:schemeClr>
+              </a:lnRef>
+              <a:fillRef idx="1">
+                <a:schemeClr val="accent1"/>
+              </a:fillRef>
+              <a:effectRef idx="0">
+                <a:schemeClr val="accent1"/>
+              </a:effectRef>
+              <a:fontRef idx="minor">
+                <a:schemeClr val="lt1"/>
+              </a:fontRef>
+            </p:style>
+            <p:txBody>
+              <a:bodyPr rtlCol="0" anchor="ctr"/>
+              <a:lstStyle/>
+              <a:p>
+                <a:pPr algn="ctr"/>
+                <a:endParaRPr lang="en-IN"/>
+              </a:p>
+            </p:txBody>
+          </p:sp>
+        </p:grpSp>
+        <p:cxnSp>
+          <p:nvCxnSpPr>
+            <p:cNvPr id="60" name="Straight Connector 59">
+              <a:extLst>
+                <a:ext uri="{FF2B5EF4-FFF2-40B4-BE49-F238E27FC236}">
+                  <a16:creationId xmlns:a16="http://schemas.microsoft.com/office/drawing/2014/main" id="{F55D3469-0AC4-F915-618B-F8730F1AC5B3}"/>
+                </a:ext>
+              </a:extLst>
+            </p:cNvPr>
+            <p:cNvCxnSpPr>
+              <a:cxnSpLocks/>
+            </p:cNvCxnSpPr>
+            <p:nvPr/>
+          </p:nvCxnSpPr>
+          <p:spPr>
+            <a:xfrm flipV="1">
+              <a:off x="6020111" y="4079267"/>
+              <a:ext cx="0" cy="597901"/>
+            </a:xfrm>
+            <a:prstGeom prst="line">
+              <a:avLst/>
+            </a:prstGeom>
+            <a:ln w="57150">
+              <a:solidFill>
+                <a:schemeClr val="accent1"/>
+              </a:solidFill>
+            </a:ln>
+          </p:spPr>
+          <p:style>
+            <a:lnRef idx="1">
+              <a:schemeClr val="accent1"/>
+            </a:lnRef>
+            <a:fillRef idx="0">
+              <a:schemeClr val="accent1"/>
+            </a:fillRef>
+            <a:effectRef idx="0">
+              <a:schemeClr val="accent1"/>
+            </a:effectRef>
+            <a:fontRef idx="minor">
+              <a:schemeClr val="tx1"/>
+            </a:fontRef>
+          </p:style>
+        </p:cxnSp>
+      </p:grpSp>
+      <p:cxnSp>
+        <p:nvCxnSpPr>
+          <p:cNvPr id="67" name="Straight Connector 66">
+            <a:extLst>
+              <a:ext uri="{FF2B5EF4-FFF2-40B4-BE49-F238E27FC236}">
+                <a16:creationId xmlns:a16="http://schemas.microsoft.com/office/drawing/2014/main" id="{8D175A11-9291-9833-456E-5E2336EF3E8F}"/>
+              </a:ext>
+            </a:extLst>
+          </p:cNvPr>
+          <p:cNvCxnSpPr>
+            <a:cxnSpLocks/>
+          </p:cNvCxnSpPr>
+          <p:nvPr/>
+        </p:nvCxnSpPr>
+        <p:spPr>
+          <a:xfrm flipH="1" flipV="1">
+            <a:off x="7726954" y="1969084"/>
+            <a:ext cx="2124382" cy="11733"/>
+          </a:xfrm>
+          <a:prstGeom prst="line">
+            <a:avLst/>
+          </a:prstGeom>
+          <a:ln w="57150">
+            <a:solidFill>
+              <a:schemeClr val="tx1"/>
+            </a:solidFill>
+          </a:ln>
+        </p:spPr>
+        <p:style>
+          <a:lnRef idx="1">
+            <a:schemeClr val="accent1"/>
+          </a:lnRef>
+          <a:fillRef idx="0">
+            <a:schemeClr val="accent1"/>
+          </a:fillRef>
+          <a:effectRef idx="0">
+            <a:schemeClr val="accent1"/>
+          </a:effectRef>
+          <a:fontRef idx="minor">
+            <a:schemeClr val="tx1"/>
+          </a:fontRef>
+        </p:style>
+      </p:cxnSp>
+      <p:sp>
+        <p:nvSpPr>
+          <p:cNvPr id="77" name="TextBox 76">
+            <a:extLst>
+              <a:ext uri="{FF2B5EF4-FFF2-40B4-BE49-F238E27FC236}">
+                <a16:creationId xmlns:a16="http://schemas.microsoft.com/office/drawing/2014/main" id="{46B964C8-CD15-9829-8F41-2AA1D13BD29E}"/>
+              </a:ext>
+            </a:extLst>
+          </p:cNvPr>
+          <p:cNvSpPr txBox="1"/>
+          <p:nvPr/>
+        </p:nvSpPr>
+        <p:spPr>
+          <a:xfrm>
+            <a:off x="6317325" y="1714203"/>
+            <a:ext cx="549987" cy="369332"/>
+          </a:xfrm>
+          <a:prstGeom prst="rect">
+            <a:avLst/>
+          </a:prstGeom>
+          <a:noFill/>
+        </p:spPr>
+        <p:txBody>
+          <a:bodyPr wrap="square">
+            <a:spAutoFit/>
+          </a:bodyPr>
+          <a:lstStyle/>
+          <a:p>
+            <a:pPr algn="ctr"/>
+            <a:r>
+              <a:rPr lang="en-US" sz="1800" b="1" dirty="0">
+                <a:solidFill>
+                  <a:srgbClr val="FF0000"/>
+                </a:solidFill>
+                <a:latin typeface="Times New Roman" panose="02020603050405020304" pitchFamily="18" charset="0"/>
+                <a:cs typeface="Times New Roman" panose="02020603050405020304" pitchFamily="18" charset="0"/>
+              </a:rPr>
+              <a:t>T</a:t>
+            </a:r>
+            <a:r>
+              <a:rPr lang="en-US" sz="1800" b="1" baseline="-25000" dirty="0">
+                <a:solidFill>
+                  <a:srgbClr val="FF0000"/>
+                </a:solidFill>
+                <a:latin typeface="Times New Roman" panose="02020603050405020304" pitchFamily="18" charset="0"/>
+                <a:cs typeface="Times New Roman" panose="02020603050405020304" pitchFamily="18" charset="0"/>
+              </a:rPr>
+              <a:t>1</a:t>
+            </a:r>
+            <a:endParaRPr lang="en-IN" sz="1800" b="1" dirty="0">
+              <a:solidFill>
+                <a:srgbClr val="FF0000"/>
+              </a:solidFill>
+              <a:latin typeface="Times New Roman" panose="02020603050405020304" pitchFamily="18" charset="0"/>
+              <a:cs typeface="Times New Roman" panose="02020603050405020304" pitchFamily="18" charset="0"/>
+            </a:endParaRPr>
+          </a:p>
+        </p:txBody>
+      </p:sp>
+      <p:sp>
+        <p:nvSpPr>
+          <p:cNvPr id="78" name="TextBox 77">
+            <a:extLst>
+              <a:ext uri="{FF2B5EF4-FFF2-40B4-BE49-F238E27FC236}">
+                <a16:creationId xmlns:a16="http://schemas.microsoft.com/office/drawing/2014/main" id="{0AF02104-A90D-448B-FC24-48A6E2972346}"/>
+              </a:ext>
+            </a:extLst>
+          </p:cNvPr>
+          <p:cNvSpPr txBox="1"/>
+          <p:nvPr/>
+        </p:nvSpPr>
+        <p:spPr>
+          <a:xfrm>
+            <a:off x="4540973" y="754167"/>
+            <a:ext cx="549987" cy="369332"/>
+          </a:xfrm>
+          <a:prstGeom prst="rect">
+            <a:avLst/>
+          </a:prstGeom>
+          <a:noFill/>
+        </p:spPr>
+        <p:txBody>
+          <a:bodyPr wrap="square">
+            <a:spAutoFit/>
+          </a:bodyPr>
+          <a:lstStyle/>
+          <a:p>
+            <a:pPr algn="ctr"/>
+            <a:r>
+              <a:rPr lang="en-US" sz="1800" b="1" dirty="0">
+                <a:solidFill>
+                  <a:srgbClr val="FF0000"/>
+                </a:solidFill>
+                <a:latin typeface="Times New Roman" panose="02020603050405020304" pitchFamily="18" charset="0"/>
+                <a:cs typeface="Times New Roman" panose="02020603050405020304" pitchFamily="18" charset="0"/>
+              </a:rPr>
+              <a:t>D</a:t>
+            </a:r>
+            <a:r>
+              <a:rPr lang="en-US" sz="1800" b="1" baseline="-25000" dirty="0">
+                <a:solidFill>
+                  <a:srgbClr val="FF0000"/>
+                </a:solidFill>
+                <a:latin typeface="Times New Roman" panose="02020603050405020304" pitchFamily="18" charset="0"/>
+                <a:cs typeface="Times New Roman" panose="02020603050405020304" pitchFamily="18" charset="0"/>
+              </a:rPr>
+              <a:t>1</a:t>
+            </a:r>
+            <a:endParaRPr lang="en-IN" sz="1800" b="1" dirty="0">
+              <a:solidFill>
+                <a:srgbClr val="FF0000"/>
+              </a:solidFill>
+              <a:latin typeface="Times New Roman" panose="02020603050405020304" pitchFamily="18" charset="0"/>
+              <a:cs typeface="Times New Roman" panose="02020603050405020304" pitchFamily="18" charset="0"/>
+            </a:endParaRPr>
+          </a:p>
+        </p:txBody>
+      </p:sp>
+      <p:sp>
+        <p:nvSpPr>
+          <p:cNvPr id="79" name="TextBox 78">
+            <a:extLst>
+              <a:ext uri="{FF2B5EF4-FFF2-40B4-BE49-F238E27FC236}">
+                <a16:creationId xmlns:a16="http://schemas.microsoft.com/office/drawing/2014/main" id="{5C981E19-04AB-EAA5-8E36-6783ED5A65FB}"/>
+              </a:ext>
+            </a:extLst>
+          </p:cNvPr>
+          <p:cNvSpPr txBox="1"/>
+          <p:nvPr/>
+        </p:nvSpPr>
+        <p:spPr>
+          <a:xfrm>
+            <a:off x="7176967" y="737905"/>
+            <a:ext cx="549987" cy="369332"/>
+          </a:xfrm>
+          <a:prstGeom prst="rect">
+            <a:avLst/>
+          </a:prstGeom>
+          <a:noFill/>
+        </p:spPr>
+        <p:txBody>
+          <a:bodyPr wrap="square">
+            <a:spAutoFit/>
+          </a:bodyPr>
+          <a:lstStyle/>
+          <a:p>
+            <a:pPr algn="ctr"/>
+            <a:r>
+              <a:rPr lang="en-US" sz="1800" b="1" dirty="0">
+                <a:solidFill>
+                  <a:srgbClr val="FF0000"/>
+                </a:solidFill>
+                <a:latin typeface="Times New Roman" panose="02020603050405020304" pitchFamily="18" charset="0"/>
+                <a:cs typeface="Times New Roman" panose="02020603050405020304" pitchFamily="18" charset="0"/>
+              </a:rPr>
+              <a:t>D</a:t>
+            </a:r>
+            <a:r>
+              <a:rPr lang="en-US" b="1" baseline="-25000" dirty="0">
+                <a:solidFill>
+                  <a:srgbClr val="FF0000"/>
+                </a:solidFill>
+                <a:latin typeface="Times New Roman" panose="02020603050405020304" pitchFamily="18" charset="0"/>
+                <a:cs typeface="Times New Roman" panose="02020603050405020304" pitchFamily="18" charset="0"/>
+              </a:rPr>
+              <a:t>2</a:t>
+            </a:r>
+            <a:endParaRPr lang="en-IN" sz="1800" b="1" dirty="0">
+              <a:solidFill>
+                <a:srgbClr val="FF0000"/>
+              </a:solidFill>
+              <a:latin typeface="Times New Roman" panose="02020603050405020304" pitchFamily="18" charset="0"/>
+              <a:cs typeface="Times New Roman" panose="02020603050405020304" pitchFamily="18" charset="0"/>
+            </a:endParaRPr>
+          </a:p>
+        </p:txBody>
+      </p:sp>
+      <p:sp>
+        <p:nvSpPr>
+          <p:cNvPr id="80" name="TextBox 79">
+            <a:extLst>
+              <a:ext uri="{FF2B5EF4-FFF2-40B4-BE49-F238E27FC236}">
+                <a16:creationId xmlns:a16="http://schemas.microsoft.com/office/drawing/2014/main" id="{F1602A9B-EADF-35E0-19F4-CBD8BA253E24}"/>
+              </a:ext>
+            </a:extLst>
+          </p:cNvPr>
+          <p:cNvSpPr txBox="1"/>
+          <p:nvPr/>
+        </p:nvSpPr>
+        <p:spPr>
+          <a:xfrm>
+            <a:off x="4669331" y="2861990"/>
+            <a:ext cx="549987" cy="369332"/>
+          </a:xfrm>
+          <a:prstGeom prst="rect">
+            <a:avLst/>
+          </a:prstGeom>
+          <a:noFill/>
+        </p:spPr>
+        <p:txBody>
+          <a:bodyPr wrap="square">
+            <a:spAutoFit/>
+          </a:bodyPr>
+          <a:lstStyle/>
+          <a:p>
+            <a:pPr algn="ctr"/>
+            <a:r>
+              <a:rPr lang="en-US" sz="1800" b="1" dirty="0">
+                <a:solidFill>
+                  <a:srgbClr val="FF0000"/>
+                </a:solidFill>
+                <a:latin typeface="Times New Roman" panose="02020603050405020304" pitchFamily="18" charset="0"/>
+                <a:cs typeface="Times New Roman" panose="02020603050405020304" pitchFamily="18" charset="0"/>
+              </a:rPr>
+              <a:t>D</a:t>
+            </a:r>
+            <a:r>
+              <a:rPr lang="en-US" b="1" baseline="-25000" dirty="0">
+                <a:solidFill>
+                  <a:srgbClr val="FF0000"/>
+                </a:solidFill>
+                <a:latin typeface="Times New Roman" panose="02020603050405020304" pitchFamily="18" charset="0"/>
+                <a:cs typeface="Times New Roman" panose="02020603050405020304" pitchFamily="18" charset="0"/>
+              </a:rPr>
+              <a:t>3</a:t>
+            </a:r>
+            <a:endParaRPr lang="en-IN" sz="1800" b="1" dirty="0">
+              <a:solidFill>
+                <a:srgbClr val="FF0000"/>
+              </a:solidFill>
+              <a:latin typeface="Times New Roman" panose="02020603050405020304" pitchFamily="18" charset="0"/>
+              <a:cs typeface="Times New Roman" panose="02020603050405020304" pitchFamily="18" charset="0"/>
+            </a:endParaRPr>
+          </a:p>
+        </p:txBody>
+      </p:sp>
+      <p:sp>
+        <p:nvSpPr>
+          <p:cNvPr id="81" name="TextBox 80">
+            <a:extLst>
+              <a:ext uri="{FF2B5EF4-FFF2-40B4-BE49-F238E27FC236}">
+                <a16:creationId xmlns:a16="http://schemas.microsoft.com/office/drawing/2014/main" id="{738BDDEF-D061-925B-8508-A568870E5761}"/>
+              </a:ext>
+            </a:extLst>
+          </p:cNvPr>
+          <p:cNvSpPr txBox="1"/>
+          <p:nvPr/>
+        </p:nvSpPr>
+        <p:spPr>
+          <a:xfrm>
+            <a:off x="7164606" y="2799406"/>
+            <a:ext cx="549987" cy="369332"/>
+          </a:xfrm>
+          <a:prstGeom prst="rect">
+            <a:avLst/>
+          </a:prstGeom>
+          <a:noFill/>
+        </p:spPr>
+        <p:txBody>
+          <a:bodyPr wrap="square">
+            <a:spAutoFit/>
+          </a:bodyPr>
+          <a:lstStyle/>
+          <a:p>
+            <a:pPr algn="ctr"/>
+            <a:r>
+              <a:rPr lang="en-US" sz="1800" b="1" dirty="0">
+                <a:solidFill>
+                  <a:srgbClr val="FF0000"/>
+                </a:solidFill>
+                <a:latin typeface="Times New Roman" panose="02020603050405020304" pitchFamily="18" charset="0"/>
+                <a:cs typeface="Times New Roman" panose="02020603050405020304" pitchFamily="18" charset="0"/>
+              </a:rPr>
+              <a:t>D</a:t>
+            </a:r>
+            <a:r>
+              <a:rPr lang="en-US" b="1" baseline="-25000" dirty="0">
+                <a:solidFill>
+                  <a:srgbClr val="FF0000"/>
+                </a:solidFill>
+                <a:latin typeface="Times New Roman" panose="02020603050405020304" pitchFamily="18" charset="0"/>
+                <a:cs typeface="Times New Roman" panose="02020603050405020304" pitchFamily="18" charset="0"/>
+              </a:rPr>
+              <a:t>4</a:t>
+            </a:r>
+            <a:endParaRPr lang="en-IN" sz="1800" b="1" dirty="0">
+              <a:solidFill>
+                <a:srgbClr val="FF0000"/>
+              </a:solidFill>
+              <a:latin typeface="Times New Roman" panose="02020603050405020304" pitchFamily="18" charset="0"/>
+              <a:cs typeface="Times New Roman" panose="02020603050405020304" pitchFamily="18" charset="0"/>
+            </a:endParaRPr>
+          </a:p>
+        </p:txBody>
+      </p:sp>
+    </p:spTree>
+    <p:extLst>
+      <p:ext uri="{BB962C8B-B14F-4D97-AF65-F5344CB8AC3E}">
+        <p14:creationId xmlns:p14="http://schemas.microsoft.com/office/powerpoint/2010/main" val="635201240"/>
+      </p:ext>
+    </p:extLst>
+  </p:cSld>
+  <p:clrMapOvr>
+    <a:masterClrMapping/>
+  </p:clrMapOvr>
+</p:sld>
+</file>
+
 <file path=ppt/theme/theme1.xml><?xml version="1.0" encoding="utf-8"?>
 <a:theme xmlns:a="http://schemas.openxmlformats.org/drawingml/2006/main" name="Office Theme">
   <a:themeElements>

</xml_diff>

<commit_message>
expt 4 simulation page
</commit_message>
<xml_diff>
--- a/Assets/Powerpoints/AC Voltage Controller.pptx
+++ b/Assets/Powerpoints/AC Voltage Controller.pptx
@@ -268,7 +268,7 @@
           <a:p>
             <a:fld id="{62092866-234F-450F-AD7A-560A105E5EC1}" type="datetimeFigureOut">
               <a:rPr lang="en-IN" smtClean="0"/>
-              <a:t>20-12-2022</a:t>
+              <a:t>24-12-2022</a:t>
             </a:fld>
             <a:endParaRPr lang="en-IN"/>
           </a:p>
@@ -468,7 +468,7 @@
           <a:p>
             <a:fld id="{62092866-234F-450F-AD7A-560A105E5EC1}" type="datetimeFigureOut">
               <a:rPr lang="en-IN" smtClean="0"/>
-              <a:t>20-12-2022</a:t>
+              <a:t>24-12-2022</a:t>
             </a:fld>
             <a:endParaRPr lang="en-IN"/>
           </a:p>
@@ -678,7 +678,7 @@
           <a:p>
             <a:fld id="{62092866-234F-450F-AD7A-560A105E5EC1}" type="datetimeFigureOut">
               <a:rPr lang="en-IN" smtClean="0"/>
-              <a:t>20-12-2022</a:t>
+              <a:t>24-12-2022</a:t>
             </a:fld>
             <a:endParaRPr lang="en-IN"/>
           </a:p>
@@ -878,7 +878,7 @@
           <a:p>
             <a:fld id="{62092866-234F-450F-AD7A-560A105E5EC1}" type="datetimeFigureOut">
               <a:rPr lang="en-IN" smtClean="0"/>
-              <a:t>20-12-2022</a:t>
+              <a:t>24-12-2022</a:t>
             </a:fld>
             <a:endParaRPr lang="en-IN"/>
           </a:p>
@@ -1154,7 +1154,7 @@
           <a:p>
             <a:fld id="{62092866-234F-450F-AD7A-560A105E5EC1}" type="datetimeFigureOut">
               <a:rPr lang="en-IN" smtClean="0"/>
-              <a:t>20-12-2022</a:t>
+              <a:t>24-12-2022</a:t>
             </a:fld>
             <a:endParaRPr lang="en-IN"/>
           </a:p>
@@ -1422,7 +1422,7 @@
           <a:p>
             <a:fld id="{62092866-234F-450F-AD7A-560A105E5EC1}" type="datetimeFigureOut">
               <a:rPr lang="en-IN" smtClean="0"/>
-              <a:t>20-12-2022</a:t>
+              <a:t>24-12-2022</a:t>
             </a:fld>
             <a:endParaRPr lang="en-IN"/>
           </a:p>
@@ -1837,7 +1837,7 @@
           <a:p>
             <a:fld id="{62092866-234F-450F-AD7A-560A105E5EC1}" type="datetimeFigureOut">
               <a:rPr lang="en-IN" smtClean="0"/>
-              <a:t>20-12-2022</a:t>
+              <a:t>24-12-2022</a:t>
             </a:fld>
             <a:endParaRPr lang="en-IN"/>
           </a:p>
@@ -1979,7 +1979,7 @@
           <a:p>
             <a:fld id="{62092866-234F-450F-AD7A-560A105E5EC1}" type="datetimeFigureOut">
               <a:rPr lang="en-IN" smtClean="0"/>
-              <a:t>20-12-2022</a:t>
+              <a:t>24-12-2022</a:t>
             </a:fld>
             <a:endParaRPr lang="en-IN"/>
           </a:p>
@@ -2092,7 +2092,7 @@
           <a:p>
             <a:fld id="{62092866-234F-450F-AD7A-560A105E5EC1}" type="datetimeFigureOut">
               <a:rPr lang="en-IN" smtClean="0"/>
-              <a:t>20-12-2022</a:t>
+              <a:t>24-12-2022</a:t>
             </a:fld>
             <a:endParaRPr lang="en-IN"/>
           </a:p>
@@ -2405,7 +2405,7 @@
           <a:p>
             <a:fld id="{62092866-234F-450F-AD7A-560A105E5EC1}" type="datetimeFigureOut">
               <a:rPr lang="en-IN" smtClean="0"/>
-              <a:t>20-12-2022</a:t>
+              <a:t>24-12-2022</a:t>
             </a:fld>
             <a:endParaRPr lang="en-IN"/>
           </a:p>
@@ -2694,7 +2694,7 @@
           <a:p>
             <a:fld id="{62092866-234F-450F-AD7A-560A105E5EC1}" type="datetimeFigureOut">
               <a:rPr lang="en-IN" smtClean="0"/>
-              <a:t>20-12-2022</a:t>
+              <a:t>24-12-2022</a:t>
             </a:fld>
             <a:endParaRPr lang="en-IN"/>
           </a:p>
@@ -2937,7 +2937,7 @@
           <a:p>
             <a:fld id="{62092866-234F-450F-AD7A-560A105E5EC1}" type="datetimeFigureOut">
               <a:rPr lang="en-IN" smtClean="0"/>
-              <a:t>20-12-2022</a:t>
+              <a:t>24-12-2022</a:t>
             </a:fld>
             <a:endParaRPr lang="en-IN"/>
           </a:p>
@@ -6059,921 +6059,49 @@
           </a:fontRef>
         </p:style>
       </p:cxnSp>
-      <p:grpSp>
-        <p:nvGrpSpPr>
-          <p:cNvPr id="98" name="Group 97">
+      <p:cxnSp>
+        <p:nvCxnSpPr>
+          <p:cNvPr id="71" name="Straight Connector 70">
             <a:extLst>
               <a:ext uri="{FF2B5EF4-FFF2-40B4-BE49-F238E27FC236}">
-                <a16:creationId xmlns:a16="http://schemas.microsoft.com/office/drawing/2014/main" id="{45C11704-904E-220E-EBE7-95B61D79C380}"/>
+                <a16:creationId xmlns:a16="http://schemas.microsoft.com/office/drawing/2014/main" id="{CFB41F3C-E6CB-8F3F-B440-46BF6AF4EE24}"/>
               </a:ext>
             </a:extLst>
           </p:cNvPr>
-          <p:cNvGrpSpPr/>
+          <p:cNvCxnSpPr>
+            <a:cxnSpLocks/>
+          </p:cNvCxnSpPr>
           <p:nvPr/>
-        </p:nvGrpSpPr>
-        <p:grpSpPr>
-          <a:xfrm rot="16200000" flipV="1">
-            <a:off x="4812384" y="318830"/>
-            <a:ext cx="540144" cy="1027870"/>
-            <a:chOff x="5839573" y="3055515"/>
-            <a:chExt cx="540144" cy="1027870"/>
+        </p:nvCxnSpPr>
+        <p:spPr>
+          <a:xfrm rot="16200000">
+            <a:off x="5076404" y="338527"/>
+            <a:ext cx="12104" cy="1027870"/>
           </a:xfrm>
-        </p:grpSpPr>
-        <p:cxnSp>
-          <p:nvCxnSpPr>
-            <p:cNvPr id="71" name="Straight Connector 70">
-              <a:extLst>
-                <a:ext uri="{FF2B5EF4-FFF2-40B4-BE49-F238E27FC236}">
-                  <a16:creationId xmlns:a16="http://schemas.microsoft.com/office/drawing/2014/main" id="{CFB41F3C-E6CB-8F3F-B440-46BF6AF4EE24}"/>
-                </a:ext>
-              </a:extLst>
-            </p:cNvPr>
-            <p:cNvCxnSpPr>
-              <a:cxnSpLocks/>
-            </p:cNvCxnSpPr>
-            <p:nvPr/>
-          </p:nvCxnSpPr>
-          <p:spPr>
-            <a:xfrm flipV="1">
-              <a:off x="6083896" y="3055515"/>
-              <a:ext cx="12104" cy="1027870"/>
-            </a:xfrm>
-            <a:prstGeom prst="line">
-              <a:avLst/>
-            </a:prstGeom>
-            <a:ln w="38100">
-              <a:solidFill>
-                <a:schemeClr val="accent1"/>
-              </a:solidFill>
-            </a:ln>
-          </p:spPr>
-          <p:style>
-            <a:lnRef idx="1">
+          <a:prstGeom prst="line">
+            <a:avLst/>
+          </a:prstGeom>
+          <a:ln w="38100">
+            <a:solidFill>
               <a:schemeClr val="accent1"/>
-            </a:lnRef>
-            <a:fillRef idx="0">
-              <a:schemeClr val="accent1"/>
-            </a:fillRef>
-            <a:effectRef idx="0">
-              <a:schemeClr val="accent1"/>
-            </a:effectRef>
-            <a:fontRef idx="minor">
-              <a:schemeClr val="tx1"/>
-            </a:fontRef>
-          </p:style>
-        </p:cxnSp>
-        <p:grpSp>
-          <p:nvGrpSpPr>
-            <p:cNvPr id="68" name="Group 67">
-              <a:extLst>
-                <a:ext uri="{FF2B5EF4-FFF2-40B4-BE49-F238E27FC236}">
-                  <a16:creationId xmlns:a16="http://schemas.microsoft.com/office/drawing/2014/main" id="{FC9C2663-FBA1-F40D-3C1F-29EA73128DEC}"/>
-                </a:ext>
-              </a:extLst>
-            </p:cNvPr>
-            <p:cNvGrpSpPr/>
-            <p:nvPr/>
-          </p:nvGrpSpPr>
-          <p:grpSpPr>
-            <a:xfrm>
-              <a:off x="5839573" y="3421034"/>
-              <a:ext cx="512854" cy="410776"/>
-              <a:chOff x="3610045" y="3464345"/>
-              <a:chExt cx="693435" cy="420634"/>
-            </a:xfrm>
-          </p:grpSpPr>
-          <p:sp>
-            <p:nvSpPr>
-              <p:cNvPr id="69" name="Isosceles Triangle 68">
-                <a:extLst>
-                  <a:ext uri="{FF2B5EF4-FFF2-40B4-BE49-F238E27FC236}">
-                    <a16:creationId xmlns:a16="http://schemas.microsoft.com/office/drawing/2014/main" id="{45501B5A-7120-8FEB-171D-C43148A881EF}"/>
-                  </a:ext>
-                </a:extLst>
-              </p:cNvPr>
-              <p:cNvSpPr/>
-              <p:nvPr/>
-            </p:nvSpPr>
-            <p:spPr>
-              <a:xfrm>
-                <a:off x="3610045" y="3464345"/>
-                <a:ext cx="653139" cy="420634"/>
-              </a:xfrm>
-              <a:prstGeom prst="triangle">
-                <a:avLst/>
-              </a:prstGeom>
-              <a:ln>
-                <a:solidFill>
-                  <a:schemeClr val="accent1"/>
-                </a:solidFill>
-              </a:ln>
-            </p:spPr>
-            <p:style>
-              <a:lnRef idx="2">
-                <a:schemeClr val="accent1">
-                  <a:shade val="50000"/>
-                </a:schemeClr>
-              </a:lnRef>
-              <a:fillRef idx="1">
-                <a:schemeClr val="accent1"/>
-              </a:fillRef>
-              <a:effectRef idx="0">
-                <a:schemeClr val="accent1"/>
-              </a:effectRef>
-              <a:fontRef idx="minor">
-                <a:schemeClr val="lt1"/>
-              </a:fontRef>
-            </p:style>
-            <p:txBody>
-              <a:bodyPr rtlCol="0" anchor="ctr"/>
-              <a:lstStyle/>
-              <a:p>
-                <a:pPr algn="ctr"/>
-                <a:endParaRPr lang="en-IN"/>
-              </a:p>
-            </p:txBody>
-          </p:sp>
-          <p:cxnSp>
-            <p:nvCxnSpPr>
-              <p:cNvPr id="70" name="Straight Connector 69">
-                <a:extLst>
-                  <a:ext uri="{FF2B5EF4-FFF2-40B4-BE49-F238E27FC236}">
-                    <a16:creationId xmlns:a16="http://schemas.microsoft.com/office/drawing/2014/main" id="{86434388-F9EF-4ECA-8F7C-AB90D63995DB}"/>
-                  </a:ext>
-                </a:extLst>
-              </p:cNvPr>
-              <p:cNvCxnSpPr>
-                <a:cxnSpLocks/>
-              </p:cNvCxnSpPr>
-              <p:nvPr/>
-            </p:nvCxnSpPr>
-            <p:spPr>
-              <a:xfrm>
-                <a:off x="3610045" y="3491609"/>
-                <a:ext cx="693435" cy="0"/>
-              </a:xfrm>
-              <a:prstGeom prst="line">
-                <a:avLst/>
-              </a:prstGeom>
-              <a:ln w="57150">
-                <a:solidFill>
-                  <a:schemeClr val="accent1"/>
-                </a:solidFill>
-              </a:ln>
-            </p:spPr>
-            <p:style>
-              <a:lnRef idx="1">
-                <a:schemeClr val="accent1"/>
-              </a:lnRef>
-              <a:fillRef idx="0">
-                <a:schemeClr val="accent1"/>
-              </a:fillRef>
-              <a:effectRef idx="0">
-                <a:schemeClr val="accent1"/>
-              </a:effectRef>
-              <a:fontRef idx="minor">
-                <a:schemeClr val="tx1"/>
-              </a:fontRef>
-            </p:style>
-          </p:cxnSp>
-        </p:grpSp>
-        <p:cxnSp>
-          <p:nvCxnSpPr>
-            <p:cNvPr id="83" name="Straight Connector 82">
-              <a:extLst>
-                <a:ext uri="{FF2B5EF4-FFF2-40B4-BE49-F238E27FC236}">
-                  <a16:creationId xmlns:a16="http://schemas.microsoft.com/office/drawing/2014/main" id="{B65A9E9C-3F8C-C31E-C730-8DA1EE6FF773}"/>
-                </a:ext>
-              </a:extLst>
-            </p:cNvPr>
-            <p:cNvCxnSpPr>
-              <a:cxnSpLocks/>
-            </p:cNvCxnSpPr>
-            <p:nvPr/>
-          </p:nvCxnSpPr>
-          <p:spPr>
-            <a:xfrm flipV="1">
-              <a:off x="6107900" y="3226933"/>
-              <a:ext cx="214725" cy="207413"/>
-            </a:xfrm>
-            <a:prstGeom prst="line">
-              <a:avLst/>
-            </a:prstGeom>
-            <a:ln w="38100">
-              <a:solidFill>
-                <a:schemeClr val="accent1"/>
-              </a:solidFill>
-            </a:ln>
-          </p:spPr>
-          <p:style>
-            <a:lnRef idx="1">
-              <a:schemeClr val="accent1"/>
-            </a:lnRef>
-            <a:fillRef idx="0">
-              <a:schemeClr val="accent1"/>
-            </a:fillRef>
-            <a:effectRef idx="0">
-              <a:schemeClr val="accent1"/>
-            </a:effectRef>
-            <a:fontRef idx="minor">
-              <a:schemeClr val="tx1"/>
-            </a:fontRef>
-          </p:style>
-        </p:cxnSp>
-        <p:sp>
-          <p:nvSpPr>
-            <p:cNvPr id="87" name="Oval 86">
-              <a:extLst>
-                <a:ext uri="{FF2B5EF4-FFF2-40B4-BE49-F238E27FC236}">
-                  <a16:creationId xmlns:a16="http://schemas.microsoft.com/office/drawing/2014/main" id="{F6D6AA49-E008-FF5B-63F9-98505A71EECC}"/>
-                </a:ext>
-              </a:extLst>
-            </p:cNvPr>
-            <p:cNvSpPr/>
-            <p:nvPr/>
-          </p:nvSpPr>
-          <p:spPr>
-            <a:xfrm>
-              <a:off x="6294155" y="3196637"/>
-              <a:ext cx="85562" cy="70962"/>
-            </a:xfrm>
-            <a:prstGeom prst="ellipse">
-              <a:avLst/>
-            </a:prstGeom>
-            <a:ln>
-              <a:solidFill>
-                <a:schemeClr val="accent1"/>
-              </a:solidFill>
-            </a:ln>
-          </p:spPr>
-          <p:style>
-            <a:lnRef idx="2">
-              <a:schemeClr val="accent1">
-                <a:shade val="50000"/>
-              </a:schemeClr>
-            </a:lnRef>
-            <a:fillRef idx="1">
-              <a:schemeClr val="accent1"/>
-            </a:fillRef>
-            <a:effectRef idx="0">
-              <a:schemeClr val="accent1"/>
-            </a:effectRef>
-            <a:fontRef idx="minor">
-              <a:schemeClr val="lt1"/>
-            </a:fontRef>
-          </p:style>
-          <p:txBody>
-            <a:bodyPr rtlCol="0" anchor="ctr"/>
-            <a:lstStyle/>
-            <a:p>
-              <a:pPr algn="ctr"/>
-              <a:endParaRPr lang="en-IN"/>
-            </a:p>
-          </p:txBody>
-        </p:sp>
-      </p:grpSp>
-      <p:grpSp>
-        <p:nvGrpSpPr>
-          <p:cNvPr id="4" name="Group 3">
-            <a:extLst>
-              <a:ext uri="{FF2B5EF4-FFF2-40B4-BE49-F238E27FC236}">
-                <a16:creationId xmlns:a16="http://schemas.microsoft.com/office/drawing/2014/main" id="{4FFB1692-5BD1-6CBB-C846-5E433A65A0B1}"/>
-              </a:ext>
-            </a:extLst>
-          </p:cNvPr>
-          <p:cNvGrpSpPr/>
-          <p:nvPr/>
-        </p:nvGrpSpPr>
-        <p:grpSpPr>
-          <a:xfrm>
-            <a:off x="7918605" y="2707362"/>
-            <a:ext cx="439795" cy="2180612"/>
-            <a:chOff x="7918605" y="2707362"/>
-            <a:chExt cx="439795" cy="2180612"/>
-          </a:xfrm>
-        </p:grpSpPr>
-        <p:grpSp>
-          <p:nvGrpSpPr>
-            <p:cNvPr id="184" name="Group 183">
-              <a:extLst>
-                <a:ext uri="{FF2B5EF4-FFF2-40B4-BE49-F238E27FC236}">
-                  <a16:creationId xmlns:a16="http://schemas.microsoft.com/office/drawing/2014/main" id="{B47AEAF3-3714-2FF8-3919-A63320181064}"/>
-                </a:ext>
-              </a:extLst>
-            </p:cNvPr>
-            <p:cNvGrpSpPr/>
-            <p:nvPr/>
-          </p:nvGrpSpPr>
-          <p:grpSpPr>
-            <a:xfrm rot="16200000">
-              <a:off x="7615874" y="3638920"/>
-              <a:ext cx="1045257" cy="439795"/>
-              <a:chOff x="2905113" y="3027281"/>
-              <a:chExt cx="1489971" cy="494935"/>
-            </a:xfrm>
-          </p:grpSpPr>
-          <p:cxnSp>
-            <p:nvCxnSpPr>
-              <p:cNvPr id="188" name="Straight Connector 187">
-                <a:extLst>
-                  <a:ext uri="{FF2B5EF4-FFF2-40B4-BE49-F238E27FC236}">
-                    <a16:creationId xmlns:a16="http://schemas.microsoft.com/office/drawing/2014/main" id="{9F70DDE8-056C-4C79-3550-6FFB892BEDAA}"/>
-                  </a:ext>
-                </a:extLst>
-              </p:cNvPr>
-              <p:cNvCxnSpPr>
-                <a:cxnSpLocks/>
-              </p:cNvCxnSpPr>
-              <p:nvPr/>
-            </p:nvCxnSpPr>
-            <p:spPr>
-              <a:xfrm rot="5400000" flipH="1" flipV="1">
-                <a:off x="2786718" y="3145681"/>
-                <a:ext cx="394474" cy="157683"/>
-              </a:xfrm>
-              <a:prstGeom prst="line">
-                <a:avLst/>
-              </a:prstGeom>
-              <a:ln w="38100">
-                <a:solidFill>
-                  <a:srgbClr val="0070C0"/>
-                </a:solidFill>
-              </a:ln>
-            </p:spPr>
-            <p:style>
-              <a:lnRef idx="1">
-                <a:schemeClr val="accent1"/>
-              </a:lnRef>
-              <a:fillRef idx="0">
-                <a:schemeClr val="accent1"/>
-              </a:fillRef>
-              <a:effectRef idx="0">
-                <a:schemeClr val="accent1"/>
-              </a:effectRef>
-              <a:fontRef idx="minor">
-                <a:schemeClr val="tx1"/>
-              </a:fontRef>
-            </p:style>
-          </p:cxnSp>
-          <p:grpSp>
-            <p:nvGrpSpPr>
-              <p:cNvPr id="189" name="Group 188">
-                <a:extLst>
-                  <a:ext uri="{FF2B5EF4-FFF2-40B4-BE49-F238E27FC236}">
-                    <a16:creationId xmlns:a16="http://schemas.microsoft.com/office/drawing/2014/main" id="{9FB16B94-B2E4-1D5D-F26A-CAE10A77ABA3}"/>
-                  </a:ext>
-                </a:extLst>
-              </p:cNvPr>
-              <p:cNvGrpSpPr/>
-              <p:nvPr/>
-            </p:nvGrpSpPr>
-            <p:grpSpPr>
-              <a:xfrm>
-                <a:off x="3062796" y="3038382"/>
-                <a:ext cx="301842" cy="483834"/>
-                <a:chOff x="3062796" y="3027285"/>
-                <a:chExt cx="301842" cy="483834"/>
-              </a:xfrm>
-            </p:grpSpPr>
-            <p:cxnSp>
-              <p:nvCxnSpPr>
-                <p:cNvPr id="206" name="Straight Connector 205">
-                  <a:extLst>
-                    <a:ext uri="{FF2B5EF4-FFF2-40B4-BE49-F238E27FC236}">
-                      <a16:creationId xmlns:a16="http://schemas.microsoft.com/office/drawing/2014/main" id="{722908EA-81F1-AA1D-DBCE-87111E9F0421}"/>
-                    </a:ext>
-                  </a:extLst>
-                </p:cNvPr>
-                <p:cNvCxnSpPr>
-                  <a:cxnSpLocks/>
-                </p:cNvCxnSpPr>
-                <p:nvPr/>
-              </p:nvCxnSpPr>
-              <p:spPr>
-                <a:xfrm flipH="1" flipV="1">
-                  <a:off x="3062796" y="3027285"/>
-                  <a:ext cx="150921" cy="483834"/>
-                </a:xfrm>
-                <a:prstGeom prst="line">
-                  <a:avLst/>
-                </a:prstGeom>
-                <a:ln w="38100">
-                  <a:solidFill>
-                    <a:srgbClr val="0070C0"/>
-                  </a:solidFill>
-                </a:ln>
-              </p:spPr>
-              <p:style>
-                <a:lnRef idx="1">
-                  <a:schemeClr val="accent1"/>
-                </a:lnRef>
-                <a:fillRef idx="0">
-                  <a:schemeClr val="accent1"/>
-                </a:fillRef>
-                <a:effectRef idx="0">
-                  <a:schemeClr val="accent1"/>
-                </a:effectRef>
-                <a:fontRef idx="minor">
-                  <a:schemeClr val="tx1"/>
-                </a:fontRef>
-              </p:style>
-            </p:cxnSp>
-            <p:cxnSp>
-              <p:nvCxnSpPr>
-                <p:cNvPr id="207" name="Straight Connector 206">
-                  <a:extLst>
-                    <a:ext uri="{FF2B5EF4-FFF2-40B4-BE49-F238E27FC236}">
-                      <a16:creationId xmlns:a16="http://schemas.microsoft.com/office/drawing/2014/main" id="{FA4378CD-475D-516C-06A6-B763E5BEB3AC}"/>
-                    </a:ext>
-                  </a:extLst>
-                </p:cNvPr>
-                <p:cNvCxnSpPr>
-                  <a:cxnSpLocks/>
-                </p:cNvCxnSpPr>
-                <p:nvPr/>
-              </p:nvCxnSpPr>
-              <p:spPr>
-                <a:xfrm flipV="1">
-                  <a:off x="3213717" y="3027285"/>
-                  <a:ext cx="150921" cy="483834"/>
-                </a:xfrm>
-                <a:prstGeom prst="line">
-                  <a:avLst/>
-                </a:prstGeom>
-                <a:ln w="38100">
-                  <a:solidFill>
-                    <a:srgbClr val="0070C0"/>
-                  </a:solidFill>
-                </a:ln>
-              </p:spPr>
-              <p:style>
-                <a:lnRef idx="1">
-                  <a:schemeClr val="accent1"/>
-                </a:lnRef>
-                <a:fillRef idx="0">
-                  <a:schemeClr val="accent1"/>
-                </a:fillRef>
-                <a:effectRef idx="0">
-                  <a:schemeClr val="accent1"/>
-                </a:effectRef>
-                <a:fontRef idx="minor">
-                  <a:schemeClr val="tx1"/>
-                </a:fontRef>
-              </p:style>
-            </p:cxnSp>
-          </p:grpSp>
-          <p:grpSp>
-            <p:nvGrpSpPr>
-              <p:cNvPr id="190" name="Group 189">
-                <a:extLst>
-                  <a:ext uri="{FF2B5EF4-FFF2-40B4-BE49-F238E27FC236}">
-                    <a16:creationId xmlns:a16="http://schemas.microsoft.com/office/drawing/2014/main" id="{B5427AC1-3C72-195C-4E35-F86EAE47779A}"/>
-                  </a:ext>
-                </a:extLst>
-              </p:cNvPr>
-              <p:cNvGrpSpPr/>
-              <p:nvPr/>
-            </p:nvGrpSpPr>
-            <p:grpSpPr>
-              <a:xfrm>
-                <a:off x="3366118" y="3027281"/>
-                <a:ext cx="301842" cy="483838"/>
-                <a:chOff x="3062796" y="3027281"/>
-                <a:chExt cx="301842" cy="483838"/>
-              </a:xfrm>
-            </p:grpSpPr>
-            <p:cxnSp>
-              <p:nvCxnSpPr>
-                <p:cNvPr id="202" name="Straight Connector 201">
-                  <a:extLst>
-                    <a:ext uri="{FF2B5EF4-FFF2-40B4-BE49-F238E27FC236}">
-                      <a16:creationId xmlns:a16="http://schemas.microsoft.com/office/drawing/2014/main" id="{4A8D13F2-7675-9508-28DF-D687D3BDE5A8}"/>
-                    </a:ext>
-                  </a:extLst>
-                </p:cNvPr>
-                <p:cNvCxnSpPr>
-                  <a:cxnSpLocks/>
-                </p:cNvCxnSpPr>
-                <p:nvPr/>
-              </p:nvCxnSpPr>
-              <p:spPr>
-                <a:xfrm flipH="1" flipV="1">
-                  <a:off x="3062796" y="3027281"/>
-                  <a:ext cx="150922" cy="483834"/>
-                </a:xfrm>
-                <a:prstGeom prst="line">
-                  <a:avLst/>
-                </a:prstGeom>
-                <a:ln w="38100">
-                  <a:solidFill>
-                    <a:srgbClr val="0070C0"/>
-                  </a:solidFill>
-                </a:ln>
-              </p:spPr>
-              <p:style>
-                <a:lnRef idx="1">
-                  <a:schemeClr val="accent1"/>
-                </a:lnRef>
-                <a:fillRef idx="0">
-                  <a:schemeClr val="accent1"/>
-                </a:fillRef>
-                <a:effectRef idx="0">
-                  <a:schemeClr val="accent1"/>
-                </a:effectRef>
-                <a:fontRef idx="minor">
-                  <a:schemeClr val="tx1"/>
-                </a:fontRef>
-              </p:style>
-            </p:cxnSp>
-            <p:cxnSp>
-              <p:nvCxnSpPr>
-                <p:cNvPr id="205" name="Straight Connector 204">
-                  <a:extLst>
-                    <a:ext uri="{FF2B5EF4-FFF2-40B4-BE49-F238E27FC236}">
-                      <a16:creationId xmlns:a16="http://schemas.microsoft.com/office/drawing/2014/main" id="{0E7C1EDA-4C94-895A-C84C-E71EA5AED9F7}"/>
-                    </a:ext>
-                  </a:extLst>
-                </p:cNvPr>
-                <p:cNvCxnSpPr>
-                  <a:cxnSpLocks/>
-                </p:cNvCxnSpPr>
-                <p:nvPr/>
-              </p:nvCxnSpPr>
-              <p:spPr>
-                <a:xfrm flipV="1">
-                  <a:off x="3213717" y="3027285"/>
-                  <a:ext cx="150921" cy="483834"/>
-                </a:xfrm>
-                <a:prstGeom prst="line">
-                  <a:avLst/>
-                </a:prstGeom>
-                <a:ln w="38100">
-                  <a:solidFill>
-                    <a:srgbClr val="0070C0"/>
-                  </a:solidFill>
-                </a:ln>
-              </p:spPr>
-              <p:style>
-                <a:lnRef idx="1">
-                  <a:schemeClr val="accent1"/>
-                </a:lnRef>
-                <a:fillRef idx="0">
-                  <a:schemeClr val="accent1"/>
-                </a:fillRef>
-                <a:effectRef idx="0">
-                  <a:schemeClr val="accent1"/>
-                </a:effectRef>
-                <a:fontRef idx="minor">
-                  <a:schemeClr val="tx1"/>
-                </a:fontRef>
-              </p:style>
-            </p:cxnSp>
-          </p:grpSp>
-          <p:grpSp>
-            <p:nvGrpSpPr>
-              <p:cNvPr id="191" name="Group 190">
-                <a:extLst>
-                  <a:ext uri="{FF2B5EF4-FFF2-40B4-BE49-F238E27FC236}">
-                    <a16:creationId xmlns:a16="http://schemas.microsoft.com/office/drawing/2014/main" id="{77F13BE4-36F5-6A8A-E274-493E2EB6F350}"/>
-                  </a:ext>
-                </a:extLst>
-              </p:cNvPr>
-              <p:cNvGrpSpPr/>
-              <p:nvPr/>
-            </p:nvGrpSpPr>
-            <p:grpSpPr>
-              <a:xfrm>
-                <a:off x="3971282" y="3038381"/>
-                <a:ext cx="301843" cy="483835"/>
-                <a:chOff x="3062796" y="3027284"/>
-                <a:chExt cx="301843" cy="483835"/>
-              </a:xfrm>
-            </p:grpSpPr>
-            <p:cxnSp>
-              <p:nvCxnSpPr>
-                <p:cNvPr id="200" name="Straight Connector 199">
-                  <a:extLst>
-                    <a:ext uri="{FF2B5EF4-FFF2-40B4-BE49-F238E27FC236}">
-                      <a16:creationId xmlns:a16="http://schemas.microsoft.com/office/drawing/2014/main" id="{AFCCE1BC-86A0-56DA-1AA3-44144CAC3F58}"/>
-                    </a:ext>
-                  </a:extLst>
-                </p:cNvPr>
-                <p:cNvCxnSpPr>
-                  <a:cxnSpLocks/>
-                </p:cNvCxnSpPr>
-                <p:nvPr/>
-              </p:nvCxnSpPr>
-              <p:spPr>
-                <a:xfrm flipH="1" flipV="1">
-                  <a:off x="3062796" y="3027285"/>
-                  <a:ext cx="150921" cy="483834"/>
-                </a:xfrm>
-                <a:prstGeom prst="line">
-                  <a:avLst/>
-                </a:prstGeom>
-                <a:ln w="38100">
-                  <a:solidFill>
-                    <a:srgbClr val="0070C0"/>
-                  </a:solidFill>
-                </a:ln>
-              </p:spPr>
-              <p:style>
-                <a:lnRef idx="1">
-                  <a:schemeClr val="accent1"/>
-                </a:lnRef>
-                <a:fillRef idx="0">
-                  <a:schemeClr val="accent1"/>
-                </a:fillRef>
-                <a:effectRef idx="0">
-                  <a:schemeClr val="accent1"/>
-                </a:effectRef>
-                <a:fontRef idx="minor">
-                  <a:schemeClr val="tx1"/>
-                </a:fontRef>
-              </p:style>
-            </p:cxnSp>
-            <p:cxnSp>
-              <p:nvCxnSpPr>
-                <p:cNvPr id="201" name="Straight Connector 200">
-                  <a:extLst>
-                    <a:ext uri="{FF2B5EF4-FFF2-40B4-BE49-F238E27FC236}">
-                      <a16:creationId xmlns:a16="http://schemas.microsoft.com/office/drawing/2014/main" id="{86ABF26B-ED31-B578-E369-BD4D1D5D522E}"/>
-                    </a:ext>
-                  </a:extLst>
-                </p:cNvPr>
-                <p:cNvCxnSpPr>
-                  <a:cxnSpLocks/>
-                </p:cNvCxnSpPr>
-                <p:nvPr/>
-              </p:nvCxnSpPr>
-              <p:spPr>
-                <a:xfrm flipV="1">
-                  <a:off x="3213719" y="3027284"/>
-                  <a:ext cx="150920" cy="483834"/>
-                </a:xfrm>
-                <a:prstGeom prst="line">
-                  <a:avLst/>
-                </a:prstGeom>
-                <a:ln w="38100">
-                  <a:solidFill>
-                    <a:srgbClr val="0070C0"/>
-                  </a:solidFill>
-                </a:ln>
-              </p:spPr>
-              <p:style>
-                <a:lnRef idx="1">
-                  <a:schemeClr val="accent1"/>
-                </a:lnRef>
-                <a:fillRef idx="0">
-                  <a:schemeClr val="accent1"/>
-                </a:fillRef>
-                <a:effectRef idx="0">
-                  <a:schemeClr val="accent1"/>
-                </a:effectRef>
-                <a:fontRef idx="minor">
-                  <a:schemeClr val="tx1"/>
-                </a:fontRef>
-              </p:style>
-            </p:cxnSp>
-          </p:grpSp>
-          <p:grpSp>
-            <p:nvGrpSpPr>
-              <p:cNvPr id="194" name="Group 193">
-                <a:extLst>
-                  <a:ext uri="{FF2B5EF4-FFF2-40B4-BE49-F238E27FC236}">
-                    <a16:creationId xmlns:a16="http://schemas.microsoft.com/office/drawing/2014/main" id="{045D130E-AF12-FF49-69F8-E6C8528F566A}"/>
-                  </a:ext>
-                </a:extLst>
-              </p:cNvPr>
-              <p:cNvGrpSpPr/>
-              <p:nvPr/>
-            </p:nvGrpSpPr>
-            <p:grpSpPr>
-              <a:xfrm>
-                <a:off x="3667960" y="3038382"/>
-                <a:ext cx="301842" cy="483834"/>
-                <a:chOff x="3062796" y="3027285"/>
-                <a:chExt cx="301842" cy="483834"/>
-              </a:xfrm>
-            </p:grpSpPr>
-            <p:cxnSp>
-              <p:nvCxnSpPr>
-                <p:cNvPr id="197" name="Straight Connector 196">
-                  <a:extLst>
-                    <a:ext uri="{FF2B5EF4-FFF2-40B4-BE49-F238E27FC236}">
-                      <a16:creationId xmlns:a16="http://schemas.microsoft.com/office/drawing/2014/main" id="{F2F55F28-B3E3-4D60-C23B-D6CB785CE72D}"/>
-                    </a:ext>
-                  </a:extLst>
-                </p:cNvPr>
-                <p:cNvCxnSpPr>
-                  <a:cxnSpLocks/>
-                </p:cNvCxnSpPr>
-                <p:nvPr/>
-              </p:nvCxnSpPr>
-              <p:spPr>
-                <a:xfrm flipH="1" flipV="1">
-                  <a:off x="3062796" y="3027285"/>
-                  <a:ext cx="150921" cy="483834"/>
-                </a:xfrm>
-                <a:prstGeom prst="line">
-                  <a:avLst/>
-                </a:prstGeom>
-                <a:ln w="38100">
-                  <a:solidFill>
-                    <a:srgbClr val="0070C0"/>
-                  </a:solidFill>
-                </a:ln>
-              </p:spPr>
-              <p:style>
-                <a:lnRef idx="1">
-                  <a:schemeClr val="accent1"/>
-                </a:lnRef>
-                <a:fillRef idx="0">
-                  <a:schemeClr val="accent1"/>
-                </a:fillRef>
-                <a:effectRef idx="0">
-                  <a:schemeClr val="accent1"/>
-                </a:effectRef>
-                <a:fontRef idx="minor">
-                  <a:schemeClr val="tx1"/>
-                </a:fontRef>
-              </p:style>
-            </p:cxnSp>
-            <p:cxnSp>
-              <p:nvCxnSpPr>
-                <p:cNvPr id="199" name="Straight Connector 198">
-                  <a:extLst>
-                    <a:ext uri="{FF2B5EF4-FFF2-40B4-BE49-F238E27FC236}">
-                      <a16:creationId xmlns:a16="http://schemas.microsoft.com/office/drawing/2014/main" id="{8B3BD9E0-2D85-AAF9-A62A-B13D80F13117}"/>
-                    </a:ext>
-                  </a:extLst>
-                </p:cNvPr>
-                <p:cNvCxnSpPr>
-                  <a:cxnSpLocks/>
-                </p:cNvCxnSpPr>
-                <p:nvPr/>
-              </p:nvCxnSpPr>
-              <p:spPr>
-                <a:xfrm flipV="1">
-                  <a:off x="3213717" y="3027285"/>
-                  <a:ext cx="150921" cy="483834"/>
-                </a:xfrm>
-                <a:prstGeom prst="line">
-                  <a:avLst/>
-                </a:prstGeom>
-                <a:ln w="38100">
-                  <a:solidFill>
-                    <a:srgbClr val="0070C0"/>
-                  </a:solidFill>
-                </a:ln>
-              </p:spPr>
-              <p:style>
-                <a:lnRef idx="1">
-                  <a:schemeClr val="accent1"/>
-                </a:lnRef>
-                <a:fillRef idx="0">
-                  <a:schemeClr val="accent1"/>
-                </a:fillRef>
-                <a:effectRef idx="0">
-                  <a:schemeClr val="accent1"/>
-                </a:effectRef>
-                <a:fontRef idx="minor">
-                  <a:schemeClr val="tx1"/>
-                </a:fontRef>
-              </p:style>
-            </p:cxnSp>
-          </p:grpSp>
-          <p:cxnSp>
-            <p:nvCxnSpPr>
-              <p:cNvPr id="195" name="Straight Connector 194">
-                <a:extLst>
-                  <a:ext uri="{FF2B5EF4-FFF2-40B4-BE49-F238E27FC236}">
-                    <a16:creationId xmlns:a16="http://schemas.microsoft.com/office/drawing/2014/main" id="{F933B2E3-36E0-0659-F773-33570C6F241F}"/>
-                  </a:ext>
-                </a:extLst>
-              </p:cNvPr>
-              <p:cNvCxnSpPr>
-                <a:cxnSpLocks/>
-              </p:cNvCxnSpPr>
-              <p:nvPr/>
-            </p:nvCxnSpPr>
-            <p:spPr>
-              <a:xfrm rot="5400000" flipH="1">
-                <a:off x="4136867" y="3163543"/>
-                <a:ext cx="394475" cy="121959"/>
-              </a:xfrm>
-              <a:prstGeom prst="line">
-                <a:avLst/>
-              </a:prstGeom>
-              <a:ln w="38100">
-                <a:solidFill>
-                  <a:srgbClr val="0070C0"/>
-                </a:solidFill>
-              </a:ln>
-            </p:spPr>
-            <p:style>
-              <a:lnRef idx="1">
-                <a:schemeClr val="accent1"/>
-              </a:lnRef>
-              <a:fillRef idx="0">
-                <a:schemeClr val="accent1"/>
-              </a:fillRef>
-              <a:effectRef idx="0">
-                <a:schemeClr val="accent1"/>
-              </a:effectRef>
-              <a:fontRef idx="minor">
-                <a:schemeClr val="tx1"/>
-              </a:fontRef>
-            </p:style>
-          </p:cxnSp>
-        </p:grpSp>
-        <p:cxnSp>
-          <p:nvCxnSpPr>
-            <p:cNvPr id="185" name="Straight Connector 184">
-              <a:extLst>
-                <a:ext uri="{FF2B5EF4-FFF2-40B4-BE49-F238E27FC236}">
-                  <a16:creationId xmlns:a16="http://schemas.microsoft.com/office/drawing/2014/main" id="{3D9A62DF-FA2C-633B-2BCC-D3E4635D2EE0}"/>
-                </a:ext>
-              </a:extLst>
-            </p:cNvPr>
-            <p:cNvCxnSpPr>
-              <a:cxnSpLocks/>
-            </p:cNvCxnSpPr>
-            <p:nvPr/>
-          </p:nvCxnSpPr>
-          <p:spPr>
-            <a:xfrm>
-              <a:off x="8259196" y="2707362"/>
-              <a:ext cx="9938" cy="628827"/>
-            </a:xfrm>
-            <a:prstGeom prst="line">
-              <a:avLst/>
-            </a:prstGeom>
-            <a:ln w="38100">
-              <a:solidFill>
-                <a:srgbClr val="0070C0"/>
-              </a:solidFill>
-            </a:ln>
-          </p:spPr>
-          <p:style>
-            <a:lnRef idx="1">
-              <a:schemeClr val="accent1"/>
-            </a:lnRef>
-            <a:fillRef idx="0">
-              <a:schemeClr val="accent1"/>
-            </a:fillRef>
-            <a:effectRef idx="0">
-              <a:schemeClr val="accent1"/>
-            </a:effectRef>
-            <a:fontRef idx="minor">
-              <a:schemeClr val="tx1"/>
-            </a:fontRef>
-          </p:style>
-        </p:cxnSp>
-        <p:cxnSp>
-          <p:nvCxnSpPr>
-            <p:cNvPr id="187" name="Straight Connector 186">
-              <a:extLst>
-                <a:ext uri="{FF2B5EF4-FFF2-40B4-BE49-F238E27FC236}">
-                  <a16:creationId xmlns:a16="http://schemas.microsoft.com/office/drawing/2014/main" id="{C1BAEB0A-2F8E-BFC8-A9F3-C5E92281BD5B}"/>
-                </a:ext>
-              </a:extLst>
-            </p:cNvPr>
-            <p:cNvCxnSpPr>
-              <a:cxnSpLocks/>
-            </p:cNvCxnSpPr>
-            <p:nvPr/>
-          </p:nvCxnSpPr>
-          <p:spPr>
-            <a:xfrm>
-              <a:off x="8259196" y="4381446"/>
-              <a:ext cx="11743" cy="506528"/>
-            </a:xfrm>
-            <a:prstGeom prst="line">
-              <a:avLst/>
-            </a:prstGeom>
-            <a:ln w="38100">
-              <a:solidFill>
-                <a:srgbClr val="0070C0"/>
-              </a:solidFill>
-            </a:ln>
-          </p:spPr>
-          <p:style>
-            <a:lnRef idx="1">
-              <a:schemeClr val="accent1"/>
-            </a:lnRef>
-            <a:fillRef idx="0">
-              <a:schemeClr val="accent1"/>
-            </a:fillRef>
-            <a:effectRef idx="0">
-              <a:schemeClr val="accent1"/>
-            </a:effectRef>
-            <a:fontRef idx="minor">
-              <a:schemeClr val="tx1"/>
-            </a:fontRef>
-          </p:style>
-        </p:cxnSp>
-      </p:grpSp>
+            </a:solidFill>
+          </a:ln>
+        </p:spPr>
+        <p:style>
+          <a:lnRef idx="1">
+            <a:schemeClr val="accent1"/>
+          </a:lnRef>
+          <a:fillRef idx="0">
+            <a:schemeClr val="accent1"/>
+          </a:fillRef>
+          <a:effectRef idx="0">
+            <a:schemeClr val="accent1"/>
+          </a:effectRef>
+          <a:fontRef idx="minor">
+            <a:schemeClr val="tx1"/>
+          </a:fontRef>
+        </p:style>
+      </p:cxnSp>
       <p:grpSp>
         <p:nvGrpSpPr>
           <p:cNvPr id="143" name="Group 142">
@@ -7206,8 +6334,8 @@
         </p:nvCxnSpPr>
         <p:spPr>
           <a:xfrm>
-            <a:off x="5971592" y="1603451"/>
-            <a:ext cx="5173417" cy="0"/>
+            <a:off x="7560940" y="1589973"/>
+            <a:ext cx="3584069" cy="13478"/>
           </a:xfrm>
           <a:prstGeom prst="line">
             <a:avLst/>
@@ -7276,12 +6404,55 @@
           </a:fontRef>
         </p:style>
       </p:cxnSp>
+      <p:cxnSp>
+        <p:nvCxnSpPr>
+          <p:cNvPr id="101" name="Straight Connector 100">
+            <a:extLst>
+              <a:ext uri="{FF2B5EF4-FFF2-40B4-BE49-F238E27FC236}">
+                <a16:creationId xmlns:a16="http://schemas.microsoft.com/office/drawing/2014/main" id="{5FFD8010-32DF-714B-4693-A5AD61E92482}"/>
+              </a:ext>
+            </a:extLst>
+          </p:cNvPr>
+          <p:cNvCxnSpPr>
+            <a:cxnSpLocks/>
+          </p:cNvCxnSpPr>
+          <p:nvPr/>
+        </p:nvCxnSpPr>
+        <p:spPr>
+          <a:xfrm rot="16200000" flipH="1" flipV="1">
+            <a:off x="5084192" y="1813895"/>
+            <a:ext cx="12104" cy="1027870"/>
+          </a:xfrm>
+          <a:prstGeom prst="line">
+            <a:avLst/>
+          </a:prstGeom>
+          <a:ln w="38100">
+            <a:solidFill>
+              <a:schemeClr val="accent1"/>
+            </a:solidFill>
+          </a:ln>
+        </p:spPr>
+        <p:style>
+          <a:lnRef idx="1">
+            <a:schemeClr val="accent1"/>
+          </a:lnRef>
+          <a:fillRef idx="0">
+            <a:schemeClr val="accent1"/>
+          </a:fillRef>
+          <a:effectRef idx="0">
+            <a:schemeClr val="accent1"/>
+          </a:effectRef>
+          <a:fontRef idx="minor">
+            <a:schemeClr val="tx1"/>
+          </a:fontRef>
+        </p:style>
+      </p:cxnSp>
       <p:grpSp>
         <p:nvGrpSpPr>
-          <p:cNvPr id="72" name="Group 71">
+          <p:cNvPr id="111" name="Group 110">
             <a:extLst>
               <a:ext uri="{FF2B5EF4-FFF2-40B4-BE49-F238E27FC236}">
-                <a16:creationId xmlns:a16="http://schemas.microsoft.com/office/drawing/2014/main" id="{BECA981F-DC4D-34C1-3838-516206E0E4D1}"/>
+                <a16:creationId xmlns:a16="http://schemas.microsoft.com/office/drawing/2014/main" id="{E1798ECB-C1E7-A153-9B6B-838C1F6F3D88}"/>
               </a:ext>
             </a:extLst>
           </p:cNvPr>
@@ -7289,220 +6460,19 @@
           <p:nvPr/>
         </p:nvGrpSpPr>
         <p:grpSpPr>
-          <a:xfrm>
-            <a:off x="4576309" y="2069525"/>
-            <a:ext cx="1027870" cy="548188"/>
-            <a:chOff x="4576309" y="2069525"/>
-            <a:chExt cx="1027870" cy="548188"/>
+          <a:xfrm rot="16200000" flipH="1">
+            <a:off x="4890372" y="2120564"/>
+            <a:ext cx="512854" cy="410776"/>
+            <a:chOff x="3610045" y="3464345"/>
+            <a:chExt cx="693435" cy="420634"/>
           </a:xfrm>
         </p:grpSpPr>
-        <p:cxnSp>
-          <p:nvCxnSpPr>
-            <p:cNvPr id="101" name="Straight Connector 100">
+        <p:sp>
+          <p:nvSpPr>
+            <p:cNvPr id="146" name="Isosceles Triangle 145">
               <a:extLst>
                 <a:ext uri="{FF2B5EF4-FFF2-40B4-BE49-F238E27FC236}">
-                  <a16:creationId xmlns:a16="http://schemas.microsoft.com/office/drawing/2014/main" id="{5FFD8010-32DF-714B-4693-A5AD61E92482}"/>
-                </a:ext>
-              </a:extLst>
-            </p:cNvPr>
-            <p:cNvCxnSpPr>
-              <a:cxnSpLocks/>
-            </p:cNvCxnSpPr>
-            <p:nvPr/>
-          </p:nvCxnSpPr>
-          <p:spPr>
-            <a:xfrm rot="16200000" flipH="1" flipV="1">
-              <a:off x="5084192" y="1813895"/>
-              <a:ext cx="12104" cy="1027870"/>
-            </a:xfrm>
-            <a:prstGeom prst="line">
-              <a:avLst/>
-            </a:prstGeom>
-            <a:ln w="38100">
-              <a:solidFill>
-                <a:schemeClr val="accent1"/>
-              </a:solidFill>
-            </a:ln>
-          </p:spPr>
-          <p:style>
-            <a:lnRef idx="1">
-              <a:schemeClr val="accent1"/>
-            </a:lnRef>
-            <a:fillRef idx="0">
-              <a:schemeClr val="accent1"/>
-            </a:fillRef>
-            <a:effectRef idx="0">
-              <a:schemeClr val="accent1"/>
-            </a:effectRef>
-            <a:fontRef idx="minor">
-              <a:schemeClr val="tx1"/>
-            </a:fontRef>
-          </p:style>
-        </p:cxnSp>
-        <p:grpSp>
-          <p:nvGrpSpPr>
-            <p:cNvPr id="111" name="Group 110">
-              <a:extLst>
-                <a:ext uri="{FF2B5EF4-FFF2-40B4-BE49-F238E27FC236}">
-                  <a16:creationId xmlns:a16="http://schemas.microsoft.com/office/drawing/2014/main" id="{E1798ECB-C1E7-A153-9B6B-838C1F6F3D88}"/>
-                </a:ext>
-              </a:extLst>
-            </p:cNvPr>
-            <p:cNvGrpSpPr/>
-            <p:nvPr/>
-          </p:nvGrpSpPr>
-          <p:grpSpPr>
-            <a:xfrm rot="16200000" flipH="1">
-              <a:off x="4890372" y="2120564"/>
-              <a:ext cx="512854" cy="410776"/>
-              <a:chOff x="3610045" y="3464345"/>
-              <a:chExt cx="693435" cy="420634"/>
-            </a:xfrm>
-          </p:grpSpPr>
-          <p:sp>
-            <p:nvSpPr>
-              <p:cNvPr id="146" name="Isosceles Triangle 145">
-                <a:extLst>
-                  <a:ext uri="{FF2B5EF4-FFF2-40B4-BE49-F238E27FC236}">
-                    <a16:creationId xmlns:a16="http://schemas.microsoft.com/office/drawing/2014/main" id="{88A46133-FAC1-5D0B-4A58-27D57BCDD261}"/>
-                  </a:ext>
-                </a:extLst>
-              </p:cNvPr>
-              <p:cNvSpPr/>
-              <p:nvPr/>
-            </p:nvSpPr>
-            <p:spPr>
-              <a:xfrm>
-                <a:off x="3610045" y="3464345"/>
-                <a:ext cx="653139" cy="420634"/>
-              </a:xfrm>
-              <a:prstGeom prst="triangle">
-                <a:avLst/>
-              </a:prstGeom>
-              <a:ln>
-                <a:solidFill>
-                  <a:schemeClr val="accent1"/>
-                </a:solidFill>
-              </a:ln>
-            </p:spPr>
-            <p:style>
-              <a:lnRef idx="2">
-                <a:schemeClr val="accent1">
-                  <a:shade val="50000"/>
-                </a:schemeClr>
-              </a:lnRef>
-              <a:fillRef idx="1">
-                <a:schemeClr val="accent1"/>
-              </a:fillRef>
-              <a:effectRef idx="0">
-                <a:schemeClr val="accent1"/>
-              </a:effectRef>
-              <a:fontRef idx="minor">
-                <a:schemeClr val="lt1"/>
-              </a:fontRef>
-            </p:style>
-            <p:txBody>
-              <a:bodyPr rtlCol="0" anchor="ctr"/>
-              <a:lstStyle/>
-              <a:p>
-                <a:pPr algn="ctr"/>
-                <a:endParaRPr lang="en-IN"/>
-              </a:p>
-            </p:txBody>
-          </p:sp>
-          <p:cxnSp>
-            <p:nvCxnSpPr>
-              <p:cNvPr id="147" name="Straight Connector 146">
-                <a:extLst>
-                  <a:ext uri="{FF2B5EF4-FFF2-40B4-BE49-F238E27FC236}">
-                    <a16:creationId xmlns:a16="http://schemas.microsoft.com/office/drawing/2014/main" id="{3A85BE9C-667C-9F90-241D-45B42A65BED2}"/>
-                  </a:ext>
-                </a:extLst>
-              </p:cNvPr>
-              <p:cNvCxnSpPr>
-                <a:cxnSpLocks/>
-              </p:cNvCxnSpPr>
-              <p:nvPr/>
-            </p:nvCxnSpPr>
-            <p:spPr>
-              <a:xfrm>
-                <a:off x="3610045" y="3491609"/>
-                <a:ext cx="693435" cy="0"/>
-              </a:xfrm>
-              <a:prstGeom prst="line">
-                <a:avLst/>
-              </a:prstGeom>
-              <a:ln w="57150">
-                <a:solidFill>
-                  <a:schemeClr val="accent1"/>
-                </a:solidFill>
-              </a:ln>
-            </p:spPr>
-            <p:style>
-              <a:lnRef idx="1">
-                <a:schemeClr val="accent1"/>
-              </a:lnRef>
-              <a:fillRef idx="0">
-                <a:schemeClr val="accent1"/>
-              </a:fillRef>
-              <a:effectRef idx="0">
-                <a:schemeClr val="accent1"/>
-              </a:effectRef>
-              <a:fontRef idx="minor">
-                <a:schemeClr val="tx1"/>
-              </a:fontRef>
-            </p:style>
-          </p:cxnSp>
-        </p:grpSp>
-        <p:cxnSp>
-          <p:nvCxnSpPr>
-            <p:cNvPr id="112" name="Straight Connector 111">
-              <a:extLst>
-                <a:ext uri="{FF2B5EF4-FFF2-40B4-BE49-F238E27FC236}">
-                  <a16:creationId xmlns:a16="http://schemas.microsoft.com/office/drawing/2014/main" id="{5B4BBEAA-DF5C-DC52-E5DB-834004A6F8CC}"/>
-                </a:ext>
-              </a:extLst>
-            </p:cNvPr>
-            <p:cNvCxnSpPr>
-              <a:cxnSpLocks/>
-            </p:cNvCxnSpPr>
-            <p:nvPr/>
-          </p:nvCxnSpPr>
-          <p:spPr>
-            <a:xfrm rot="16200000" flipH="1" flipV="1">
-              <a:off x="4743654" y="2341508"/>
-              <a:ext cx="214725" cy="207413"/>
-            </a:xfrm>
-            <a:prstGeom prst="line">
-              <a:avLst/>
-            </a:prstGeom>
-            <a:ln w="38100">
-              <a:solidFill>
-                <a:schemeClr val="accent1"/>
-              </a:solidFill>
-            </a:ln>
-          </p:spPr>
-          <p:style>
-            <a:lnRef idx="1">
-              <a:schemeClr val="accent1"/>
-            </a:lnRef>
-            <a:fillRef idx="0">
-              <a:schemeClr val="accent1"/>
-            </a:fillRef>
-            <a:effectRef idx="0">
-              <a:schemeClr val="accent1"/>
-            </a:effectRef>
-            <a:fontRef idx="minor">
-              <a:schemeClr val="tx1"/>
-            </a:fontRef>
-          </p:style>
-        </p:cxnSp>
-        <p:sp>
-          <p:nvSpPr>
-            <p:cNvPr id="120" name="Oval 119">
-              <a:extLst>
-                <a:ext uri="{FF2B5EF4-FFF2-40B4-BE49-F238E27FC236}">
-                  <a16:creationId xmlns:a16="http://schemas.microsoft.com/office/drawing/2014/main" id="{93D0AD3E-43A5-4581-4A69-9FD7C835FDD5}"/>
+                  <a16:creationId xmlns:a16="http://schemas.microsoft.com/office/drawing/2014/main" id="{88A46133-FAC1-5D0B-4A58-27D57BCDD261}"/>
                 </a:ext>
               </a:extLst>
             </p:cNvPr>
@@ -7510,11 +6480,11 @@
             <p:nvPr/>
           </p:nvSpPr>
           <p:spPr>
-            <a:xfrm rot="16200000" flipH="1">
-              <a:off x="4678501" y="2539451"/>
-              <a:ext cx="85562" cy="70962"/>
+            <a:xfrm>
+              <a:off x="3610045" y="3464345"/>
+              <a:ext cx="653139" cy="420634"/>
             </a:xfrm>
-            <a:prstGeom prst="ellipse">
+            <a:prstGeom prst="triangle">
               <a:avLst/>
             </a:prstGeom>
             <a:ln>
@@ -7548,13 +6518,99 @@
             </a:p>
           </p:txBody>
         </p:sp>
+        <p:cxnSp>
+          <p:nvCxnSpPr>
+            <p:cNvPr id="147" name="Straight Connector 146">
+              <a:extLst>
+                <a:ext uri="{FF2B5EF4-FFF2-40B4-BE49-F238E27FC236}">
+                  <a16:creationId xmlns:a16="http://schemas.microsoft.com/office/drawing/2014/main" id="{3A85BE9C-667C-9F90-241D-45B42A65BED2}"/>
+                </a:ext>
+              </a:extLst>
+            </p:cNvPr>
+            <p:cNvCxnSpPr>
+              <a:cxnSpLocks/>
+            </p:cNvCxnSpPr>
+            <p:nvPr/>
+          </p:nvCxnSpPr>
+          <p:spPr>
+            <a:xfrm>
+              <a:off x="3610045" y="3491609"/>
+              <a:ext cx="693435" cy="0"/>
+            </a:xfrm>
+            <a:prstGeom prst="line">
+              <a:avLst/>
+            </a:prstGeom>
+            <a:ln w="57150">
+              <a:solidFill>
+                <a:schemeClr val="accent1"/>
+              </a:solidFill>
+            </a:ln>
+          </p:spPr>
+          <p:style>
+            <a:lnRef idx="1">
+              <a:schemeClr val="accent1"/>
+            </a:lnRef>
+            <a:fillRef idx="0">
+              <a:schemeClr val="accent1"/>
+            </a:fillRef>
+            <a:effectRef idx="0">
+              <a:schemeClr val="accent1"/>
+            </a:effectRef>
+            <a:fontRef idx="minor">
+              <a:schemeClr val="tx1"/>
+            </a:fontRef>
+          </p:style>
+        </p:cxnSp>
       </p:grpSp>
+      <p:cxnSp>
+        <p:nvCxnSpPr>
+          <p:cNvPr id="112" name="Straight Connector 111">
+            <a:extLst>
+              <a:ext uri="{FF2B5EF4-FFF2-40B4-BE49-F238E27FC236}">
+                <a16:creationId xmlns:a16="http://schemas.microsoft.com/office/drawing/2014/main" id="{5B4BBEAA-DF5C-DC52-E5DB-834004A6F8CC}"/>
+              </a:ext>
+            </a:extLst>
+          </p:cNvPr>
+          <p:cNvCxnSpPr>
+            <a:cxnSpLocks/>
+          </p:cNvCxnSpPr>
+          <p:nvPr/>
+        </p:nvCxnSpPr>
+        <p:spPr>
+          <a:xfrm rot="16200000" flipH="1" flipV="1">
+            <a:off x="4743654" y="2341508"/>
+            <a:ext cx="214725" cy="207413"/>
+          </a:xfrm>
+          <a:prstGeom prst="line">
+            <a:avLst/>
+          </a:prstGeom>
+          <a:ln w="38100">
+            <a:solidFill>
+              <a:schemeClr val="accent1"/>
+            </a:solidFill>
+          </a:ln>
+        </p:spPr>
+        <p:style>
+          <a:lnRef idx="1">
+            <a:schemeClr val="accent1"/>
+          </a:lnRef>
+          <a:fillRef idx="0">
+            <a:schemeClr val="accent1"/>
+          </a:fillRef>
+          <a:effectRef idx="0">
+            <a:schemeClr val="accent1"/>
+          </a:effectRef>
+          <a:fontRef idx="minor">
+            <a:schemeClr val="tx1"/>
+          </a:fontRef>
+        </p:style>
+      </p:cxnSp>
       <p:grpSp>
         <p:nvGrpSpPr>
-          <p:cNvPr id="255" name="Group 254">
+          <p:cNvPr id="237" name="Group 236">
             <a:extLst>
               <a:ext uri="{FF2B5EF4-FFF2-40B4-BE49-F238E27FC236}">
-                <a16:creationId xmlns:a16="http://schemas.microsoft.com/office/drawing/2014/main" id="{F026BAD8-A5B4-89A2-E7AD-FE31721D815C}"/>
+                <a16:creationId xmlns:a16="http://schemas.microsoft.com/office/drawing/2014/main" id="{ECD3C850-C73E-5685-7386-9F762615D31D}"/>
               </a:ext>
             </a:extLst>
           </p:cNvPr>
@@ -7563,256 +6619,110 @@
         </p:nvGrpSpPr>
         <p:grpSpPr>
           <a:xfrm>
-            <a:off x="6377300" y="1217403"/>
+            <a:off x="9076968" y="502511"/>
             <a:ext cx="897065" cy="819897"/>
-            <a:chOff x="6793891" y="1225320"/>
-            <a:chExt cx="830754" cy="775156"/>
+            <a:chOff x="5736068" y="1686622"/>
+            <a:chExt cx="1042108" cy="993632"/>
           </a:xfrm>
         </p:grpSpPr>
-        <p:grpSp>
-          <p:nvGrpSpPr>
-            <p:cNvPr id="237" name="Group 236">
+        <p:sp>
+          <p:nvSpPr>
+            <p:cNvPr id="238" name="Oval 237">
               <a:extLst>
                 <a:ext uri="{FF2B5EF4-FFF2-40B4-BE49-F238E27FC236}">
-                  <a16:creationId xmlns:a16="http://schemas.microsoft.com/office/drawing/2014/main" id="{ECD3C850-C73E-5685-7386-9F762615D31D}"/>
+                  <a16:creationId xmlns:a16="http://schemas.microsoft.com/office/drawing/2014/main" id="{3F88FD44-C257-74EB-5FDD-1125722E67B4}"/>
                 </a:ext>
               </a:extLst>
             </p:cNvPr>
-            <p:cNvGrpSpPr/>
+            <p:cNvSpPr/>
             <p:nvPr/>
-          </p:nvGrpSpPr>
-          <p:grpSpPr>
+          </p:nvSpPr>
+          <p:spPr>
             <a:xfrm>
-              <a:off x="6793891" y="1225320"/>
-              <a:ext cx="830754" cy="775156"/>
-              <a:chOff x="5736068" y="1686622"/>
-              <a:chExt cx="1042108" cy="993632"/>
+              <a:off x="5736068" y="1686622"/>
+              <a:ext cx="1042108" cy="993632"/>
             </a:xfrm>
-          </p:grpSpPr>
-          <p:sp>
-            <p:nvSpPr>
-              <p:cNvPr id="238" name="Oval 237">
-                <a:extLst>
-                  <a:ext uri="{FF2B5EF4-FFF2-40B4-BE49-F238E27FC236}">
-                    <a16:creationId xmlns:a16="http://schemas.microsoft.com/office/drawing/2014/main" id="{3F88FD44-C257-74EB-5FDD-1125722E67B4}"/>
-                  </a:ext>
-                </a:extLst>
-              </p:cNvPr>
-              <p:cNvSpPr/>
-              <p:nvPr/>
-            </p:nvSpPr>
-            <p:spPr>
-              <a:xfrm>
-                <a:off x="5736068" y="1686622"/>
-                <a:ext cx="1042108" cy="993632"/>
-              </a:xfrm>
-              <a:prstGeom prst="ellipse">
-                <a:avLst/>
-              </a:prstGeom>
-              <a:solidFill>
-                <a:schemeClr val="bg1">
-                  <a:lumMod val="95000"/>
-                </a:schemeClr>
-              </a:solidFill>
-              <a:ln w="38100"/>
-            </p:spPr>
-            <p:style>
-              <a:lnRef idx="2">
-                <a:schemeClr val="accent1">
-                  <a:shade val="50000"/>
-                </a:schemeClr>
-              </a:lnRef>
-              <a:fillRef idx="1">
-                <a:schemeClr val="accent1"/>
-              </a:fillRef>
-              <a:effectRef idx="0">
-                <a:schemeClr val="accent1"/>
-              </a:effectRef>
-              <a:fontRef idx="minor">
-                <a:schemeClr val="lt1"/>
-              </a:fontRef>
-            </p:style>
-            <p:txBody>
-              <a:bodyPr rtlCol="0" anchor="ctr"/>
-              <a:lstStyle/>
-              <a:p>
-                <a:pPr algn="ctr"/>
-                <a:endParaRPr lang="en-IN" sz="4000" dirty="0">
+            <a:prstGeom prst="ellipse">
+              <a:avLst/>
+            </a:prstGeom>
+            <a:solidFill>
+              <a:schemeClr val="bg1">
+                <a:lumMod val="95000"/>
+              </a:schemeClr>
+            </a:solidFill>
+            <a:ln w="38100"/>
+          </p:spPr>
+          <p:style>
+            <a:lnRef idx="2">
+              <a:schemeClr val="accent1">
+                <a:shade val="50000"/>
+              </a:schemeClr>
+            </a:lnRef>
+            <a:fillRef idx="1">
+              <a:schemeClr val="accent1"/>
+            </a:fillRef>
+            <a:effectRef idx="0">
+              <a:schemeClr val="accent1"/>
+            </a:effectRef>
+            <a:fontRef idx="minor">
+              <a:schemeClr val="lt1"/>
+            </a:fontRef>
+          </p:style>
+          <p:txBody>
+            <a:bodyPr rtlCol="0" anchor="ctr"/>
+            <a:lstStyle/>
+            <a:p>
+              <a:pPr algn="ctr"/>
+              <a:endParaRPr lang="en-IN" sz="4000" dirty="0">
+                <a:solidFill>
+                  <a:srgbClr val="FF0000"/>
+                </a:solidFill>
+              </a:endParaRPr>
+            </a:p>
+          </p:txBody>
+        </p:sp>
+        <p:sp>
+          <p:nvSpPr>
+            <p:cNvPr id="239" name="TextBox 238">
+              <a:extLst>
+                <a:ext uri="{FF2B5EF4-FFF2-40B4-BE49-F238E27FC236}">
+                  <a16:creationId xmlns:a16="http://schemas.microsoft.com/office/drawing/2014/main" id="{B20D38FC-BE9D-BF4D-1680-63F73F3E634F}"/>
+                </a:ext>
+              </a:extLst>
+            </p:cNvPr>
+            <p:cNvSpPr txBox="1"/>
+            <p:nvPr/>
+          </p:nvSpPr>
+          <p:spPr>
+            <a:xfrm>
+              <a:off x="5999025" y="1717945"/>
+              <a:ext cx="516194" cy="708688"/>
+            </a:xfrm>
+            <a:prstGeom prst="rect">
+              <a:avLst/>
+            </a:prstGeom>
+            <a:noFill/>
+          </p:spPr>
+          <p:txBody>
+            <a:bodyPr wrap="square" rtlCol="0">
+              <a:spAutoFit/>
+            </a:bodyPr>
+            <a:lstStyle/>
+            <a:p>
+              <a:pPr algn="ctr"/>
+              <a:r>
+                <a:rPr lang="en-IN" sz="3200" b="1" dirty="0">
                   <a:solidFill>
                     <a:srgbClr val="FF0000"/>
                   </a:solidFill>
-                </a:endParaRPr>
-              </a:p>
-            </p:txBody>
-          </p:sp>
-          <p:sp>
-            <p:nvSpPr>
-              <p:cNvPr id="239" name="TextBox 238">
-                <a:extLst>
-                  <a:ext uri="{FF2B5EF4-FFF2-40B4-BE49-F238E27FC236}">
-                    <a16:creationId xmlns:a16="http://schemas.microsoft.com/office/drawing/2014/main" id="{B20D38FC-BE9D-BF4D-1680-63F73F3E634F}"/>
-                  </a:ext>
-                </a:extLst>
-              </p:cNvPr>
-              <p:cNvSpPr txBox="1"/>
-              <p:nvPr/>
-            </p:nvSpPr>
-            <p:spPr>
-              <a:xfrm>
-                <a:off x="5999025" y="1717945"/>
-                <a:ext cx="516194" cy="584775"/>
-              </a:xfrm>
-              <a:prstGeom prst="rect">
-                <a:avLst/>
-              </a:prstGeom>
-              <a:noFill/>
-            </p:spPr>
-            <p:txBody>
-              <a:bodyPr wrap="square" rtlCol="0">
-                <a:spAutoFit/>
-              </a:bodyPr>
-              <a:lstStyle/>
-              <a:p>
-                <a:pPr algn="ctr"/>
-                <a:r>
-                  <a:rPr lang="en-IN" sz="3200" b="1" dirty="0">
-                    <a:solidFill>
-                      <a:srgbClr val="FF0000"/>
-                    </a:solidFill>
-                    <a:latin typeface="Arial" panose="020B0604020202020204" pitchFamily="34" charset="0"/>
-                    <a:cs typeface="Arial" panose="020B0604020202020204" pitchFamily="34" charset="0"/>
-                  </a:rPr>
-                  <a:t>A</a:t>
-                </a:r>
-              </a:p>
-            </p:txBody>
-          </p:sp>
-        </p:grpSp>
-        <p:grpSp>
-          <p:nvGrpSpPr>
-            <p:cNvPr id="240" name="Group 239">
-              <a:extLst>
-                <a:ext uri="{FF2B5EF4-FFF2-40B4-BE49-F238E27FC236}">
-                  <a16:creationId xmlns:a16="http://schemas.microsoft.com/office/drawing/2014/main" id="{D8E858A8-14F7-496B-4B0D-E33529EB7336}"/>
-                </a:ext>
-              </a:extLst>
-            </p:cNvPr>
-            <p:cNvGrpSpPr/>
-            <p:nvPr/>
-          </p:nvGrpSpPr>
-          <p:grpSpPr>
-            <a:xfrm rot="4841119" flipV="1">
-              <a:off x="7147334" y="1647947"/>
-              <a:ext cx="131685" cy="304028"/>
-              <a:chOff x="3898812" y="2986773"/>
-              <a:chExt cx="232509" cy="554879"/>
-            </a:xfrm>
-          </p:grpSpPr>
-          <p:sp>
-            <p:nvSpPr>
-              <p:cNvPr id="242" name="Arc 241">
-                <a:extLst>
-                  <a:ext uri="{FF2B5EF4-FFF2-40B4-BE49-F238E27FC236}">
-                    <a16:creationId xmlns:a16="http://schemas.microsoft.com/office/drawing/2014/main" id="{D05E425C-C9EF-856D-AE45-83F3892B4D53}"/>
-                  </a:ext>
-                </a:extLst>
-              </p:cNvPr>
-              <p:cNvSpPr/>
-              <p:nvPr/>
-            </p:nvSpPr>
-            <p:spPr>
-              <a:xfrm rot="16200000">
-                <a:off x="3877316" y="3010463"/>
-                <a:ext cx="277695" cy="230315"/>
-              </a:xfrm>
-              <a:prstGeom prst="arc">
-                <a:avLst>
-                  <a:gd name="adj1" fmla="val 10739696"/>
-                  <a:gd name="adj2" fmla="val 0"/>
-                </a:avLst>
-              </a:prstGeom>
-              <a:ln w="38100">
-                <a:solidFill>
-                  <a:srgbClr val="FF0000"/>
-                </a:solidFill>
-              </a:ln>
-            </p:spPr>
-            <p:style>
-              <a:lnRef idx="1">
-                <a:schemeClr val="dk1"/>
-              </a:lnRef>
-              <a:fillRef idx="0">
-                <a:schemeClr val="dk1"/>
-              </a:fillRef>
-              <a:effectRef idx="0">
-                <a:schemeClr val="dk1"/>
-              </a:effectRef>
-              <a:fontRef idx="minor">
-                <a:schemeClr val="tx1"/>
-              </a:fontRef>
-            </p:style>
-            <p:txBody>
-              <a:bodyPr rtlCol="0" anchor="ctr"/>
-              <a:lstStyle/>
-              <a:p>
-                <a:pPr algn="ctr"/>
-                <a:endParaRPr lang="en-IN"/>
-              </a:p>
-            </p:txBody>
-          </p:sp>
-          <p:sp>
-            <p:nvSpPr>
-              <p:cNvPr id="247" name="Arc 246">
-                <a:extLst>
-                  <a:ext uri="{FF2B5EF4-FFF2-40B4-BE49-F238E27FC236}">
-                    <a16:creationId xmlns:a16="http://schemas.microsoft.com/office/drawing/2014/main" id="{3429F9A2-CC14-A0A9-2FA2-E1D05D57C0BD}"/>
-                  </a:ext>
-                </a:extLst>
-              </p:cNvPr>
-              <p:cNvSpPr/>
-              <p:nvPr/>
-            </p:nvSpPr>
-            <p:spPr>
-              <a:xfrm rot="5400000" flipH="1">
-                <a:off x="3875122" y="3287647"/>
-                <a:ext cx="277695" cy="230315"/>
-              </a:xfrm>
-              <a:prstGeom prst="arc">
-                <a:avLst>
-                  <a:gd name="adj1" fmla="val 10739696"/>
-                  <a:gd name="adj2" fmla="val 0"/>
-                </a:avLst>
-              </a:prstGeom>
-              <a:ln w="38100">
-                <a:solidFill>
-                  <a:srgbClr val="FF0000"/>
-                </a:solidFill>
-              </a:ln>
-            </p:spPr>
-            <p:style>
-              <a:lnRef idx="1">
-                <a:schemeClr val="dk1"/>
-              </a:lnRef>
-              <a:fillRef idx="0">
-                <a:schemeClr val="dk1"/>
-              </a:fillRef>
-              <a:effectRef idx="0">
-                <a:schemeClr val="dk1"/>
-              </a:effectRef>
-              <a:fontRef idx="minor">
-                <a:schemeClr val="tx1"/>
-              </a:fontRef>
-            </p:style>
-            <p:txBody>
-              <a:bodyPr rtlCol="0" anchor="ctr"/>
-              <a:lstStyle/>
-              <a:p>
-                <a:pPr algn="ctr"/>
-                <a:endParaRPr lang="en-IN"/>
-              </a:p>
-            </p:txBody>
-          </p:sp>
-        </p:grpSp>
+                  <a:latin typeface="Arial" panose="020B0604020202020204" pitchFamily="34" charset="0"/>
+                  <a:cs typeface="Arial" panose="020B0604020202020204" pitchFamily="34" charset="0"/>
+                </a:rPr>
+                <a:t>A</a:t>
+              </a:r>
+            </a:p>
+          </p:txBody>
+        </p:sp>
       </p:grpSp>
       <p:cxnSp>
         <p:nvCxnSpPr>
@@ -7872,9 +6782,9 @@
           <p:nvPr/>
         </p:nvCxnSpPr>
         <p:spPr>
-          <a:xfrm>
-            <a:off x="9691527" y="1589973"/>
-            <a:ext cx="0" cy="4242148"/>
+          <a:xfrm flipH="1">
+            <a:off x="9698664" y="1620774"/>
+            <a:ext cx="1683" cy="3279308"/>
           </a:xfrm>
           <a:prstGeom prst="line">
             <a:avLst/>
@@ -7900,271 +6810,6 @@
           </a:fontRef>
         </p:style>
       </p:cxnSp>
-      <p:grpSp>
-        <p:nvGrpSpPr>
-          <p:cNvPr id="273" name="Group 272">
-            <a:extLst>
-              <a:ext uri="{FF2B5EF4-FFF2-40B4-BE49-F238E27FC236}">
-                <a16:creationId xmlns:a16="http://schemas.microsoft.com/office/drawing/2014/main" id="{7E5B4FAF-52A4-3341-7B29-C8F1AC6FD652}"/>
-              </a:ext>
-            </a:extLst>
-          </p:cNvPr>
-          <p:cNvGrpSpPr/>
-          <p:nvPr/>
-        </p:nvGrpSpPr>
-        <p:grpSpPr>
-          <a:xfrm>
-            <a:off x="9234497" y="3366558"/>
-            <a:ext cx="897065" cy="819897"/>
-            <a:chOff x="6793891" y="1225320"/>
-            <a:chExt cx="830754" cy="775156"/>
-          </a:xfrm>
-        </p:grpSpPr>
-        <p:grpSp>
-          <p:nvGrpSpPr>
-            <p:cNvPr id="278" name="Group 277">
-              <a:extLst>
-                <a:ext uri="{FF2B5EF4-FFF2-40B4-BE49-F238E27FC236}">
-                  <a16:creationId xmlns:a16="http://schemas.microsoft.com/office/drawing/2014/main" id="{C361FA8C-0BC3-8AFD-7006-A72A3847DA1E}"/>
-                </a:ext>
-              </a:extLst>
-            </p:cNvPr>
-            <p:cNvGrpSpPr/>
-            <p:nvPr/>
-          </p:nvGrpSpPr>
-          <p:grpSpPr>
-            <a:xfrm>
-              <a:off x="6793891" y="1225320"/>
-              <a:ext cx="830754" cy="775156"/>
-              <a:chOff x="5736068" y="1686622"/>
-              <a:chExt cx="1042108" cy="993632"/>
-            </a:xfrm>
-          </p:grpSpPr>
-          <p:sp>
-            <p:nvSpPr>
-              <p:cNvPr id="283" name="Oval 282">
-                <a:extLst>
-                  <a:ext uri="{FF2B5EF4-FFF2-40B4-BE49-F238E27FC236}">
-                    <a16:creationId xmlns:a16="http://schemas.microsoft.com/office/drawing/2014/main" id="{B0B67F98-1536-D03C-3B39-2D40DE3A080D}"/>
-                  </a:ext>
-                </a:extLst>
-              </p:cNvPr>
-              <p:cNvSpPr/>
-              <p:nvPr/>
-            </p:nvSpPr>
-            <p:spPr>
-              <a:xfrm>
-                <a:off x="5736068" y="1686622"/>
-                <a:ext cx="1042108" cy="993632"/>
-              </a:xfrm>
-              <a:prstGeom prst="ellipse">
-                <a:avLst/>
-              </a:prstGeom>
-              <a:solidFill>
-                <a:schemeClr val="bg1">
-                  <a:lumMod val="95000"/>
-                </a:schemeClr>
-              </a:solidFill>
-              <a:ln w="38100"/>
-            </p:spPr>
-            <p:style>
-              <a:lnRef idx="2">
-                <a:schemeClr val="accent1">
-                  <a:shade val="50000"/>
-                </a:schemeClr>
-              </a:lnRef>
-              <a:fillRef idx="1">
-                <a:schemeClr val="accent1"/>
-              </a:fillRef>
-              <a:effectRef idx="0">
-                <a:schemeClr val="accent1"/>
-              </a:effectRef>
-              <a:fontRef idx="minor">
-                <a:schemeClr val="lt1"/>
-              </a:fontRef>
-            </p:style>
-            <p:txBody>
-              <a:bodyPr rtlCol="0" anchor="ctr"/>
-              <a:lstStyle/>
-              <a:p>
-                <a:pPr algn="ctr"/>
-                <a:endParaRPr lang="en-IN" sz="4000" dirty="0">
-                  <a:solidFill>
-                    <a:srgbClr val="FF0000"/>
-                  </a:solidFill>
-                </a:endParaRPr>
-              </a:p>
-            </p:txBody>
-          </p:sp>
-          <p:sp>
-            <p:nvSpPr>
-              <p:cNvPr id="284" name="TextBox 283">
-                <a:extLst>
-                  <a:ext uri="{FF2B5EF4-FFF2-40B4-BE49-F238E27FC236}">
-                    <a16:creationId xmlns:a16="http://schemas.microsoft.com/office/drawing/2014/main" id="{94AAB8EE-9976-CD57-90FC-26EE1EE29312}"/>
-                  </a:ext>
-                </a:extLst>
-              </p:cNvPr>
-              <p:cNvSpPr txBox="1"/>
-              <p:nvPr/>
-            </p:nvSpPr>
-            <p:spPr>
-              <a:xfrm>
-                <a:off x="5999025" y="1717945"/>
-                <a:ext cx="516194" cy="708688"/>
-              </a:xfrm>
-              <a:prstGeom prst="rect">
-                <a:avLst/>
-              </a:prstGeom>
-              <a:noFill/>
-            </p:spPr>
-            <p:txBody>
-              <a:bodyPr wrap="square" rtlCol="0">
-                <a:spAutoFit/>
-              </a:bodyPr>
-              <a:lstStyle/>
-              <a:p>
-                <a:pPr algn="ctr"/>
-                <a:r>
-                  <a:rPr lang="en-IN" sz="3200" b="1" dirty="0">
-                    <a:solidFill>
-                      <a:srgbClr val="FF0000"/>
-                    </a:solidFill>
-                    <a:latin typeface="Arial" panose="020B0604020202020204" pitchFamily="34" charset="0"/>
-                    <a:cs typeface="Arial" panose="020B0604020202020204" pitchFamily="34" charset="0"/>
-                  </a:rPr>
-                  <a:t>V</a:t>
-                </a:r>
-              </a:p>
-            </p:txBody>
-          </p:sp>
-        </p:grpSp>
-        <p:grpSp>
-          <p:nvGrpSpPr>
-            <p:cNvPr id="279" name="Group 278">
-              <a:extLst>
-                <a:ext uri="{FF2B5EF4-FFF2-40B4-BE49-F238E27FC236}">
-                  <a16:creationId xmlns:a16="http://schemas.microsoft.com/office/drawing/2014/main" id="{62A04A91-CDF7-9AA6-B534-B7305B6A5B69}"/>
-                </a:ext>
-              </a:extLst>
-            </p:cNvPr>
-            <p:cNvGrpSpPr/>
-            <p:nvPr/>
-          </p:nvGrpSpPr>
-          <p:grpSpPr>
-            <a:xfrm rot="4841119" flipV="1">
-              <a:off x="7147334" y="1647947"/>
-              <a:ext cx="131685" cy="304028"/>
-              <a:chOff x="3898812" y="2986773"/>
-              <a:chExt cx="232509" cy="554879"/>
-            </a:xfrm>
-          </p:grpSpPr>
-          <p:sp>
-            <p:nvSpPr>
-              <p:cNvPr id="280" name="Arc 279">
-                <a:extLst>
-                  <a:ext uri="{FF2B5EF4-FFF2-40B4-BE49-F238E27FC236}">
-                    <a16:creationId xmlns:a16="http://schemas.microsoft.com/office/drawing/2014/main" id="{C286DC38-F8D4-45DD-1A77-E227CEB6D134}"/>
-                  </a:ext>
-                </a:extLst>
-              </p:cNvPr>
-              <p:cNvSpPr/>
-              <p:nvPr/>
-            </p:nvSpPr>
-            <p:spPr>
-              <a:xfrm rot="16200000">
-                <a:off x="3877316" y="3010463"/>
-                <a:ext cx="277695" cy="230315"/>
-              </a:xfrm>
-              <a:prstGeom prst="arc">
-                <a:avLst>
-                  <a:gd name="adj1" fmla="val 10739696"/>
-                  <a:gd name="adj2" fmla="val 0"/>
-                </a:avLst>
-              </a:prstGeom>
-              <a:ln w="38100">
-                <a:solidFill>
-                  <a:srgbClr val="FF0000"/>
-                </a:solidFill>
-              </a:ln>
-            </p:spPr>
-            <p:style>
-              <a:lnRef idx="1">
-                <a:schemeClr val="dk1"/>
-              </a:lnRef>
-              <a:fillRef idx="0">
-                <a:schemeClr val="dk1"/>
-              </a:fillRef>
-              <a:effectRef idx="0">
-                <a:schemeClr val="dk1"/>
-              </a:effectRef>
-              <a:fontRef idx="minor">
-                <a:schemeClr val="tx1"/>
-              </a:fontRef>
-            </p:style>
-            <p:txBody>
-              <a:bodyPr rtlCol="0" anchor="ctr"/>
-              <a:lstStyle/>
-              <a:p>
-                <a:pPr algn="ctr"/>
-                <a:endParaRPr lang="en-IN"/>
-              </a:p>
-            </p:txBody>
-          </p:sp>
-          <p:sp>
-            <p:nvSpPr>
-              <p:cNvPr id="281" name="Arc 280">
-                <a:extLst>
-                  <a:ext uri="{FF2B5EF4-FFF2-40B4-BE49-F238E27FC236}">
-                    <a16:creationId xmlns:a16="http://schemas.microsoft.com/office/drawing/2014/main" id="{3921947A-2F95-69AC-8F04-7DF04EF4E417}"/>
-                  </a:ext>
-                </a:extLst>
-              </p:cNvPr>
-              <p:cNvSpPr/>
-              <p:nvPr/>
-            </p:nvSpPr>
-            <p:spPr>
-              <a:xfrm rot="5400000" flipH="1">
-                <a:off x="3875122" y="3287647"/>
-                <a:ext cx="277695" cy="230315"/>
-              </a:xfrm>
-              <a:prstGeom prst="arc">
-                <a:avLst>
-                  <a:gd name="adj1" fmla="val 10739696"/>
-                  <a:gd name="adj2" fmla="val 0"/>
-                </a:avLst>
-              </a:prstGeom>
-              <a:ln w="38100">
-                <a:solidFill>
-                  <a:srgbClr val="FF0000"/>
-                </a:solidFill>
-              </a:ln>
-            </p:spPr>
-            <p:style>
-              <a:lnRef idx="1">
-                <a:schemeClr val="dk1"/>
-              </a:lnRef>
-              <a:fillRef idx="0">
-                <a:schemeClr val="dk1"/>
-              </a:fillRef>
-              <a:effectRef idx="0">
-                <a:schemeClr val="dk1"/>
-              </a:effectRef>
-              <a:fontRef idx="minor">
-                <a:schemeClr val="tx1"/>
-              </a:fontRef>
-            </p:style>
-            <p:txBody>
-              <a:bodyPr rtlCol="0" anchor="ctr"/>
-              <a:lstStyle/>
-              <a:p>
-                <a:pPr algn="ctr"/>
-                <a:endParaRPr lang="en-IN"/>
-              </a:p>
-            </p:txBody>
-          </p:sp>
-        </p:grpSp>
-      </p:grpSp>
       <p:cxnSp>
         <p:nvCxnSpPr>
           <p:cNvPr id="335" name="Straight Connector 334">
@@ -8181,8 +6826,8 @@
         </p:nvCxnSpPr>
         <p:spPr>
           <a:xfrm>
-            <a:off x="8271129" y="1591517"/>
-            <a:ext cx="0" cy="1130312"/>
+            <a:off x="8253703" y="1590293"/>
+            <a:ext cx="1776" cy="2498628"/>
           </a:xfrm>
           <a:prstGeom prst="line">
             <a:avLst/>
@@ -8224,8 +6869,8 @@
         </p:nvCxnSpPr>
         <p:spPr>
           <a:xfrm>
-            <a:off x="8259196" y="4861409"/>
-            <a:ext cx="11743" cy="979081"/>
+            <a:off x="8259141" y="3962428"/>
+            <a:ext cx="11798" cy="1878062"/>
           </a:xfrm>
           <a:prstGeom prst="line">
             <a:avLst/>
@@ -8817,12 +7462,473 @@
           </a:fontRef>
         </p:style>
       </p:cxnSp>
+      <p:sp>
+        <p:nvSpPr>
+          <p:cNvPr id="9" name="Rectangle 8">
+            <a:extLst>
+              <a:ext uri="{FF2B5EF4-FFF2-40B4-BE49-F238E27FC236}">
+                <a16:creationId xmlns:a16="http://schemas.microsoft.com/office/drawing/2014/main" id="{666EC159-806F-1B17-F89D-8CFD191ADCD2}"/>
+              </a:ext>
+            </a:extLst>
+          </p:cNvPr>
+          <p:cNvSpPr/>
+          <p:nvPr/>
+        </p:nvSpPr>
+        <p:spPr>
+          <a:xfrm>
+            <a:off x="4574538" y="336369"/>
+            <a:ext cx="1021852" cy="990454"/>
+          </a:xfrm>
+          <a:prstGeom prst="rect">
+            <a:avLst/>
+          </a:prstGeom>
+          <a:noFill/>
+        </p:spPr>
+        <p:style>
+          <a:lnRef idx="2">
+            <a:schemeClr val="accent1">
+              <a:shade val="50000"/>
+            </a:schemeClr>
+          </a:lnRef>
+          <a:fillRef idx="1">
+            <a:schemeClr val="accent1"/>
+          </a:fillRef>
+          <a:effectRef idx="0">
+            <a:schemeClr val="accent1"/>
+          </a:effectRef>
+          <a:fontRef idx="minor">
+            <a:schemeClr val="lt1"/>
+          </a:fontRef>
+        </p:style>
+        <p:txBody>
+          <a:bodyPr rtlCol="0" anchor="ctr"/>
+          <a:lstStyle/>
+          <a:p>
+            <a:pPr algn="ctr"/>
+            <a:endParaRPr lang="en-IN"/>
+          </a:p>
+        </p:txBody>
+      </p:sp>
+      <p:sp>
+        <p:nvSpPr>
+          <p:cNvPr id="10" name="Rectangle 9">
+            <a:extLst>
+              <a:ext uri="{FF2B5EF4-FFF2-40B4-BE49-F238E27FC236}">
+                <a16:creationId xmlns:a16="http://schemas.microsoft.com/office/drawing/2014/main" id="{B8216809-AF2D-CD33-8CBA-F28A7ADE90B4}"/>
+              </a:ext>
+            </a:extLst>
+          </p:cNvPr>
+          <p:cNvSpPr/>
+          <p:nvPr/>
+        </p:nvSpPr>
+        <p:spPr>
+          <a:xfrm>
+            <a:off x="4568519" y="1861369"/>
+            <a:ext cx="1021852" cy="990454"/>
+          </a:xfrm>
+          <a:prstGeom prst="rect">
+            <a:avLst/>
+          </a:prstGeom>
+          <a:noFill/>
+        </p:spPr>
+        <p:style>
+          <a:lnRef idx="2">
+            <a:schemeClr val="accent1">
+              <a:shade val="50000"/>
+            </a:schemeClr>
+          </a:lnRef>
+          <a:fillRef idx="1">
+            <a:schemeClr val="accent1"/>
+          </a:fillRef>
+          <a:effectRef idx="0">
+            <a:schemeClr val="accent1"/>
+          </a:effectRef>
+          <a:fontRef idx="minor">
+            <a:schemeClr val="lt1"/>
+          </a:fontRef>
+        </p:style>
+        <p:txBody>
+          <a:bodyPr rtlCol="0" anchor="ctr"/>
+          <a:lstStyle/>
+          <a:p>
+            <a:pPr algn="ctr"/>
+            <a:endParaRPr lang="en-IN"/>
+          </a:p>
+        </p:txBody>
+      </p:sp>
       <p:cxnSp>
         <p:nvCxnSpPr>
-          <p:cNvPr id="106" name="Straight Connector 105">
+          <p:cNvPr id="12" name="Straight Connector 11">
             <a:extLst>
               <a:ext uri="{FF2B5EF4-FFF2-40B4-BE49-F238E27FC236}">
-                <a16:creationId xmlns:a16="http://schemas.microsoft.com/office/drawing/2014/main" id="{21DC268D-D1BF-7041-E3CE-16FAE45223FA}"/>
+                <a16:creationId xmlns:a16="http://schemas.microsoft.com/office/drawing/2014/main" id="{1FC38FE0-3D2C-08B5-E6C4-CEBE0695E75E}"/>
+              </a:ext>
+            </a:extLst>
+          </p:cNvPr>
+          <p:cNvCxnSpPr/>
+          <p:nvPr/>
+        </p:nvCxnSpPr>
+        <p:spPr>
+          <a:xfrm>
+            <a:off x="9397916" y="1113132"/>
+            <a:ext cx="255167" cy="0"/>
+          </a:xfrm>
+          <a:prstGeom prst="line">
+            <a:avLst/>
+          </a:prstGeom>
+          <a:ln w="57150">
+            <a:solidFill>
+              <a:srgbClr val="FF0000"/>
+            </a:solidFill>
+          </a:ln>
+        </p:spPr>
+        <p:style>
+          <a:lnRef idx="3">
+            <a:schemeClr val="accent1"/>
+          </a:lnRef>
+          <a:fillRef idx="0">
+            <a:schemeClr val="accent1"/>
+          </a:fillRef>
+          <a:effectRef idx="2">
+            <a:schemeClr val="accent1"/>
+          </a:effectRef>
+          <a:fontRef idx="minor">
+            <a:schemeClr val="tx1"/>
+          </a:fontRef>
+        </p:style>
+      </p:cxnSp>
+      <p:sp>
+        <p:nvSpPr>
+          <p:cNvPr id="43" name="TextBox 42">
+            <a:extLst>
+              <a:ext uri="{FF2B5EF4-FFF2-40B4-BE49-F238E27FC236}">
+                <a16:creationId xmlns:a16="http://schemas.microsoft.com/office/drawing/2014/main" id="{DB2C3726-3E82-F16E-F0AB-D6DFF40C69F5}"/>
+              </a:ext>
+            </a:extLst>
+          </p:cNvPr>
+          <p:cNvSpPr txBox="1"/>
+          <p:nvPr/>
+        </p:nvSpPr>
+        <p:spPr>
+          <a:xfrm>
+            <a:off x="8737790" y="482190"/>
+            <a:ext cx="344096" cy="338554"/>
+          </a:xfrm>
+          <a:prstGeom prst="rect">
+            <a:avLst/>
+          </a:prstGeom>
+          <a:noFill/>
+        </p:spPr>
+        <p:txBody>
+          <a:bodyPr wrap="square" rtlCol="0">
+            <a:spAutoFit/>
+          </a:bodyPr>
+          <a:lstStyle/>
+          <a:p>
+            <a:r>
+              <a:rPr lang="en-IN" sz="1600" b="1" dirty="0">
+                <a:solidFill>
+                  <a:srgbClr val="FF0000"/>
+                </a:solidFill>
+                <a:latin typeface="Arial Rounded MT Bold" panose="020F0704030504030204" pitchFamily="34" charset="0"/>
+                <a:cs typeface="Arial" panose="020B0604020202020204" pitchFamily="34" charset="0"/>
+              </a:rPr>
+              <a:t>+</a:t>
+            </a:r>
+          </a:p>
+        </p:txBody>
+      </p:sp>
+      <p:sp>
+        <p:nvSpPr>
+          <p:cNvPr id="48" name="TextBox 47">
+            <a:extLst>
+              <a:ext uri="{FF2B5EF4-FFF2-40B4-BE49-F238E27FC236}">
+                <a16:creationId xmlns:a16="http://schemas.microsoft.com/office/drawing/2014/main" id="{11CC5484-184A-04F5-DF7C-233980E2B77B}"/>
+              </a:ext>
+            </a:extLst>
+          </p:cNvPr>
+          <p:cNvSpPr txBox="1"/>
+          <p:nvPr/>
+        </p:nvSpPr>
+        <p:spPr>
+          <a:xfrm>
+            <a:off x="10046534" y="450508"/>
+            <a:ext cx="344096" cy="338554"/>
+          </a:xfrm>
+          <a:prstGeom prst="rect">
+            <a:avLst/>
+          </a:prstGeom>
+          <a:noFill/>
+        </p:spPr>
+        <p:txBody>
+          <a:bodyPr wrap="square" rtlCol="0">
+            <a:spAutoFit/>
+          </a:bodyPr>
+          <a:lstStyle/>
+          <a:p>
+            <a:r>
+              <a:rPr lang="en-IN" sz="1600" b="1" dirty="0">
+                <a:solidFill>
+                  <a:srgbClr val="FF0000"/>
+                </a:solidFill>
+                <a:latin typeface="Arial Rounded MT Bold" panose="020F0704030504030204" pitchFamily="34" charset="0"/>
+                <a:cs typeface="Arial" panose="020B0604020202020204" pitchFamily="34" charset="0"/>
+              </a:rPr>
+              <a:t>-</a:t>
+            </a:r>
+          </a:p>
+        </p:txBody>
+      </p:sp>
+      <p:grpSp>
+        <p:nvGrpSpPr>
+          <p:cNvPr id="278" name="Group 277">
+            <a:extLst>
+              <a:ext uri="{FF2B5EF4-FFF2-40B4-BE49-F238E27FC236}">
+                <a16:creationId xmlns:a16="http://schemas.microsoft.com/office/drawing/2014/main" id="{C361FA8C-0BC3-8AFD-7006-A72A3847DA1E}"/>
+              </a:ext>
+            </a:extLst>
+          </p:cNvPr>
+          <p:cNvGrpSpPr/>
+          <p:nvPr/>
+        </p:nvGrpSpPr>
+        <p:grpSpPr>
+          <a:xfrm>
+            <a:off x="10560768" y="401140"/>
+            <a:ext cx="897065" cy="819897"/>
+            <a:chOff x="5736068" y="1686622"/>
+            <a:chExt cx="1042108" cy="993632"/>
+          </a:xfrm>
+        </p:grpSpPr>
+        <p:sp>
+          <p:nvSpPr>
+            <p:cNvPr id="283" name="Oval 282">
+              <a:extLst>
+                <a:ext uri="{FF2B5EF4-FFF2-40B4-BE49-F238E27FC236}">
+                  <a16:creationId xmlns:a16="http://schemas.microsoft.com/office/drawing/2014/main" id="{B0B67F98-1536-D03C-3B39-2D40DE3A080D}"/>
+                </a:ext>
+              </a:extLst>
+            </p:cNvPr>
+            <p:cNvSpPr/>
+            <p:nvPr/>
+          </p:nvSpPr>
+          <p:spPr>
+            <a:xfrm>
+              <a:off x="5736068" y="1686622"/>
+              <a:ext cx="1042108" cy="993632"/>
+            </a:xfrm>
+            <a:prstGeom prst="ellipse">
+              <a:avLst/>
+            </a:prstGeom>
+            <a:solidFill>
+              <a:schemeClr val="bg1">
+                <a:lumMod val="95000"/>
+              </a:schemeClr>
+            </a:solidFill>
+            <a:ln w="38100"/>
+          </p:spPr>
+          <p:style>
+            <a:lnRef idx="2">
+              <a:schemeClr val="accent1">
+                <a:shade val="50000"/>
+              </a:schemeClr>
+            </a:lnRef>
+            <a:fillRef idx="1">
+              <a:schemeClr val="accent1"/>
+            </a:fillRef>
+            <a:effectRef idx="0">
+              <a:schemeClr val="accent1"/>
+            </a:effectRef>
+            <a:fontRef idx="minor">
+              <a:schemeClr val="lt1"/>
+            </a:fontRef>
+          </p:style>
+          <p:txBody>
+            <a:bodyPr rtlCol="0" anchor="ctr"/>
+            <a:lstStyle/>
+            <a:p>
+              <a:pPr algn="ctr"/>
+              <a:endParaRPr lang="en-IN" sz="4000" dirty="0">
+                <a:solidFill>
+                  <a:srgbClr val="FF0000"/>
+                </a:solidFill>
+              </a:endParaRPr>
+            </a:p>
+          </p:txBody>
+        </p:sp>
+        <p:sp>
+          <p:nvSpPr>
+            <p:cNvPr id="284" name="TextBox 283">
+              <a:extLst>
+                <a:ext uri="{FF2B5EF4-FFF2-40B4-BE49-F238E27FC236}">
+                  <a16:creationId xmlns:a16="http://schemas.microsoft.com/office/drawing/2014/main" id="{94AAB8EE-9976-CD57-90FC-26EE1EE29312}"/>
+                </a:ext>
+              </a:extLst>
+            </p:cNvPr>
+            <p:cNvSpPr txBox="1"/>
+            <p:nvPr/>
+          </p:nvSpPr>
+          <p:spPr>
+            <a:xfrm>
+              <a:off x="5999025" y="1717945"/>
+              <a:ext cx="516194" cy="708688"/>
+            </a:xfrm>
+            <a:prstGeom prst="rect">
+              <a:avLst/>
+            </a:prstGeom>
+            <a:noFill/>
+          </p:spPr>
+          <p:txBody>
+            <a:bodyPr wrap="square" rtlCol="0">
+              <a:spAutoFit/>
+            </a:bodyPr>
+            <a:lstStyle/>
+            <a:p>
+              <a:pPr algn="ctr"/>
+              <a:r>
+                <a:rPr lang="en-IN" sz="3200" b="1" dirty="0">
+                  <a:solidFill>
+                    <a:srgbClr val="FF0000"/>
+                  </a:solidFill>
+                  <a:latin typeface="Arial" panose="020B0604020202020204" pitchFamily="34" charset="0"/>
+                  <a:cs typeface="Arial" panose="020B0604020202020204" pitchFamily="34" charset="0"/>
+                </a:rPr>
+                <a:t>V</a:t>
+              </a:r>
+            </a:p>
+          </p:txBody>
+        </p:sp>
+      </p:grpSp>
+      <p:grpSp>
+        <p:nvGrpSpPr>
+          <p:cNvPr id="124" name="Group 123">
+            <a:extLst>
+              <a:ext uri="{FF2B5EF4-FFF2-40B4-BE49-F238E27FC236}">
+                <a16:creationId xmlns:a16="http://schemas.microsoft.com/office/drawing/2014/main" id="{5BFC7CBF-008F-E09C-B544-4C1772BEF66F}"/>
+              </a:ext>
+            </a:extLst>
+          </p:cNvPr>
+          <p:cNvGrpSpPr/>
+          <p:nvPr/>
+        </p:nvGrpSpPr>
+        <p:grpSpPr>
+          <a:xfrm rot="5400000" flipV="1">
+            <a:off x="10970325" y="907061"/>
+            <a:ext cx="131685" cy="304028"/>
+            <a:chOff x="3898812" y="2986773"/>
+            <a:chExt cx="232509" cy="554879"/>
+          </a:xfrm>
+        </p:grpSpPr>
+        <p:sp>
+          <p:nvSpPr>
+            <p:cNvPr id="125" name="Arc 124">
+              <a:extLst>
+                <a:ext uri="{FF2B5EF4-FFF2-40B4-BE49-F238E27FC236}">
+                  <a16:creationId xmlns:a16="http://schemas.microsoft.com/office/drawing/2014/main" id="{341F7BD6-35B6-AF6C-8A56-9779924B2DC4}"/>
+                </a:ext>
+              </a:extLst>
+            </p:cNvPr>
+            <p:cNvSpPr/>
+            <p:nvPr/>
+          </p:nvSpPr>
+          <p:spPr>
+            <a:xfrm rot="16200000">
+              <a:off x="3877316" y="3010463"/>
+              <a:ext cx="277695" cy="230315"/>
+            </a:xfrm>
+            <a:prstGeom prst="arc">
+              <a:avLst>
+                <a:gd name="adj1" fmla="val 10739696"/>
+                <a:gd name="adj2" fmla="val 0"/>
+              </a:avLst>
+            </a:prstGeom>
+            <a:ln w="38100">
+              <a:solidFill>
+                <a:srgbClr val="FF0000"/>
+              </a:solidFill>
+            </a:ln>
+          </p:spPr>
+          <p:style>
+            <a:lnRef idx="1">
+              <a:schemeClr val="dk1"/>
+            </a:lnRef>
+            <a:fillRef idx="0">
+              <a:schemeClr val="dk1"/>
+            </a:fillRef>
+            <a:effectRef idx="0">
+              <a:schemeClr val="dk1"/>
+            </a:effectRef>
+            <a:fontRef idx="minor">
+              <a:schemeClr val="tx1"/>
+            </a:fontRef>
+          </p:style>
+          <p:txBody>
+            <a:bodyPr rtlCol="0" anchor="ctr"/>
+            <a:lstStyle/>
+            <a:p>
+              <a:pPr algn="ctr"/>
+              <a:endParaRPr lang="en-IN"/>
+            </a:p>
+          </p:txBody>
+        </p:sp>
+        <p:sp>
+          <p:nvSpPr>
+            <p:cNvPr id="126" name="Arc 125">
+              <a:extLst>
+                <a:ext uri="{FF2B5EF4-FFF2-40B4-BE49-F238E27FC236}">
+                  <a16:creationId xmlns:a16="http://schemas.microsoft.com/office/drawing/2014/main" id="{E76BA579-A737-D26B-AC87-85EBC4875539}"/>
+                </a:ext>
+              </a:extLst>
+            </p:cNvPr>
+            <p:cNvSpPr/>
+            <p:nvPr/>
+          </p:nvSpPr>
+          <p:spPr>
+            <a:xfrm rot="5400000" flipH="1">
+              <a:off x="3875122" y="3287647"/>
+              <a:ext cx="277695" cy="230315"/>
+            </a:xfrm>
+            <a:prstGeom prst="arc">
+              <a:avLst>
+                <a:gd name="adj1" fmla="val 10739696"/>
+                <a:gd name="adj2" fmla="val 0"/>
+              </a:avLst>
+            </a:prstGeom>
+            <a:ln w="38100">
+              <a:solidFill>
+                <a:srgbClr val="FF0000"/>
+              </a:solidFill>
+            </a:ln>
+          </p:spPr>
+          <p:style>
+            <a:lnRef idx="1">
+              <a:schemeClr val="dk1"/>
+            </a:lnRef>
+            <a:fillRef idx="0">
+              <a:schemeClr val="dk1"/>
+            </a:fillRef>
+            <a:effectRef idx="0">
+              <a:schemeClr val="dk1"/>
+            </a:effectRef>
+            <a:fontRef idx="minor">
+              <a:schemeClr val="tx1"/>
+            </a:fontRef>
+          </p:style>
+          <p:txBody>
+            <a:bodyPr rtlCol="0" anchor="ctr"/>
+            <a:lstStyle/>
+            <a:p>
+              <a:pPr algn="ctr"/>
+              <a:endParaRPr lang="en-IN"/>
+            </a:p>
+          </p:txBody>
+        </p:sp>
+      </p:grpSp>
+      <p:cxnSp>
+        <p:nvCxnSpPr>
+          <p:cNvPr id="128" name="Straight Connector 127">
+            <a:extLst>
+              <a:ext uri="{FF2B5EF4-FFF2-40B4-BE49-F238E27FC236}">
+                <a16:creationId xmlns:a16="http://schemas.microsoft.com/office/drawing/2014/main" id="{A2CBA8AB-9278-DE64-DFAD-21E7463FC490}"/>
               </a:ext>
             </a:extLst>
           </p:cNvPr>
@@ -8832,13 +7938,18 @@
           <p:nvPr/>
         </p:nvCxnSpPr>
         <p:spPr>
-          <a:xfrm flipH="1">
-            <a:off x="4562505" y="1329513"/>
-            <a:ext cx="1055478" cy="0"/>
+          <a:xfrm>
+            <a:off x="9692715" y="4861409"/>
+            <a:ext cx="7639" cy="972113"/>
           </a:xfrm>
           <a:prstGeom prst="line">
             <a:avLst/>
           </a:prstGeom>
+          <a:ln w="38100">
+            <a:solidFill>
+              <a:schemeClr val="tx1"/>
+            </a:solidFill>
+          </a:ln>
         </p:spPr>
         <p:style>
           <a:lnRef idx="1">
@@ -8855,120 +7966,1504 @@
           </a:fontRef>
         </p:style>
       </p:cxnSp>
-      <p:cxnSp>
-        <p:nvCxnSpPr>
-          <p:cNvPr id="108" name="Straight Connector 107">
+      <p:grpSp>
+        <p:nvGrpSpPr>
+          <p:cNvPr id="135" name="Group 134">
             <a:extLst>
               <a:ext uri="{FF2B5EF4-FFF2-40B4-BE49-F238E27FC236}">
-                <a16:creationId xmlns:a16="http://schemas.microsoft.com/office/drawing/2014/main" id="{6F9141B0-7527-38F0-F29E-7352EFF4FAC7}"/>
+                <a16:creationId xmlns:a16="http://schemas.microsoft.com/office/drawing/2014/main" id="{E7B00BDA-A50C-B796-71CB-EE1AE56D02DE}"/>
               </a:ext>
             </a:extLst>
           </p:cNvPr>
-          <p:cNvCxnSpPr>
-            <a:cxnSpLocks/>
-          </p:cNvCxnSpPr>
+          <p:cNvGrpSpPr/>
           <p:nvPr/>
-        </p:nvCxnSpPr>
+        </p:nvGrpSpPr>
+        <p:grpSpPr>
+          <a:xfrm rot="16200000" flipV="1">
+            <a:off x="4921457" y="793422"/>
+            <a:ext cx="512854" cy="410776"/>
+            <a:chOff x="3610045" y="3464345"/>
+            <a:chExt cx="693435" cy="420634"/>
+          </a:xfrm>
+        </p:grpSpPr>
+        <p:sp>
+          <p:nvSpPr>
+            <p:cNvPr id="136" name="Isosceles Triangle 135">
+              <a:extLst>
+                <a:ext uri="{FF2B5EF4-FFF2-40B4-BE49-F238E27FC236}">
+                  <a16:creationId xmlns:a16="http://schemas.microsoft.com/office/drawing/2014/main" id="{A815B1FA-CFD9-38FB-16CE-EBA02A4AE1B7}"/>
+                </a:ext>
+              </a:extLst>
+            </p:cNvPr>
+            <p:cNvSpPr/>
+            <p:nvPr/>
+          </p:nvSpPr>
+          <p:spPr>
+            <a:xfrm>
+              <a:off x="3610045" y="3464345"/>
+              <a:ext cx="653139" cy="420634"/>
+            </a:xfrm>
+            <a:prstGeom prst="triangle">
+              <a:avLst/>
+            </a:prstGeom>
+            <a:ln>
+              <a:solidFill>
+                <a:schemeClr val="accent1"/>
+              </a:solidFill>
+            </a:ln>
+          </p:spPr>
+          <p:style>
+            <a:lnRef idx="2">
+              <a:schemeClr val="accent1">
+                <a:shade val="50000"/>
+              </a:schemeClr>
+            </a:lnRef>
+            <a:fillRef idx="1">
+              <a:schemeClr val="accent1"/>
+            </a:fillRef>
+            <a:effectRef idx="0">
+              <a:schemeClr val="accent1"/>
+            </a:effectRef>
+            <a:fontRef idx="minor">
+              <a:schemeClr val="lt1"/>
+            </a:fontRef>
+          </p:style>
+          <p:txBody>
+            <a:bodyPr rtlCol="0" anchor="ctr"/>
+            <a:lstStyle/>
+            <a:p>
+              <a:pPr algn="ctr"/>
+              <a:endParaRPr lang="en-IN"/>
+            </a:p>
+          </p:txBody>
+        </p:sp>
+        <p:cxnSp>
+          <p:nvCxnSpPr>
+            <p:cNvPr id="137" name="Straight Connector 136">
+              <a:extLst>
+                <a:ext uri="{FF2B5EF4-FFF2-40B4-BE49-F238E27FC236}">
+                  <a16:creationId xmlns:a16="http://schemas.microsoft.com/office/drawing/2014/main" id="{59E14FC6-600B-7B61-ED29-1CFD9689CC80}"/>
+                </a:ext>
+              </a:extLst>
+            </p:cNvPr>
+            <p:cNvCxnSpPr>
+              <a:cxnSpLocks/>
+            </p:cNvCxnSpPr>
+            <p:nvPr/>
+          </p:nvCxnSpPr>
+          <p:spPr>
+            <a:xfrm>
+              <a:off x="3610045" y="3491609"/>
+              <a:ext cx="693435" cy="0"/>
+            </a:xfrm>
+            <a:prstGeom prst="line">
+              <a:avLst/>
+            </a:prstGeom>
+            <a:ln w="57150">
+              <a:solidFill>
+                <a:schemeClr val="accent1"/>
+              </a:solidFill>
+            </a:ln>
+          </p:spPr>
+          <p:style>
+            <a:lnRef idx="1">
+              <a:schemeClr val="accent1"/>
+            </a:lnRef>
+            <a:fillRef idx="0">
+              <a:schemeClr val="accent1"/>
+            </a:fillRef>
+            <a:effectRef idx="0">
+              <a:schemeClr val="accent1"/>
+            </a:effectRef>
+            <a:fontRef idx="minor">
+              <a:schemeClr val="tx1"/>
+            </a:fontRef>
+          </p:style>
+        </p:cxnSp>
+      </p:grpSp>
+      <p:sp>
+        <p:nvSpPr>
+          <p:cNvPr id="145" name="Oval 144">
+            <a:extLst>
+              <a:ext uri="{FF2B5EF4-FFF2-40B4-BE49-F238E27FC236}">
+                <a16:creationId xmlns:a16="http://schemas.microsoft.com/office/drawing/2014/main" id="{CDA49D9F-AEB3-E24D-53AF-4078C58F736C}"/>
+              </a:ext>
+            </a:extLst>
+          </p:cNvPr>
+          <p:cNvSpPr/>
+          <p:nvPr/>
+        </p:nvSpPr>
         <p:spPr>
-          <a:xfrm flipH="1">
-            <a:off x="4562505" y="377732"/>
-            <a:ext cx="1055478" cy="0"/>
+          <a:xfrm rot="16200000" flipV="1">
+            <a:off x="4747752" y="2496740"/>
+            <a:ext cx="45719" cy="45719"/>
           </a:xfrm>
-          <a:prstGeom prst="line">
+          <a:prstGeom prst="ellipse">
             <a:avLst/>
           </a:prstGeom>
+          <a:ln w="57150">
+            <a:solidFill>
+              <a:schemeClr val="accent1"/>
+            </a:solidFill>
+          </a:ln>
         </p:spPr>
         <p:style>
-          <a:lnRef idx="1">
-            <a:schemeClr val="accent1"/>
+          <a:lnRef idx="2">
+            <a:schemeClr val="accent1">
+              <a:shade val="50000"/>
+            </a:schemeClr>
           </a:lnRef>
-          <a:fillRef idx="0">
+          <a:fillRef idx="1">
             <a:schemeClr val="accent1"/>
           </a:fillRef>
           <a:effectRef idx="0">
             <a:schemeClr val="accent1"/>
           </a:effectRef>
           <a:fontRef idx="minor">
-            <a:schemeClr val="tx1"/>
+            <a:schemeClr val="lt1"/>
           </a:fontRef>
         </p:style>
-      </p:cxnSp>
-      <p:cxnSp>
-        <p:nvCxnSpPr>
-          <p:cNvPr id="109" name="Straight Connector 108">
+        <p:txBody>
+          <a:bodyPr rtlCol="0" anchor="ctr"/>
+          <a:lstStyle/>
+          <a:p>
+            <a:pPr algn="ctr"/>
+            <a:endParaRPr lang="en-IN" dirty="0"/>
+          </a:p>
+        </p:txBody>
+      </p:sp>
+      <p:grpSp>
+        <p:nvGrpSpPr>
+          <p:cNvPr id="155" name="Group 154">
             <a:extLst>
               <a:ext uri="{FF2B5EF4-FFF2-40B4-BE49-F238E27FC236}">
-                <a16:creationId xmlns:a16="http://schemas.microsoft.com/office/drawing/2014/main" id="{99FADB49-0F57-4516-C99F-A1AEDE00C839}"/>
+                <a16:creationId xmlns:a16="http://schemas.microsoft.com/office/drawing/2014/main" id="{628EB4B6-A5E7-C319-8357-B127233F4023}"/>
               </a:ext>
             </a:extLst>
           </p:cNvPr>
-          <p:cNvCxnSpPr>
-            <a:cxnSpLocks/>
-          </p:cNvCxnSpPr>
+          <p:cNvGrpSpPr/>
           <p:nvPr/>
-        </p:nvCxnSpPr>
-        <p:spPr>
-          <a:xfrm flipH="1">
-            <a:off x="4562505" y="1843054"/>
-            <a:ext cx="1055478" cy="0"/>
+        </p:nvGrpSpPr>
+        <p:grpSpPr>
+          <a:xfrm rot="10800000">
+            <a:off x="1917866" y="928617"/>
+            <a:ext cx="604877" cy="512854"/>
+            <a:chOff x="4747310" y="2069525"/>
+            <a:chExt cx="604877" cy="512854"/>
           </a:xfrm>
-          <a:prstGeom prst="line">
-            <a:avLst/>
-          </a:prstGeom>
-        </p:spPr>
-        <p:style>
-          <a:lnRef idx="1">
-            <a:schemeClr val="accent1"/>
-          </a:lnRef>
-          <a:fillRef idx="0">
-            <a:schemeClr val="accent1"/>
-          </a:fillRef>
-          <a:effectRef idx="0">
-            <a:schemeClr val="accent1"/>
-          </a:effectRef>
-          <a:fontRef idx="minor">
-            <a:schemeClr val="tx1"/>
-          </a:fontRef>
-        </p:style>
-      </p:cxnSp>
-      <p:cxnSp>
-        <p:nvCxnSpPr>
-          <p:cNvPr id="110" name="Straight Connector 109">
+        </p:grpSpPr>
+        <p:grpSp>
+          <p:nvGrpSpPr>
+            <p:cNvPr id="156" name="Group 155">
+              <a:extLst>
+                <a:ext uri="{FF2B5EF4-FFF2-40B4-BE49-F238E27FC236}">
+                  <a16:creationId xmlns:a16="http://schemas.microsoft.com/office/drawing/2014/main" id="{0AE2BE1E-2AB9-CC7F-0A01-C2EB205E973C}"/>
+                </a:ext>
+              </a:extLst>
+            </p:cNvPr>
+            <p:cNvGrpSpPr/>
+            <p:nvPr/>
+          </p:nvGrpSpPr>
+          <p:grpSpPr>
+            <a:xfrm rot="16200000" flipH="1">
+              <a:off x="4890372" y="2120564"/>
+              <a:ext cx="512854" cy="410776"/>
+              <a:chOff x="3610045" y="3464345"/>
+              <a:chExt cx="693435" cy="420634"/>
+            </a:xfrm>
+          </p:grpSpPr>
+          <p:sp>
+            <p:nvSpPr>
+              <p:cNvPr id="159" name="Isosceles Triangle 158">
+                <a:extLst>
+                  <a:ext uri="{FF2B5EF4-FFF2-40B4-BE49-F238E27FC236}">
+                    <a16:creationId xmlns:a16="http://schemas.microsoft.com/office/drawing/2014/main" id="{E7A29293-40FD-A1AE-F530-56C83BDD005F}"/>
+                  </a:ext>
+                </a:extLst>
+              </p:cNvPr>
+              <p:cNvSpPr/>
+              <p:nvPr/>
+            </p:nvSpPr>
+            <p:spPr>
+              <a:xfrm>
+                <a:off x="3610045" y="3464345"/>
+                <a:ext cx="653139" cy="420634"/>
+              </a:xfrm>
+              <a:prstGeom prst="triangle">
+                <a:avLst/>
+              </a:prstGeom>
+              <a:ln>
+                <a:solidFill>
+                  <a:schemeClr val="accent1"/>
+                </a:solidFill>
+              </a:ln>
+            </p:spPr>
+            <p:style>
+              <a:lnRef idx="2">
+                <a:schemeClr val="accent1">
+                  <a:shade val="50000"/>
+                </a:schemeClr>
+              </a:lnRef>
+              <a:fillRef idx="1">
+                <a:schemeClr val="accent1"/>
+              </a:fillRef>
+              <a:effectRef idx="0">
+                <a:schemeClr val="accent1"/>
+              </a:effectRef>
+              <a:fontRef idx="minor">
+                <a:schemeClr val="lt1"/>
+              </a:fontRef>
+            </p:style>
+            <p:txBody>
+              <a:bodyPr rtlCol="0" anchor="ctr"/>
+              <a:lstStyle/>
+              <a:p>
+                <a:pPr algn="ctr"/>
+                <a:endParaRPr lang="en-IN"/>
+              </a:p>
+            </p:txBody>
+          </p:sp>
+          <p:cxnSp>
+            <p:nvCxnSpPr>
+              <p:cNvPr id="160" name="Straight Connector 159">
+                <a:extLst>
+                  <a:ext uri="{FF2B5EF4-FFF2-40B4-BE49-F238E27FC236}">
+                    <a16:creationId xmlns:a16="http://schemas.microsoft.com/office/drawing/2014/main" id="{2BE55F0E-9E6D-E64A-4F8D-BB5AD290BFE1}"/>
+                  </a:ext>
+                </a:extLst>
+              </p:cNvPr>
+              <p:cNvCxnSpPr>
+                <a:cxnSpLocks/>
+              </p:cNvCxnSpPr>
+              <p:nvPr/>
+            </p:nvCxnSpPr>
+            <p:spPr>
+              <a:xfrm>
+                <a:off x="3610045" y="3491609"/>
+                <a:ext cx="693435" cy="0"/>
+              </a:xfrm>
+              <a:prstGeom prst="line">
+                <a:avLst/>
+              </a:prstGeom>
+              <a:ln w="57150">
+                <a:solidFill>
+                  <a:schemeClr val="accent1"/>
+                </a:solidFill>
+              </a:ln>
+            </p:spPr>
+            <p:style>
+              <a:lnRef idx="1">
+                <a:schemeClr val="accent1"/>
+              </a:lnRef>
+              <a:fillRef idx="0">
+                <a:schemeClr val="accent1"/>
+              </a:fillRef>
+              <a:effectRef idx="0">
+                <a:schemeClr val="accent1"/>
+              </a:effectRef>
+              <a:fontRef idx="minor">
+                <a:schemeClr val="tx1"/>
+              </a:fontRef>
+            </p:style>
+          </p:cxnSp>
+        </p:grpSp>
+        <p:cxnSp>
+          <p:nvCxnSpPr>
+            <p:cNvPr id="157" name="Straight Connector 156">
+              <a:extLst>
+                <a:ext uri="{FF2B5EF4-FFF2-40B4-BE49-F238E27FC236}">
+                  <a16:creationId xmlns:a16="http://schemas.microsoft.com/office/drawing/2014/main" id="{C8901547-7618-5E44-F225-4AA21C707759}"/>
+                </a:ext>
+              </a:extLst>
+            </p:cNvPr>
+            <p:cNvCxnSpPr>
+              <a:cxnSpLocks/>
+            </p:cNvCxnSpPr>
+            <p:nvPr/>
+          </p:nvCxnSpPr>
+          <p:spPr>
+            <a:xfrm rot="16200000" flipH="1" flipV="1">
+              <a:off x="4743654" y="2341508"/>
+              <a:ext cx="214725" cy="207413"/>
+            </a:xfrm>
+            <a:prstGeom prst="line">
+              <a:avLst/>
+            </a:prstGeom>
+            <a:ln w="38100">
+              <a:solidFill>
+                <a:schemeClr val="accent1"/>
+              </a:solidFill>
+            </a:ln>
+          </p:spPr>
+          <p:style>
+            <a:lnRef idx="1">
+              <a:schemeClr val="accent1"/>
+            </a:lnRef>
+            <a:fillRef idx="0">
+              <a:schemeClr val="accent1"/>
+            </a:fillRef>
+            <a:effectRef idx="0">
+              <a:schemeClr val="accent1"/>
+            </a:effectRef>
+            <a:fontRef idx="minor">
+              <a:schemeClr val="tx1"/>
+            </a:fontRef>
+          </p:style>
+        </p:cxnSp>
+        <p:sp>
+          <p:nvSpPr>
+            <p:cNvPr id="158" name="Oval 157">
+              <a:extLst>
+                <a:ext uri="{FF2B5EF4-FFF2-40B4-BE49-F238E27FC236}">
+                  <a16:creationId xmlns:a16="http://schemas.microsoft.com/office/drawing/2014/main" id="{277E374E-D5A7-D390-92FD-D4D9054AC2D2}"/>
+                </a:ext>
+              </a:extLst>
+            </p:cNvPr>
+            <p:cNvSpPr/>
+            <p:nvPr/>
+          </p:nvSpPr>
+          <p:spPr>
+            <a:xfrm rot="16200000" flipV="1">
+              <a:off x="4747752" y="2496740"/>
+              <a:ext cx="45719" cy="45719"/>
+            </a:xfrm>
+            <a:prstGeom prst="ellipse">
+              <a:avLst/>
+            </a:prstGeom>
+            <a:ln w="57150">
+              <a:solidFill>
+                <a:schemeClr val="accent1"/>
+              </a:solidFill>
+            </a:ln>
+          </p:spPr>
+          <p:style>
+            <a:lnRef idx="2">
+              <a:schemeClr val="accent1">
+                <a:shade val="50000"/>
+              </a:schemeClr>
+            </a:lnRef>
+            <a:fillRef idx="1">
+              <a:schemeClr val="accent1"/>
+            </a:fillRef>
+            <a:effectRef idx="0">
+              <a:schemeClr val="accent1"/>
+            </a:effectRef>
+            <a:fontRef idx="minor">
+              <a:schemeClr val="lt1"/>
+            </a:fontRef>
+          </p:style>
+          <p:txBody>
+            <a:bodyPr rtlCol="0" anchor="ctr"/>
+            <a:lstStyle/>
+            <a:p>
+              <a:pPr algn="ctr"/>
+              <a:endParaRPr lang="en-IN" dirty="0"/>
+            </a:p>
+          </p:txBody>
+        </p:sp>
+      </p:grpSp>
+      <p:grpSp>
+        <p:nvGrpSpPr>
+          <p:cNvPr id="169" name="Group 168">
             <a:extLst>
               <a:ext uri="{FF2B5EF4-FFF2-40B4-BE49-F238E27FC236}">
-                <a16:creationId xmlns:a16="http://schemas.microsoft.com/office/drawing/2014/main" id="{7A7028AC-05FD-ADD4-58E0-3942EF70D5AD}"/>
+                <a16:creationId xmlns:a16="http://schemas.microsoft.com/office/drawing/2014/main" id="{0B804AB2-D0BF-FE79-FE92-3DC77E444F27}"/>
               </a:ext>
             </a:extLst>
           </p:cNvPr>
-          <p:cNvCxnSpPr>
-            <a:cxnSpLocks/>
-          </p:cNvCxnSpPr>
+          <p:cNvGrpSpPr/>
           <p:nvPr/>
-        </p:nvCxnSpPr>
-        <p:spPr>
-          <a:xfrm flipH="1">
-            <a:off x="4562505" y="2850112"/>
-            <a:ext cx="1055478" cy="0"/>
+        </p:nvGrpSpPr>
+        <p:grpSpPr>
+          <a:xfrm>
+            <a:off x="7993656" y="3426083"/>
+            <a:ext cx="512854" cy="630509"/>
+            <a:chOff x="7992394" y="3426266"/>
+            <a:chExt cx="512854" cy="630509"/>
           </a:xfrm>
-          <a:prstGeom prst="line">
-            <a:avLst/>
-          </a:prstGeom>
-        </p:spPr>
-        <p:style>
-          <a:lnRef idx="1">
-            <a:schemeClr val="accent1"/>
-          </a:lnRef>
-          <a:fillRef idx="0">
-            <a:schemeClr val="accent1"/>
-          </a:fillRef>
-          <a:effectRef idx="0">
-            <a:schemeClr val="accent1"/>
-          </a:effectRef>
-          <a:fontRef idx="minor">
-            <a:schemeClr val="tx1"/>
-          </a:fontRef>
-        </p:style>
-      </p:cxnSp>
+        </p:grpSpPr>
+        <p:grpSp>
+          <p:nvGrpSpPr>
+            <p:cNvPr id="162" name="Group 161">
+              <a:extLst>
+                <a:ext uri="{FF2B5EF4-FFF2-40B4-BE49-F238E27FC236}">
+                  <a16:creationId xmlns:a16="http://schemas.microsoft.com/office/drawing/2014/main" id="{15DE584C-4A15-502B-EA12-65D46BCF0674}"/>
+                </a:ext>
+              </a:extLst>
+            </p:cNvPr>
+            <p:cNvGrpSpPr/>
+            <p:nvPr/>
+          </p:nvGrpSpPr>
+          <p:grpSpPr>
+            <a:xfrm flipH="1">
+              <a:off x="7992394" y="3645999"/>
+              <a:ext cx="512854" cy="410776"/>
+              <a:chOff x="3610045" y="3464345"/>
+              <a:chExt cx="693435" cy="420634"/>
+            </a:xfrm>
+          </p:grpSpPr>
+          <p:sp>
+            <p:nvSpPr>
+              <p:cNvPr id="166" name="Isosceles Triangle 165">
+                <a:extLst>
+                  <a:ext uri="{FF2B5EF4-FFF2-40B4-BE49-F238E27FC236}">
+                    <a16:creationId xmlns:a16="http://schemas.microsoft.com/office/drawing/2014/main" id="{DFFD54C1-457C-FF81-BEEF-A48F30C0A31C}"/>
+                  </a:ext>
+                </a:extLst>
+              </p:cNvPr>
+              <p:cNvSpPr/>
+              <p:nvPr/>
+            </p:nvSpPr>
+            <p:spPr>
+              <a:xfrm>
+                <a:off x="3610045" y="3464345"/>
+                <a:ext cx="653139" cy="420634"/>
+              </a:xfrm>
+              <a:prstGeom prst="triangle">
+                <a:avLst/>
+              </a:prstGeom>
+              <a:ln>
+                <a:solidFill>
+                  <a:schemeClr val="accent1"/>
+                </a:solidFill>
+              </a:ln>
+            </p:spPr>
+            <p:style>
+              <a:lnRef idx="2">
+                <a:schemeClr val="accent1">
+                  <a:shade val="50000"/>
+                </a:schemeClr>
+              </a:lnRef>
+              <a:fillRef idx="1">
+                <a:schemeClr val="accent1"/>
+              </a:fillRef>
+              <a:effectRef idx="0">
+                <a:schemeClr val="accent1"/>
+              </a:effectRef>
+              <a:fontRef idx="minor">
+                <a:schemeClr val="lt1"/>
+              </a:fontRef>
+            </p:style>
+            <p:txBody>
+              <a:bodyPr rtlCol="0" anchor="ctr"/>
+              <a:lstStyle/>
+              <a:p>
+                <a:pPr algn="ctr"/>
+                <a:endParaRPr lang="en-IN"/>
+              </a:p>
+            </p:txBody>
+          </p:sp>
+          <p:cxnSp>
+            <p:nvCxnSpPr>
+              <p:cNvPr id="167" name="Straight Connector 166">
+                <a:extLst>
+                  <a:ext uri="{FF2B5EF4-FFF2-40B4-BE49-F238E27FC236}">
+                    <a16:creationId xmlns:a16="http://schemas.microsoft.com/office/drawing/2014/main" id="{8860685C-A8AD-A3C7-F810-0B0660B4D3DF}"/>
+                  </a:ext>
+                </a:extLst>
+              </p:cNvPr>
+              <p:cNvCxnSpPr>
+                <a:cxnSpLocks/>
+              </p:cNvCxnSpPr>
+              <p:nvPr/>
+            </p:nvCxnSpPr>
+            <p:spPr>
+              <a:xfrm>
+                <a:off x="3610045" y="3491609"/>
+                <a:ext cx="693435" cy="0"/>
+              </a:xfrm>
+              <a:prstGeom prst="line">
+                <a:avLst/>
+              </a:prstGeom>
+              <a:ln w="57150">
+                <a:solidFill>
+                  <a:schemeClr val="accent1"/>
+                </a:solidFill>
+              </a:ln>
+            </p:spPr>
+            <p:style>
+              <a:lnRef idx="1">
+                <a:schemeClr val="accent1"/>
+              </a:lnRef>
+              <a:fillRef idx="0">
+                <a:schemeClr val="accent1"/>
+              </a:fillRef>
+              <a:effectRef idx="0">
+                <a:schemeClr val="accent1"/>
+              </a:effectRef>
+              <a:fontRef idx="minor">
+                <a:schemeClr val="tx1"/>
+              </a:fontRef>
+            </p:style>
+          </p:cxnSp>
+        </p:grpSp>
+        <p:cxnSp>
+          <p:nvCxnSpPr>
+            <p:cNvPr id="163" name="Straight Connector 162">
+              <a:extLst>
+                <a:ext uri="{FF2B5EF4-FFF2-40B4-BE49-F238E27FC236}">
+                  <a16:creationId xmlns:a16="http://schemas.microsoft.com/office/drawing/2014/main" id="{A017C2D5-D734-9096-43AA-AFD1B94E8D84}"/>
+                </a:ext>
+              </a:extLst>
+            </p:cNvPr>
+            <p:cNvCxnSpPr>
+              <a:cxnSpLocks/>
+            </p:cNvCxnSpPr>
+            <p:nvPr/>
+          </p:nvCxnSpPr>
+          <p:spPr>
+            <a:xfrm flipV="1">
+              <a:off x="8324463" y="3446184"/>
+              <a:ext cx="133114" cy="221291"/>
+            </a:xfrm>
+            <a:prstGeom prst="line">
+              <a:avLst/>
+            </a:prstGeom>
+            <a:ln w="38100">
+              <a:solidFill>
+                <a:schemeClr val="accent1"/>
+              </a:solidFill>
+            </a:ln>
+          </p:spPr>
+          <p:style>
+            <a:lnRef idx="1">
+              <a:schemeClr val="accent1"/>
+            </a:lnRef>
+            <a:fillRef idx="0">
+              <a:schemeClr val="accent1"/>
+            </a:fillRef>
+            <a:effectRef idx="0">
+              <a:schemeClr val="accent1"/>
+            </a:effectRef>
+            <a:fontRef idx="minor">
+              <a:schemeClr val="tx1"/>
+            </a:fontRef>
+          </p:style>
+        </p:cxnSp>
+        <p:sp>
+          <p:nvSpPr>
+            <p:cNvPr id="164" name="Oval 163">
+              <a:extLst>
+                <a:ext uri="{FF2B5EF4-FFF2-40B4-BE49-F238E27FC236}">
+                  <a16:creationId xmlns:a16="http://schemas.microsoft.com/office/drawing/2014/main" id="{8CC20089-CD60-4684-967D-CE46737BB936}"/>
+                </a:ext>
+              </a:extLst>
+            </p:cNvPr>
+            <p:cNvSpPr/>
+            <p:nvPr/>
+          </p:nvSpPr>
+          <p:spPr>
+            <a:xfrm flipV="1">
+              <a:off x="8431339" y="3426266"/>
+              <a:ext cx="45719" cy="45719"/>
+            </a:xfrm>
+            <a:prstGeom prst="ellipse">
+              <a:avLst/>
+            </a:prstGeom>
+            <a:ln w="57150">
+              <a:solidFill>
+                <a:schemeClr val="accent1"/>
+              </a:solidFill>
+            </a:ln>
+          </p:spPr>
+          <p:style>
+            <a:lnRef idx="2">
+              <a:schemeClr val="accent1">
+                <a:shade val="50000"/>
+              </a:schemeClr>
+            </a:lnRef>
+            <a:fillRef idx="1">
+              <a:schemeClr val="accent1"/>
+            </a:fillRef>
+            <a:effectRef idx="0">
+              <a:schemeClr val="accent1"/>
+            </a:effectRef>
+            <a:fontRef idx="minor">
+              <a:schemeClr val="lt1"/>
+            </a:fontRef>
+          </p:style>
+          <p:txBody>
+            <a:bodyPr rtlCol="0" anchor="ctr"/>
+            <a:lstStyle/>
+            <a:p>
+              <a:pPr algn="ctr"/>
+              <a:endParaRPr lang="en-IN" dirty="0"/>
+            </a:p>
+          </p:txBody>
+        </p:sp>
+      </p:grpSp>
+      <p:grpSp>
+        <p:nvGrpSpPr>
+          <p:cNvPr id="170" name="Group 169">
+            <a:extLst>
+              <a:ext uri="{FF2B5EF4-FFF2-40B4-BE49-F238E27FC236}">
+                <a16:creationId xmlns:a16="http://schemas.microsoft.com/office/drawing/2014/main" id="{4915CBB3-DC3D-BE38-16D7-B39302AFC571}"/>
+              </a:ext>
+            </a:extLst>
+          </p:cNvPr>
+          <p:cNvGrpSpPr/>
+          <p:nvPr/>
+        </p:nvGrpSpPr>
+        <p:grpSpPr>
+          <a:xfrm>
+            <a:off x="9421745" y="3395575"/>
+            <a:ext cx="512854" cy="630509"/>
+            <a:chOff x="7992394" y="3426266"/>
+            <a:chExt cx="512854" cy="630509"/>
+          </a:xfrm>
+        </p:grpSpPr>
+        <p:grpSp>
+          <p:nvGrpSpPr>
+            <p:cNvPr id="171" name="Group 170">
+              <a:extLst>
+                <a:ext uri="{FF2B5EF4-FFF2-40B4-BE49-F238E27FC236}">
+                  <a16:creationId xmlns:a16="http://schemas.microsoft.com/office/drawing/2014/main" id="{E60046E9-55E3-7EB2-9BE2-11888CF4300F}"/>
+                </a:ext>
+              </a:extLst>
+            </p:cNvPr>
+            <p:cNvGrpSpPr/>
+            <p:nvPr/>
+          </p:nvGrpSpPr>
+          <p:grpSpPr>
+            <a:xfrm flipH="1">
+              <a:off x="7992394" y="3645999"/>
+              <a:ext cx="512854" cy="410776"/>
+              <a:chOff x="3610045" y="3464345"/>
+              <a:chExt cx="693435" cy="420634"/>
+            </a:xfrm>
+          </p:grpSpPr>
+          <p:sp>
+            <p:nvSpPr>
+              <p:cNvPr id="174" name="Isosceles Triangle 173">
+                <a:extLst>
+                  <a:ext uri="{FF2B5EF4-FFF2-40B4-BE49-F238E27FC236}">
+                    <a16:creationId xmlns:a16="http://schemas.microsoft.com/office/drawing/2014/main" id="{5B738434-A4C3-09FB-62BA-7CFA6C47A9CC}"/>
+                  </a:ext>
+                </a:extLst>
+              </p:cNvPr>
+              <p:cNvSpPr/>
+              <p:nvPr/>
+            </p:nvSpPr>
+            <p:spPr>
+              <a:xfrm>
+                <a:off x="3610045" y="3464345"/>
+                <a:ext cx="653139" cy="420634"/>
+              </a:xfrm>
+              <a:prstGeom prst="triangle">
+                <a:avLst/>
+              </a:prstGeom>
+              <a:ln>
+                <a:solidFill>
+                  <a:schemeClr val="accent1"/>
+                </a:solidFill>
+              </a:ln>
+            </p:spPr>
+            <p:style>
+              <a:lnRef idx="2">
+                <a:schemeClr val="accent1">
+                  <a:shade val="50000"/>
+                </a:schemeClr>
+              </a:lnRef>
+              <a:fillRef idx="1">
+                <a:schemeClr val="accent1"/>
+              </a:fillRef>
+              <a:effectRef idx="0">
+                <a:schemeClr val="accent1"/>
+              </a:effectRef>
+              <a:fontRef idx="minor">
+                <a:schemeClr val="lt1"/>
+              </a:fontRef>
+            </p:style>
+            <p:txBody>
+              <a:bodyPr rtlCol="0" anchor="ctr"/>
+              <a:lstStyle/>
+              <a:p>
+                <a:pPr algn="ctr"/>
+                <a:endParaRPr lang="en-IN"/>
+              </a:p>
+            </p:txBody>
+          </p:sp>
+          <p:cxnSp>
+            <p:nvCxnSpPr>
+              <p:cNvPr id="176" name="Straight Connector 175">
+                <a:extLst>
+                  <a:ext uri="{FF2B5EF4-FFF2-40B4-BE49-F238E27FC236}">
+                    <a16:creationId xmlns:a16="http://schemas.microsoft.com/office/drawing/2014/main" id="{C47309EF-EFE0-1904-A9CA-0BE0E7E9D2A0}"/>
+                  </a:ext>
+                </a:extLst>
+              </p:cNvPr>
+              <p:cNvCxnSpPr>
+                <a:cxnSpLocks/>
+              </p:cNvCxnSpPr>
+              <p:nvPr/>
+            </p:nvCxnSpPr>
+            <p:spPr>
+              <a:xfrm>
+                <a:off x="3610045" y="3491609"/>
+                <a:ext cx="693435" cy="0"/>
+              </a:xfrm>
+              <a:prstGeom prst="line">
+                <a:avLst/>
+              </a:prstGeom>
+              <a:ln w="57150">
+                <a:solidFill>
+                  <a:schemeClr val="accent1"/>
+                </a:solidFill>
+              </a:ln>
+            </p:spPr>
+            <p:style>
+              <a:lnRef idx="1">
+                <a:schemeClr val="accent1"/>
+              </a:lnRef>
+              <a:fillRef idx="0">
+                <a:schemeClr val="accent1"/>
+              </a:fillRef>
+              <a:effectRef idx="0">
+                <a:schemeClr val="accent1"/>
+              </a:effectRef>
+              <a:fontRef idx="minor">
+                <a:schemeClr val="tx1"/>
+              </a:fontRef>
+            </p:style>
+          </p:cxnSp>
+        </p:grpSp>
+        <p:cxnSp>
+          <p:nvCxnSpPr>
+            <p:cNvPr id="172" name="Straight Connector 171">
+              <a:extLst>
+                <a:ext uri="{FF2B5EF4-FFF2-40B4-BE49-F238E27FC236}">
+                  <a16:creationId xmlns:a16="http://schemas.microsoft.com/office/drawing/2014/main" id="{C6C3D99F-2F2F-A14C-B884-4819D1C24CCF}"/>
+                </a:ext>
+              </a:extLst>
+            </p:cNvPr>
+            <p:cNvCxnSpPr>
+              <a:cxnSpLocks/>
+            </p:cNvCxnSpPr>
+            <p:nvPr/>
+          </p:nvCxnSpPr>
+          <p:spPr>
+            <a:xfrm flipV="1">
+              <a:off x="8324463" y="3446184"/>
+              <a:ext cx="133114" cy="221291"/>
+            </a:xfrm>
+            <a:prstGeom prst="line">
+              <a:avLst/>
+            </a:prstGeom>
+            <a:ln w="38100">
+              <a:solidFill>
+                <a:schemeClr val="accent1"/>
+              </a:solidFill>
+            </a:ln>
+          </p:spPr>
+          <p:style>
+            <a:lnRef idx="1">
+              <a:schemeClr val="accent1"/>
+            </a:lnRef>
+            <a:fillRef idx="0">
+              <a:schemeClr val="accent1"/>
+            </a:fillRef>
+            <a:effectRef idx="0">
+              <a:schemeClr val="accent1"/>
+            </a:effectRef>
+            <a:fontRef idx="minor">
+              <a:schemeClr val="tx1"/>
+            </a:fontRef>
+          </p:style>
+        </p:cxnSp>
+        <p:sp>
+          <p:nvSpPr>
+            <p:cNvPr id="173" name="Oval 172">
+              <a:extLst>
+                <a:ext uri="{FF2B5EF4-FFF2-40B4-BE49-F238E27FC236}">
+                  <a16:creationId xmlns:a16="http://schemas.microsoft.com/office/drawing/2014/main" id="{CAC5DD21-E036-58F4-E9C4-22D37EC444E5}"/>
+                </a:ext>
+              </a:extLst>
+            </p:cNvPr>
+            <p:cNvSpPr/>
+            <p:nvPr/>
+          </p:nvSpPr>
+          <p:spPr>
+            <a:xfrm flipV="1">
+              <a:off x="8431339" y="3426266"/>
+              <a:ext cx="45719" cy="45719"/>
+            </a:xfrm>
+            <a:prstGeom prst="ellipse">
+              <a:avLst/>
+            </a:prstGeom>
+            <a:ln w="57150">
+              <a:solidFill>
+                <a:schemeClr val="accent1"/>
+              </a:solidFill>
+            </a:ln>
+          </p:spPr>
+          <p:style>
+            <a:lnRef idx="2">
+              <a:schemeClr val="accent1">
+                <a:shade val="50000"/>
+              </a:schemeClr>
+            </a:lnRef>
+            <a:fillRef idx="1">
+              <a:schemeClr val="accent1"/>
+            </a:fillRef>
+            <a:effectRef idx="0">
+              <a:schemeClr val="accent1"/>
+            </a:effectRef>
+            <a:fontRef idx="minor">
+              <a:schemeClr val="lt1"/>
+            </a:fontRef>
+          </p:style>
+          <p:txBody>
+            <a:bodyPr rtlCol="0" anchor="ctr"/>
+            <a:lstStyle/>
+            <a:p>
+              <a:pPr algn="ctr"/>
+              <a:endParaRPr lang="en-IN" dirty="0"/>
+            </a:p>
+          </p:txBody>
+        </p:sp>
+      </p:grpSp>
+      <p:grpSp>
+        <p:nvGrpSpPr>
+          <p:cNvPr id="148" name="Group 147">
+            <a:extLst>
+              <a:ext uri="{FF2B5EF4-FFF2-40B4-BE49-F238E27FC236}">
+                <a16:creationId xmlns:a16="http://schemas.microsoft.com/office/drawing/2014/main" id="{866A697E-6FCA-FB44-8237-A7BC0B2050C5}"/>
+              </a:ext>
+            </a:extLst>
+          </p:cNvPr>
+          <p:cNvGrpSpPr/>
+          <p:nvPr/>
+        </p:nvGrpSpPr>
+        <p:grpSpPr>
+          <a:xfrm rot="5400000">
+            <a:off x="6610756" y="737398"/>
+            <a:ext cx="439795" cy="1449883"/>
+            <a:chOff x="9357780" y="2716384"/>
+            <a:chExt cx="439795" cy="2144197"/>
+          </a:xfrm>
+        </p:grpSpPr>
+        <p:grpSp>
+          <p:nvGrpSpPr>
+            <p:cNvPr id="184" name="Group 183">
+              <a:extLst>
+                <a:ext uri="{FF2B5EF4-FFF2-40B4-BE49-F238E27FC236}">
+                  <a16:creationId xmlns:a16="http://schemas.microsoft.com/office/drawing/2014/main" id="{B47AEAF3-3714-2FF8-3919-A63320181064}"/>
+                </a:ext>
+              </a:extLst>
+            </p:cNvPr>
+            <p:cNvGrpSpPr/>
+            <p:nvPr/>
+          </p:nvGrpSpPr>
+          <p:grpSpPr>
+            <a:xfrm rot="16200000">
+              <a:off x="9055049" y="3647942"/>
+              <a:ext cx="1045257" cy="439795"/>
+              <a:chOff x="2905113" y="3027281"/>
+              <a:chExt cx="1489971" cy="494935"/>
+            </a:xfrm>
+          </p:grpSpPr>
+          <p:cxnSp>
+            <p:nvCxnSpPr>
+              <p:cNvPr id="188" name="Straight Connector 187">
+                <a:extLst>
+                  <a:ext uri="{FF2B5EF4-FFF2-40B4-BE49-F238E27FC236}">
+                    <a16:creationId xmlns:a16="http://schemas.microsoft.com/office/drawing/2014/main" id="{9F70DDE8-056C-4C79-3550-6FFB892BEDAA}"/>
+                  </a:ext>
+                </a:extLst>
+              </p:cNvPr>
+              <p:cNvCxnSpPr>
+                <a:cxnSpLocks/>
+              </p:cNvCxnSpPr>
+              <p:nvPr/>
+            </p:nvCxnSpPr>
+            <p:spPr>
+              <a:xfrm rot="5400000" flipH="1" flipV="1">
+                <a:off x="2786718" y="3145681"/>
+                <a:ext cx="394474" cy="157683"/>
+              </a:xfrm>
+              <a:prstGeom prst="line">
+                <a:avLst/>
+              </a:prstGeom>
+              <a:ln w="38100">
+                <a:solidFill>
+                  <a:srgbClr val="0070C0"/>
+                </a:solidFill>
+              </a:ln>
+            </p:spPr>
+            <p:style>
+              <a:lnRef idx="1">
+                <a:schemeClr val="accent1"/>
+              </a:lnRef>
+              <a:fillRef idx="0">
+                <a:schemeClr val="accent1"/>
+              </a:fillRef>
+              <a:effectRef idx="0">
+                <a:schemeClr val="accent1"/>
+              </a:effectRef>
+              <a:fontRef idx="minor">
+                <a:schemeClr val="tx1"/>
+              </a:fontRef>
+            </p:style>
+          </p:cxnSp>
+          <p:grpSp>
+            <p:nvGrpSpPr>
+              <p:cNvPr id="189" name="Group 188">
+                <a:extLst>
+                  <a:ext uri="{FF2B5EF4-FFF2-40B4-BE49-F238E27FC236}">
+                    <a16:creationId xmlns:a16="http://schemas.microsoft.com/office/drawing/2014/main" id="{9FB16B94-B2E4-1D5D-F26A-CAE10A77ABA3}"/>
+                  </a:ext>
+                </a:extLst>
+              </p:cNvPr>
+              <p:cNvGrpSpPr/>
+              <p:nvPr/>
+            </p:nvGrpSpPr>
+            <p:grpSpPr>
+              <a:xfrm>
+                <a:off x="3062796" y="3038382"/>
+                <a:ext cx="301842" cy="483834"/>
+                <a:chOff x="3062796" y="3027285"/>
+                <a:chExt cx="301842" cy="483834"/>
+              </a:xfrm>
+            </p:grpSpPr>
+            <p:cxnSp>
+              <p:nvCxnSpPr>
+                <p:cNvPr id="206" name="Straight Connector 205">
+                  <a:extLst>
+                    <a:ext uri="{FF2B5EF4-FFF2-40B4-BE49-F238E27FC236}">
+                      <a16:creationId xmlns:a16="http://schemas.microsoft.com/office/drawing/2014/main" id="{722908EA-81F1-AA1D-DBCE-87111E9F0421}"/>
+                    </a:ext>
+                  </a:extLst>
+                </p:cNvPr>
+                <p:cNvCxnSpPr>
+                  <a:cxnSpLocks/>
+                </p:cNvCxnSpPr>
+                <p:nvPr/>
+              </p:nvCxnSpPr>
+              <p:spPr>
+                <a:xfrm flipH="1" flipV="1">
+                  <a:off x="3062796" y="3027285"/>
+                  <a:ext cx="150921" cy="483834"/>
+                </a:xfrm>
+                <a:prstGeom prst="line">
+                  <a:avLst/>
+                </a:prstGeom>
+                <a:ln w="38100">
+                  <a:solidFill>
+                    <a:srgbClr val="0070C0"/>
+                  </a:solidFill>
+                </a:ln>
+              </p:spPr>
+              <p:style>
+                <a:lnRef idx="1">
+                  <a:schemeClr val="accent1"/>
+                </a:lnRef>
+                <a:fillRef idx="0">
+                  <a:schemeClr val="accent1"/>
+                </a:fillRef>
+                <a:effectRef idx="0">
+                  <a:schemeClr val="accent1"/>
+                </a:effectRef>
+                <a:fontRef idx="minor">
+                  <a:schemeClr val="tx1"/>
+                </a:fontRef>
+              </p:style>
+            </p:cxnSp>
+            <p:cxnSp>
+              <p:nvCxnSpPr>
+                <p:cNvPr id="207" name="Straight Connector 206">
+                  <a:extLst>
+                    <a:ext uri="{FF2B5EF4-FFF2-40B4-BE49-F238E27FC236}">
+                      <a16:creationId xmlns:a16="http://schemas.microsoft.com/office/drawing/2014/main" id="{FA4378CD-475D-516C-06A6-B763E5BEB3AC}"/>
+                    </a:ext>
+                  </a:extLst>
+                </p:cNvPr>
+                <p:cNvCxnSpPr>
+                  <a:cxnSpLocks/>
+                </p:cNvCxnSpPr>
+                <p:nvPr/>
+              </p:nvCxnSpPr>
+              <p:spPr>
+                <a:xfrm flipV="1">
+                  <a:off x="3213717" y="3027285"/>
+                  <a:ext cx="150921" cy="483834"/>
+                </a:xfrm>
+                <a:prstGeom prst="line">
+                  <a:avLst/>
+                </a:prstGeom>
+                <a:ln w="38100">
+                  <a:solidFill>
+                    <a:srgbClr val="0070C0"/>
+                  </a:solidFill>
+                </a:ln>
+              </p:spPr>
+              <p:style>
+                <a:lnRef idx="1">
+                  <a:schemeClr val="accent1"/>
+                </a:lnRef>
+                <a:fillRef idx="0">
+                  <a:schemeClr val="accent1"/>
+                </a:fillRef>
+                <a:effectRef idx="0">
+                  <a:schemeClr val="accent1"/>
+                </a:effectRef>
+                <a:fontRef idx="minor">
+                  <a:schemeClr val="tx1"/>
+                </a:fontRef>
+              </p:style>
+            </p:cxnSp>
+          </p:grpSp>
+          <p:grpSp>
+            <p:nvGrpSpPr>
+              <p:cNvPr id="190" name="Group 189">
+                <a:extLst>
+                  <a:ext uri="{FF2B5EF4-FFF2-40B4-BE49-F238E27FC236}">
+                    <a16:creationId xmlns:a16="http://schemas.microsoft.com/office/drawing/2014/main" id="{B5427AC1-3C72-195C-4E35-F86EAE47779A}"/>
+                  </a:ext>
+                </a:extLst>
+              </p:cNvPr>
+              <p:cNvGrpSpPr/>
+              <p:nvPr/>
+            </p:nvGrpSpPr>
+            <p:grpSpPr>
+              <a:xfrm>
+                <a:off x="3366118" y="3027281"/>
+                <a:ext cx="301842" cy="483838"/>
+                <a:chOff x="3062796" y="3027281"/>
+                <a:chExt cx="301842" cy="483838"/>
+              </a:xfrm>
+            </p:grpSpPr>
+            <p:cxnSp>
+              <p:nvCxnSpPr>
+                <p:cNvPr id="202" name="Straight Connector 201">
+                  <a:extLst>
+                    <a:ext uri="{FF2B5EF4-FFF2-40B4-BE49-F238E27FC236}">
+                      <a16:creationId xmlns:a16="http://schemas.microsoft.com/office/drawing/2014/main" id="{4A8D13F2-7675-9508-28DF-D687D3BDE5A8}"/>
+                    </a:ext>
+                  </a:extLst>
+                </p:cNvPr>
+                <p:cNvCxnSpPr>
+                  <a:cxnSpLocks/>
+                </p:cNvCxnSpPr>
+                <p:nvPr/>
+              </p:nvCxnSpPr>
+              <p:spPr>
+                <a:xfrm flipH="1" flipV="1">
+                  <a:off x="3062796" y="3027281"/>
+                  <a:ext cx="150922" cy="483834"/>
+                </a:xfrm>
+                <a:prstGeom prst="line">
+                  <a:avLst/>
+                </a:prstGeom>
+                <a:ln w="38100">
+                  <a:solidFill>
+                    <a:srgbClr val="0070C0"/>
+                  </a:solidFill>
+                </a:ln>
+              </p:spPr>
+              <p:style>
+                <a:lnRef idx="1">
+                  <a:schemeClr val="accent1"/>
+                </a:lnRef>
+                <a:fillRef idx="0">
+                  <a:schemeClr val="accent1"/>
+                </a:fillRef>
+                <a:effectRef idx="0">
+                  <a:schemeClr val="accent1"/>
+                </a:effectRef>
+                <a:fontRef idx="minor">
+                  <a:schemeClr val="tx1"/>
+                </a:fontRef>
+              </p:style>
+            </p:cxnSp>
+            <p:cxnSp>
+              <p:nvCxnSpPr>
+                <p:cNvPr id="205" name="Straight Connector 204">
+                  <a:extLst>
+                    <a:ext uri="{FF2B5EF4-FFF2-40B4-BE49-F238E27FC236}">
+                      <a16:creationId xmlns:a16="http://schemas.microsoft.com/office/drawing/2014/main" id="{0E7C1EDA-4C94-895A-C84C-E71EA5AED9F7}"/>
+                    </a:ext>
+                  </a:extLst>
+                </p:cNvPr>
+                <p:cNvCxnSpPr>
+                  <a:cxnSpLocks/>
+                </p:cNvCxnSpPr>
+                <p:nvPr/>
+              </p:nvCxnSpPr>
+              <p:spPr>
+                <a:xfrm flipV="1">
+                  <a:off x="3213717" y="3027285"/>
+                  <a:ext cx="150921" cy="483834"/>
+                </a:xfrm>
+                <a:prstGeom prst="line">
+                  <a:avLst/>
+                </a:prstGeom>
+                <a:ln w="38100">
+                  <a:solidFill>
+                    <a:srgbClr val="0070C0"/>
+                  </a:solidFill>
+                </a:ln>
+              </p:spPr>
+              <p:style>
+                <a:lnRef idx="1">
+                  <a:schemeClr val="accent1"/>
+                </a:lnRef>
+                <a:fillRef idx="0">
+                  <a:schemeClr val="accent1"/>
+                </a:fillRef>
+                <a:effectRef idx="0">
+                  <a:schemeClr val="accent1"/>
+                </a:effectRef>
+                <a:fontRef idx="minor">
+                  <a:schemeClr val="tx1"/>
+                </a:fontRef>
+              </p:style>
+            </p:cxnSp>
+          </p:grpSp>
+          <p:grpSp>
+            <p:nvGrpSpPr>
+              <p:cNvPr id="191" name="Group 190">
+                <a:extLst>
+                  <a:ext uri="{FF2B5EF4-FFF2-40B4-BE49-F238E27FC236}">
+                    <a16:creationId xmlns:a16="http://schemas.microsoft.com/office/drawing/2014/main" id="{77F13BE4-36F5-6A8A-E274-493E2EB6F350}"/>
+                  </a:ext>
+                </a:extLst>
+              </p:cNvPr>
+              <p:cNvGrpSpPr/>
+              <p:nvPr/>
+            </p:nvGrpSpPr>
+            <p:grpSpPr>
+              <a:xfrm>
+                <a:off x="3971282" y="3038381"/>
+                <a:ext cx="301843" cy="483835"/>
+                <a:chOff x="3062796" y="3027284"/>
+                <a:chExt cx="301843" cy="483835"/>
+              </a:xfrm>
+            </p:grpSpPr>
+            <p:cxnSp>
+              <p:nvCxnSpPr>
+                <p:cNvPr id="200" name="Straight Connector 199">
+                  <a:extLst>
+                    <a:ext uri="{FF2B5EF4-FFF2-40B4-BE49-F238E27FC236}">
+                      <a16:creationId xmlns:a16="http://schemas.microsoft.com/office/drawing/2014/main" id="{AFCCE1BC-86A0-56DA-1AA3-44144CAC3F58}"/>
+                    </a:ext>
+                  </a:extLst>
+                </p:cNvPr>
+                <p:cNvCxnSpPr>
+                  <a:cxnSpLocks/>
+                </p:cNvCxnSpPr>
+                <p:nvPr/>
+              </p:nvCxnSpPr>
+              <p:spPr>
+                <a:xfrm flipH="1" flipV="1">
+                  <a:off x="3062796" y="3027285"/>
+                  <a:ext cx="150921" cy="483834"/>
+                </a:xfrm>
+                <a:prstGeom prst="line">
+                  <a:avLst/>
+                </a:prstGeom>
+                <a:ln w="38100">
+                  <a:solidFill>
+                    <a:srgbClr val="0070C0"/>
+                  </a:solidFill>
+                </a:ln>
+              </p:spPr>
+              <p:style>
+                <a:lnRef idx="1">
+                  <a:schemeClr val="accent1"/>
+                </a:lnRef>
+                <a:fillRef idx="0">
+                  <a:schemeClr val="accent1"/>
+                </a:fillRef>
+                <a:effectRef idx="0">
+                  <a:schemeClr val="accent1"/>
+                </a:effectRef>
+                <a:fontRef idx="minor">
+                  <a:schemeClr val="tx1"/>
+                </a:fontRef>
+              </p:style>
+            </p:cxnSp>
+            <p:cxnSp>
+              <p:nvCxnSpPr>
+                <p:cNvPr id="201" name="Straight Connector 200">
+                  <a:extLst>
+                    <a:ext uri="{FF2B5EF4-FFF2-40B4-BE49-F238E27FC236}">
+                      <a16:creationId xmlns:a16="http://schemas.microsoft.com/office/drawing/2014/main" id="{86ABF26B-ED31-B578-E369-BD4D1D5D522E}"/>
+                    </a:ext>
+                  </a:extLst>
+                </p:cNvPr>
+                <p:cNvCxnSpPr>
+                  <a:cxnSpLocks/>
+                </p:cNvCxnSpPr>
+                <p:nvPr/>
+              </p:nvCxnSpPr>
+              <p:spPr>
+                <a:xfrm flipV="1">
+                  <a:off x="3213719" y="3027284"/>
+                  <a:ext cx="150920" cy="483834"/>
+                </a:xfrm>
+                <a:prstGeom prst="line">
+                  <a:avLst/>
+                </a:prstGeom>
+                <a:ln w="38100">
+                  <a:solidFill>
+                    <a:srgbClr val="0070C0"/>
+                  </a:solidFill>
+                </a:ln>
+              </p:spPr>
+              <p:style>
+                <a:lnRef idx="1">
+                  <a:schemeClr val="accent1"/>
+                </a:lnRef>
+                <a:fillRef idx="0">
+                  <a:schemeClr val="accent1"/>
+                </a:fillRef>
+                <a:effectRef idx="0">
+                  <a:schemeClr val="accent1"/>
+                </a:effectRef>
+                <a:fontRef idx="minor">
+                  <a:schemeClr val="tx1"/>
+                </a:fontRef>
+              </p:style>
+            </p:cxnSp>
+          </p:grpSp>
+          <p:grpSp>
+            <p:nvGrpSpPr>
+              <p:cNvPr id="194" name="Group 193">
+                <a:extLst>
+                  <a:ext uri="{FF2B5EF4-FFF2-40B4-BE49-F238E27FC236}">
+                    <a16:creationId xmlns:a16="http://schemas.microsoft.com/office/drawing/2014/main" id="{045D130E-AF12-FF49-69F8-E6C8528F566A}"/>
+                  </a:ext>
+                </a:extLst>
+              </p:cNvPr>
+              <p:cNvGrpSpPr/>
+              <p:nvPr/>
+            </p:nvGrpSpPr>
+            <p:grpSpPr>
+              <a:xfrm>
+                <a:off x="3667960" y="3038382"/>
+                <a:ext cx="301842" cy="483834"/>
+                <a:chOff x="3062796" y="3027285"/>
+                <a:chExt cx="301842" cy="483834"/>
+              </a:xfrm>
+            </p:grpSpPr>
+            <p:cxnSp>
+              <p:nvCxnSpPr>
+                <p:cNvPr id="197" name="Straight Connector 196">
+                  <a:extLst>
+                    <a:ext uri="{FF2B5EF4-FFF2-40B4-BE49-F238E27FC236}">
+                      <a16:creationId xmlns:a16="http://schemas.microsoft.com/office/drawing/2014/main" id="{F2F55F28-B3E3-4D60-C23B-D6CB785CE72D}"/>
+                    </a:ext>
+                  </a:extLst>
+                </p:cNvPr>
+                <p:cNvCxnSpPr>
+                  <a:cxnSpLocks/>
+                </p:cNvCxnSpPr>
+                <p:nvPr/>
+              </p:nvCxnSpPr>
+              <p:spPr>
+                <a:xfrm flipH="1" flipV="1">
+                  <a:off x="3062796" y="3027285"/>
+                  <a:ext cx="150921" cy="483834"/>
+                </a:xfrm>
+                <a:prstGeom prst="line">
+                  <a:avLst/>
+                </a:prstGeom>
+                <a:ln w="38100">
+                  <a:solidFill>
+                    <a:srgbClr val="0070C0"/>
+                  </a:solidFill>
+                </a:ln>
+              </p:spPr>
+              <p:style>
+                <a:lnRef idx="1">
+                  <a:schemeClr val="accent1"/>
+                </a:lnRef>
+                <a:fillRef idx="0">
+                  <a:schemeClr val="accent1"/>
+                </a:fillRef>
+                <a:effectRef idx="0">
+                  <a:schemeClr val="accent1"/>
+                </a:effectRef>
+                <a:fontRef idx="minor">
+                  <a:schemeClr val="tx1"/>
+                </a:fontRef>
+              </p:style>
+            </p:cxnSp>
+            <p:cxnSp>
+              <p:nvCxnSpPr>
+                <p:cNvPr id="199" name="Straight Connector 198">
+                  <a:extLst>
+                    <a:ext uri="{FF2B5EF4-FFF2-40B4-BE49-F238E27FC236}">
+                      <a16:creationId xmlns:a16="http://schemas.microsoft.com/office/drawing/2014/main" id="{8B3BD9E0-2D85-AAF9-A62A-B13D80F13117}"/>
+                    </a:ext>
+                  </a:extLst>
+                </p:cNvPr>
+                <p:cNvCxnSpPr>
+                  <a:cxnSpLocks/>
+                </p:cNvCxnSpPr>
+                <p:nvPr/>
+              </p:nvCxnSpPr>
+              <p:spPr>
+                <a:xfrm flipV="1">
+                  <a:off x="3213717" y="3027285"/>
+                  <a:ext cx="150921" cy="483834"/>
+                </a:xfrm>
+                <a:prstGeom prst="line">
+                  <a:avLst/>
+                </a:prstGeom>
+                <a:ln w="38100">
+                  <a:solidFill>
+                    <a:srgbClr val="0070C0"/>
+                  </a:solidFill>
+                </a:ln>
+              </p:spPr>
+              <p:style>
+                <a:lnRef idx="1">
+                  <a:schemeClr val="accent1"/>
+                </a:lnRef>
+                <a:fillRef idx="0">
+                  <a:schemeClr val="accent1"/>
+                </a:fillRef>
+                <a:effectRef idx="0">
+                  <a:schemeClr val="accent1"/>
+                </a:effectRef>
+                <a:fontRef idx="minor">
+                  <a:schemeClr val="tx1"/>
+                </a:fontRef>
+              </p:style>
+            </p:cxnSp>
+          </p:grpSp>
+          <p:cxnSp>
+            <p:nvCxnSpPr>
+              <p:cNvPr id="195" name="Straight Connector 194">
+                <a:extLst>
+                  <a:ext uri="{FF2B5EF4-FFF2-40B4-BE49-F238E27FC236}">
+                    <a16:creationId xmlns:a16="http://schemas.microsoft.com/office/drawing/2014/main" id="{F933B2E3-36E0-0659-F773-33570C6F241F}"/>
+                  </a:ext>
+                </a:extLst>
+              </p:cNvPr>
+              <p:cNvCxnSpPr>
+                <a:cxnSpLocks/>
+              </p:cNvCxnSpPr>
+              <p:nvPr/>
+            </p:nvCxnSpPr>
+            <p:spPr>
+              <a:xfrm rot="5400000" flipH="1">
+                <a:off x="4136867" y="3163543"/>
+                <a:ext cx="394475" cy="121959"/>
+              </a:xfrm>
+              <a:prstGeom prst="line">
+                <a:avLst/>
+              </a:prstGeom>
+              <a:ln w="38100">
+                <a:solidFill>
+                  <a:srgbClr val="0070C0"/>
+                </a:solidFill>
+              </a:ln>
+            </p:spPr>
+            <p:style>
+              <a:lnRef idx="1">
+                <a:schemeClr val="accent1"/>
+              </a:lnRef>
+              <a:fillRef idx="0">
+                <a:schemeClr val="accent1"/>
+              </a:fillRef>
+              <a:effectRef idx="0">
+                <a:schemeClr val="accent1"/>
+              </a:effectRef>
+              <a:fontRef idx="minor">
+                <a:schemeClr val="tx1"/>
+              </a:fontRef>
+            </p:style>
+          </p:cxnSp>
+        </p:grpSp>
+        <p:cxnSp>
+          <p:nvCxnSpPr>
+            <p:cNvPr id="185" name="Straight Connector 184">
+              <a:extLst>
+                <a:ext uri="{FF2B5EF4-FFF2-40B4-BE49-F238E27FC236}">
+                  <a16:creationId xmlns:a16="http://schemas.microsoft.com/office/drawing/2014/main" id="{3D9A62DF-FA2C-633B-2BCC-D3E4635D2EE0}"/>
+                </a:ext>
+              </a:extLst>
+            </p:cNvPr>
+            <p:cNvCxnSpPr>
+              <a:cxnSpLocks/>
+            </p:cNvCxnSpPr>
+            <p:nvPr/>
+          </p:nvCxnSpPr>
+          <p:spPr>
+            <a:xfrm>
+              <a:off x="9698371" y="2716384"/>
+              <a:ext cx="9938" cy="628827"/>
+            </a:xfrm>
+            <a:prstGeom prst="line">
+              <a:avLst/>
+            </a:prstGeom>
+            <a:ln w="38100">
+              <a:solidFill>
+                <a:srgbClr val="0070C0"/>
+              </a:solidFill>
+            </a:ln>
+          </p:spPr>
+          <p:style>
+            <a:lnRef idx="1">
+              <a:schemeClr val="accent1"/>
+            </a:lnRef>
+            <a:fillRef idx="0">
+              <a:schemeClr val="accent1"/>
+            </a:fillRef>
+            <a:effectRef idx="0">
+              <a:schemeClr val="accent1"/>
+            </a:effectRef>
+            <a:fontRef idx="minor">
+              <a:schemeClr val="tx1"/>
+            </a:fontRef>
+          </p:style>
+        </p:cxnSp>
+        <p:cxnSp>
+          <p:nvCxnSpPr>
+            <p:cNvPr id="187" name="Straight Connector 186">
+              <a:extLst>
+                <a:ext uri="{FF2B5EF4-FFF2-40B4-BE49-F238E27FC236}">
+                  <a16:creationId xmlns:a16="http://schemas.microsoft.com/office/drawing/2014/main" id="{C1BAEB0A-2F8E-BFC8-A9F3-C5E92281BD5B}"/>
+                </a:ext>
+              </a:extLst>
+            </p:cNvPr>
+            <p:cNvCxnSpPr>
+              <a:cxnSpLocks/>
+            </p:cNvCxnSpPr>
+            <p:nvPr/>
+          </p:nvCxnSpPr>
+          <p:spPr>
+            <a:xfrm>
+              <a:off x="9698371" y="4390468"/>
+              <a:ext cx="0" cy="470113"/>
+            </a:xfrm>
+            <a:prstGeom prst="line">
+              <a:avLst/>
+            </a:prstGeom>
+            <a:ln w="38100">
+              <a:solidFill>
+                <a:srgbClr val="0070C0"/>
+              </a:solidFill>
+            </a:ln>
+          </p:spPr>
+          <p:style>
+            <a:lnRef idx="1">
+              <a:schemeClr val="accent1"/>
+            </a:lnRef>
+            <a:fillRef idx="0">
+              <a:schemeClr val="accent1"/>
+            </a:fillRef>
+            <a:effectRef idx="0">
+              <a:schemeClr val="accent1"/>
+            </a:effectRef>
+            <a:fontRef idx="minor">
+              <a:schemeClr val="tx1"/>
+            </a:fontRef>
+          </p:style>
+        </p:cxnSp>
+      </p:grpSp>
     </p:spTree>
     <p:extLst>
       <p:ext uri="{BB962C8B-B14F-4D97-AF65-F5344CB8AC3E}">
@@ -9013,7 +9508,7 @@
         </p:nvGrpSpPr>
         <p:grpSpPr>
           <a:xfrm>
-            <a:off x="1242403" y="364348"/>
+            <a:off x="1242403" y="312590"/>
             <a:ext cx="9046485" cy="5276170"/>
             <a:chOff x="663905" y="327025"/>
             <a:chExt cx="9046485" cy="5276170"/>
@@ -9639,7 +10134,7 @@
                 <a:lstStyle/>
                 <a:p>
                   <a:pPr algn="ctr"/>
-                  <a:endParaRPr lang="en-IN"/>
+                  <a:endParaRPr lang="en-IN" dirty="0"/>
                 </a:p>
               </p:txBody>
             </p:sp>
@@ -11239,10 +11734,10 @@
         </p:nvGrpSpPr>
         <p:grpSpPr>
           <a:xfrm>
-            <a:off x="1242403" y="364348"/>
-            <a:ext cx="9046485" cy="5276170"/>
+            <a:off x="828336" y="-463788"/>
+            <a:ext cx="9433401" cy="6643050"/>
             <a:chOff x="663905" y="327025"/>
-            <a:chExt cx="9046485" cy="5276170"/>
+            <a:chExt cx="9433401" cy="6643050"/>
           </a:xfrm>
         </p:grpSpPr>
         <p:cxnSp>
@@ -11546,7 +12041,7 @@
           </p:nvSpPr>
           <p:spPr>
             <a:xfrm rot="16200000" flipV="1">
-              <a:off x="5774848" y="965466"/>
+              <a:off x="10019044" y="6891813"/>
               <a:ext cx="85562" cy="70962"/>
             </a:xfrm>
             <a:prstGeom prst="ellipse">
@@ -11579,7 +12074,7 @@
             <a:lstStyle/>
             <a:p>
               <a:pPr algn="ctr"/>
-              <a:endParaRPr lang="en-IN"/>
+              <a:endParaRPr lang="en-IN" dirty="0"/>
             </a:p>
           </p:txBody>
         </p:sp>
@@ -11759,10 +12254,10 @@
             </p:nvGrpSpPr>
             <p:grpSpPr>
               <a:xfrm rot="5400000" flipV="1">
-                <a:off x="10921432" y="1708703"/>
-                <a:ext cx="592453" cy="880897"/>
-                <a:chOff x="3308385" y="8500613"/>
-                <a:chExt cx="232509" cy="554880"/>
+                <a:off x="10921436" y="1708695"/>
+                <a:ext cx="592455" cy="880899"/>
+                <a:chOff x="3308385" y="8500612"/>
+                <a:chExt cx="232510" cy="554881"/>
               </a:xfrm>
             </p:grpSpPr>
             <p:sp>
@@ -11779,7 +12274,7 @@
               </p:nvSpPr>
               <p:spPr>
                 <a:xfrm rot="16200000">
-                  <a:off x="3286889" y="8524303"/>
+                  <a:off x="3286890" y="8524302"/>
                   <a:ext cx="277695" cy="230315"/>
                 </a:xfrm>
                 <a:prstGeom prst="arc">
@@ -11813,7 +12308,7 @@
                 <a:lstStyle/>
                 <a:p>
                   <a:pPr algn="ctr"/>
-                  <a:endParaRPr lang="en-IN"/>
+                  <a:endParaRPr lang="en-IN" dirty="0"/>
                 </a:p>
               </p:txBody>
             </p:sp>
@@ -11865,7 +12360,7 @@
                 <a:lstStyle/>
                 <a:p>
                   <a:pPr algn="ctr"/>
-                  <a:endParaRPr lang="en-IN"/>
+                  <a:endParaRPr lang="en-IN" dirty="0"/>
                 </a:p>
               </p:txBody>
             </p:sp>
@@ -13327,6 +13822,57 @@
           </p:txBody>
         </p:sp>
       </p:grpSp>
+      <p:sp>
+        <p:nvSpPr>
+          <p:cNvPr id="15" name="Oval 14">
+            <a:extLst>
+              <a:ext uri="{FF2B5EF4-FFF2-40B4-BE49-F238E27FC236}">
+                <a16:creationId xmlns:a16="http://schemas.microsoft.com/office/drawing/2014/main" id="{CA7596E7-BA83-F84D-836A-73D6B918655C}"/>
+              </a:ext>
+            </a:extLst>
+          </p:cNvPr>
+          <p:cNvSpPr/>
+          <p:nvPr/>
+        </p:nvSpPr>
+        <p:spPr>
+          <a:xfrm rot="16200000" flipV="1">
+            <a:off x="10335875" y="6253400"/>
+            <a:ext cx="85562" cy="70962"/>
+          </a:xfrm>
+          <a:prstGeom prst="ellipse">
+            <a:avLst/>
+          </a:prstGeom>
+          <a:ln w="57150">
+            <a:solidFill>
+              <a:schemeClr val="accent1"/>
+            </a:solidFill>
+          </a:ln>
+        </p:spPr>
+        <p:style>
+          <a:lnRef idx="2">
+            <a:schemeClr val="accent1">
+              <a:shade val="50000"/>
+            </a:schemeClr>
+          </a:lnRef>
+          <a:fillRef idx="1">
+            <a:schemeClr val="accent1"/>
+          </a:fillRef>
+          <a:effectRef idx="0">
+            <a:schemeClr val="accent1"/>
+          </a:effectRef>
+          <a:fontRef idx="minor">
+            <a:schemeClr val="lt1"/>
+          </a:fontRef>
+        </p:style>
+        <p:txBody>
+          <a:bodyPr rtlCol="0" anchor="ctr"/>
+          <a:lstStyle/>
+          <a:p>
+            <a:pPr algn="ctr"/>
+            <a:endParaRPr lang="en-IN" dirty="0"/>
+          </a:p>
+        </p:txBody>
+      </p:sp>
     </p:spTree>
     <p:extLst>
       <p:ext uri="{BB962C8B-B14F-4D97-AF65-F5344CB8AC3E}">

</xml_diff>

<commit_message>
Completed post quiz of ACVR
</commit_message>
<xml_diff>
--- a/Assets/Powerpoints/AC Voltage Controller.pptx
+++ b/Assets/Powerpoints/AC Voltage Controller.pptx
@@ -268,7 +268,7 @@
           <a:p>
             <a:fld id="{62092866-234F-450F-AD7A-560A105E5EC1}" type="datetimeFigureOut">
               <a:rPr lang="en-IN" smtClean="0"/>
-              <a:t>24-12-2022</a:t>
+              <a:t>26-12-2022</a:t>
             </a:fld>
             <a:endParaRPr lang="en-IN"/>
           </a:p>
@@ -468,7 +468,7 @@
           <a:p>
             <a:fld id="{62092866-234F-450F-AD7A-560A105E5EC1}" type="datetimeFigureOut">
               <a:rPr lang="en-IN" smtClean="0"/>
-              <a:t>24-12-2022</a:t>
+              <a:t>26-12-2022</a:t>
             </a:fld>
             <a:endParaRPr lang="en-IN"/>
           </a:p>
@@ -678,7 +678,7 @@
           <a:p>
             <a:fld id="{62092866-234F-450F-AD7A-560A105E5EC1}" type="datetimeFigureOut">
               <a:rPr lang="en-IN" smtClean="0"/>
-              <a:t>24-12-2022</a:t>
+              <a:t>26-12-2022</a:t>
             </a:fld>
             <a:endParaRPr lang="en-IN"/>
           </a:p>
@@ -878,7 +878,7 @@
           <a:p>
             <a:fld id="{62092866-234F-450F-AD7A-560A105E5EC1}" type="datetimeFigureOut">
               <a:rPr lang="en-IN" smtClean="0"/>
-              <a:t>24-12-2022</a:t>
+              <a:t>26-12-2022</a:t>
             </a:fld>
             <a:endParaRPr lang="en-IN"/>
           </a:p>
@@ -1154,7 +1154,7 @@
           <a:p>
             <a:fld id="{62092866-234F-450F-AD7A-560A105E5EC1}" type="datetimeFigureOut">
               <a:rPr lang="en-IN" smtClean="0"/>
-              <a:t>24-12-2022</a:t>
+              <a:t>26-12-2022</a:t>
             </a:fld>
             <a:endParaRPr lang="en-IN"/>
           </a:p>
@@ -1422,7 +1422,7 @@
           <a:p>
             <a:fld id="{62092866-234F-450F-AD7A-560A105E5EC1}" type="datetimeFigureOut">
               <a:rPr lang="en-IN" smtClean="0"/>
-              <a:t>24-12-2022</a:t>
+              <a:t>26-12-2022</a:t>
             </a:fld>
             <a:endParaRPr lang="en-IN"/>
           </a:p>
@@ -1837,7 +1837,7 @@
           <a:p>
             <a:fld id="{62092866-234F-450F-AD7A-560A105E5EC1}" type="datetimeFigureOut">
               <a:rPr lang="en-IN" smtClean="0"/>
-              <a:t>24-12-2022</a:t>
+              <a:t>26-12-2022</a:t>
             </a:fld>
             <a:endParaRPr lang="en-IN"/>
           </a:p>
@@ -1979,7 +1979,7 @@
           <a:p>
             <a:fld id="{62092866-234F-450F-AD7A-560A105E5EC1}" type="datetimeFigureOut">
               <a:rPr lang="en-IN" smtClean="0"/>
-              <a:t>24-12-2022</a:t>
+              <a:t>26-12-2022</a:t>
             </a:fld>
             <a:endParaRPr lang="en-IN"/>
           </a:p>
@@ -2092,7 +2092,7 @@
           <a:p>
             <a:fld id="{62092866-234F-450F-AD7A-560A105E5EC1}" type="datetimeFigureOut">
               <a:rPr lang="en-IN" smtClean="0"/>
-              <a:t>24-12-2022</a:t>
+              <a:t>26-12-2022</a:t>
             </a:fld>
             <a:endParaRPr lang="en-IN"/>
           </a:p>
@@ -2405,7 +2405,7 @@
           <a:p>
             <a:fld id="{62092866-234F-450F-AD7A-560A105E5EC1}" type="datetimeFigureOut">
               <a:rPr lang="en-IN" smtClean="0"/>
-              <a:t>24-12-2022</a:t>
+              <a:t>26-12-2022</a:t>
             </a:fld>
             <a:endParaRPr lang="en-IN"/>
           </a:p>
@@ -2694,7 +2694,7 @@
           <a:p>
             <a:fld id="{62092866-234F-450F-AD7A-560A105E5EC1}" type="datetimeFigureOut">
               <a:rPr lang="en-IN" smtClean="0"/>
-              <a:t>24-12-2022</a:t>
+              <a:t>26-12-2022</a:t>
             </a:fld>
             <a:endParaRPr lang="en-IN"/>
           </a:p>
@@ -2937,7 +2937,7 @@
           <a:p>
             <a:fld id="{62092866-234F-450F-AD7A-560A105E5EC1}" type="datetimeFigureOut">
               <a:rPr lang="en-IN" smtClean="0"/>
-              <a:t>24-12-2022</a:t>
+              <a:t>26-12-2022</a:t>
             </a:fld>
             <a:endParaRPr lang="en-IN"/>
           </a:p>
@@ -11734,10 +11734,10 @@
         </p:nvGrpSpPr>
         <p:grpSpPr>
           <a:xfrm>
-            <a:off x="828336" y="-463788"/>
-            <a:ext cx="9433401" cy="6643050"/>
+            <a:off x="1276205" y="386821"/>
+            <a:ext cx="9046485" cy="5276170"/>
             <a:chOff x="663905" y="327025"/>
-            <a:chExt cx="9433401" cy="6643050"/>
+            <a:chExt cx="9046485" cy="5276170"/>
           </a:xfrm>
         </p:grpSpPr>
         <p:cxnSp>
@@ -12027,57 +12027,6 @@
             </a:fontRef>
           </p:style>
         </p:cxnSp>
-        <p:sp>
-          <p:nvSpPr>
-            <p:cNvPr id="8" name="Oval 7">
-              <a:extLst>
-                <a:ext uri="{FF2B5EF4-FFF2-40B4-BE49-F238E27FC236}">
-                  <a16:creationId xmlns:a16="http://schemas.microsoft.com/office/drawing/2014/main" id="{EAA2195E-0DCE-CC7B-23CD-82741B2F8CAF}"/>
-                </a:ext>
-              </a:extLst>
-            </p:cNvPr>
-            <p:cNvSpPr/>
-            <p:nvPr/>
-          </p:nvSpPr>
-          <p:spPr>
-            <a:xfrm rot="16200000" flipV="1">
-              <a:off x="10019044" y="6891813"/>
-              <a:ext cx="85562" cy="70962"/>
-            </a:xfrm>
-            <a:prstGeom prst="ellipse">
-              <a:avLst/>
-            </a:prstGeom>
-            <a:ln w="57150">
-              <a:solidFill>
-                <a:schemeClr val="accent1"/>
-              </a:solidFill>
-            </a:ln>
-          </p:spPr>
-          <p:style>
-            <a:lnRef idx="2">
-              <a:schemeClr val="accent1">
-                <a:shade val="50000"/>
-              </a:schemeClr>
-            </a:lnRef>
-            <a:fillRef idx="1">
-              <a:schemeClr val="accent1"/>
-            </a:fillRef>
-            <a:effectRef idx="0">
-              <a:schemeClr val="accent1"/>
-            </a:effectRef>
-            <a:fontRef idx="minor">
-              <a:schemeClr val="lt1"/>
-            </a:fontRef>
-          </p:style>
-          <p:txBody>
-            <a:bodyPr rtlCol="0" anchor="ctr"/>
-            <a:lstStyle/>
-            <a:p>
-              <a:pPr algn="ctr"/>
-              <a:endParaRPr lang="en-IN" dirty="0"/>
-            </a:p>
-          </p:txBody>
-        </p:sp>
         <p:cxnSp>
           <p:nvCxnSpPr>
             <p:cNvPr id="57" name="Straight Connector 56">
@@ -13822,57 +13771,6 @@
           </p:txBody>
         </p:sp>
       </p:grpSp>
-      <p:sp>
-        <p:nvSpPr>
-          <p:cNvPr id="15" name="Oval 14">
-            <a:extLst>
-              <a:ext uri="{FF2B5EF4-FFF2-40B4-BE49-F238E27FC236}">
-                <a16:creationId xmlns:a16="http://schemas.microsoft.com/office/drawing/2014/main" id="{CA7596E7-BA83-F84D-836A-73D6B918655C}"/>
-              </a:ext>
-            </a:extLst>
-          </p:cNvPr>
-          <p:cNvSpPr/>
-          <p:nvPr/>
-        </p:nvSpPr>
-        <p:spPr>
-          <a:xfrm rot="16200000" flipV="1">
-            <a:off x="10335875" y="6253400"/>
-            <a:ext cx="85562" cy="70962"/>
-          </a:xfrm>
-          <a:prstGeom prst="ellipse">
-            <a:avLst/>
-          </a:prstGeom>
-          <a:ln w="57150">
-            <a:solidFill>
-              <a:schemeClr val="accent1"/>
-            </a:solidFill>
-          </a:ln>
-        </p:spPr>
-        <p:style>
-          <a:lnRef idx="2">
-            <a:schemeClr val="accent1">
-              <a:shade val="50000"/>
-            </a:schemeClr>
-          </a:lnRef>
-          <a:fillRef idx="1">
-            <a:schemeClr val="accent1"/>
-          </a:fillRef>
-          <a:effectRef idx="0">
-            <a:schemeClr val="accent1"/>
-          </a:effectRef>
-          <a:fontRef idx="minor">
-            <a:schemeClr val="lt1"/>
-          </a:fontRef>
-        </p:style>
-        <p:txBody>
-          <a:bodyPr rtlCol="0" anchor="ctr"/>
-          <a:lstStyle/>
-          <a:p>
-            <a:pPr algn="ctr"/>
-            <a:endParaRPr lang="en-IN" dirty="0"/>
-          </a:p>
-        </p:txBody>
-      </p:sp>
     </p:spTree>
     <p:extLst>
       <p:ext uri="{BB962C8B-B14F-4D97-AF65-F5344CB8AC3E}">

</xml_diff>